<commit_message>
added fun page on PPT
</commit_message>
<xml_diff>
--- a/docs/LaserChess.pptx
+++ b/docs/LaserChess.pptx
@@ -4,6 +4,9 @@
   <p:sldMasterIdLst>
     <p:sldMasterId id="2147483708" r:id="rId1"/>
   </p:sldMasterIdLst>
+  <p:notesMasterIdLst>
+    <p:notesMasterId r:id="rId15"/>
+  </p:notesMasterIdLst>
   <p:sldIdLst>
     <p:sldId id="256" r:id="rId2"/>
     <p:sldId id="257" r:id="rId3"/>
@@ -13,9 +16,11 @@
     <p:sldId id="261" r:id="rId7"/>
     <p:sldId id="262" r:id="rId8"/>
     <p:sldId id="263" r:id="rId9"/>
-    <p:sldId id="264" r:id="rId10"/>
-    <p:sldId id="265" r:id="rId11"/>
-    <p:sldId id="266" r:id="rId12"/>
+    <p:sldId id="268" r:id="rId10"/>
+    <p:sldId id="267" r:id="rId11"/>
+    <p:sldId id="264" r:id="rId12"/>
+    <p:sldId id="265" r:id="rId13"/>
+    <p:sldId id="266" r:id="rId14"/>
   </p:sldIdLst>
   <p:sldSz cx="9144000" cy="6858000" type="screen4x3"/>
   <p:notesSz cx="6858000" cy="9144000"/>
@@ -117,6 +122,1291 @@
 </p:presentation>
 </file>
 
+<file path=ppt/notesMasters/notesMaster1.xml><?xml version="1.0" encoding="utf-8"?>
+<p:notesMaster xmlns:a="http://schemas.openxmlformats.org/drawingml/2006/main" xmlns:r="http://schemas.openxmlformats.org/officeDocument/2006/relationships" xmlns:p="http://schemas.openxmlformats.org/presentationml/2006/main">
+  <p:cSld>
+    <p:bg>
+      <p:bgRef idx="1001">
+        <a:schemeClr val="bg1"/>
+      </p:bgRef>
+    </p:bg>
+    <p:spTree>
+      <p:nvGrpSpPr>
+        <p:cNvPr id="1" name=""/>
+        <p:cNvGrpSpPr/>
+        <p:nvPr/>
+      </p:nvGrpSpPr>
+      <p:grpSpPr>
+        <a:xfrm>
+          <a:off x="0" y="0"/>
+          <a:ext cx="0" cy="0"/>
+          <a:chOff x="0" y="0"/>
+          <a:chExt cx="0" cy="0"/>
+        </a:xfrm>
+      </p:grpSpPr>
+      <p:sp>
+        <p:nvSpPr>
+          <p:cNvPr id="2" name="Kopfzeilenplatzhalter 1"/>
+          <p:cNvSpPr>
+            <a:spLocks noGrp="1"/>
+          </p:cNvSpPr>
+          <p:nvPr>
+            <p:ph type="hdr" sz="quarter"/>
+          </p:nvPr>
+        </p:nvSpPr>
+        <p:spPr>
+          <a:xfrm>
+            <a:off x="0" y="0"/>
+            <a:ext cx="2971800" cy="457200"/>
+          </a:xfrm>
+          <a:prstGeom prst="rect">
+            <a:avLst/>
+          </a:prstGeom>
+        </p:spPr>
+        <p:txBody>
+          <a:bodyPr vert="horz" lIns="91440" tIns="45720" rIns="91440" bIns="45720" rtlCol="0"/>
+          <a:lstStyle>
+            <a:lvl1pPr algn="l">
+              <a:defRPr sz="1200"/>
+            </a:lvl1pPr>
+          </a:lstStyle>
+          <a:p>
+            <a:endParaRPr lang="de-CH"/>
+          </a:p>
+        </p:txBody>
+      </p:sp>
+      <p:sp>
+        <p:nvSpPr>
+          <p:cNvPr id="3" name="Datumsplatzhalter 2"/>
+          <p:cNvSpPr>
+            <a:spLocks noGrp="1"/>
+          </p:cNvSpPr>
+          <p:nvPr>
+            <p:ph type="dt" idx="1"/>
+          </p:nvPr>
+        </p:nvSpPr>
+        <p:spPr>
+          <a:xfrm>
+            <a:off x="3884613" y="0"/>
+            <a:ext cx="2971800" cy="457200"/>
+          </a:xfrm>
+          <a:prstGeom prst="rect">
+            <a:avLst/>
+          </a:prstGeom>
+        </p:spPr>
+        <p:txBody>
+          <a:bodyPr vert="horz" lIns="91440" tIns="45720" rIns="91440" bIns="45720" rtlCol="0"/>
+          <a:lstStyle>
+            <a:lvl1pPr algn="r">
+              <a:defRPr sz="1200"/>
+            </a:lvl1pPr>
+          </a:lstStyle>
+          <a:p>
+            <a:fld id="{9CCF7261-FAE9-431D-A535-F0D32AAE8354}" type="datetimeFigureOut">
+              <a:rPr lang="de-CH" smtClean="0"/>
+              <a:t>13.04.2012</a:t>
+            </a:fld>
+            <a:endParaRPr lang="de-CH"/>
+          </a:p>
+        </p:txBody>
+      </p:sp>
+      <p:sp>
+        <p:nvSpPr>
+          <p:cNvPr id="4" name="Folienbildplatzhalter 3"/>
+          <p:cNvSpPr>
+            <a:spLocks noGrp="1" noRot="1" noChangeAspect="1"/>
+          </p:cNvSpPr>
+          <p:nvPr>
+            <p:ph type="sldImg" idx="2"/>
+          </p:nvPr>
+        </p:nvSpPr>
+        <p:spPr>
+          <a:xfrm>
+            <a:off x="1143000" y="685800"/>
+            <a:ext cx="4572000" cy="3429000"/>
+          </a:xfrm>
+          <a:prstGeom prst="rect">
+            <a:avLst/>
+          </a:prstGeom>
+          <a:noFill/>
+          <a:ln w="12700">
+            <a:solidFill>
+              <a:prstClr val="black"/>
+            </a:solidFill>
+          </a:ln>
+        </p:spPr>
+        <p:txBody>
+          <a:bodyPr vert="horz" lIns="91440" tIns="45720" rIns="91440" bIns="45720" rtlCol="0" anchor="ctr"/>
+          <a:lstStyle/>
+          <a:p>
+            <a:endParaRPr lang="de-CH"/>
+          </a:p>
+        </p:txBody>
+      </p:sp>
+      <p:sp>
+        <p:nvSpPr>
+          <p:cNvPr id="5" name="Notizenplatzhalter 4"/>
+          <p:cNvSpPr>
+            <a:spLocks noGrp="1"/>
+          </p:cNvSpPr>
+          <p:nvPr>
+            <p:ph type="body" sz="quarter" idx="3"/>
+          </p:nvPr>
+        </p:nvSpPr>
+        <p:spPr>
+          <a:xfrm>
+            <a:off x="685800" y="4343400"/>
+            <a:ext cx="5486400" cy="4114800"/>
+          </a:xfrm>
+          <a:prstGeom prst="rect">
+            <a:avLst/>
+          </a:prstGeom>
+        </p:spPr>
+        <p:txBody>
+          <a:bodyPr vert="horz" lIns="91440" tIns="45720" rIns="91440" bIns="45720" rtlCol="0">
+            <a:normAutofit/>
+          </a:bodyPr>
+          <a:lstStyle/>
+          <a:p>
+            <a:pPr lvl="0"/>
+            <a:r>
+              <a:rPr lang="de-DE" smtClean="0"/>
+              <a:t>Textmasterformate durch Klicken bearbeiten</a:t>
+            </a:r>
+          </a:p>
+          <a:p>
+            <a:pPr lvl="1"/>
+            <a:r>
+              <a:rPr lang="de-DE" smtClean="0"/>
+              <a:t>Zweite Ebene</a:t>
+            </a:r>
+          </a:p>
+          <a:p>
+            <a:pPr lvl="2"/>
+            <a:r>
+              <a:rPr lang="de-DE" smtClean="0"/>
+              <a:t>Dritte Ebene</a:t>
+            </a:r>
+          </a:p>
+          <a:p>
+            <a:pPr lvl="3"/>
+            <a:r>
+              <a:rPr lang="de-DE" smtClean="0"/>
+              <a:t>Vierte Ebene</a:t>
+            </a:r>
+          </a:p>
+          <a:p>
+            <a:pPr lvl="4"/>
+            <a:r>
+              <a:rPr lang="de-DE" smtClean="0"/>
+              <a:t>Fünfte Ebene</a:t>
+            </a:r>
+            <a:endParaRPr lang="de-CH"/>
+          </a:p>
+        </p:txBody>
+      </p:sp>
+      <p:sp>
+        <p:nvSpPr>
+          <p:cNvPr id="6" name="Fußzeilenplatzhalter 5"/>
+          <p:cNvSpPr>
+            <a:spLocks noGrp="1"/>
+          </p:cNvSpPr>
+          <p:nvPr>
+            <p:ph type="ftr" sz="quarter" idx="4"/>
+          </p:nvPr>
+        </p:nvSpPr>
+        <p:spPr>
+          <a:xfrm>
+            <a:off x="0" y="8685213"/>
+            <a:ext cx="2971800" cy="457200"/>
+          </a:xfrm>
+          <a:prstGeom prst="rect">
+            <a:avLst/>
+          </a:prstGeom>
+        </p:spPr>
+        <p:txBody>
+          <a:bodyPr vert="horz" lIns="91440" tIns="45720" rIns="91440" bIns="45720" rtlCol="0" anchor="b"/>
+          <a:lstStyle>
+            <a:lvl1pPr algn="l">
+              <a:defRPr sz="1200"/>
+            </a:lvl1pPr>
+          </a:lstStyle>
+          <a:p>
+            <a:endParaRPr lang="de-CH"/>
+          </a:p>
+        </p:txBody>
+      </p:sp>
+      <p:sp>
+        <p:nvSpPr>
+          <p:cNvPr id="7" name="Foliennummernplatzhalter 6"/>
+          <p:cNvSpPr>
+            <a:spLocks noGrp="1"/>
+          </p:cNvSpPr>
+          <p:nvPr>
+            <p:ph type="sldNum" sz="quarter" idx="5"/>
+          </p:nvPr>
+        </p:nvSpPr>
+        <p:spPr>
+          <a:xfrm>
+            <a:off x="3884613" y="8685213"/>
+            <a:ext cx="2971800" cy="457200"/>
+          </a:xfrm>
+          <a:prstGeom prst="rect">
+            <a:avLst/>
+          </a:prstGeom>
+        </p:spPr>
+        <p:txBody>
+          <a:bodyPr vert="horz" lIns="91440" tIns="45720" rIns="91440" bIns="45720" rtlCol="0" anchor="b"/>
+          <a:lstStyle>
+            <a:lvl1pPr algn="r">
+              <a:defRPr sz="1200"/>
+            </a:lvl1pPr>
+          </a:lstStyle>
+          <a:p>
+            <a:fld id="{485DD82D-527C-48E8-9B47-36C7BFBD461B}" type="slidenum">
+              <a:rPr lang="de-CH" smtClean="0"/>
+              <a:t>‹Nr.›</a:t>
+            </a:fld>
+            <a:endParaRPr lang="de-CH"/>
+          </a:p>
+        </p:txBody>
+      </p:sp>
+    </p:spTree>
+  </p:cSld>
+  <p:clrMap bg1="lt1" tx1="dk1" bg2="lt2" tx2="dk2" accent1="accent1" accent2="accent2" accent3="accent3" accent4="accent4" accent5="accent5" accent6="accent6" hlink="hlink" folHlink="folHlink"/>
+  <p:notesStyle>
+    <a:lvl1pPr marL="0" algn="l" defTabSz="914400" rtl="0" eaLnBrk="1" latinLnBrk="0" hangingPunct="1">
+      <a:defRPr sz="1200" kern="1200">
+        <a:solidFill>
+          <a:schemeClr val="tx1"/>
+        </a:solidFill>
+        <a:latin typeface="+mn-lt"/>
+        <a:ea typeface="+mn-ea"/>
+        <a:cs typeface="+mn-cs"/>
+      </a:defRPr>
+    </a:lvl1pPr>
+    <a:lvl2pPr marL="457200" algn="l" defTabSz="914400" rtl="0" eaLnBrk="1" latinLnBrk="0" hangingPunct="1">
+      <a:defRPr sz="1200" kern="1200">
+        <a:solidFill>
+          <a:schemeClr val="tx1"/>
+        </a:solidFill>
+        <a:latin typeface="+mn-lt"/>
+        <a:ea typeface="+mn-ea"/>
+        <a:cs typeface="+mn-cs"/>
+      </a:defRPr>
+    </a:lvl2pPr>
+    <a:lvl3pPr marL="914400" algn="l" defTabSz="914400" rtl="0" eaLnBrk="1" latinLnBrk="0" hangingPunct="1">
+      <a:defRPr sz="1200" kern="1200">
+        <a:solidFill>
+          <a:schemeClr val="tx1"/>
+        </a:solidFill>
+        <a:latin typeface="+mn-lt"/>
+        <a:ea typeface="+mn-ea"/>
+        <a:cs typeface="+mn-cs"/>
+      </a:defRPr>
+    </a:lvl3pPr>
+    <a:lvl4pPr marL="1371600" algn="l" defTabSz="914400" rtl="0" eaLnBrk="1" latinLnBrk="0" hangingPunct="1">
+      <a:defRPr sz="1200" kern="1200">
+        <a:solidFill>
+          <a:schemeClr val="tx1"/>
+        </a:solidFill>
+        <a:latin typeface="+mn-lt"/>
+        <a:ea typeface="+mn-ea"/>
+        <a:cs typeface="+mn-cs"/>
+      </a:defRPr>
+    </a:lvl4pPr>
+    <a:lvl5pPr marL="1828800" algn="l" defTabSz="914400" rtl="0" eaLnBrk="1" latinLnBrk="0" hangingPunct="1">
+      <a:defRPr sz="1200" kern="1200">
+        <a:solidFill>
+          <a:schemeClr val="tx1"/>
+        </a:solidFill>
+        <a:latin typeface="+mn-lt"/>
+        <a:ea typeface="+mn-ea"/>
+        <a:cs typeface="+mn-cs"/>
+      </a:defRPr>
+    </a:lvl5pPr>
+    <a:lvl6pPr marL="2286000" algn="l" defTabSz="914400" rtl="0" eaLnBrk="1" latinLnBrk="0" hangingPunct="1">
+      <a:defRPr sz="1200" kern="1200">
+        <a:solidFill>
+          <a:schemeClr val="tx1"/>
+        </a:solidFill>
+        <a:latin typeface="+mn-lt"/>
+        <a:ea typeface="+mn-ea"/>
+        <a:cs typeface="+mn-cs"/>
+      </a:defRPr>
+    </a:lvl6pPr>
+    <a:lvl7pPr marL="2743200" algn="l" defTabSz="914400" rtl="0" eaLnBrk="1" latinLnBrk="0" hangingPunct="1">
+      <a:defRPr sz="1200" kern="1200">
+        <a:solidFill>
+          <a:schemeClr val="tx1"/>
+        </a:solidFill>
+        <a:latin typeface="+mn-lt"/>
+        <a:ea typeface="+mn-ea"/>
+        <a:cs typeface="+mn-cs"/>
+      </a:defRPr>
+    </a:lvl7pPr>
+    <a:lvl8pPr marL="3200400" algn="l" defTabSz="914400" rtl="0" eaLnBrk="1" latinLnBrk="0" hangingPunct="1">
+      <a:defRPr sz="1200" kern="1200">
+        <a:solidFill>
+          <a:schemeClr val="tx1"/>
+        </a:solidFill>
+        <a:latin typeface="+mn-lt"/>
+        <a:ea typeface="+mn-ea"/>
+        <a:cs typeface="+mn-cs"/>
+      </a:defRPr>
+    </a:lvl8pPr>
+    <a:lvl9pPr marL="3657600" algn="l" defTabSz="914400" rtl="0" eaLnBrk="1" latinLnBrk="0" hangingPunct="1">
+      <a:defRPr sz="1200" kern="1200">
+        <a:solidFill>
+          <a:schemeClr val="tx1"/>
+        </a:solidFill>
+        <a:latin typeface="+mn-lt"/>
+        <a:ea typeface="+mn-ea"/>
+        <a:cs typeface="+mn-cs"/>
+      </a:defRPr>
+    </a:lvl9pPr>
+  </p:notesStyle>
+</p:notesMaster>
+</file>
+
+<file path=ppt/notesSlides/notesSlide1.xml><?xml version="1.0" encoding="utf-8"?>
+<p:notes xmlns:a="http://schemas.openxmlformats.org/drawingml/2006/main" xmlns:r="http://schemas.openxmlformats.org/officeDocument/2006/relationships" xmlns:p="http://schemas.openxmlformats.org/presentationml/2006/main">
+  <p:cSld>
+    <p:spTree>
+      <p:nvGrpSpPr>
+        <p:cNvPr id="1" name=""/>
+        <p:cNvGrpSpPr/>
+        <p:nvPr/>
+      </p:nvGrpSpPr>
+      <p:grpSpPr>
+        <a:xfrm>
+          <a:off x="0" y="0"/>
+          <a:ext cx="0" cy="0"/>
+          <a:chOff x="0" y="0"/>
+          <a:chExt cx="0" cy="0"/>
+        </a:xfrm>
+      </p:grpSpPr>
+      <p:sp>
+        <p:nvSpPr>
+          <p:cNvPr id="2" name="Folienbildplatzhalter 1"/>
+          <p:cNvSpPr>
+            <a:spLocks noGrp="1" noRot="1" noChangeAspect="1"/>
+          </p:cNvSpPr>
+          <p:nvPr>
+            <p:ph type="sldImg"/>
+          </p:nvPr>
+        </p:nvSpPr>
+        <p:spPr/>
+      </p:sp>
+      <p:sp>
+        <p:nvSpPr>
+          <p:cNvPr id="3" name="Notizenplatzhalter 2"/>
+          <p:cNvSpPr>
+            <a:spLocks noGrp="1"/>
+          </p:cNvSpPr>
+          <p:nvPr>
+            <p:ph type="body" idx="1"/>
+          </p:nvPr>
+        </p:nvSpPr>
+        <p:spPr/>
+        <p:txBody>
+          <a:bodyPr>
+            <a:normAutofit/>
+          </a:bodyPr>
+          <a:lstStyle/>
+          <a:p>
+            <a:pPr marL="0" marR="0" indent="0" algn="l" defTabSz="914400" rtl="0" eaLnBrk="1" fontAlgn="auto" latinLnBrk="0" hangingPunct="1">
+              <a:lnSpc>
+                <a:spcPct val="100000"/>
+              </a:lnSpc>
+              <a:spcBef>
+                <a:spcPts val="0"/>
+              </a:spcBef>
+              <a:spcAft>
+                <a:spcPts val="0"/>
+              </a:spcAft>
+              <a:buClrTx/>
+              <a:buSzTx/>
+              <a:buFontTx/>
+              <a:buNone/>
+              <a:tabLst/>
+              <a:defRPr/>
+            </a:pPr>
+            <a:r>
+              <a:rPr lang="de-CH" dirty="0" smtClean="0"/>
+              <a:t>U </a:t>
+            </a:r>
+            <a:r>
+              <a:rPr lang="de-CH" dirty="0" err="1" smtClean="0"/>
+              <a:t>me</a:t>
+            </a:r>
+            <a:r>
+              <a:rPr lang="de-CH" dirty="0" smtClean="0"/>
+              <a:t> </a:t>
+            </a:r>
+            <a:r>
+              <a:rPr lang="de-CH" dirty="0" err="1" smtClean="0"/>
+              <a:t>het</a:t>
+            </a:r>
+            <a:r>
+              <a:rPr lang="de-CH" dirty="0" smtClean="0"/>
+              <a:t> o </a:t>
+            </a:r>
+            <a:r>
+              <a:rPr lang="de-CH" dirty="0" err="1" smtClean="0"/>
+              <a:t>viu</a:t>
+            </a:r>
+            <a:r>
+              <a:rPr lang="de-CH" dirty="0" smtClean="0"/>
+              <a:t> spass </a:t>
+            </a:r>
+            <a:r>
+              <a:rPr lang="de-CH" dirty="0" err="1" smtClean="0"/>
+              <a:t>derbi</a:t>
+            </a:r>
+            <a:r>
+              <a:rPr lang="de-CH" dirty="0" smtClean="0"/>
+              <a:t>..</a:t>
+            </a:r>
+            <a:endParaRPr lang="de-CH" baseline="0" dirty="0" smtClean="0"/>
+          </a:p>
+          <a:p>
+            <a:r>
+              <a:rPr lang="de-CH" baseline="0" dirty="0" smtClean="0"/>
+              <a:t>Hie </a:t>
+            </a:r>
+            <a:r>
+              <a:rPr lang="de-CH" baseline="0" dirty="0" err="1" smtClean="0"/>
+              <a:t>heimer</a:t>
+            </a:r>
+            <a:r>
+              <a:rPr lang="de-CH" baseline="0" dirty="0" smtClean="0"/>
+              <a:t> z.B. e </a:t>
+            </a:r>
+            <a:r>
+              <a:rPr lang="de-CH" baseline="0" dirty="0" err="1" smtClean="0"/>
+              <a:t>nöiartigi</a:t>
+            </a:r>
+            <a:r>
+              <a:rPr lang="de-CH" baseline="0" dirty="0" smtClean="0"/>
+              <a:t> programmier Workstation erschaffe,  sehr praktisch </a:t>
+            </a:r>
+            <a:r>
+              <a:rPr lang="de-CH" baseline="0" dirty="0" err="1" smtClean="0"/>
+              <a:t>weme</a:t>
+            </a:r>
+            <a:r>
+              <a:rPr lang="de-CH" baseline="0" dirty="0" smtClean="0"/>
+              <a:t> </a:t>
+            </a:r>
+            <a:r>
+              <a:rPr lang="de-CH" baseline="0" dirty="0" err="1" smtClean="0"/>
+              <a:t>chli</a:t>
+            </a:r>
+            <a:r>
+              <a:rPr lang="de-CH" baseline="0" dirty="0" smtClean="0"/>
+              <a:t> </a:t>
+            </a:r>
+            <a:r>
+              <a:rPr lang="de-CH" baseline="0" dirty="0" err="1" smtClean="0"/>
+              <a:t>meh</a:t>
+            </a:r>
+            <a:r>
+              <a:rPr lang="de-CH" baseline="0" dirty="0" smtClean="0"/>
+              <a:t> </a:t>
+            </a:r>
+            <a:r>
+              <a:rPr lang="de-CH" baseline="0" dirty="0" err="1" smtClean="0"/>
+              <a:t>zile</a:t>
+            </a:r>
+            <a:r>
+              <a:rPr lang="de-CH" baseline="0" dirty="0" smtClean="0"/>
+              <a:t> </a:t>
+            </a:r>
+            <a:r>
+              <a:rPr lang="de-CH" baseline="0" dirty="0" err="1" smtClean="0"/>
+              <a:t>wott</a:t>
+            </a:r>
+            <a:r>
+              <a:rPr lang="de-CH" baseline="0" dirty="0" smtClean="0"/>
+              <a:t> </a:t>
+            </a:r>
+            <a:r>
+              <a:rPr lang="de-CH" baseline="0" dirty="0" err="1" smtClean="0"/>
+              <a:t>aazeige</a:t>
+            </a:r>
+            <a:r>
+              <a:rPr lang="de-CH" baseline="0" dirty="0" smtClean="0"/>
+              <a:t>.</a:t>
+            </a:r>
+          </a:p>
+          <a:p>
+            <a:endParaRPr lang="de-CH" baseline="0" dirty="0" smtClean="0"/>
+          </a:p>
+          <a:p>
+            <a:endParaRPr lang="de-CH" dirty="0"/>
+          </a:p>
+        </p:txBody>
+      </p:sp>
+      <p:sp>
+        <p:nvSpPr>
+          <p:cNvPr id="4" name="Foliennummernplatzhalter 3"/>
+          <p:cNvSpPr>
+            <a:spLocks noGrp="1"/>
+          </p:cNvSpPr>
+          <p:nvPr>
+            <p:ph type="sldNum" sz="quarter" idx="10"/>
+          </p:nvPr>
+        </p:nvSpPr>
+        <p:spPr/>
+        <p:txBody>
+          <a:bodyPr/>
+          <a:lstStyle/>
+          <a:p>
+            <a:fld id="{485DD82D-527C-48E8-9B47-36C7BFBD461B}" type="slidenum">
+              <a:rPr lang="de-CH" smtClean="0"/>
+              <a:t>9</a:t>
+            </a:fld>
+            <a:endParaRPr lang="de-CH"/>
+          </a:p>
+        </p:txBody>
+      </p:sp>
+    </p:spTree>
+  </p:cSld>
+  <p:clrMapOvr>
+    <a:masterClrMapping/>
+  </p:clrMapOvr>
+</p:notes>
+</file>
+
+<file path=ppt/notesSlides/notesSlide2.xml><?xml version="1.0" encoding="utf-8"?>
+<p:notes xmlns:a="http://schemas.openxmlformats.org/drawingml/2006/main" xmlns:r="http://schemas.openxmlformats.org/officeDocument/2006/relationships" xmlns:p="http://schemas.openxmlformats.org/presentationml/2006/main">
+  <p:cSld>
+    <p:spTree>
+      <p:nvGrpSpPr>
+        <p:cNvPr id="1" name=""/>
+        <p:cNvGrpSpPr/>
+        <p:nvPr/>
+      </p:nvGrpSpPr>
+      <p:grpSpPr>
+        <a:xfrm>
+          <a:off x="0" y="0"/>
+          <a:ext cx="0" cy="0"/>
+          <a:chOff x="0" y="0"/>
+          <a:chExt cx="0" cy="0"/>
+        </a:xfrm>
+      </p:grpSpPr>
+      <p:sp>
+        <p:nvSpPr>
+          <p:cNvPr id="2" name="Folienbildplatzhalter 1"/>
+          <p:cNvSpPr>
+            <a:spLocks noGrp="1" noRot="1" noChangeAspect="1"/>
+          </p:cNvSpPr>
+          <p:nvPr>
+            <p:ph type="sldImg"/>
+          </p:nvPr>
+        </p:nvSpPr>
+        <p:spPr/>
+      </p:sp>
+      <p:sp>
+        <p:nvSpPr>
+          <p:cNvPr id="3" name="Notizenplatzhalter 2"/>
+          <p:cNvSpPr>
+            <a:spLocks noGrp="1"/>
+          </p:cNvSpPr>
+          <p:nvPr>
+            <p:ph type="body" idx="1"/>
+          </p:nvPr>
+        </p:nvSpPr>
+        <p:spPr/>
+        <p:txBody>
+          <a:bodyPr>
+            <a:normAutofit/>
+          </a:bodyPr>
+          <a:lstStyle/>
+          <a:p>
+            <a:r>
+              <a:rPr lang="de-CH" dirty="0" smtClean="0"/>
+              <a:t>Es</a:t>
+            </a:r>
+            <a:r>
+              <a:rPr lang="de-CH" baseline="0" dirty="0" smtClean="0"/>
+              <a:t> </a:t>
+            </a:r>
+            <a:r>
+              <a:rPr lang="de-CH" baseline="0" dirty="0" err="1" smtClean="0"/>
+              <a:t>cha</a:t>
+            </a:r>
+            <a:r>
+              <a:rPr lang="de-CH" baseline="0" dirty="0" smtClean="0"/>
+              <a:t> o </a:t>
+            </a:r>
+            <a:r>
+              <a:rPr lang="de-CH" baseline="0" dirty="0" err="1" smtClean="0"/>
+              <a:t>guet</a:t>
+            </a:r>
+            <a:r>
+              <a:rPr lang="de-CH" baseline="0" dirty="0" smtClean="0"/>
+              <a:t> mau </a:t>
+            </a:r>
+            <a:r>
+              <a:rPr lang="de-CH" baseline="0" dirty="0" err="1" smtClean="0"/>
+              <a:t>vorcho</a:t>
+            </a:r>
+            <a:r>
+              <a:rPr lang="de-CH" baseline="0" dirty="0" smtClean="0"/>
+              <a:t>, </a:t>
+            </a:r>
+            <a:r>
+              <a:rPr lang="de-CH" baseline="0" dirty="0" err="1" smtClean="0"/>
+              <a:t>dasme</a:t>
+            </a:r>
+            <a:r>
+              <a:rPr lang="de-CH" baseline="0" dirty="0" smtClean="0"/>
+              <a:t> </a:t>
+            </a:r>
+            <a:r>
+              <a:rPr lang="de-CH" baseline="0" dirty="0" err="1" smtClean="0"/>
+              <a:t>vougendi</a:t>
+            </a:r>
+            <a:r>
+              <a:rPr lang="de-CH" baseline="0" dirty="0" smtClean="0"/>
+              <a:t> Funktion </a:t>
+            </a:r>
+            <a:r>
+              <a:rPr lang="de-CH" baseline="0" dirty="0" err="1" smtClean="0"/>
+              <a:t>het</a:t>
+            </a:r>
+            <a:r>
+              <a:rPr lang="de-CH" baseline="0" dirty="0" smtClean="0"/>
+              <a:t>, wo e </a:t>
+            </a:r>
+            <a:r>
+              <a:rPr lang="de-CH" baseline="0" dirty="0" err="1" smtClean="0"/>
+              <a:t>Berichsüberprüefig</a:t>
+            </a:r>
+            <a:r>
+              <a:rPr lang="de-CH" baseline="0" dirty="0" smtClean="0"/>
+              <a:t> macht und Rückgabewärt 0 oder 1 </a:t>
+            </a:r>
+            <a:r>
+              <a:rPr lang="de-CH" baseline="0" dirty="0" err="1" smtClean="0"/>
+              <a:t>het</a:t>
+            </a:r>
+            <a:r>
+              <a:rPr lang="de-CH" baseline="0" dirty="0" smtClean="0"/>
+              <a:t>.</a:t>
+            </a:r>
+          </a:p>
+          <a:p>
+            <a:r>
+              <a:rPr lang="de-CH" baseline="0" dirty="0" err="1" smtClean="0"/>
+              <a:t>När</a:t>
+            </a:r>
+            <a:r>
+              <a:rPr lang="de-CH" baseline="0" dirty="0" smtClean="0"/>
+              <a:t> </a:t>
+            </a:r>
+            <a:r>
+              <a:rPr lang="de-CH" baseline="0" dirty="0" err="1" smtClean="0"/>
+              <a:t>schribt</a:t>
+            </a:r>
+            <a:r>
+              <a:rPr lang="de-CH" baseline="0" dirty="0" smtClean="0"/>
+              <a:t> </a:t>
+            </a:r>
+            <a:r>
+              <a:rPr lang="de-CH" baseline="0" dirty="0" err="1" smtClean="0"/>
+              <a:t>me</a:t>
+            </a:r>
+            <a:r>
+              <a:rPr lang="de-CH" baseline="0" dirty="0" smtClean="0"/>
+              <a:t> so </a:t>
+            </a:r>
+            <a:r>
+              <a:rPr lang="de-CH" baseline="0" dirty="0" err="1" smtClean="0"/>
+              <a:t>us</a:t>
+            </a:r>
+            <a:r>
+              <a:rPr lang="de-CH" baseline="0" dirty="0" smtClean="0"/>
+              <a:t> spass </a:t>
+            </a:r>
+            <a:r>
+              <a:rPr lang="de-CH" baseline="0" dirty="0" err="1" smtClean="0"/>
+              <a:t>no</a:t>
+            </a:r>
+            <a:r>
+              <a:rPr lang="de-CH" baseline="0" dirty="0" smtClean="0"/>
+              <a:t> das häre:</a:t>
+            </a:r>
+          </a:p>
+          <a:p>
+            <a:r>
+              <a:rPr lang="de-CH" baseline="0" dirty="0" smtClean="0"/>
+              <a:t>Und </a:t>
+            </a:r>
+            <a:r>
+              <a:rPr lang="de-CH" baseline="0" dirty="0" err="1" smtClean="0"/>
+              <a:t>wome</a:t>
+            </a:r>
+            <a:r>
+              <a:rPr lang="de-CH" baseline="0" dirty="0" smtClean="0"/>
+              <a:t> nach fasch 2 </a:t>
+            </a:r>
+            <a:r>
+              <a:rPr lang="de-CH" baseline="0" dirty="0" err="1" smtClean="0"/>
+              <a:t>wuche</a:t>
+            </a:r>
+            <a:r>
+              <a:rPr lang="de-CH" baseline="0" dirty="0" smtClean="0"/>
+              <a:t> </a:t>
+            </a:r>
+            <a:r>
+              <a:rPr lang="de-CH" baseline="0" dirty="0" err="1" smtClean="0"/>
+              <a:t>dr</a:t>
+            </a:r>
+            <a:r>
+              <a:rPr lang="de-CH" baseline="0" dirty="0" smtClean="0"/>
+              <a:t> aktuell </a:t>
+            </a:r>
+            <a:r>
+              <a:rPr lang="de-CH" baseline="0" dirty="0" err="1" smtClean="0"/>
+              <a:t>code</a:t>
+            </a:r>
+            <a:r>
+              <a:rPr lang="de-CH" baseline="0" dirty="0" smtClean="0"/>
+              <a:t> </a:t>
+            </a:r>
+            <a:r>
+              <a:rPr lang="de-CH" baseline="0" dirty="0" err="1" smtClean="0"/>
+              <a:t>düreluegt</a:t>
+            </a:r>
+            <a:r>
+              <a:rPr lang="de-CH" baseline="0" dirty="0" smtClean="0"/>
+              <a:t>, </a:t>
+            </a:r>
+            <a:r>
+              <a:rPr lang="de-CH" baseline="0" dirty="0" err="1" smtClean="0"/>
+              <a:t>gseht</a:t>
+            </a:r>
+            <a:r>
+              <a:rPr lang="de-CH" baseline="0" dirty="0" smtClean="0"/>
+              <a:t> </a:t>
+            </a:r>
+            <a:r>
+              <a:rPr lang="de-CH" baseline="0" dirty="0" err="1" smtClean="0"/>
+              <a:t>me</a:t>
+            </a:r>
+            <a:r>
+              <a:rPr lang="de-CH" baseline="0" dirty="0" smtClean="0"/>
+              <a:t> </a:t>
+            </a:r>
+            <a:r>
+              <a:rPr lang="de-CH" baseline="0" dirty="0" err="1" smtClean="0"/>
+              <a:t>fougendes</a:t>
+            </a:r>
+            <a:r>
+              <a:rPr lang="de-CH" baseline="0" dirty="0" smtClean="0"/>
+              <a:t>:</a:t>
+            </a:r>
+          </a:p>
+        </p:txBody>
+      </p:sp>
+      <p:sp>
+        <p:nvSpPr>
+          <p:cNvPr id="4" name="Foliennummernplatzhalter 3"/>
+          <p:cNvSpPr>
+            <a:spLocks noGrp="1"/>
+          </p:cNvSpPr>
+          <p:nvPr>
+            <p:ph type="sldNum" sz="quarter" idx="10"/>
+          </p:nvPr>
+        </p:nvSpPr>
+        <p:spPr/>
+        <p:txBody>
+          <a:bodyPr/>
+          <a:lstStyle/>
+          <a:p>
+            <a:fld id="{485DD82D-527C-48E8-9B47-36C7BFBD461B}" type="slidenum">
+              <a:rPr lang="de-CH" smtClean="0"/>
+              <a:t>10</a:t>
+            </a:fld>
+            <a:endParaRPr lang="de-CH"/>
+          </a:p>
+        </p:txBody>
+      </p:sp>
+    </p:spTree>
+  </p:cSld>
+  <p:clrMapOvr>
+    <a:masterClrMapping/>
+  </p:clrMapOvr>
+</p:notes>
+</file>
+
+<file path=ppt/notesSlides/notesSlide3.xml><?xml version="1.0" encoding="utf-8"?>
+<p:notes xmlns:a="http://schemas.openxmlformats.org/drawingml/2006/main" xmlns:r="http://schemas.openxmlformats.org/officeDocument/2006/relationships" xmlns:p="http://schemas.openxmlformats.org/presentationml/2006/main">
+  <p:cSld>
+    <p:spTree>
+      <p:nvGrpSpPr>
+        <p:cNvPr id="1" name=""/>
+        <p:cNvGrpSpPr/>
+        <p:nvPr/>
+      </p:nvGrpSpPr>
+      <p:grpSpPr>
+        <a:xfrm>
+          <a:off x="0" y="0"/>
+          <a:ext cx="0" cy="0"/>
+          <a:chOff x="0" y="0"/>
+          <a:chExt cx="0" cy="0"/>
+        </a:xfrm>
+      </p:grpSpPr>
+      <p:sp>
+        <p:nvSpPr>
+          <p:cNvPr id="2" name="Folienbildplatzhalter 1"/>
+          <p:cNvSpPr>
+            <a:spLocks noGrp="1" noRot="1" noChangeAspect="1"/>
+          </p:cNvSpPr>
+          <p:nvPr>
+            <p:ph type="sldImg"/>
+          </p:nvPr>
+        </p:nvSpPr>
+        <p:spPr/>
+      </p:sp>
+      <p:sp>
+        <p:nvSpPr>
+          <p:cNvPr id="3" name="Notizenplatzhalter 2"/>
+          <p:cNvSpPr>
+            <a:spLocks noGrp="1"/>
+          </p:cNvSpPr>
+          <p:nvPr>
+            <p:ph type="body" idx="1"/>
+          </p:nvPr>
+        </p:nvSpPr>
+        <p:spPr/>
+        <p:txBody>
+          <a:bodyPr>
+            <a:normAutofit/>
+          </a:bodyPr>
+          <a:lstStyle/>
+          <a:p>
+            <a:r>
+              <a:rPr lang="de-CH" baseline="0" dirty="0" smtClean="0"/>
+              <a:t>Mir hei </a:t>
+            </a:r>
+            <a:r>
+              <a:rPr lang="de-CH" baseline="0" dirty="0" err="1" smtClean="0"/>
+              <a:t>beschlosse</a:t>
+            </a:r>
+            <a:r>
+              <a:rPr lang="de-CH" baseline="0" dirty="0" smtClean="0"/>
+              <a:t>, d Versionskontrolle mit </a:t>
+            </a:r>
+            <a:r>
+              <a:rPr lang="de-CH" baseline="0" dirty="0" err="1" smtClean="0"/>
+              <a:t>Git</a:t>
+            </a:r>
+            <a:r>
+              <a:rPr lang="de-CH" baseline="0" dirty="0" smtClean="0"/>
+              <a:t> z mache und </a:t>
+            </a:r>
+            <a:r>
+              <a:rPr lang="de-CH" baseline="0" dirty="0" err="1" smtClean="0"/>
+              <a:t>nid</a:t>
+            </a:r>
+            <a:r>
+              <a:rPr lang="de-CH" baseline="0" dirty="0" smtClean="0"/>
+              <a:t> mit SVN und hei </a:t>
+            </a:r>
+            <a:r>
+              <a:rPr lang="de-CH" baseline="0" dirty="0" err="1" smtClean="0"/>
+              <a:t>dadermit</a:t>
+            </a:r>
+            <a:r>
+              <a:rPr lang="de-CH" baseline="0" dirty="0" smtClean="0"/>
+              <a:t> </a:t>
+            </a:r>
+            <a:r>
+              <a:rPr lang="de-CH" baseline="0" dirty="0" err="1" smtClean="0"/>
+              <a:t>mitem</a:t>
+            </a:r>
+            <a:r>
+              <a:rPr lang="de-CH" baseline="0" dirty="0" smtClean="0"/>
+              <a:t> Code Hosting Service </a:t>
+            </a:r>
+            <a:r>
+              <a:rPr lang="de-CH" baseline="0" dirty="0" err="1" smtClean="0"/>
+              <a:t>GitHub</a:t>
+            </a:r>
+            <a:r>
+              <a:rPr lang="de-CH" baseline="0" dirty="0" smtClean="0"/>
+              <a:t> </a:t>
+            </a:r>
+            <a:r>
+              <a:rPr lang="de-CH" baseline="0" dirty="0" err="1" smtClean="0"/>
+              <a:t>einigi</a:t>
+            </a:r>
+            <a:r>
+              <a:rPr lang="de-CH" baseline="0" dirty="0" smtClean="0"/>
+              <a:t> </a:t>
+            </a:r>
+            <a:r>
+              <a:rPr lang="de-CH" baseline="0" dirty="0" err="1" smtClean="0"/>
+              <a:t>gäbigi</a:t>
+            </a:r>
+            <a:r>
+              <a:rPr lang="de-CH" baseline="0" dirty="0" smtClean="0"/>
+              <a:t> Tools </a:t>
+            </a:r>
+            <a:r>
+              <a:rPr lang="de-CH" baseline="0" dirty="0" err="1" smtClean="0"/>
+              <a:t>chönne</a:t>
+            </a:r>
+            <a:r>
+              <a:rPr lang="de-CH" baseline="0" dirty="0" smtClean="0"/>
+              <a:t> </a:t>
+            </a:r>
+            <a:r>
+              <a:rPr lang="de-CH" baseline="0" dirty="0" err="1" smtClean="0"/>
+              <a:t>bruche</a:t>
+            </a:r>
+            <a:r>
+              <a:rPr lang="de-CH" baseline="0" dirty="0" smtClean="0"/>
+              <a:t>.</a:t>
+            </a:r>
+          </a:p>
+          <a:p>
+            <a:r>
+              <a:rPr lang="de-CH" baseline="0" dirty="0" smtClean="0"/>
+              <a:t>z.B. wird grafisch </a:t>
+            </a:r>
+            <a:r>
+              <a:rPr lang="de-CH" baseline="0" dirty="0" err="1" smtClean="0"/>
+              <a:t>aazeigt</a:t>
+            </a:r>
+            <a:r>
+              <a:rPr lang="de-CH" baseline="0" dirty="0" smtClean="0"/>
+              <a:t>, wie </a:t>
+            </a:r>
+            <a:r>
+              <a:rPr lang="de-CH" baseline="0" dirty="0" err="1" smtClean="0"/>
+              <a:t>dr</a:t>
+            </a:r>
+            <a:r>
+              <a:rPr lang="de-CH" baseline="0" dirty="0" smtClean="0"/>
+              <a:t> </a:t>
+            </a:r>
+            <a:r>
+              <a:rPr lang="de-CH" baseline="0" dirty="0" err="1" smtClean="0"/>
+              <a:t>verlouf</a:t>
+            </a:r>
+            <a:r>
+              <a:rPr lang="de-CH" baseline="0" dirty="0" smtClean="0"/>
+              <a:t> vom </a:t>
+            </a:r>
+            <a:r>
+              <a:rPr lang="de-CH" baseline="0" dirty="0" err="1" smtClean="0"/>
+              <a:t>code</a:t>
+            </a:r>
+            <a:r>
+              <a:rPr lang="de-CH" baseline="0" dirty="0" smtClean="0"/>
+              <a:t> </a:t>
+            </a:r>
+            <a:r>
+              <a:rPr lang="de-CH" baseline="0" dirty="0" err="1" smtClean="0"/>
+              <a:t>usgseht</a:t>
+            </a:r>
+            <a:r>
+              <a:rPr lang="de-CH" baseline="0" dirty="0" smtClean="0"/>
+              <a:t>:</a:t>
+            </a:r>
+          </a:p>
+          <a:p>
+            <a:endParaRPr lang="de-CH" baseline="0" dirty="0" smtClean="0"/>
+          </a:p>
+          <a:p>
+            <a:r>
+              <a:rPr lang="de-CH" baseline="0" dirty="0" smtClean="0"/>
+              <a:t>Das da </a:t>
+            </a:r>
+            <a:r>
+              <a:rPr lang="de-CH" baseline="0" dirty="0" err="1" smtClean="0"/>
+              <a:t>isch</a:t>
+            </a:r>
+            <a:r>
+              <a:rPr lang="de-CH" baseline="0" dirty="0" smtClean="0"/>
+              <a:t> e sehr </a:t>
+            </a:r>
+            <a:r>
+              <a:rPr lang="de-CH" baseline="0" dirty="0" err="1" smtClean="0"/>
+              <a:t>eifache</a:t>
+            </a:r>
+            <a:r>
+              <a:rPr lang="de-CH" baseline="0" dirty="0" smtClean="0"/>
+              <a:t> Workflow, </a:t>
+            </a:r>
+            <a:r>
+              <a:rPr lang="de-CH" baseline="0" dirty="0" err="1" smtClean="0"/>
+              <a:t>me</a:t>
+            </a:r>
+            <a:r>
+              <a:rPr lang="de-CH" baseline="0" dirty="0" smtClean="0"/>
+              <a:t> klinkt </a:t>
+            </a:r>
+            <a:r>
+              <a:rPr lang="de-CH" baseline="0" dirty="0" err="1" smtClean="0"/>
+              <a:t>sech</a:t>
+            </a:r>
+            <a:r>
+              <a:rPr lang="de-CH" baseline="0" dirty="0" smtClean="0"/>
+              <a:t> </a:t>
+            </a:r>
+            <a:r>
+              <a:rPr lang="de-CH" baseline="0" dirty="0" err="1" smtClean="0"/>
+              <a:t>sini</a:t>
+            </a:r>
+            <a:r>
+              <a:rPr lang="de-CH" baseline="0" dirty="0" smtClean="0"/>
+              <a:t> </a:t>
+            </a:r>
+            <a:r>
+              <a:rPr lang="de-CH" baseline="0" dirty="0" err="1" smtClean="0"/>
+              <a:t>version</a:t>
+            </a:r>
+            <a:r>
+              <a:rPr lang="de-CH" baseline="0" dirty="0" smtClean="0"/>
+              <a:t> irgendwo </a:t>
+            </a:r>
+            <a:r>
+              <a:rPr lang="de-CH" baseline="0" dirty="0" err="1" smtClean="0"/>
+              <a:t>us</a:t>
+            </a:r>
+            <a:r>
+              <a:rPr lang="de-CH" baseline="0" dirty="0" smtClean="0"/>
+              <a:t>, </a:t>
+            </a:r>
+            <a:r>
+              <a:rPr lang="de-CH" baseline="0" dirty="0" err="1" smtClean="0"/>
+              <a:t>änderet</a:t>
+            </a:r>
+            <a:r>
+              <a:rPr lang="de-CH" baseline="0" dirty="0" smtClean="0"/>
+              <a:t> säuber </a:t>
+            </a:r>
+            <a:r>
+              <a:rPr lang="de-CH" baseline="0" dirty="0" err="1" smtClean="0"/>
+              <a:t>öppis</a:t>
+            </a:r>
+            <a:r>
+              <a:rPr lang="de-CH" baseline="0" dirty="0" smtClean="0"/>
+              <a:t> </a:t>
+            </a:r>
+            <a:r>
+              <a:rPr lang="de-CH" baseline="0" dirty="0" err="1" smtClean="0"/>
+              <a:t>dranne</a:t>
+            </a:r>
+            <a:r>
+              <a:rPr lang="de-CH" baseline="0" dirty="0" smtClean="0"/>
+              <a:t> und </a:t>
+            </a:r>
+            <a:r>
+              <a:rPr lang="de-CH" baseline="0" dirty="0" err="1" smtClean="0"/>
+              <a:t>füegt</a:t>
+            </a:r>
+            <a:r>
+              <a:rPr lang="de-CH" baseline="0" dirty="0" smtClean="0"/>
+              <a:t> </a:t>
+            </a:r>
+            <a:r>
+              <a:rPr lang="de-CH" baseline="0" dirty="0" err="1" smtClean="0"/>
+              <a:t>när</a:t>
+            </a:r>
+            <a:r>
+              <a:rPr lang="de-CH" baseline="0" dirty="0" smtClean="0"/>
+              <a:t> </a:t>
+            </a:r>
+            <a:r>
+              <a:rPr lang="de-CH" baseline="0" dirty="0" err="1" smtClean="0"/>
+              <a:t>ungerschidlechi</a:t>
+            </a:r>
+            <a:r>
+              <a:rPr lang="de-CH" baseline="0" dirty="0" smtClean="0"/>
+              <a:t> </a:t>
+            </a:r>
+            <a:r>
+              <a:rPr lang="de-CH" baseline="0" dirty="0" err="1" smtClean="0"/>
+              <a:t>Änderige</a:t>
+            </a:r>
+            <a:r>
+              <a:rPr lang="de-CH" baseline="0" dirty="0" smtClean="0"/>
+              <a:t> wider </a:t>
+            </a:r>
+            <a:r>
+              <a:rPr lang="de-CH" baseline="0" dirty="0" err="1" smtClean="0"/>
+              <a:t>zäme</a:t>
+            </a:r>
+            <a:r>
+              <a:rPr lang="de-CH" baseline="0" dirty="0" smtClean="0"/>
+              <a:t>.</a:t>
+            </a:r>
+          </a:p>
+          <a:p>
+            <a:r>
+              <a:rPr lang="de-CH" baseline="0" dirty="0" smtClean="0"/>
+              <a:t>Das hie </a:t>
+            </a:r>
+            <a:r>
+              <a:rPr lang="de-CH" baseline="0" dirty="0" err="1" smtClean="0"/>
+              <a:t>isch</a:t>
+            </a:r>
+            <a:r>
+              <a:rPr lang="de-CH" baseline="0" dirty="0" smtClean="0"/>
+              <a:t> </a:t>
+            </a:r>
+            <a:r>
+              <a:rPr lang="de-CH" baseline="0" dirty="0" err="1" smtClean="0"/>
+              <a:t>chline</a:t>
+            </a:r>
+            <a:r>
+              <a:rPr lang="de-CH" baseline="0" dirty="0" smtClean="0"/>
+              <a:t> </a:t>
+            </a:r>
+            <a:r>
+              <a:rPr lang="de-CH" baseline="0" dirty="0" err="1" smtClean="0"/>
+              <a:t>komplizierteri</a:t>
+            </a:r>
+            <a:r>
+              <a:rPr lang="de-CH" baseline="0" dirty="0" smtClean="0"/>
+              <a:t> </a:t>
+            </a:r>
+            <a:r>
+              <a:rPr lang="de-CH" baseline="0" dirty="0" err="1" smtClean="0"/>
+              <a:t>situation</a:t>
+            </a:r>
+            <a:r>
+              <a:rPr lang="de-CH" baseline="0" dirty="0" smtClean="0"/>
+              <a:t> </a:t>
+            </a:r>
+            <a:r>
+              <a:rPr lang="de-CH" baseline="0" dirty="0" err="1" smtClean="0"/>
+              <a:t>wome</a:t>
+            </a:r>
+            <a:r>
+              <a:rPr lang="de-CH" baseline="0" dirty="0" smtClean="0"/>
+              <a:t> </a:t>
+            </a:r>
+            <a:r>
+              <a:rPr lang="de-CH" baseline="0" dirty="0" err="1" smtClean="0"/>
+              <a:t>viu</a:t>
+            </a:r>
+            <a:r>
+              <a:rPr lang="de-CH" baseline="0" dirty="0" smtClean="0"/>
+              <a:t> </a:t>
+            </a:r>
+            <a:r>
+              <a:rPr lang="de-CH" baseline="0" dirty="0" err="1" smtClean="0"/>
+              <a:t>glichzitigi</a:t>
+            </a:r>
+            <a:r>
+              <a:rPr lang="de-CH" baseline="0" dirty="0" smtClean="0"/>
+              <a:t> </a:t>
+            </a:r>
+            <a:r>
+              <a:rPr lang="de-CH" baseline="0" dirty="0" err="1" smtClean="0"/>
+              <a:t>änderige</a:t>
+            </a:r>
+            <a:r>
+              <a:rPr lang="de-CH" baseline="0" dirty="0" smtClean="0"/>
+              <a:t> </a:t>
+            </a:r>
+            <a:r>
+              <a:rPr lang="de-CH" baseline="0" dirty="0" err="1" smtClean="0"/>
+              <a:t>het</a:t>
+            </a:r>
+            <a:r>
+              <a:rPr lang="de-CH" baseline="0" dirty="0" smtClean="0"/>
+              <a:t> </a:t>
+            </a:r>
+            <a:r>
+              <a:rPr lang="de-CH" baseline="0" dirty="0" err="1" smtClean="0"/>
+              <a:t>vorgnoh</a:t>
+            </a:r>
+            <a:r>
+              <a:rPr lang="de-CH" baseline="0" dirty="0" smtClean="0"/>
+              <a:t>.</a:t>
+            </a:r>
+          </a:p>
+          <a:p>
+            <a:r>
+              <a:rPr lang="de-CH" baseline="0" dirty="0" smtClean="0"/>
+              <a:t>Und da </a:t>
+            </a:r>
+            <a:r>
+              <a:rPr lang="de-CH" baseline="0" dirty="0" err="1" smtClean="0"/>
+              <a:t>heimer</a:t>
+            </a:r>
+            <a:r>
+              <a:rPr lang="de-CH" baseline="0" dirty="0" smtClean="0"/>
+              <a:t> </a:t>
+            </a:r>
+            <a:r>
+              <a:rPr lang="de-CH" baseline="0" dirty="0" err="1" smtClean="0"/>
+              <a:t>eifach</a:t>
+            </a:r>
+            <a:r>
+              <a:rPr lang="de-CH" baseline="0" dirty="0" smtClean="0"/>
+              <a:t> </a:t>
+            </a:r>
+            <a:r>
+              <a:rPr lang="de-CH" baseline="0" dirty="0" err="1" smtClean="0"/>
+              <a:t>nume</a:t>
+            </a:r>
+            <a:r>
+              <a:rPr lang="de-CH" baseline="0" dirty="0" smtClean="0"/>
+              <a:t> </a:t>
+            </a:r>
+            <a:r>
+              <a:rPr lang="de-CH" baseline="0" dirty="0" err="1" smtClean="0"/>
+              <a:t>ghöiet</a:t>
+            </a:r>
+            <a:r>
+              <a:rPr lang="de-CH" baseline="0" dirty="0" smtClean="0"/>
+              <a:t>.</a:t>
+            </a:r>
+            <a:endParaRPr lang="de-CH" dirty="0"/>
+          </a:p>
+        </p:txBody>
+      </p:sp>
+      <p:sp>
+        <p:nvSpPr>
+          <p:cNvPr id="4" name="Foliennummernplatzhalter 3"/>
+          <p:cNvSpPr>
+            <a:spLocks noGrp="1"/>
+          </p:cNvSpPr>
+          <p:nvPr>
+            <p:ph type="sldNum" sz="quarter" idx="10"/>
+          </p:nvPr>
+        </p:nvSpPr>
+        <p:spPr/>
+        <p:txBody>
+          <a:bodyPr/>
+          <a:lstStyle/>
+          <a:p>
+            <a:fld id="{485DD82D-527C-48E8-9B47-36C7BFBD461B}" type="slidenum">
+              <a:rPr lang="de-CH" smtClean="0"/>
+              <a:t>11</a:t>
+            </a:fld>
+            <a:endParaRPr lang="de-CH"/>
+          </a:p>
+        </p:txBody>
+      </p:sp>
+    </p:spTree>
+  </p:cSld>
+  <p:clrMapOvr>
+    <a:masterClrMapping/>
+  </p:clrMapOvr>
+</p:notes>
+</file>
+
 <file path=ppt/slideLayouts/slideLayout1.xml><?xml version="1.0" encoding="utf-8"?>
 <p:sldLayout xmlns:a="http://schemas.openxmlformats.org/drawingml/2006/main" xmlns:r="http://schemas.openxmlformats.org/officeDocument/2006/relationships" xmlns:p="http://schemas.openxmlformats.org/presentationml/2006/main" showMasterSp="0" type="title" preserve="1">
   <p:cSld name="Titelfolie">
@@ -176,6 +1466,7 @@
           <a:p>
             <a:fld id="{0B8AC65F-F2B9-4AE9-880A-F19E8D9538B7}" type="datetimeFigureOut">
               <a:rPr lang="de-CH" smtClean="0"/>
+              <a:pPr/>
               <a:t>13.04.2012</a:t>
             </a:fld>
             <a:endParaRPr lang="de-CH"/>
@@ -218,6 +1509,7 @@
           <a:p>
             <a:fld id="{6668FC18-58CD-44B0-A445-E41127E26D58}" type="slidenum">
               <a:rPr lang="de-CH" smtClean="0"/>
+              <a:pPr/>
               <a:t>‹Nr.›</a:t>
             </a:fld>
             <a:endParaRPr lang="de-CH"/>
@@ -492,6 +1784,7 @@
           <a:p>
             <a:fld id="{0B8AC65F-F2B9-4AE9-880A-F19E8D9538B7}" type="datetimeFigureOut">
               <a:rPr lang="de-CH" smtClean="0"/>
+              <a:pPr/>
               <a:t>13.04.2012</a:t>
             </a:fld>
             <a:endParaRPr lang="de-CH"/>
@@ -534,6 +1827,7 @@
           <a:p>
             <a:fld id="{6668FC18-58CD-44B0-A445-E41127E26D58}" type="slidenum">
               <a:rPr lang="de-CH" smtClean="0"/>
+              <a:pPr/>
               <a:t>‹Nr.›</a:t>
             </a:fld>
             <a:endParaRPr lang="de-CH"/>
@@ -667,6 +1961,7 @@
           <a:p>
             <a:fld id="{0B8AC65F-F2B9-4AE9-880A-F19E8D9538B7}" type="datetimeFigureOut">
               <a:rPr lang="de-CH" smtClean="0"/>
+              <a:pPr/>
               <a:t>13.04.2012</a:t>
             </a:fld>
             <a:endParaRPr lang="de-CH"/>
@@ -709,6 +2004,7 @@
           <a:p>
             <a:fld id="{6668FC18-58CD-44B0-A445-E41127E26D58}" type="slidenum">
               <a:rPr lang="de-CH" smtClean="0"/>
+              <a:pPr/>
               <a:t>‹Nr.›</a:t>
             </a:fld>
             <a:endParaRPr lang="de-CH"/>
@@ -785,6 +2081,7 @@
           <a:p>
             <a:fld id="{0B8AC65F-F2B9-4AE9-880A-F19E8D9538B7}" type="datetimeFigureOut">
               <a:rPr lang="de-CH" smtClean="0"/>
+              <a:pPr/>
               <a:t>13.04.2012</a:t>
             </a:fld>
             <a:endParaRPr lang="de-CH"/>
@@ -827,6 +2124,7 @@
           <a:p>
             <a:fld id="{6668FC18-58CD-44B0-A445-E41127E26D58}" type="slidenum">
               <a:rPr lang="de-CH" smtClean="0"/>
+              <a:pPr/>
               <a:t>‹Nr.›</a:t>
             </a:fld>
             <a:endParaRPr lang="de-CH"/>
@@ -1083,6 +2381,7 @@
           <a:p>
             <a:fld id="{0B8AC65F-F2B9-4AE9-880A-F19E8D9538B7}" type="datetimeFigureOut">
               <a:rPr lang="de-CH" smtClean="0"/>
+              <a:pPr/>
               <a:t>13.04.2012</a:t>
             </a:fld>
             <a:endParaRPr lang="de-CH"/>
@@ -1125,6 +2424,7 @@
           <a:p>
             <a:fld id="{6668FC18-58CD-44B0-A445-E41127E26D58}" type="slidenum">
               <a:rPr lang="de-CH" smtClean="0"/>
+              <a:pPr/>
               <a:t>‹Nr.›</a:t>
             </a:fld>
             <a:endParaRPr lang="de-CH"/>
@@ -1376,6 +2676,7 @@
           <a:p>
             <a:fld id="{0B8AC65F-F2B9-4AE9-880A-F19E8D9538B7}" type="datetimeFigureOut">
               <a:rPr lang="de-CH" smtClean="0"/>
+              <a:pPr/>
               <a:t>13.04.2012</a:t>
             </a:fld>
             <a:endParaRPr lang="de-CH"/>
@@ -1418,6 +2719,7 @@
           <a:p>
             <a:fld id="{6668FC18-58CD-44B0-A445-E41127E26D58}" type="slidenum">
               <a:rPr lang="de-CH" smtClean="0"/>
+              <a:pPr/>
               <a:t>‹Nr.›</a:t>
             </a:fld>
             <a:endParaRPr lang="de-CH"/>
@@ -1804,6 +3106,7 @@
           <a:p>
             <a:fld id="{0B8AC65F-F2B9-4AE9-880A-F19E8D9538B7}" type="datetimeFigureOut">
               <a:rPr lang="de-CH" smtClean="0"/>
+              <a:pPr/>
               <a:t>13.04.2012</a:t>
             </a:fld>
             <a:endParaRPr lang="de-CH"/>
@@ -1846,6 +3149,7 @@
           <a:p>
             <a:fld id="{6668FC18-58CD-44B0-A445-E41127E26D58}" type="slidenum">
               <a:rPr lang="de-CH" smtClean="0"/>
+              <a:pPr/>
               <a:t>‹Nr.›</a:t>
             </a:fld>
             <a:endParaRPr lang="de-CH"/>
@@ -1922,6 +3226,7 @@
           <a:p>
             <a:fld id="{0B8AC65F-F2B9-4AE9-880A-F19E8D9538B7}" type="datetimeFigureOut">
               <a:rPr lang="de-CH" smtClean="0"/>
+              <a:pPr/>
               <a:t>13.04.2012</a:t>
             </a:fld>
             <a:endParaRPr lang="de-CH"/>
@@ -1964,6 +3269,7 @@
           <a:p>
             <a:fld id="{6668FC18-58CD-44B0-A445-E41127E26D58}" type="slidenum">
               <a:rPr lang="de-CH" smtClean="0"/>
+              <a:pPr/>
               <a:t>‹Nr.›</a:t>
             </a:fld>
             <a:endParaRPr lang="de-CH"/>
@@ -2012,6 +3318,7 @@
           <a:p>
             <a:fld id="{0B8AC65F-F2B9-4AE9-880A-F19E8D9538B7}" type="datetimeFigureOut">
               <a:rPr lang="de-CH" smtClean="0"/>
+              <a:pPr/>
               <a:t>13.04.2012</a:t>
             </a:fld>
             <a:endParaRPr lang="de-CH"/>
@@ -2054,6 +3361,7 @@
           <a:p>
             <a:fld id="{6668FC18-58CD-44B0-A445-E41127E26D58}" type="slidenum">
               <a:rPr lang="de-CH" smtClean="0"/>
+              <a:pPr/>
               <a:t>‹Nr.›</a:t>
             </a:fld>
             <a:endParaRPr lang="de-CH"/>
@@ -2262,6 +3570,7 @@
           <a:p>
             <a:fld id="{0B8AC65F-F2B9-4AE9-880A-F19E8D9538B7}" type="datetimeFigureOut">
               <a:rPr lang="de-CH" smtClean="0"/>
+              <a:pPr/>
               <a:t>13.04.2012</a:t>
             </a:fld>
             <a:endParaRPr lang="de-CH"/>
@@ -2304,6 +3613,7 @@
           <a:p>
             <a:fld id="{6668FC18-58CD-44B0-A445-E41127E26D58}" type="slidenum">
               <a:rPr lang="de-CH" smtClean="0"/>
+              <a:pPr/>
               <a:t>‹Nr.›</a:t>
             </a:fld>
             <a:endParaRPr lang="de-CH"/>
@@ -2778,6 +4088,7 @@
           <a:p>
             <a:fld id="{0B8AC65F-F2B9-4AE9-880A-F19E8D9538B7}" type="datetimeFigureOut">
               <a:rPr lang="de-CH" smtClean="0"/>
+              <a:pPr/>
               <a:t>13.04.2012</a:t>
             </a:fld>
             <a:endParaRPr lang="de-CH"/>
@@ -2820,6 +4131,7 @@
           <a:p>
             <a:fld id="{6668FC18-58CD-44B0-A445-E41127E26D58}" type="slidenum">
               <a:rPr lang="de-CH" smtClean="0"/>
+              <a:pPr/>
               <a:t>‹Nr.›</a:t>
             </a:fld>
             <a:endParaRPr lang="de-CH"/>
@@ -3008,6 +4320,7 @@
           <a:p>
             <a:fld id="{0B8AC65F-F2B9-4AE9-880A-F19E8D9538B7}" type="datetimeFigureOut">
               <a:rPr lang="de-CH" smtClean="0"/>
+              <a:pPr/>
               <a:t>13.04.2012</a:t>
             </a:fld>
             <a:endParaRPr lang="de-CH"/>
@@ -3082,6 +4395,7 @@
           <a:p>
             <a:fld id="{6668FC18-58CD-44B0-A445-E41127E26D58}" type="slidenum">
               <a:rPr lang="de-CH" smtClean="0"/>
+              <a:pPr/>
               <a:t>‹Nr.›</a:t>
             </a:fld>
             <a:endParaRPr lang="de-CH"/>
@@ -3786,7 +5100,7 @@
     </p:spTree>
     <p:extLst>
       <p:ext uri="{BB962C8B-B14F-4D97-AF65-F5344CB8AC3E}">
-        <p14:creationId xmlns:p14="http://schemas.microsoft.com/office/powerpoint/2010/main" val="1704400666"/>
+        <p14:creationId xmlns:p14="http://schemas.microsoft.com/office/powerpoint/2010/main" xmlns="" val="1704400666"/>
       </p:ext>
     </p:extLst>
   </p:cSld>
@@ -3822,79 +5136,1260 @@
       </p:grpSpPr>
       <p:sp>
         <p:nvSpPr>
-          <p:cNvPr id="2" name="Titel 1"/>
-          <p:cNvSpPr>
-            <a:spLocks noGrp="1"/>
-          </p:cNvSpPr>
-          <p:nvPr>
-            <p:ph type="title"/>
-          </p:nvPr>
-        </p:nvSpPr>
-        <p:spPr/>
-        <p:txBody>
-          <a:bodyPr/>
+          <p:cNvPr id="6" name="Textfeld 5"/>
+          <p:cNvSpPr txBox="1"/>
+          <p:nvPr/>
+        </p:nvSpPr>
+        <p:spPr>
+          <a:xfrm>
+            <a:off x="2051720" y="332656"/>
+            <a:ext cx="6696744" cy="2400657"/>
+          </a:xfrm>
+          <a:prstGeom prst="rect">
+            <a:avLst/>
+          </a:prstGeom>
+          <a:solidFill>
+            <a:srgbClr val="FFFFFF">
+              <a:alpha val="74118"/>
+            </a:srgbClr>
+          </a:solidFill>
+          <a:effectLst>
+            <a:outerShdw blurRad="546100" dir="5400000" sx="104000" sy="104000" algn="ctr" rotWithShape="0">
+              <a:schemeClr val="tx1">
+                <a:alpha val="47000"/>
+              </a:schemeClr>
+            </a:outerShdw>
+          </a:effectLst>
+        </p:spPr>
+        <p:txBody>
+          <a:bodyPr wrap="square" rtlCol="0">
+            <a:spAutoFit/>
+          </a:bodyPr>
           <a:lstStyle/>
           <a:p>
-            <a:r>
-              <a:rPr lang="de-CH" dirty="0" err="1" smtClean="0"/>
-              <a:t>TestVorgehen</a:t>
-            </a:r>
-            <a:endParaRPr lang="de-CH" dirty="0"/>
-          </a:p>
-        </p:txBody>
-      </p:sp>
-      <p:sp>
-        <p:nvSpPr>
-          <p:cNvPr id="3" name="Inhaltsplatzhalter 2"/>
-          <p:cNvSpPr>
-            <a:spLocks noGrp="1"/>
-          </p:cNvSpPr>
-          <p:nvPr>
-            <p:ph sz="quarter" idx="13"/>
-          </p:nvPr>
-        </p:nvSpPr>
-        <p:spPr/>
-        <p:txBody>
-          <a:bodyPr/>
+            <a:pPr>
+              <a:lnSpc>
+                <a:spcPct val="115000"/>
+              </a:lnSpc>
+              <a:spcAft>
+                <a:spcPts val="0"/>
+              </a:spcAft>
+            </a:pPr>
+            <a:r>
+              <a:rPr lang="en-US" sz="1200" b="1" dirty="0" smtClean="0">
+                <a:solidFill>
+                  <a:srgbClr val="7F0055"/>
+                </a:solidFill>
+                <a:latin typeface="Courier New"/>
+                <a:ea typeface="Calibri"/>
+                <a:cs typeface="Times New Roman"/>
+              </a:rPr>
+              <a:t>if</a:t>
+            </a:r>
+            <a:r>
+              <a:rPr lang="en-US" sz="1200" dirty="0" smtClean="0">
+                <a:solidFill>
+                  <a:srgbClr val="000000"/>
+                </a:solidFill>
+                <a:latin typeface="Courier New"/>
+                <a:ea typeface="Calibri"/>
+                <a:cs typeface="Times New Roman"/>
+              </a:rPr>
+              <a:t>((</a:t>
+            </a:r>
+            <a:r>
+              <a:rPr lang="en-US" sz="1200" dirty="0" err="1" smtClean="0">
+                <a:solidFill>
+                  <a:srgbClr val="000000"/>
+                </a:solidFill>
+                <a:latin typeface="Courier New"/>
+                <a:ea typeface="Calibri"/>
+                <a:cs typeface="Times New Roman"/>
+              </a:rPr>
+              <a:t>pos.</a:t>
+            </a:r>
+            <a:r>
+              <a:rPr lang="en-US" sz="1200" dirty="0" err="1" smtClean="0">
+                <a:solidFill>
+                  <a:srgbClr val="0000C0"/>
+                </a:solidFill>
+                <a:latin typeface="Courier New"/>
+                <a:ea typeface="Calibri"/>
+                <a:cs typeface="Times New Roman"/>
+              </a:rPr>
+              <a:t>x</a:t>
+            </a:r>
+            <a:r>
+              <a:rPr lang="en-US" sz="1200" dirty="0" smtClean="0">
+                <a:solidFill>
+                  <a:srgbClr val="000000"/>
+                </a:solidFill>
+                <a:latin typeface="Courier New"/>
+                <a:ea typeface="Calibri"/>
+                <a:cs typeface="Times New Roman"/>
+              </a:rPr>
+              <a:t> &lt; PLAYGROUND_X_MAX &amp;&amp; </a:t>
+            </a:r>
+            <a:r>
+              <a:rPr lang="en-US" sz="1200" dirty="0" err="1" smtClean="0">
+                <a:solidFill>
+                  <a:srgbClr val="000000"/>
+                </a:solidFill>
+                <a:latin typeface="Courier New"/>
+                <a:ea typeface="Calibri"/>
+                <a:cs typeface="Times New Roman"/>
+              </a:rPr>
+              <a:t>pos.</a:t>
+            </a:r>
+            <a:r>
+              <a:rPr lang="en-US" sz="1200" dirty="0" err="1" smtClean="0">
+                <a:solidFill>
+                  <a:srgbClr val="0000C0"/>
+                </a:solidFill>
+                <a:latin typeface="Courier New"/>
+                <a:ea typeface="Calibri"/>
+                <a:cs typeface="Times New Roman"/>
+              </a:rPr>
+              <a:t>x</a:t>
+            </a:r>
+            <a:r>
+              <a:rPr lang="en-US" sz="1200" dirty="0" smtClean="0">
+                <a:solidFill>
+                  <a:srgbClr val="000000"/>
+                </a:solidFill>
+                <a:latin typeface="Courier New"/>
+                <a:ea typeface="Calibri"/>
+                <a:cs typeface="Times New Roman"/>
+              </a:rPr>
+              <a:t> &gt;= 0) </a:t>
+            </a:r>
+            <a:r>
+              <a:rPr lang="en-US" sz="1200" dirty="0" smtClean="0">
+                <a:solidFill>
+                  <a:srgbClr val="000000"/>
+                </a:solidFill>
+                <a:latin typeface="Courier New"/>
+                <a:ea typeface="Calibri"/>
+                <a:cs typeface="Times New Roman"/>
+              </a:rPr>
+              <a:t>&amp;&amp;</a:t>
+            </a:r>
+            <a:endParaRPr lang="de-CH" sz="1200" dirty="0" smtClean="0">
+              <a:latin typeface="Calibri"/>
+              <a:ea typeface="Calibri"/>
+              <a:cs typeface="Times New Roman"/>
+            </a:endParaRPr>
+          </a:p>
+          <a:p>
+            <a:pPr>
+              <a:lnSpc>
+                <a:spcPct val="115000"/>
+              </a:lnSpc>
+              <a:spcAft>
+                <a:spcPts val="0"/>
+              </a:spcAft>
+            </a:pPr>
+            <a:r>
+              <a:rPr lang="en-US" sz="1200" dirty="0" smtClean="0">
+                <a:solidFill>
+                  <a:srgbClr val="000000"/>
+                </a:solidFill>
+                <a:latin typeface="Courier New"/>
+                <a:ea typeface="Calibri"/>
+                <a:cs typeface="Times New Roman"/>
+              </a:rPr>
+              <a:t>   (</a:t>
+            </a:r>
+            <a:r>
+              <a:rPr lang="en-US" sz="1200" dirty="0" err="1" smtClean="0">
+                <a:solidFill>
+                  <a:srgbClr val="000000"/>
+                </a:solidFill>
+                <a:latin typeface="Courier New"/>
+                <a:ea typeface="Calibri"/>
+                <a:cs typeface="Times New Roman"/>
+              </a:rPr>
+              <a:t>pos.</a:t>
+            </a:r>
+            <a:r>
+              <a:rPr lang="en-US" sz="1200" dirty="0" err="1" smtClean="0">
+                <a:solidFill>
+                  <a:srgbClr val="0000C0"/>
+                </a:solidFill>
+                <a:latin typeface="Courier New"/>
+                <a:ea typeface="Calibri"/>
+                <a:cs typeface="Times New Roman"/>
+              </a:rPr>
+              <a:t>y</a:t>
+            </a:r>
+            <a:r>
+              <a:rPr lang="en-US" sz="1200" dirty="0" smtClean="0">
+                <a:solidFill>
+                  <a:srgbClr val="000000"/>
+                </a:solidFill>
+                <a:latin typeface="Courier New"/>
+                <a:ea typeface="Calibri"/>
+                <a:cs typeface="Times New Roman"/>
+              </a:rPr>
+              <a:t> &lt; PLAYGROUND_Y_MAX &amp;&amp; </a:t>
+            </a:r>
+            <a:r>
+              <a:rPr lang="en-US" sz="1200" dirty="0" err="1" smtClean="0">
+                <a:solidFill>
+                  <a:srgbClr val="000000"/>
+                </a:solidFill>
+                <a:latin typeface="Courier New"/>
+                <a:ea typeface="Calibri"/>
+                <a:cs typeface="Times New Roman"/>
+              </a:rPr>
+              <a:t>pos.</a:t>
+            </a:r>
+            <a:r>
+              <a:rPr lang="en-US" sz="1200" dirty="0" err="1" smtClean="0">
+                <a:solidFill>
+                  <a:srgbClr val="0000C0"/>
+                </a:solidFill>
+                <a:latin typeface="Courier New"/>
+                <a:ea typeface="Calibri"/>
+                <a:cs typeface="Times New Roman"/>
+              </a:rPr>
+              <a:t>y</a:t>
+            </a:r>
+            <a:r>
+              <a:rPr lang="en-US" sz="1200" dirty="0" smtClean="0">
+                <a:solidFill>
+                  <a:srgbClr val="000000"/>
+                </a:solidFill>
+                <a:latin typeface="Courier New"/>
+                <a:ea typeface="Calibri"/>
+                <a:cs typeface="Times New Roman"/>
+              </a:rPr>
+              <a:t> &gt;= 0))</a:t>
+            </a:r>
+            <a:endParaRPr lang="de-CH" sz="1200" dirty="0" smtClean="0">
+              <a:latin typeface="Calibri"/>
+              <a:ea typeface="Calibri"/>
+              <a:cs typeface="Times New Roman"/>
+            </a:endParaRPr>
+          </a:p>
+          <a:p>
+            <a:pPr>
+              <a:lnSpc>
+                <a:spcPct val="115000"/>
+              </a:lnSpc>
+              <a:spcAft>
+                <a:spcPts val="0"/>
+              </a:spcAft>
+            </a:pPr>
+            <a:r>
+              <a:rPr lang="de-CH" sz="1200" dirty="0" smtClean="0">
+                <a:solidFill>
+                  <a:srgbClr val="000000"/>
+                </a:solidFill>
+                <a:latin typeface="Courier New"/>
+                <a:ea typeface="Calibri"/>
+                <a:cs typeface="Times New Roman"/>
+              </a:rPr>
+              <a:t>{</a:t>
+            </a:r>
+            <a:endParaRPr lang="de-CH" sz="1200" dirty="0" smtClean="0">
+              <a:latin typeface="Calibri"/>
+              <a:ea typeface="Calibri"/>
+              <a:cs typeface="Times New Roman"/>
+            </a:endParaRPr>
+          </a:p>
+          <a:p>
+            <a:pPr>
+              <a:lnSpc>
+                <a:spcPct val="115000"/>
+              </a:lnSpc>
+              <a:spcAft>
+                <a:spcPts val="0"/>
+              </a:spcAft>
+            </a:pPr>
+            <a:r>
+              <a:rPr lang="de-CH" sz="1200" dirty="0" smtClean="0">
+                <a:solidFill>
+                  <a:srgbClr val="000000"/>
+                </a:solidFill>
+                <a:latin typeface="Courier New"/>
+                <a:ea typeface="Calibri"/>
+                <a:cs typeface="Times New Roman"/>
+              </a:rPr>
+              <a:t>    </a:t>
+            </a:r>
+            <a:r>
+              <a:rPr lang="de-CH" sz="1200" dirty="0" smtClean="0">
+                <a:solidFill>
+                  <a:srgbClr val="3F7F5F"/>
+                </a:solidFill>
+                <a:latin typeface="Courier New"/>
+                <a:ea typeface="Calibri"/>
+                <a:cs typeface="Times New Roman"/>
+              </a:rPr>
+              <a:t>// </a:t>
+            </a:r>
+            <a:r>
+              <a:rPr lang="de-CH" sz="1200" dirty="0" err="1" smtClean="0">
+                <a:solidFill>
+                  <a:srgbClr val="3F7F5F"/>
+                </a:solidFill>
+                <a:latin typeface="Courier New"/>
+                <a:ea typeface="Calibri"/>
+                <a:cs typeface="Times New Roman"/>
+              </a:rPr>
+              <a:t>true</a:t>
+            </a:r>
+            <a:r>
+              <a:rPr lang="de-CH" sz="1200" dirty="0" smtClean="0">
+                <a:solidFill>
+                  <a:srgbClr val="3F7F5F"/>
+                </a:solidFill>
+                <a:latin typeface="Courier New"/>
+                <a:ea typeface="Calibri"/>
+                <a:cs typeface="Times New Roman"/>
+              </a:rPr>
+              <a:t> zurückgeben</a:t>
+            </a:r>
+            <a:endParaRPr lang="de-CH" sz="1200" dirty="0" smtClean="0">
+              <a:latin typeface="Calibri"/>
+              <a:ea typeface="Calibri"/>
+              <a:cs typeface="Times New Roman"/>
+            </a:endParaRPr>
+          </a:p>
+          <a:p>
+            <a:pPr>
+              <a:lnSpc>
+                <a:spcPct val="115000"/>
+              </a:lnSpc>
+              <a:spcAft>
+                <a:spcPts val="0"/>
+              </a:spcAft>
+            </a:pPr>
+            <a:r>
+              <a:rPr lang="de-CH" sz="1200" dirty="0" smtClean="0">
+                <a:solidFill>
+                  <a:srgbClr val="000000"/>
+                </a:solidFill>
+                <a:latin typeface="Courier New"/>
+                <a:ea typeface="Calibri"/>
+                <a:cs typeface="Times New Roman"/>
+              </a:rPr>
+              <a:t>    </a:t>
+            </a:r>
+            <a:r>
+              <a:rPr lang="de-CH" sz="1200" b="1" dirty="0" err="1" smtClean="0">
+                <a:solidFill>
+                  <a:srgbClr val="7F0055"/>
+                </a:solidFill>
+                <a:latin typeface="Courier New"/>
+                <a:ea typeface="Calibri"/>
+                <a:cs typeface="Times New Roman"/>
+              </a:rPr>
+              <a:t>return</a:t>
+            </a:r>
+            <a:r>
+              <a:rPr lang="de-CH" sz="1200" dirty="0" smtClean="0">
+                <a:solidFill>
+                  <a:srgbClr val="000000"/>
+                </a:solidFill>
+                <a:latin typeface="Courier New"/>
+                <a:ea typeface="Calibri"/>
+                <a:cs typeface="Times New Roman"/>
+              </a:rPr>
+              <a:t> 1;</a:t>
+            </a:r>
+            <a:endParaRPr lang="de-CH" sz="1200" dirty="0" smtClean="0">
+              <a:latin typeface="Calibri"/>
+              <a:ea typeface="Calibri"/>
+              <a:cs typeface="Times New Roman"/>
+            </a:endParaRPr>
+          </a:p>
+          <a:p>
+            <a:pPr>
+              <a:lnSpc>
+                <a:spcPct val="115000"/>
+              </a:lnSpc>
+              <a:spcAft>
+                <a:spcPts val="0"/>
+              </a:spcAft>
+            </a:pPr>
+            <a:r>
+              <a:rPr lang="de-CH" sz="1200" dirty="0" smtClean="0">
+                <a:solidFill>
+                  <a:srgbClr val="000000"/>
+                </a:solidFill>
+                <a:latin typeface="Courier New"/>
+                <a:ea typeface="Calibri"/>
+                <a:cs typeface="Times New Roman"/>
+              </a:rPr>
+              <a:t>}</a:t>
+            </a:r>
+            <a:endParaRPr lang="de-CH" sz="1200" dirty="0" smtClean="0">
+              <a:latin typeface="Calibri"/>
+              <a:ea typeface="Calibri"/>
+              <a:cs typeface="Times New Roman"/>
+            </a:endParaRPr>
+          </a:p>
+          <a:p>
+            <a:pPr>
+              <a:lnSpc>
+                <a:spcPct val="115000"/>
+              </a:lnSpc>
+              <a:spcAft>
+                <a:spcPts val="0"/>
+              </a:spcAft>
+            </a:pPr>
+            <a:r>
+              <a:rPr lang="de-CH" sz="1200" b="1" dirty="0" err="1" smtClean="0">
+                <a:solidFill>
+                  <a:srgbClr val="7F0055"/>
+                </a:solidFill>
+                <a:latin typeface="Courier New"/>
+                <a:ea typeface="Calibri"/>
+                <a:cs typeface="Times New Roman"/>
+              </a:rPr>
+              <a:t>else</a:t>
+            </a:r>
+            <a:endParaRPr lang="de-CH" sz="1200" dirty="0" smtClean="0">
+              <a:latin typeface="Calibri"/>
+              <a:ea typeface="Calibri"/>
+              <a:cs typeface="Times New Roman"/>
+            </a:endParaRPr>
+          </a:p>
+          <a:p>
+            <a:pPr>
+              <a:lnSpc>
+                <a:spcPct val="115000"/>
+              </a:lnSpc>
+              <a:spcAft>
+                <a:spcPts val="0"/>
+              </a:spcAft>
+            </a:pPr>
+            <a:r>
+              <a:rPr lang="de-CH" sz="1200" dirty="0" smtClean="0">
+                <a:solidFill>
+                  <a:srgbClr val="000000"/>
+                </a:solidFill>
+                <a:latin typeface="Courier New"/>
+                <a:ea typeface="Calibri"/>
+                <a:cs typeface="Times New Roman"/>
+              </a:rPr>
+              <a:t>{</a:t>
+            </a:r>
+            <a:endParaRPr lang="de-CH" sz="1200" dirty="0" smtClean="0">
+              <a:latin typeface="Calibri"/>
+              <a:ea typeface="Calibri"/>
+              <a:cs typeface="Times New Roman"/>
+            </a:endParaRPr>
+          </a:p>
+          <a:p>
+            <a:pPr>
+              <a:lnSpc>
+                <a:spcPct val="115000"/>
+              </a:lnSpc>
+              <a:spcAft>
+                <a:spcPts val="0"/>
+              </a:spcAft>
+            </a:pPr>
+            <a:r>
+              <a:rPr lang="en-US" sz="1200" dirty="0" smtClean="0">
+                <a:solidFill>
+                  <a:srgbClr val="000000"/>
+                </a:solidFill>
+                <a:latin typeface="Courier New"/>
+                <a:ea typeface="Calibri"/>
+                <a:cs typeface="Times New Roman"/>
+              </a:rPr>
+              <a:t>    </a:t>
+            </a:r>
+            <a:r>
+              <a:rPr lang="en-US" sz="1200" dirty="0" smtClean="0">
+                <a:solidFill>
+                  <a:srgbClr val="3F7F5F"/>
+                </a:solidFill>
+                <a:latin typeface="Courier New"/>
+                <a:ea typeface="Calibri"/>
+                <a:cs typeface="Times New Roman"/>
+              </a:rPr>
+              <a:t>// false </a:t>
+            </a:r>
+            <a:r>
+              <a:rPr lang="en-US" sz="1200" dirty="0" err="1" smtClean="0">
+                <a:solidFill>
+                  <a:srgbClr val="3F7F5F"/>
+                </a:solidFill>
+                <a:latin typeface="Courier New"/>
+                <a:ea typeface="Calibri"/>
+                <a:cs typeface="Times New Roman"/>
+              </a:rPr>
+              <a:t>zurückgeben</a:t>
+            </a:r>
+            <a:endParaRPr lang="de-CH" sz="1200" dirty="0" smtClean="0">
+              <a:latin typeface="Calibri"/>
+              <a:ea typeface="Calibri"/>
+              <a:cs typeface="Times New Roman"/>
+            </a:endParaRPr>
+          </a:p>
+          <a:p>
+            <a:pPr>
+              <a:lnSpc>
+                <a:spcPct val="115000"/>
+              </a:lnSpc>
+              <a:spcAft>
+                <a:spcPts val="0"/>
+              </a:spcAft>
+            </a:pPr>
+            <a:r>
+              <a:rPr lang="en-US" sz="1200" dirty="0" smtClean="0">
+                <a:solidFill>
+                  <a:srgbClr val="000000"/>
+                </a:solidFill>
+                <a:latin typeface="Courier New"/>
+                <a:ea typeface="Calibri"/>
+                <a:cs typeface="Times New Roman"/>
+              </a:rPr>
+              <a:t>    </a:t>
+            </a:r>
+            <a:r>
+              <a:rPr lang="en-US" sz="1200" b="1" dirty="0" smtClean="0">
+                <a:solidFill>
+                  <a:srgbClr val="7F0055"/>
+                </a:solidFill>
+                <a:latin typeface="Courier New"/>
+                <a:ea typeface="Calibri"/>
+                <a:cs typeface="Times New Roman"/>
+              </a:rPr>
+              <a:t>return</a:t>
+            </a:r>
+            <a:r>
+              <a:rPr lang="en-US" sz="1200" dirty="0" smtClean="0">
+                <a:solidFill>
+                  <a:srgbClr val="000000"/>
+                </a:solidFill>
+                <a:latin typeface="Courier New"/>
+                <a:ea typeface="Calibri"/>
+                <a:cs typeface="Times New Roman"/>
+              </a:rPr>
+              <a:t> 0;</a:t>
+            </a:r>
+            <a:endParaRPr lang="de-CH" sz="1200" dirty="0" smtClean="0">
+              <a:latin typeface="Calibri"/>
+              <a:ea typeface="Calibri"/>
+              <a:cs typeface="Times New Roman"/>
+            </a:endParaRPr>
+          </a:p>
+          <a:p>
+            <a:r>
+              <a:rPr lang="en-US" sz="1200" dirty="0" smtClean="0">
+                <a:solidFill>
+                  <a:srgbClr val="000000"/>
+                </a:solidFill>
+                <a:latin typeface="Courier New"/>
+                <a:ea typeface="Calibri"/>
+              </a:rPr>
+              <a:t>}</a:t>
+            </a:r>
+            <a:endParaRPr lang="de-CH" sz="1200" dirty="0"/>
+          </a:p>
+        </p:txBody>
+      </p:sp>
+      <p:sp>
+        <p:nvSpPr>
+          <p:cNvPr id="10" name="Textfeld 9"/>
+          <p:cNvSpPr txBox="1"/>
+          <p:nvPr/>
+        </p:nvSpPr>
+        <p:spPr>
+          <a:xfrm>
+            <a:off x="2051720" y="2967605"/>
+            <a:ext cx="6696744" cy="1325491"/>
+          </a:xfrm>
+          <a:prstGeom prst="rect">
+            <a:avLst/>
+          </a:prstGeom>
+          <a:solidFill>
+            <a:srgbClr val="FFFFFF">
+              <a:alpha val="74118"/>
+            </a:srgbClr>
+          </a:solidFill>
+          <a:effectLst>
+            <a:outerShdw blurRad="546100" dir="5400000" sx="104000" sy="104000" algn="ctr" rotWithShape="0">
+              <a:schemeClr val="tx1">
+                <a:alpha val="47000"/>
+              </a:schemeClr>
+            </a:outerShdw>
+          </a:effectLst>
+        </p:spPr>
+        <p:txBody>
+          <a:bodyPr wrap="square" rtlCol="0">
+            <a:spAutoFit/>
+          </a:bodyPr>
           <a:lstStyle/>
           <a:p>
-            <a:r>
-              <a:rPr lang="de-CH" dirty="0" smtClean="0"/>
-              <a:t>Testprotokoll anhand des </a:t>
-            </a:r>
-            <a:r>
-              <a:rPr lang="de-CH" dirty="0" err="1" smtClean="0"/>
-              <a:t>Plichtenhefts</a:t>
-            </a:r>
-            <a:r>
-              <a:rPr lang="de-CH" dirty="0" smtClean="0"/>
-              <a:t> entworfen</a:t>
-            </a:r>
-          </a:p>
-          <a:p>
-            <a:r>
-              <a:rPr lang="de-CH" dirty="0" smtClean="0"/>
-              <a:t>Version 1.0 getestet</a:t>
-            </a:r>
-          </a:p>
-          <a:p>
-            <a:r>
-              <a:rPr lang="de-CH" dirty="0" smtClean="0"/>
-              <a:t>Gefundene Fehler notiert und teilweise behoben</a:t>
-            </a:r>
-          </a:p>
-          <a:p>
-            <a:endParaRPr lang="de-CH" dirty="0" smtClean="0"/>
-          </a:p>
-          <a:p>
-            <a:endParaRPr lang="de-CH" dirty="0"/>
+            <a:pPr>
+              <a:lnSpc>
+                <a:spcPct val="115000"/>
+              </a:lnSpc>
+              <a:spcAft>
+                <a:spcPts val="1000"/>
+              </a:spcAft>
+            </a:pPr>
+            <a:r>
+              <a:rPr lang="en-US" sz="1200" dirty="0" smtClean="0">
+                <a:solidFill>
+                  <a:srgbClr val="3F7F5F"/>
+                </a:solidFill>
+                <a:latin typeface="Courier New"/>
+                <a:ea typeface="Calibri"/>
+                <a:cs typeface="Times New Roman"/>
+              </a:rPr>
+              <a:t>// </a:t>
+            </a:r>
+            <a:r>
+              <a:rPr lang="en-US" sz="1200" dirty="0" smtClean="0">
+                <a:solidFill>
+                  <a:srgbClr val="3F7F5F"/>
+                </a:solidFill>
+                <a:latin typeface="Courier New"/>
+                <a:ea typeface="Calibri"/>
+                <a:cs typeface="Times New Roman"/>
+              </a:rPr>
+              <a:t>Python </a:t>
+            </a:r>
+            <a:r>
+              <a:rPr lang="en-US" sz="1200" dirty="0" err="1" smtClean="0">
+                <a:solidFill>
+                  <a:srgbClr val="3F7F5F"/>
+                </a:solidFill>
+                <a:latin typeface="Courier New"/>
+                <a:ea typeface="Calibri"/>
+                <a:cs typeface="Times New Roman"/>
+              </a:rPr>
+              <a:t>wär</a:t>
+            </a:r>
+            <a:r>
+              <a:rPr lang="en-US" sz="1200" dirty="0" smtClean="0">
+                <a:solidFill>
+                  <a:srgbClr val="3F7F5F"/>
+                </a:solidFill>
+                <a:latin typeface="Courier New"/>
+                <a:ea typeface="Calibri"/>
+                <a:cs typeface="Times New Roman"/>
+              </a:rPr>
+              <a:t> </a:t>
+            </a:r>
+            <a:r>
+              <a:rPr lang="en-US" sz="1200" dirty="0" err="1" smtClean="0">
+                <a:solidFill>
+                  <a:srgbClr val="3F7F5F"/>
+                </a:solidFill>
+                <a:latin typeface="Courier New"/>
+                <a:ea typeface="Calibri"/>
+                <a:cs typeface="Times New Roman"/>
+              </a:rPr>
+              <a:t>da</a:t>
+            </a:r>
+            <a:r>
+              <a:rPr lang="en-US" sz="1200" dirty="0" smtClean="0">
+                <a:solidFill>
+                  <a:srgbClr val="3F7F5F"/>
+                </a:solidFill>
+                <a:latin typeface="Courier New"/>
+                <a:ea typeface="Calibri"/>
+                <a:cs typeface="Times New Roman"/>
+              </a:rPr>
+              <a:t> </a:t>
+            </a:r>
+            <a:r>
+              <a:rPr lang="en-US" sz="1200" dirty="0" err="1" smtClean="0">
+                <a:solidFill>
+                  <a:srgbClr val="3F7F5F"/>
+                </a:solidFill>
+                <a:latin typeface="Courier New"/>
+                <a:ea typeface="Calibri"/>
+                <a:cs typeface="Times New Roman"/>
+              </a:rPr>
+              <a:t>imfau</a:t>
+            </a:r>
+            <a:r>
+              <a:rPr lang="en-US" sz="1200" dirty="0" smtClean="0">
+                <a:solidFill>
+                  <a:srgbClr val="3F7F5F"/>
+                </a:solidFill>
+                <a:latin typeface="Courier New"/>
+                <a:ea typeface="Calibri"/>
+                <a:cs typeface="Times New Roman"/>
+              </a:rPr>
+              <a:t> </a:t>
+            </a:r>
+            <a:r>
+              <a:rPr lang="en-US" sz="1200" dirty="0" err="1" smtClean="0">
+                <a:solidFill>
+                  <a:srgbClr val="3F7F5F"/>
+                </a:solidFill>
+                <a:latin typeface="Courier New"/>
+                <a:ea typeface="Calibri"/>
+                <a:cs typeface="Times New Roman"/>
+              </a:rPr>
+              <a:t>viiiiiu</a:t>
+            </a:r>
+            <a:r>
+              <a:rPr lang="en-US" sz="1200" dirty="0" smtClean="0">
+                <a:solidFill>
+                  <a:srgbClr val="3F7F5F"/>
+                </a:solidFill>
+                <a:latin typeface="Courier New"/>
+                <a:ea typeface="Calibri"/>
+                <a:cs typeface="Times New Roman"/>
+              </a:rPr>
+              <a:t> </a:t>
+            </a:r>
+            <a:r>
+              <a:rPr lang="en-US" sz="1200" dirty="0" err="1" smtClean="0">
+                <a:solidFill>
+                  <a:srgbClr val="3F7F5F"/>
+                </a:solidFill>
+                <a:latin typeface="Courier New"/>
+                <a:ea typeface="Calibri"/>
+                <a:cs typeface="Times New Roman"/>
+              </a:rPr>
+              <a:t>schöner</a:t>
+            </a:r>
+            <a:r>
+              <a:rPr lang="en-US" sz="1200" dirty="0" smtClean="0">
+                <a:solidFill>
+                  <a:srgbClr val="3F7F5F"/>
+                </a:solidFill>
+                <a:latin typeface="Courier New"/>
+                <a:ea typeface="Calibri"/>
+                <a:cs typeface="Times New Roman"/>
+              </a:rPr>
+              <a:t>:</a:t>
+            </a:r>
+            <a:endParaRPr lang="de-CH" sz="1600" dirty="0" smtClean="0">
+              <a:latin typeface="Calibri"/>
+              <a:ea typeface="Calibri"/>
+              <a:cs typeface="Times New Roman"/>
+            </a:endParaRPr>
+          </a:p>
+          <a:p>
+            <a:pPr>
+              <a:lnSpc>
+                <a:spcPct val="115000"/>
+              </a:lnSpc>
+              <a:spcAft>
+                <a:spcPts val="0"/>
+              </a:spcAft>
+            </a:pPr>
+            <a:r>
+              <a:rPr lang="en-US" sz="1200" dirty="0" smtClean="0">
+                <a:solidFill>
+                  <a:srgbClr val="3F7F5F"/>
+                </a:solidFill>
+                <a:latin typeface="Courier New"/>
+                <a:ea typeface="Calibri"/>
+                <a:cs typeface="Times New Roman"/>
+              </a:rPr>
+              <a:t>// return 1 if (0 &lt; </a:t>
+            </a:r>
+            <a:r>
+              <a:rPr lang="en-US" sz="1200" dirty="0" err="1" smtClean="0">
+                <a:solidFill>
+                  <a:srgbClr val="3F7F5F"/>
+                </a:solidFill>
+                <a:latin typeface="Courier New"/>
+                <a:ea typeface="Calibri"/>
+                <a:cs typeface="Times New Roman"/>
+              </a:rPr>
+              <a:t>pos.x</a:t>
+            </a:r>
+            <a:r>
+              <a:rPr lang="en-US" sz="1200" dirty="0" smtClean="0">
+                <a:solidFill>
+                  <a:srgbClr val="3F7F5F"/>
+                </a:solidFill>
+                <a:latin typeface="Courier New"/>
+                <a:ea typeface="Calibri"/>
+                <a:cs typeface="Times New Roman"/>
+              </a:rPr>
+              <a:t> &lt; </a:t>
+            </a:r>
+            <a:r>
+              <a:rPr lang="en-US" sz="1200" dirty="0" smtClean="0">
+                <a:solidFill>
+                  <a:srgbClr val="3F7F5F"/>
+                </a:solidFill>
+                <a:latin typeface="Courier New"/>
+                <a:ea typeface="Calibri"/>
+                <a:cs typeface="Times New Roman"/>
+              </a:rPr>
+              <a:t>PLAYGROUND_X_MAX) </a:t>
+            </a:r>
+            <a:r>
+              <a:rPr lang="en-US" sz="1200" dirty="0" smtClean="0">
+                <a:solidFill>
+                  <a:srgbClr val="3F7F5F"/>
+                </a:solidFill>
+                <a:latin typeface="Courier New"/>
+                <a:ea typeface="Calibri"/>
+                <a:cs typeface="Times New Roman"/>
+              </a:rPr>
+              <a:t>and</a:t>
+            </a:r>
+            <a:br>
+              <a:rPr lang="en-US" sz="1200" dirty="0" smtClean="0">
+                <a:solidFill>
+                  <a:srgbClr val="3F7F5F"/>
+                </a:solidFill>
+                <a:latin typeface="Courier New"/>
+                <a:ea typeface="Calibri"/>
+                <a:cs typeface="Times New Roman"/>
+              </a:rPr>
+            </a:br>
+            <a:r>
+              <a:rPr lang="en-US" sz="1200" dirty="0" smtClean="0">
+                <a:solidFill>
+                  <a:srgbClr val="3F7F5F"/>
+                </a:solidFill>
+                <a:latin typeface="Courier New"/>
+                <a:ea typeface="Calibri"/>
+                <a:cs typeface="Times New Roman"/>
+              </a:rPr>
+              <a:t>//             (0 &lt; </a:t>
+            </a:r>
+            <a:r>
+              <a:rPr lang="en-US" sz="1200" dirty="0" err="1" smtClean="0">
+                <a:solidFill>
+                  <a:srgbClr val="3F7F5F"/>
+                </a:solidFill>
+                <a:latin typeface="Courier New"/>
+                <a:ea typeface="Calibri"/>
+                <a:cs typeface="Times New Roman"/>
+              </a:rPr>
+              <a:t>pos.y</a:t>
+            </a:r>
+            <a:r>
+              <a:rPr lang="en-US" sz="1200" dirty="0" smtClean="0">
+                <a:solidFill>
+                  <a:srgbClr val="3F7F5F"/>
+                </a:solidFill>
+                <a:latin typeface="Courier New"/>
+                <a:ea typeface="Calibri"/>
+                <a:cs typeface="Times New Roman"/>
+              </a:rPr>
+              <a:t> &lt; </a:t>
+            </a:r>
+            <a:r>
+              <a:rPr lang="en-US" sz="1200" dirty="0" smtClean="0">
+                <a:solidFill>
+                  <a:srgbClr val="3F7F5F"/>
+                </a:solidFill>
+                <a:latin typeface="Courier New"/>
+                <a:ea typeface="Calibri"/>
+                <a:cs typeface="Times New Roman"/>
+              </a:rPr>
+              <a:t>PLAYGROUND_Y_MAX) </a:t>
+            </a:r>
+            <a:r>
+              <a:rPr lang="en-US" sz="1200" dirty="0" smtClean="0">
+                <a:solidFill>
+                  <a:srgbClr val="3F7F5F"/>
+                </a:solidFill>
+                <a:latin typeface="Courier New"/>
+                <a:ea typeface="Calibri"/>
+                <a:cs typeface="Times New Roman"/>
+              </a:rPr>
+              <a:t>else 0</a:t>
+            </a:r>
+            <a:br>
+              <a:rPr lang="en-US" sz="1200" dirty="0" smtClean="0">
+                <a:solidFill>
+                  <a:srgbClr val="3F7F5F"/>
+                </a:solidFill>
+                <a:latin typeface="Courier New"/>
+                <a:ea typeface="Calibri"/>
+                <a:cs typeface="Times New Roman"/>
+              </a:rPr>
+            </a:br>
+            <a:endParaRPr lang="de-CH" sz="1600" dirty="0" smtClean="0">
+              <a:latin typeface="Calibri"/>
+              <a:ea typeface="Calibri"/>
+              <a:cs typeface="Times New Roman"/>
+            </a:endParaRPr>
+          </a:p>
+          <a:p>
+            <a:r>
+              <a:rPr lang="en-US" sz="1200" dirty="0" smtClean="0">
+                <a:solidFill>
+                  <a:srgbClr val="3F7F5F"/>
+                </a:solidFill>
+                <a:latin typeface="Courier New"/>
+                <a:ea typeface="Calibri"/>
+              </a:rPr>
+              <a:t>// # - just </a:t>
+            </a:r>
+            <a:r>
+              <a:rPr lang="en-US" sz="1200" dirty="0" err="1" smtClean="0">
+                <a:solidFill>
+                  <a:srgbClr val="3F7F5F"/>
+                </a:solidFill>
+                <a:latin typeface="Courier New"/>
+                <a:ea typeface="Calibri"/>
+              </a:rPr>
+              <a:t>sayin</a:t>
+            </a:r>
+            <a:r>
+              <a:rPr lang="en-US" sz="1200" dirty="0" smtClean="0">
+                <a:solidFill>
+                  <a:srgbClr val="3F7F5F"/>
+                </a:solidFill>
+                <a:latin typeface="Courier New"/>
+                <a:ea typeface="Calibri"/>
+              </a:rPr>
+              <a:t>'</a:t>
+            </a:r>
+            <a:endParaRPr lang="de-CH" sz="1200" dirty="0"/>
+          </a:p>
+        </p:txBody>
+      </p:sp>
+      <p:sp>
+        <p:nvSpPr>
+          <p:cNvPr id="11" name="Textfeld 10"/>
+          <p:cNvSpPr txBox="1"/>
+          <p:nvPr/>
+        </p:nvSpPr>
+        <p:spPr>
+          <a:xfrm>
+            <a:off x="2051720" y="4509120"/>
+            <a:ext cx="6696744" cy="1154162"/>
+          </a:xfrm>
+          <a:prstGeom prst="rect">
+            <a:avLst/>
+          </a:prstGeom>
+          <a:solidFill>
+            <a:srgbClr val="FFFFFF">
+              <a:alpha val="74118"/>
+            </a:srgbClr>
+          </a:solidFill>
+          <a:effectLst>
+            <a:outerShdw blurRad="546100" dir="5400000" sx="104000" sy="104000" algn="ctr" rotWithShape="0">
+              <a:schemeClr val="tx1">
+                <a:alpha val="47000"/>
+              </a:schemeClr>
+            </a:outerShdw>
+          </a:effectLst>
+        </p:spPr>
+        <p:txBody>
+          <a:bodyPr wrap="square" rtlCol="0">
+            <a:spAutoFit/>
+          </a:bodyPr>
+          <a:lstStyle/>
+          <a:p>
+            <a:pPr>
+              <a:lnSpc>
+                <a:spcPct val="115000"/>
+              </a:lnSpc>
+              <a:spcAft>
+                <a:spcPts val="1000"/>
+              </a:spcAft>
+            </a:pPr>
+            <a:r>
+              <a:rPr lang="en-US" sz="1200" dirty="0" smtClean="0">
+                <a:solidFill>
+                  <a:srgbClr val="3F7F5F"/>
+                </a:solidFill>
+                <a:latin typeface="Courier New"/>
+                <a:ea typeface="Calibri"/>
+              </a:rPr>
+              <a:t>// # - Challenge accepted by kasen1, C:</a:t>
+            </a:r>
+            <a:br>
+              <a:rPr lang="en-US" sz="1200" dirty="0" smtClean="0">
+                <a:solidFill>
+                  <a:srgbClr val="3F7F5F"/>
+                </a:solidFill>
+                <a:latin typeface="Courier New"/>
+                <a:ea typeface="Calibri"/>
+              </a:rPr>
+            </a:br>
+            <a:r>
+              <a:rPr lang="en-US" sz="1200" dirty="0" smtClean="0">
+                <a:solidFill>
+                  <a:srgbClr val="3F7F5F"/>
+                </a:solidFill>
+                <a:latin typeface="Courier New"/>
+                <a:ea typeface="Calibri"/>
+              </a:rPr>
+              <a:t>// return !((</a:t>
+            </a:r>
+            <a:r>
+              <a:rPr lang="en-US" sz="1200" dirty="0" err="1" smtClean="0">
+                <a:solidFill>
+                  <a:srgbClr val="3F7F5F"/>
+                </a:solidFill>
+                <a:latin typeface="Courier New"/>
+                <a:ea typeface="Calibri"/>
+              </a:rPr>
+              <a:t>pos.x</a:t>
+            </a:r>
+            <a:r>
+              <a:rPr lang="en-US" sz="1200" dirty="0" smtClean="0">
+                <a:solidFill>
+                  <a:srgbClr val="3F7F5F"/>
+                </a:solidFill>
+                <a:latin typeface="Courier New"/>
+                <a:ea typeface="Calibri"/>
+              </a:rPr>
+              <a:t>&gt;PLAYGROUND_X_MAX)||(</a:t>
+            </a:r>
+            <a:r>
+              <a:rPr lang="en-US" sz="1200" dirty="0" err="1" smtClean="0">
+                <a:solidFill>
+                  <a:srgbClr val="3F7F5F"/>
+                </a:solidFill>
+                <a:latin typeface="Courier New"/>
+                <a:ea typeface="Calibri"/>
+              </a:rPr>
+              <a:t>pos.y</a:t>
+            </a:r>
+            <a:r>
+              <a:rPr lang="en-US" sz="1200" dirty="0" smtClean="0">
+                <a:solidFill>
+                  <a:srgbClr val="3F7F5F"/>
+                </a:solidFill>
+                <a:latin typeface="Courier New"/>
+                <a:ea typeface="Calibri"/>
+              </a:rPr>
+              <a:t>&gt;PLAYGROUND_Y_MAX)||</a:t>
+            </a:r>
+            <a:r>
+              <a:rPr lang="en-US" sz="1200" dirty="0" smtClean="0">
+                <a:solidFill>
+                  <a:srgbClr val="3F7F5F"/>
+                </a:solidFill>
+                <a:latin typeface="Courier New"/>
+                <a:ea typeface="Calibri"/>
+              </a:rPr>
+              <a:t/>
+            </a:r>
+            <a:br>
+              <a:rPr lang="en-US" sz="1200" dirty="0" smtClean="0">
+                <a:solidFill>
+                  <a:srgbClr val="3F7F5F"/>
+                </a:solidFill>
+                <a:latin typeface="Courier New"/>
+                <a:ea typeface="Calibri"/>
+              </a:rPr>
+            </a:br>
+            <a:r>
+              <a:rPr lang="en-US" sz="1200" dirty="0" smtClean="0">
+                <a:solidFill>
+                  <a:srgbClr val="3F7F5F"/>
+                </a:solidFill>
+                <a:latin typeface="Courier New"/>
+                <a:ea typeface="Calibri"/>
+              </a:rPr>
+              <a:t>            (</a:t>
+            </a:r>
+            <a:r>
+              <a:rPr lang="en-US" sz="1200" dirty="0" err="1" smtClean="0">
+                <a:solidFill>
+                  <a:srgbClr val="3F7F5F"/>
+                </a:solidFill>
+                <a:latin typeface="Courier New"/>
+                <a:ea typeface="Calibri"/>
+              </a:rPr>
+              <a:t>pos.x</a:t>
+            </a:r>
+            <a:r>
+              <a:rPr lang="en-US" sz="1200" dirty="0" smtClean="0">
+                <a:solidFill>
+                  <a:srgbClr val="3F7F5F"/>
+                </a:solidFill>
+                <a:latin typeface="Courier New"/>
+                <a:ea typeface="Calibri"/>
+              </a:rPr>
+              <a:t>&lt;=0)||(</a:t>
+            </a:r>
+            <a:r>
+              <a:rPr lang="en-US" sz="1200" dirty="0" err="1" smtClean="0">
+                <a:solidFill>
+                  <a:srgbClr val="3F7F5F"/>
+                </a:solidFill>
+                <a:latin typeface="Courier New"/>
+                <a:ea typeface="Calibri"/>
+              </a:rPr>
+              <a:t>pos.y</a:t>
+            </a:r>
+            <a:r>
+              <a:rPr lang="en-US" sz="1200" dirty="0" smtClean="0">
+                <a:solidFill>
+                  <a:srgbClr val="3F7F5F"/>
+                </a:solidFill>
+                <a:latin typeface="Courier New"/>
+                <a:ea typeface="Calibri"/>
+              </a:rPr>
+              <a:t>&lt;=0));</a:t>
+            </a:r>
+            <a:br>
+              <a:rPr lang="en-US" sz="1200" dirty="0" smtClean="0">
+                <a:solidFill>
+                  <a:srgbClr val="3F7F5F"/>
+                </a:solidFill>
+                <a:latin typeface="Courier New"/>
+                <a:ea typeface="Calibri"/>
+              </a:rPr>
+            </a:br>
+            <a:r>
+              <a:rPr lang="en-US" sz="1200" dirty="0" smtClean="0">
+                <a:solidFill>
+                  <a:srgbClr val="3F7F5F"/>
+                </a:solidFill>
+                <a:latin typeface="Courier New"/>
+                <a:ea typeface="Calibri"/>
+              </a:rPr>
+              <a:t/>
+            </a:r>
+            <a:br>
+              <a:rPr lang="en-US" sz="1200" dirty="0" smtClean="0">
+                <a:solidFill>
+                  <a:srgbClr val="3F7F5F"/>
+                </a:solidFill>
+                <a:latin typeface="Courier New"/>
+                <a:ea typeface="Calibri"/>
+              </a:rPr>
+            </a:br>
+            <a:r>
+              <a:rPr lang="en-US" sz="1200" dirty="0" smtClean="0">
+                <a:solidFill>
+                  <a:srgbClr val="3F7F5F"/>
+                </a:solidFill>
+                <a:latin typeface="Courier New"/>
+                <a:ea typeface="Calibri"/>
+              </a:rPr>
+              <a:t>// # - Like a Boss!</a:t>
+            </a:r>
+            <a:endParaRPr lang="de-CH" sz="1200" dirty="0"/>
+          </a:p>
+        </p:txBody>
+      </p:sp>
+      <p:sp>
+        <p:nvSpPr>
+          <p:cNvPr id="12" name="Textfeld 11"/>
+          <p:cNvSpPr txBox="1"/>
+          <p:nvPr/>
+        </p:nvSpPr>
+        <p:spPr>
+          <a:xfrm>
+            <a:off x="179512" y="332656"/>
+            <a:ext cx="1728192" cy="584775"/>
+          </a:xfrm>
+          <a:prstGeom prst="rect">
+            <a:avLst/>
+          </a:prstGeom>
+          <a:noFill/>
+        </p:spPr>
+        <p:txBody>
+          <a:bodyPr wrap="square" rtlCol="0">
+            <a:spAutoFit/>
+          </a:bodyPr>
+          <a:lstStyle/>
+          <a:p>
+            <a:r>
+              <a:rPr lang="de-CH" sz="1600" dirty="0" smtClean="0">
+                <a:latin typeface="Consolas" pitchFamily="49" charset="0"/>
+                <a:cs typeface="Consolas" pitchFamily="49" charset="0"/>
+              </a:rPr>
+              <a:t>19.03.2012 – </a:t>
+            </a:r>
+            <a:br>
+              <a:rPr lang="de-CH" sz="1600" dirty="0" smtClean="0">
+                <a:latin typeface="Consolas" pitchFamily="49" charset="0"/>
+                <a:cs typeface="Consolas" pitchFamily="49" charset="0"/>
+              </a:rPr>
+            </a:br>
+            <a:r>
+              <a:rPr lang="de-CH" sz="1600" dirty="0" err="1" smtClean="0">
+                <a:latin typeface="Consolas" pitchFamily="49" charset="0"/>
+                <a:cs typeface="Consolas" pitchFamily="49" charset="0"/>
+              </a:rPr>
+              <a:t>by</a:t>
+            </a:r>
+            <a:r>
+              <a:rPr lang="de-CH" sz="1600" dirty="0" smtClean="0">
+                <a:latin typeface="Consolas" pitchFamily="49" charset="0"/>
+                <a:cs typeface="Consolas" pitchFamily="49" charset="0"/>
+              </a:rPr>
+              <a:t> Stoller</a:t>
+            </a:r>
+            <a:endParaRPr lang="de-CH" sz="1600" dirty="0">
+              <a:latin typeface="Consolas" pitchFamily="49" charset="0"/>
+              <a:cs typeface="Consolas" pitchFamily="49" charset="0"/>
+            </a:endParaRPr>
+          </a:p>
+        </p:txBody>
+      </p:sp>
+      <p:sp>
+        <p:nvSpPr>
+          <p:cNvPr id="14" name="Textfeld 13"/>
+          <p:cNvSpPr txBox="1"/>
+          <p:nvPr/>
+        </p:nvSpPr>
+        <p:spPr>
+          <a:xfrm>
+            <a:off x="179512" y="4509120"/>
+            <a:ext cx="1728192" cy="584775"/>
+          </a:xfrm>
+          <a:prstGeom prst="rect">
+            <a:avLst/>
+          </a:prstGeom>
+          <a:noFill/>
+        </p:spPr>
+        <p:txBody>
+          <a:bodyPr wrap="square" rtlCol="0">
+            <a:spAutoFit/>
+          </a:bodyPr>
+          <a:lstStyle/>
+          <a:p>
+            <a:r>
+              <a:rPr lang="de-CH" sz="1600" dirty="0" smtClean="0">
+                <a:latin typeface="Consolas" pitchFamily="49" charset="0"/>
+                <a:cs typeface="Consolas" pitchFamily="49" charset="0"/>
+              </a:rPr>
+              <a:t>31.03.2012 – </a:t>
+            </a:r>
+            <a:br>
+              <a:rPr lang="de-CH" sz="1600" dirty="0" smtClean="0">
+                <a:latin typeface="Consolas" pitchFamily="49" charset="0"/>
+                <a:cs typeface="Consolas" pitchFamily="49" charset="0"/>
+              </a:rPr>
+            </a:br>
+            <a:r>
+              <a:rPr lang="de-CH" sz="1600" dirty="0" err="1" smtClean="0">
+                <a:latin typeface="Consolas" pitchFamily="49" charset="0"/>
+                <a:cs typeface="Consolas" pitchFamily="49" charset="0"/>
+              </a:rPr>
+              <a:t>by</a:t>
+            </a:r>
+            <a:r>
+              <a:rPr lang="de-CH" sz="1600" dirty="0" smtClean="0">
+                <a:latin typeface="Consolas" pitchFamily="49" charset="0"/>
+                <a:cs typeface="Consolas" pitchFamily="49" charset="0"/>
+              </a:rPr>
+              <a:t> Käser</a:t>
+            </a:r>
+            <a:endParaRPr lang="de-CH" sz="1600" dirty="0">
+              <a:latin typeface="Consolas" pitchFamily="49" charset="0"/>
+              <a:cs typeface="Consolas" pitchFamily="49" charset="0"/>
+            </a:endParaRPr>
           </a:p>
         </p:txBody>
       </p:sp>
     </p:spTree>
     <p:extLst>
       <p:ext uri="{BB962C8B-B14F-4D97-AF65-F5344CB8AC3E}">
-        <p14:creationId xmlns:p14="http://schemas.microsoft.com/office/powerpoint/2010/main" val="1300663606"/>
+        <p14:creationId xmlns:p14="http://schemas.microsoft.com/office/powerpoint/2010/main" xmlns="" val="3199722868"/>
       </p:ext>
     </p:extLst>
   </p:cSld>
@@ -3904,9 +6399,268 @@
   <p:timing>
     <p:tnLst>
       <p:par>
-        <p:cTn id="1" dur="indefinite" restart="never" nodeType="tmRoot"/>
+        <p:cTn id="1" dur="indefinite" restart="never" nodeType="tmRoot">
+          <p:childTnLst>
+            <p:seq concurrent="1" nextAc="seek">
+              <p:cTn id="2" dur="indefinite" nodeType="mainSeq">
+                <p:childTnLst>
+                  <p:par>
+                    <p:cTn id="3" fill="hold">
+                      <p:stCondLst>
+                        <p:cond delay="indefinite"/>
+                      </p:stCondLst>
+                      <p:childTnLst>
+                        <p:par>
+                          <p:cTn id="4" fill="hold">
+                            <p:stCondLst>
+                              <p:cond delay="0"/>
+                            </p:stCondLst>
+                            <p:childTnLst>
+                              <p:par>
+                                <p:cTn id="5" presetID="10" presetClass="entr" presetSubtype="0" fill="hold" grpId="0" nodeType="clickEffect">
+                                  <p:stCondLst>
+                                    <p:cond delay="0"/>
+                                  </p:stCondLst>
+                                  <p:childTnLst>
+                                    <p:set>
+                                      <p:cBhvr>
+                                        <p:cTn id="6" dur="1" fill="hold">
+                                          <p:stCondLst>
+                                            <p:cond delay="0"/>
+                                          </p:stCondLst>
+                                        </p:cTn>
+                                        <p:tgtEl>
+                                          <p:spTgt spid="6"/>
+                                        </p:tgtEl>
+                                        <p:attrNameLst>
+                                          <p:attrName>style.visibility</p:attrName>
+                                        </p:attrNameLst>
+                                      </p:cBhvr>
+                                      <p:to>
+                                        <p:strVal val="visible"/>
+                                      </p:to>
+                                    </p:set>
+                                    <p:animEffect transition="in" filter="fade">
+                                      <p:cBhvr>
+                                        <p:cTn id="7" dur="500"/>
+                                        <p:tgtEl>
+                                          <p:spTgt spid="6"/>
+                                        </p:tgtEl>
+                                      </p:cBhvr>
+                                    </p:animEffect>
+                                  </p:childTnLst>
+                                </p:cTn>
+                              </p:par>
+                              <p:par>
+                                <p:cTn id="8" presetID="10" presetClass="entr" presetSubtype="0" fill="hold" grpId="0" nodeType="withEffect">
+                                  <p:stCondLst>
+                                    <p:cond delay="0"/>
+                                  </p:stCondLst>
+                                  <p:childTnLst>
+                                    <p:set>
+                                      <p:cBhvr>
+                                        <p:cTn id="9" dur="1" fill="hold">
+                                          <p:stCondLst>
+                                            <p:cond delay="0"/>
+                                          </p:stCondLst>
+                                        </p:cTn>
+                                        <p:tgtEl>
+                                          <p:spTgt spid="12"/>
+                                        </p:tgtEl>
+                                        <p:attrNameLst>
+                                          <p:attrName>style.visibility</p:attrName>
+                                        </p:attrNameLst>
+                                      </p:cBhvr>
+                                      <p:to>
+                                        <p:strVal val="visible"/>
+                                      </p:to>
+                                    </p:set>
+                                    <p:animEffect transition="in" filter="fade">
+                                      <p:cBhvr>
+                                        <p:cTn id="10" dur="500"/>
+                                        <p:tgtEl>
+                                          <p:spTgt spid="12"/>
+                                        </p:tgtEl>
+                                      </p:cBhvr>
+                                    </p:animEffect>
+                                  </p:childTnLst>
+                                </p:cTn>
+                              </p:par>
+                            </p:childTnLst>
+                          </p:cTn>
+                        </p:par>
+                      </p:childTnLst>
+                    </p:cTn>
+                  </p:par>
+                  <p:par>
+                    <p:cTn id="11" fill="hold">
+                      <p:stCondLst>
+                        <p:cond delay="indefinite"/>
+                      </p:stCondLst>
+                      <p:childTnLst>
+                        <p:par>
+                          <p:cTn id="12" fill="hold">
+                            <p:stCondLst>
+                              <p:cond delay="0"/>
+                            </p:stCondLst>
+                            <p:childTnLst>
+                              <p:par>
+                                <p:cTn id="13" presetID="10" presetClass="entr" presetSubtype="0" fill="hold" grpId="0" nodeType="clickEffect">
+                                  <p:stCondLst>
+                                    <p:cond delay="0"/>
+                                  </p:stCondLst>
+                                  <p:childTnLst>
+                                    <p:set>
+                                      <p:cBhvr>
+                                        <p:cTn id="14" dur="1" fill="hold">
+                                          <p:stCondLst>
+                                            <p:cond delay="0"/>
+                                          </p:stCondLst>
+                                        </p:cTn>
+                                        <p:tgtEl>
+                                          <p:spTgt spid="10"/>
+                                        </p:tgtEl>
+                                        <p:attrNameLst>
+                                          <p:attrName>style.visibility</p:attrName>
+                                        </p:attrNameLst>
+                                      </p:cBhvr>
+                                      <p:to>
+                                        <p:strVal val="visible"/>
+                                      </p:to>
+                                    </p:set>
+                                    <p:animEffect transition="in" filter="fade">
+                                      <p:cBhvr>
+                                        <p:cTn id="15" dur="500"/>
+                                        <p:tgtEl>
+                                          <p:spTgt spid="10"/>
+                                        </p:tgtEl>
+                                      </p:cBhvr>
+                                    </p:animEffect>
+                                  </p:childTnLst>
+                                </p:cTn>
+                              </p:par>
+                            </p:childTnLst>
+                          </p:cTn>
+                        </p:par>
+                      </p:childTnLst>
+                    </p:cTn>
+                  </p:par>
+                  <p:par>
+                    <p:cTn id="16" fill="hold">
+                      <p:stCondLst>
+                        <p:cond delay="indefinite"/>
+                      </p:stCondLst>
+                      <p:childTnLst>
+                        <p:par>
+                          <p:cTn id="17" fill="hold">
+                            <p:stCondLst>
+                              <p:cond delay="0"/>
+                            </p:stCondLst>
+                            <p:childTnLst>
+                              <p:par>
+                                <p:cTn id="18" presetID="10" presetClass="entr" presetSubtype="0" fill="hold" grpId="0" nodeType="clickEffect">
+                                  <p:stCondLst>
+                                    <p:cond delay="0"/>
+                                  </p:stCondLst>
+                                  <p:childTnLst>
+                                    <p:set>
+                                      <p:cBhvr>
+                                        <p:cTn id="19" dur="1" fill="hold">
+                                          <p:stCondLst>
+                                            <p:cond delay="0"/>
+                                          </p:stCondLst>
+                                        </p:cTn>
+                                        <p:tgtEl>
+                                          <p:spTgt spid="11"/>
+                                        </p:tgtEl>
+                                        <p:attrNameLst>
+                                          <p:attrName>style.visibility</p:attrName>
+                                        </p:attrNameLst>
+                                      </p:cBhvr>
+                                      <p:to>
+                                        <p:strVal val="visible"/>
+                                      </p:to>
+                                    </p:set>
+                                    <p:animEffect transition="in" filter="fade">
+                                      <p:cBhvr>
+                                        <p:cTn id="20" dur="500"/>
+                                        <p:tgtEl>
+                                          <p:spTgt spid="11"/>
+                                        </p:tgtEl>
+                                      </p:cBhvr>
+                                    </p:animEffect>
+                                  </p:childTnLst>
+                                </p:cTn>
+                              </p:par>
+                              <p:par>
+                                <p:cTn id="21" presetID="10" presetClass="entr" presetSubtype="0" fill="hold" grpId="0" nodeType="withEffect">
+                                  <p:stCondLst>
+                                    <p:cond delay="0"/>
+                                  </p:stCondLst>
+                                  <p:childTnLst>
+                                    <p:set>
+                                      <p:cBhvr>
+                                        <p:cTn id="22" dur="1" fill="hold">
+                                          <p:stCondLst>
+                                            <p:cond delay="0"/>
+                                          </p:stCondLst>
+                                        </p:cTn>
+                                        <p:tgtEl>
+                                          <p:spTgt spid="14"/>
+                                        </p:tgtEl>
+                                        <p:attrNameLst>
+                                          <p:attrName>style.visibility</p:attrName>
+                                        </p:attrNameLst>
+                                      </p:cBhvr>
+                                      <p:to>
+                                        <p:strVal val="visible"/>
+                                      </p:to>
+                                    </p:set>
+                                    <p:animEffect transition="in" filter="fade">
+                                      <p:cBhvr>
+                                        <p:cTn id="23" dur="500"/>
+                                        <p:tgtEl>
+                                          <p:spTgt spid="14"/>
+                                        </p:tgtEl>
+                                      </p:cBhvr>
+                                    </p:animEffect>
+                                  </p:childTnLst>
+                                </p:cTn>
+                              </p:par>
+                            </p:childTnLst>
+                          </p:cTn>
+                        </p:par>
+                      </p:childTnLst>
+                    </p:cTn>
+                  </p:par>
+                </p:childTnLst>
+              </p:cTn>
+              <p:prevCondLst>
+                <p:cond evt="onPrev" delay="0">
+                  <p:tgtEl>
+                    <p:sldTgt/>
+                  </p:tgtEl>
+                </p:cond>
+              </p:prevCondLst>
+              <p:nextCondLst>
+                <p:cond evt="onNext" delay="0">
+                  <p:tgtEl>
+                    <p:sldTgt/>
+                  </p:tgtEl>
+                </p:cond>
+              </p:nextCondLst>
+            </p:seq>
+          </p:childTnLst>
+        </p:cTn>
       </p:par>
     </p:tnLst>
+    <p:bldLst>
+      <p:bldP spid="6" grpId="0" animBg="1"/>
+      <p:bldP spid="10" grpId="0" animBg="1"/>
+      <p:bldP spid="11" grpId="0" animBg="1"/>
+      <p:bldP spid="12" grpId="0"/>
+      <p:bldP spid="14" grpId="0"/>
+    </p:bldLst>
   </p:timing>
 </p:sld>
 </file>
@@ -3930,53 +6684,1189 @@
       </p:grpSpPr>
       <p:sp>
         <p:nvSpPr>
-          <p:cNvPr id="2" name="Titel 1"/>
-          <p:cNvSpPr>
-            <a:spLocks noGrp="1"/>
-          </p:cNvSpPr>
-          <p:nvPr>
-            <p:ph type="title"/>
-          </p:nvPr>
-        </p:nvSpPr>
-        <p:spPr/>
-        <p:txBody>
-          <a:bodyPr/>
+          <p:cNvPr id="6" name="Textfeld 5"/>
+          <p:cNvSpPr txBox="1"/>
+          <p:nvPr/>
+        </p:nvSpPr>
+        <p:spPr>
+          <a:xfrm>
+            <a:off x="9612560" y="1412776"/>
+            <a:ext cx="6696744" cy="2400657"/>
+          </a:xfrm>
+          <a:prstGeom prst="rect">
+            <a:avLst/>
+          </a:prstGeom>
+          <a:solidFill>
+            <a:srgbClr val="FFFFFF">
+              <a:alpha val="74118"/>
+            </a:srgbClr>
+          </a:solidFill>
+        </p:spPr>
+        <p:txBody>
+          <a:bodyPr wrap="square" rtlCol="0">
+            <a:spAutoFit/>
+          </a:bodyPr>
           <a:lstStyle/>
           <a:p>
-            <a:r>
-              <a:rPr lang="de-CH" dirty="0" smtClean="0"/>
-              <a:t>Spieldemonstration</a:t>
-            </a:r>
-            <a:endParaRPr lang="de-CH" dirty="0"/>
-          </a:p>
-        </p:txBody>
-      </p:sp>
-      <p:sp>
-        <p:nvSpPr>
-          <p:cNvPr id="3" name="Inhaltsplatzhalter 2"/>
-          <p:cNvSpPr>
-            <a:spLocks noGrp="1"/>
-          </p:cNvSpPr>
-          <p:nvPr>
-            <p:ph sz="quarter" idx="13"/>
-          </p:nvPr>
-        </p:nvSpPr>
-        <p:spPr/>
-        <p:txBody>
-          <a:bodyPr/>
-          <a:lstStyle/>
-          <a:p>
-            <a:endParaRPr lang="de-CH" dirty="0" smtClean="0"/>
-          </a:p>
-          <a:p>
-            <a:endParaRPr lang="de-CH" dirty="0"/>
-          </a:p>
-        </p:txBody>
-      </p:sp>
+            <a:pPr>
+              <a:lnSpc>
+                <a:spcPct val="115000"/>
+              </a:lnSpc>
+              <a:spcAft>
+                <a:spcPts val="0"/>
+              </a:spcAft>
+            </a:pPr>
+            <a:r>
+              <a:rPr lang="en-US" sz="1200" b="1" dirty="0" smtClean="0">
+                <a:solidFill>
+                  <a:srgbClr val="7F0055"/>
+                </a:solidFill>
+                <a:latin typeface="Courier New"/>
+                <a:ea typeface="Calibri"/>
+                <a:cs typeface="Times New Roman"/>
+              </a:rPr>
+              <a:t>if</a:t>
+            </a:r>
+            <a:r>
+              <a:rPr lang="en-US" sz="1200" dirty="0" smtClean="0">
+                <a:solidFill>
+                  <a:srgbClr val="000000"/>
+                </a:solidFill>
+                <a:latin typeface="Courier New"/>
+                <a:ea typeface="Calibri"/>
+                <a:cs typeface="Times New Roman"/>
+              </a:rPr>
+              <a:t>((</a:t>
+            </a:r>
+            <a:r>
+              <a:rPr lang="en-US" sz="1200" dirty="0" err="1" smtClean="0">
+                <a:solidFill>
+                  <a:srgbClr val="000000"/>
+                </a:solidFill>
+                <a:latin typeface="Courier New"/>
+                <a:ea typeface="Calibri"/>
+                <a:cs typeface="Times New Roman"/>
+              </a:rPr>
+              <a:t>pos.</a:t>
+            </a:r>
+            <a:r>
+              <a:rPr lang="en-US" sz="1200" dirty="0" err="1" smtClean="0">
+                <a:solidFill>
+                  <a:srgbClr val="0000C0"/>
+                </a:solidFill>
+                <a:latin typeface="Courier New"/>
+                <a:ea typeface="Calibri"/>
+                <a:cs typeface="Times New Roman"/>
+              </a:rPr>
+              <a:t>x</a:t>
+            </a:r>
+            <a:r>
+              <a:rPr lang="en-US" sz="1200" dirty="0" smtClean="0">
+                <a:solidFill>
+                  <a:srgbClr val="000000"/>
+                </a:solidFill>
+                <a:latin typeface="Courier New"/>
+                <a:ea typeface="Calibri"/>
+                <a:cs typeface="Times New Roman"/>
+              </a:rPr>
+              <a:t> &lt; PLAYGROUND_X_MAX &amp;&amp; </a:t>
+            </a:r>
+            <a:r>
+              <a:rPr lang="en-US" sz="1200" dirty="0" err="1" smtClean="0">
+                <a:solidFill>
+                  <a:srgbClr val="000000"/>
+                </a:solidFill>
+                <a:latin typeface="Courier New"/>
+                <a:ea typeface="Calibri"/>
+                <a:cs typeface="Times New Roman"/>
+              </a:rPr>
+              <a:t>pos.</a:t>
+            </a:r>
+            <a:r>
+              <a:rPr lang="en-US" sz="1200" dirty="0" err="1" smtClean="0">
+                <a:solidFill>
+                  <a:srgbClr val="0000C0"/>
+                </a:solidFill>
+                <a:latin typeface="Courier New"/>
+                <a:ea typeface="Calibri"/>
+                <a:cs typeface="Times New Roman"/>
+              </a:rPr>
+              <a:t>x</a:t>
+            </a:r>
+            <a:r>
+              <a:rPr lang="en-US" sz="1200" dirty="0" smtClean="0">
+                <a:solidFill>
+                  <a:srgbClr val="000000"/>
+                </a:solidFill>
+                <a:latin typeface="Courier New"/>
+                <a:ea typeface="Calibri"/>
+                <a:cs typeface="Times New Roman"/>
+              </a:rPr>
+              <a:t> &gt;= 0) &amp;&amp;</a:t>
+            </a:r>
+            <a:endParaRPr lang="de-CH" sz="1200" dirty="0" smtClean="0">
+              <a:latin typeface="Calibri"/>
+              <a:ea typeface="Calibri"/>
+              <a:cs typeface="Times New Roman"/>
+            </a:endParaRPr>
+          </a:p>
+          <a:p>
+            <a:pPr>
+              <a:lnSpc>
+                <a:spcPct val="115000"/>
+              </a:lnSpc>
+              <a:spcAft>
+                <a:spcPts val="0"/>
+              </a:spcAft>
+            </a:pPr>
+            <a:r>
+              <a:rPr lang="en-US" sz="1200" dirty="0" smtClean="0">
+                <a:solidFill>
+                  <a:srgbClr val="000000"/>
+                </a:solidFill>
+                <a:latin typeface="Courier New"/>
+                <a:ea typeface="Calibri"/>
+                <a:cs typeface="Times New Roman"/>
+              </a:rPr>
+              <a:t>   (</a:t>
+            </a:r>
+            <a:r>
+              <a:rPr lang="en-US" sz="1200" dirty="0" err="1" smtClean="0">
+                <a:solidFill>
+                  <a:srgbClr val="000000"/>
+                </a:solidFill>
+                <a:latin typeface="Courier New"/>
+                <a:ea typeface="Calibri"/>
+                <a:cs typeface="Times New Roman"/>
+              </a:rPr>
+              <a:t>pos.</a:t>
+            </a:r>
+            <a:r>
+              <a:rPr lang="en-US" sz="1200" dirty="0" err="1" smtClean="0">
+                <a:solidFill>
+                  <a:srgbClr val="0000C0"/>
+                </a:solidFill>
+                <a:latin typeface="Courier New"/>
+                <a:ea typeface="Calibri"/>
+                <a:cs typeface="Times New Roman"/>
+              </a:rPr>
+              <a:t>y</a:t>
+            </a:r>
+            <a:r>
+              <a:rPr lang="en-US" sz="1200" dirty="0" smtClean="0">
+                <a:solidFill>
+                  <a:srgbClr val="000000"/>
+                </a:solidFill>
+                <a:latin typeface="Courier New"/>
+                <a:ea typeface="Calibri"/>
+                <a:cs typeface="Times New Roman"/>
+              </a:rPr>
+              <a:t> &lt; PLAYGROUND_Y_MAX &amp;&amp; </a:t>
+            </a:r>
+            <a:r>
+              <a:rPr lang="en-US" sz="1200" dirty="0" err="1" smtClean="0">
+                <a:solidFill>
+                  <a:srgbClr val="000000"/>
+                </a:solidFill>
+                <a:latin typeface="Courier New"/>
+                <a:ea typeface="Calibri"/>
+                <a:cs typeface="Times New Roman"/>
+              </a:rPr>
+              <a:t>pos.</a:t>
+            </a:r>
+            <a:r>
+              <a:rPr lang="en-US" sz="1200" dirty="0" err="1" smtClean="0">
+                <a:solidFill>
+                  <a:srgbClr val="0000C0"/>
+                </a:solidFill>
+                <a:latin typeface="Courier New"/>
+                <a:ea typeface="Calibri"/>
+                <a:cs typeface="Times New Roman"/>
+              </a:rPr>
+              <a:t>y</a:t>
+            </a:r>
+            <a:r>
+              <a:rPr lang="en-US" sz="1200" dirty="0" smtClean="0">
+                <a:solidFill>
+                  <a:srgbClr val="000000"/>
+                </a:solidFill>
+                <a:latin typeface="Courier New"/>
+                <a:ea typeface="Calibri"/>
+                <a:cs typeface="Times New Roman"/>
+              </a:rPr>
+              <a:t> &gt;= 0))</a:t>
+            </a:r>
+            <a:endParaRPr lang="de-CH" sz="1200" dirty="0" smtClean="0">
+              <a:latin typeface="Calibri"/>
+              <a:ea typeface="Calibri"/>
+              <a:cs typeface="Times New Roman"/>
+            </a:endParaRPr>
+          </a:p>
+          <a:p>
+            <a:pPr>
+              <a:lnSpc>
+                <a:spcPct val="115000"/>
+              </a:lnSpc>
+              <a:spcAft>
+                <a:spcPts val="0"/>
+              </a:spcAft>
+            </a:pPr>
+            <a:r>
+              <a:rPr lang="de-CH" sz="1200" dirty="0" smtClean="0">
+                <a:solidFill>
+                  <a:srgbClr val="000000"/>
+                </a:solidFill>
+                <a:latin typeface="Courier New"/>
+                <a:ea typeface="Calibri"/>
+                <a:cs typeface="Times New Roman"/>
+              </a:rPr>
+              <a:t>{</a:t>
+            </a:r>
+            <a:endParaRPr lang="de-CH" sz="1200" dirty="0" smtClean="0">
+              <a:latin typeface="Calibri"/>
+              <a:ea typeface="Calibri"/>
+              <a:cs typeface="Times New Roman"/>
+            </a:endParaRPr>
+          </a:p>
+          <a:p>
+            <a:pPr>
+              <a:lnSpc>
+                <a:spcPct val="115000"/>
+              </a:lnSpc>
+              <a:spcAft>
+                <a:spcPts val="0"/>
+              </a:spcAft>
+            </a:pPr>
+            <a:r>
+              <a:rPr lang="de-CH" sz="1200" dirty="0" smtClean="0">
+                <a:solidFill>
+                  <a:srgbClr val="000000"/>
+                </a:solidFill>
+                <a:latin typeface="Courier New"/>
+                <a:ea typeface="Calibri"/>
+                <a:cs typeface="Times New Roman"/>
+              </a:rPr>
+              <a:t>    </a:t>
+            </a:r>
+            <a:r>
+              <a:rPr lang="de-CH" sz="1200" dirty="0" smtClean="0">
+                <a:solidFill>
+                  <a:srgbClr val="3F7F5F"/>
+                </a:solidFill>
+                <a:latin typeface="Courier New"/>
+                <a:ea typeface="Calibri"/>
+                <a:cs typeface="Times New Roman"/>
+              </a:rPr>
+              <a:t>// </a:t>
+            </a:r>
+            <a:r>
+              <a:rPr lang="de-CH" sz="1200" dirty="0" err="1" smtClean="0">
+                <a:solidFill>
+                  <a:srgbClr val="3F7F5F"/>
+                </a:solidFill>
+                <a:latin typeface="Courier New"/>
+                <a:ea typeface="Calibri"/>
+                <a:cs typeface="Times New Roman"/>
+              </a:rPr>
+              <a:t>true</a:t>
+            </a:r>
+            <a:r>
+              <a:rPr lang="de-CH" sz="1200" dirty="0" smtClean="0">
+                <a:solidFill>
+                  <a:srgbClr val="3F7F5F"/>
+                </a:solidFill>
+                <a:latin typeface="Courier New"/>
+                <a:ea typeface="Calibri"/>
+                <a:cs typeface="Times New Roman"/>
+              </a:rPr>
+              <a:t> zurückgeben</a:t>
+            </a:r>
+            <a:endParaRPr lang="de-CH" sz="1200" dirty="0" smtClean="0">
+              <a:latin typeface="Calibri"/>
+              <a:ea typeface="Calibri"/>
+              <a:cs typeface="Times New Roman"/>
+            </a:endParaRPr>
+          </a:p>
+          <a:p>
+            <a:pPr>
+              <a:lnSpc>
+                <a:spcPct val="115000"/>
+              </a:lnSpc>
+              <a:spcAft>
+                <a:spcPts val="0"/>
+              </a:spcAft>
+            </a:pPr>
+            <a:r>
+              <a:rPr lang="de-CH" sz="1200" dirty="0" smtClean="0">
+                <a:solidFill>
+                  <a:srgbClr val="000000"/>
+                </a:solidFill>
+                <a:latin typeface="Courier New"/>
+                <a:ea typeface="Calibri"/>
+                <a:cs typeface="Times New Roman"/>
+              </a:rPr>
+              <a:t>    </a:t>
+            </a:r>
+            <a:r>
+              <a:rPr lang="de-CH" sz="1200" b="1" dirty="0" err="1" smtClean="0">
+                <a:solidFill>
+                  <a:srgbClr val="7F0055"/>
+                </a:solidFill>
+                <a:latin typeface="Courier New"/>
+                <a:ea typeface="Calibri"/>
+                <a:cs typeface="Times New Roman"/>
+              </a:rPr>
+              <a:t>return</a:t>
+            </a:r>
+            <a:r>
+              <a:rPr lang="de-CH" sz="1200" dirty="0" smtClean="0">
+                <a:solidFill>
+                  <a:srgbClr val="000000"/>
+                </a:solidFill>
+                <a:latin typeface="Courier New"/>
+                <a:ea typeface="Calibri"/>
+                <a:cs typeface="Times New Roman"/>
+              </a:rPr>
+              <a:t> 1;</a:t>
+            </a:r>
+            <a:endParaRPr lang="de-CH" sz="1200" dirty="0" smtClean="0">
+              <a:latin typeface="Calibri"/>
+              <a:ea typeface="Calibri"/>
+              <a:cs typeface="Times New Roman"/>
+            </a:endParaRPr>
+          </a:p>
+          <a:p>
+            <a:pPr>
+              <a:lnSpc>
+                <a:spcPct val="115000"/>
+              </a:lnSpc>
+              <a:spcAft>
+                <a:spcPts val="0"/>
+              </a:spcAft>
+            </a:pPr>
+            <a:r>
+              <a:rPr lang="de-CH" sz="1200" dirty="0" smtClean="0">
+                <a:solidFill>
+                  <a:srgbClr val="000000"/>
+                </a:solidFill>
+                <a:latin typeface="Courier New"/>
+                <a:ea typeface="Calibri"/>
+                <a:cs typeface="Times New Roman"/>
+              </a:rPr>
+              <a:t>}</a:t>
+            </a:r>
+            <a:endParaRPr lang="de-CH" sz="1200" dirty="0" smtClean="0">
+              <a:latin typeface="Calibri"/>
+              <a:ea typeface="Calibri"/>
+              <a:cs typeface="Times New Roman"/>
+            </a:endParaRPr>
+          </a:p>
+          <a:p>
+            <a:pPr>
+              <a:lnSpc>
+                <a:spcPct val="115000"/>
+              </a:lnSpc>
+              <a:spcAft>
+                <a:spcPts val="0"/>
+              </a:spcAft>
+            </a:pPr>
+            <a:r>
+              <a:rPr lang="de-CH" sz="1200" b="1" dirty="0" err="1" smtClean="0">
+                <a:solidFill>
+                  <a:srgbClr val="7F0055"/>
+                </a:solidFill>
+                <a:latin typeface="Courier New"/>
+                <a:ea typeface="Calibri"/>
+                <a:cs typeface="Times New Roman"/>
+              </a:rPr>
+              <a:t>else</a:t>
+            </a:r>
+            <a:endParaRPr lang="de-CH" sz="1200" dirty="0" smtClean="0">
+              <a:latin typeface="Calibri"/>
+              <a:ea typeface="Calibri"/>
+              <a:cs typeface="Times New Roman"/>
+            </a:endParaRPr>
+          </a:p>
+          <a:p>
+            <a:pPr>
+              <a:lnSpc>
+                <a:spcPct val="115000"/>
+              </a:lnSpc>
+              <a:spcAft>
+                <a:spcPts val="0"/>
+              </a:spcAft>
+            </a:pPr>
+            <a:r>
+              <a:rPr lang="de-CH" sz="1200" dirty="0" smtClean="0">
+                <a:solidFill>
+                  <a:srgbClr val="000000"/>
+                </a:solidFill>
+                <a:latin typeface="Courier New"/>
+                <a:ea typeface="Calibri"/>
+                <a:cs typeface="Times New Roman"/>
+              </a:rPr>
+              <a:t>{</a:t>
+            </a:r>
+            <a:endParaRPr lang="de-CH" sz="1200" dirty="0" smtClean="0">
+              <a:latin typeface="Calibri"/>
+              <a:ea typeface="Calibri"/>
+              <a:cs typeface="Times New Roman"/>
+            </a:endParaRPr>
+          </a:p>
+          <a:p>
+            <a:pPr>
+              <a:lnSpc>
+                <a:spcPct val="115000"/>
+              </a:lnSpc>
+              <a:spcAft>
+                <a:spcPts val="0"/>
+              </a:spcAft>
+            </a:pPr>
+            <a:r>
+              <a:rPr lang="en-US" sz="1200" dirty="0" smtClean="0">
+                <a:solidFill>
+                  <a:srgbClr val="000000"/>
+                </a:solidFill>
+                <a:latin typeface="Courier New"/>
+                <a:ea typeface="Calibri"/>
+                <a:cs typeface="Times New Roman"/>
+              </a:rPr>
+              <a:t>    </a:t>
+            </a:r>
+            <a:r>
+              <a:rPr lang="en-US" sz="1200" dirty="0" smtClean="0">
+                <a:solidFill>
+                  <a:srgbClr val="3F7F5F"/>
+                </a:solidFill>
+                <a:latin typeface="Courier New"/>
+                <a:ea typeface="Calibri"/>
+                <a:cs typeface="Times New Roman"/>
+              </a:rPr>
+              <a:t>// false </a:t>
+            </a:r>
+            <a:r>
+              <a:rPr lang="en-US" sz="1200" dirty="0" err="1" smtClean="0">
+                <a:solidFill>
+                  <a:srgbClr val="3F7F5F"/>
+                </a:solidFill>
+                <a:latin typeface="Courier New"/>
+                <a:ea typeface="Calibri"/>
+                <a:cs typeface="Times New Roman"/>
+              </a:rPr>
+              <a:t>zurückgeben</a:t>
+            </a:r>
+            <a:endParaRPr lang="de-CH" sz="1200" dirty="0" smtClean="0">
+              <a:latin typeface="Calibri"/>
+              <a:ea typeface="Calibri"/>
+              <a:cs typeface="Times New Roman"/>
+            </a:endParaRPr>
+          </a:p>
+          <a:p>
+            <a:pPr>
+              <a:lnSpc>
+                <a:spcPct val="115000"/>
+              </a:lnSpc>
+              <a:spcAft>
+                <a:spcPts val="0"/>
+              </a:spcAft>
+            </a:pPr>
+            <a:r>
+              <a:rPr lang="en-US" sz="1200" dirty="0" smtClean="0">
+                <a:solidFill>
+                  <a:srgbClr val="000000"/>
+                </a:solidFill>
+                <a:latin typeface="Courier New"/>
+                <a:ea typeface="Calibri"/>
+                <a:cs typeface="Times New Roman"/>
+              </a:rPr>
+              <a:t>    </a:t>
+            </a:r>
+            <a:r>
+              <a:rPr lang="en-US" sz="1200" b="1" dirty="0" smtClean="0">
+                <a:solidFill>
+                  <a:srgbClr val="7F0055"/>
+                </a:solidFill>
+                <a:latin typeface="Courier New"/>
+                <a:ea typeface="Calibri"/>
+                <a:cs typeface="Times New Roman"/>
+              </a:rPr>
+              <a:t>return</a:t>
+            </a:r>
+            <a:r>
+              <a:rPr lang="en-US" sz="1200" dirty="0" smtClean="0">
+                <a:solidFill>
+                  <a:srgbClr val="000000"/>
+                </a:solidFill>
+                <a:latin typeface="Courier New"/>
+                <a:ea typeface="Calibri"/>
+                <a:cs typeface="Times New Roman"/>
+              </a:rPr>
+              <a:t> 0;</a:t>
+            </a:r>
+            <a:endParaRPr lang="de-CH" sz="1200" dirty="0" smtClean="0">
+              <a:latin typeface="Calibri"/>
+              <a:ea typeface="Calibri"/>
+              <a:cs typeface="Times New Roman"/>
+            </a:endParaRPr>
+          </a:p>
+          <a:p>
+            <a:r>
+              <a:rPr lang="en-US" sz="1200" dirty="0" smtClean="0">
+                <a:solidFill>
+                  <a:srgbClr val="000000"/>
+                </a:solidFill>
+                <a:latin typeface="Courier New"/>
+                <a:ea typeface="Calibri"/>
+              </a:rPr>
+              <a:t>}</a:t>
+            </a:r>
+            <a:endParaRPr lang="de-CH" sz="1200" dirty="0"/>
+          </a:p>
+        </p:txBody>
+      </p:sp>
+      <p:pic>
+        <p:nvPicPr>
+          <p:cNvPr id="21512" name="Picture 8" descr="http://blog.eogn.com/.a/6a00d8341c767353ef016762f7c808970b-800wi"/>
+          <p:cNvPicPr>
+            <a:picLocks noChangeAspect="1" noChangeArrowheads="1"/>
+          </p:cNvPicPr>
+          <p:nvPr/>
+        </p:nvPicPr>
+        <p:blipFill>
+          <a:blip r:embed="rId3" cstate="print"/>
+          <a:srcRect/>
+          <a:stretch>
+            <a:fillRect/>
+          </a:stretch>
+        </p:blipFill>
+        <p:spPr bwMode="auto">
+          <a:xfrm>
+            <a:off x="179512" y="188640"/>
+            <a:ext cx="1805947" cy="2708920"/>
+          </a:xfrm>
+          <a:prstGeom prst="rect">
+            <a:avLst/>
+          </a:prstGeom>
+          <a:noFill/>
+        </p:spPr>
+      </p:pic>
+      <p:pic>
+        <p:nvPicPr>
+          <p:cNvPr id="21513" name="Picture 9" descr="C:\Users\Cyril\Pictures\Screenpresso\2012-04-13 17h05_29.png"/>
+          <p:cNvPicPr>
+            <a:picLocks noChangeAspect="1" noChangeArrowheads="1"/>
+          </p:cNvPicPr>
+          <p:nvPr/>
+        </p:nvPicPr>
+        <p:blipFill>
+          <a:blip r:embed="rId4" cstate="print"/>
+          <a:srcRect/>
+          <a:stretch>
+            <a:fillRect/>
+          </a:stretch>
+        </p:blipFill>
+        <p:spPr bwMode="auto">
+          <a:xfrm>
+            <a:off x="2555776" y="260648"/>
+            <a:ext cx="6316662" cy="1962150"/>
+          </a:xfrm>
+          <a:prstGeom prst="rect">
+            <a:avLst/>
+          </a:prstGeom>
+          <a:ln>
+            <a:noFill/>
+          </a:ln>
+          <a:effectLst>
+            <a:outerShdw blurRad="292100" dist="139700" dir="2700000" algn="tl" rotWithShape="0">
+              <a:schemeClr val="bg1">
+                <a:alpha val="65000"/>
+              </a:schemeClr>
+            </a:outerShdw>
+          </a:effectLst>
+        </p:spPr>
+      </p:pic>
+      <p:pic>
+        <p:nvPicPr>
+          <p:cNvPr id="21514" name="Picture 10" descr="C:\Users\Cyril\Pictures\Screenpresso\2012-04-13 17h08_25.png"/>
+          <p:cNvPicPr>
+            <a:picLocks noChangeAspect="1" noChangeArrowheads="1"/>
+          </p:cNvPicPr>
+          <p:nvPr/>
+        </p:nvPicPr>
+        <p:blipFill>
+          <a:blip r:embed="rId5" cstate="print"/>
+          <a:srcRect/>
+          <a:stretch>
+            <a:fillRect/>
+          </a:stretch>
+        </p:blipFill>
+        <p:spPr bwMode="auto">
+          <a:xfrm>
+            <a:off x="2305844" y="2346945"/>
+            <a:ext cx="6564312" cy="2162175"/>
+          </a:xfrm>
+          <a:prstGeom prst="rect">
+            <a:avLst/>
+          </a:prstGeom>
+          <a:ln>
+            <a:noFill/>
+          </a:ln>
+          <a:effectLst>
+            <a:outerShdw blurRad="292100" dist="139700" dir="2700000" algn="tl" rotWithShape="0">
+              <a:schemeClr val="bg1">
+                <a:alpha val="65000"/>
+              </a:schemeClr>
+            </a:outerShdw>
+          </a:effectLst>
+        </p:spPr>
+      </p:pic>
+      <p:pic>
+        <p:nvPicPr>
+          <p:cNvPr id="21515" name="Picture 11" descr="C:\Users\Cyril\Pictures\Screenpresso\2012-04-13 17h09_30.png"/>
+          <p:cNvPicPr>
+            <a:picLocks noChangeAspect="1" noChangeArrowheads="1"/>
+          </p:cNvPicPr>
+          <p:nvPr/>
+        </p:nvPicPr>
+        <p:blipFill>
+          <a:blip r:embed="rId6" cstate="print"/>
+          <a:srcRect/>
+          <a:stretch>
+            <a:fillRect/>
+          </a:stretch>
+        </p:blipFill>
+        <p:spPr bwMode="auto">
+          <a:xfrm>
+            <a:off x="1432223" y="4641676"/>
+            <a:ext cx="7440612" cy="2171700"/>
+          </a:xfrm>
+          <a:prstGeom prst="rect">
+            <a:avLst/>
+          </a:prstGeom>
+          <a:noFill/>
+        </p:spPr>
+      </p:pic>
+      <p:pic>
+        <p:nvPicPr>
+          <p:cNvPr id="21506" name="Picture 2" descr="internet memes - True Story"/>
+          <p:cNvPicPr>
+            <a:picLocks noChangeAspect="1" noChangeArrowheads="1" noCrop="1"/>
+          </p:cNvPicPr>
+          <p:nvPr/>
+        </p:nvPicPr>
+        <p:blipFill>
+          <a:blip r:embed="rId7" cstate="print"/>
+          <a:srcRect/>
+          <a:stretch>
+            <a:fillRect/>
+          </a:stretch>
+        </p:blipFill>
+        <p:spPr bwMode="auto">
+          <a:xfrm>
+            <a:off x="3923928" y="2420888"/>
+            <a:ext cx="2438400" cy="2438400"/>
+          </a:xfrm>
+          <a:prstGeom prst="rect">
+            <a:avLst/>
+          </a:prstGeom>
+          <a:ln w="38100" cap="sq">
+            <a:solidFill>
+              <a:srgbClr val="000000"/>
+            </a:solidFill>
+            <a:prstDash val="solid"/>
+            <a:miter lim="800000"/>
+          </a:ln>
+          <a:effectLst>
+            <a:outerShdw blurRad="330200" dir="2700000" sx="110000" sy="110000" algn="tl" rotWithShape="0">
+              <a:prstClr val="black">
+                <a:alpha val="74000"/>
+              </a:prstClr>
+            </a:outerShdw>
+          </a:effectLst>
+        </p:spPr>
+      </p:pic>
     </p:spTree>
     <p:extLst>
       <p:ext uri="{BB962C8B-B14F-4D97-AF65-F5344CB8AC3E}">
-        <p14:creationId xmlns:p14="http://schemas.microsoft.com/office/powerpoint/2010/main" val="1595990863"/>
+        <p14:creationId xmlns:p14="http://schemas.microsoft.com/office/powerpoint/2010/main" xmlns="" val="3199722868"/>
+      </p:ext>
+    </p:extLst>
+  </p:cSld>
+  <p:clrMapOvr>
+    <a:masterClrMapping/>
+  </p:clrMapOvr>
+  <p:timing>
+    <p:tnLst>
+      <p:par>
+        <p:cTn id="1" dur="indefinite" restart="never" nodeType="tmRoot">
+          <p:childTnLst>
+            <p:seq concurrent="1" nextAc="seek">
+              <p:cTn id="2" dur="indefinite" nodeType="mainSeq">
+                <p:childTnLst>
+                  <p:par>
+                    <p:cTn id="3" fill="hold">
+                      <p:stCondLst>
+                        <p:cond delay="indefinite"/>
+                      </p:stCondLst>
+                      <p:childTnLst>
+                        <p:par>
+                          <p:cTn id="4" fill="hold">
+                            <p:stCondLst>
+                              <p:cond delay="0"/>
+                            </p:stCondLst>
+                            <p:childTnLst>
+                              <p:par>
+                                <p:cTn id="5" presetID="10" presetClass="entr" presetSubtype="0" fill="hold" nodeType="clickEffect">
+                                  <p:stCondLst>
+                                    <p:cond delay="0"/>
+                                  </p:stCondLst>
+                                  <p:childTnLst>
+                                    <p:set>
+                                      <p:cBhvr>
+                                        <p:cTn id="6" dur="1" fill="hold">
+                                          <p:stCondLst>
+                                            <p:cond delay="0"/>
+                                          </p:stCondLst>
+                                        </p:cTn>
+                                        <p:tgtEl>
+                                          <p:spTgt spid="21512"/>
+                                        </p:tgtEl>
+                                        <p:attrNameLst>
+                                          <p:attrName>style.visibility</p:attrName>
+                                        </p:attrNameLst>
+                                      </p:cBhvr>
+                                      <p:to>
+                                        <p:strVal val="visible"/>
+                                      </p:to>
+                                    </p:set>
+                                    <p:animEffect transition="in" filter="fade">
+                                      <p:cBhvr>
+                                        <p:cTn id="7" dur="500"/>
+                                        <p:tgtEl>
+                                          <p:spTgt spid="21512"/>
+                                        </p:tgtEl>
+                                      </p:cBhvr>
+                                    </p:animEffect>
+                                  </p:childTnLst>
+                                </p:cTn>
+                              </p:par>
+                            </p:childTnLst>
+                          </p:cTn>
+                        </p:par>
+                      </p:childTnLst>
+                    </p:cTn>
+                  </p:par>
+                  <p:par>
+                    <p:cTn id="8" fill="hold">
+                      <p:stCondLst>
+                        <p:cond delay="indefinite"/>
+                      </p:stCondLst>
+                      <p:childTnLst>
+                        <p:par>
+                          <p:cTn id="9" fill="hold">
+                            <p:stCondLst>
+                              <p:cond delay="0"/>
+                            </p:stCondLst>
+                            <p:childTnLst>
+                              <p:par>
+                                <p:cTn id="10" presetID="10" presetClass="entr" presetSubtype="0" fill="hold" nodeType="clickEffect">
+                                  <p:stCondLst>
+                                    <p:cond delay="0"/>
+                                  </p:stCondLst>
+                                  <p:childTnLst>
+                                    <p:set>
+                                      <p:cBhvr>
+                                        <p:cTn id="11" dur="1" fill="hold">
+                                          <p:stCondLst>
+                                            <p:cond delay="0"/>
+                                          </p:stCondLst>
+                                        </p:cTn>
+                                        <p:tgtEl>
+                                          <p:spTgt spid="21513"/>
+                                        </p:tgtEl>
+                                        <p:attrNameLst>
+                                          <p:attrName>style.visibility</p:attrName>
+                                        </p:attrNameLst>
+                                      </p:cBhvr>
+                                      <p:to>
+                                        <p:strVal val="visible"/>
+                                      </p:to>
+                                    </p:set>
+                                    <p:animEffect transition="in" filter="fade">
+                                      <p:cBhvr>
+                                        <p:cTn id="12" dur="500"/>
+                                        <p:tgtEl>
+                                          <p:spTgt spid="21513"/>
+                                        </p:tgtEl>
+                                      </p:cBhvr>
+                                    </p:animEffect>
+                                  </p:childTnLst>
+                                </p:cTn>
+                              </p:par>
+                            </p:childTnLst>
+                          </p:cTn>
+                        </p:par>
+                      </p:childTnLst>
+                    </p:cTn>
+                  </p:par>
+                  <p:par>
+                    <p:cTn id="13" fill="hold">
+                      <p:stCondLst>
+                        <p:cond delay="indefinite"/>
+                      </p:stCondLst>
+                      <p:childTnLst>
+                        <p:par>
+                          <p:cTn id="14" fill="hold">
+                            <p:stCondLst>
+                              <p:cond delay="0"/>
+                            </p:stCondLst>
+                            <p:childTnLst>
+                              <p:par>
+                                <p:cTn id="15" presetID="10" presetClass="entr" presetSubtype="0" fill="hold" nodeType="clickEffect">
+                                  <p:stCondLst>
+                                    <p:cond delay="0"/>
+                                  </p:stCondLst>
+                                  <p:childTnLst>
+                                    <p:set>
+                                      <p:cBhvr>
+                                        <p:cTn id="16" dur="1" fill="hold">
+                                          <p:stCondLst>
+                                            <p:cond delay="0"/>
+                                          </p:stCondLst>
+                                        </p:cTn>
+                                        <p:tgtEl>
+                                          <p:spTgt spid="21514"/>
+                                        </p:tgtEl>
+                                        <p:attrNameLst>
+                                          <p:attrName>style.visibility</p:attrName>
+                                        </p:attrNameLst>
+                                      </p:cBhvr>
+                                      <p:to>
+                                        <p:strVal val="visible"/>
+                                      </p:to>
+                                    </p:set>
+                                    <p:animEffect transition="in" filter="fade">
+                                      <p:cBhvr>
+                                        <p:cTn id="17" dur="500"/>
+                                        <p:tgtEl>
+                                          <p:spTgt spid="21514"/>
+                                        </p:tgtEl>
+                                      </p:cBhvr>
+                                    </p:animEffect>
+                                  </p:childTnLst>
+                                </p:cTn>
+                              </p:par>
+                            </p:childTnLst>
+                          </p:cTn>
+                        </p:par>
+                      </p:childTnLst>
+                    </p:cTn>
+                  </p:par>
+                  <p:par>
+                    <p:cTn id="18" fill="hold">
+                      <p:stCondLst>
+                        <p:cond delay="indefinite"/>
+                      </p:stCondLst>
+                      <p:childTnLst>
+                        <p:par>
+                          <p:cTn id="19" fill="hold">
+                            <p:stCondLst>
+                              <p:cond delay="0"/>
+                            </p:stCondLst>
+                            <p:childTnLst>
+                              <p:par>
+                                <p:cTn id="20" presetID="10" presetClass="entr" presetSubtype="0" fill="hold" nodeType="clickEffect">
+                                  <p:stCondLst>
+                                    <p:cond delay="0"/>
+                                  </p:stCondLst>
+                                  <p:childTnLst>
+                                    <p:set>
+                                      <p:cBhvr>
+                                        <p:cTn id="21" dur="1" fill="hold">
+                                          <p:stCondLst>
+                                            <p:cond delay="0"/>
+                                          </p:stCondLst>
+                                        </p:cTn>
+                                        <p:tgtEl>
+                                          <p:spTgt spid="21515"/>
+                                        </p:tgtEl>
+                                        <p:attrNameLst>
+                                          <p:attrName>style.visibility</p:attrName>
+                                        </p:attrNameLst>
+                                      </p:cBhvr>
+                                      <p:to>
+                                        <p:strVal val="visible"/>
+                                      </p:to>
+                                    </p:set>
+                                    <p:animEffect transition="in" filter="fade">
+                                      <p:cBhvr>
+                                        <p:cTn id="22" dur="500"/>
+                                        <p:tgtEl>
+                                          <p:spTgt spid="21515"/>
+                                        </p:tgtEl>
+                                      </p:cBhvr>
+                                    </p:animEffect>
+                                  </p:childTnLst>
+                                </p:cTn>
+                              </p:par>
+                            </p:childTnLst>
+                          </p:cTn>
+                        </p:par>
+                      </p:childTnLst>
+                    </p:cTn>
+                  </p:par>
+                  <p:par>
+                    <p:cTn id="23" fill="hold">
+                      <p:stCondLst>
+                        <p:cond delay="indefinite"/>
+                      </p:stCondLst>
+                      <p:childTnLst>
+                        <p:par>
+                          <p:cTn id="24" fill="hold">
+                            <p:stCondLst>
+                              <p:cond delay="0"/>
+                            </p:stCondLst>
+                            <p:childTnLst>
+                              <p:par>
+                                <p:cTn id="25" presetID="10" presetClass="entr" presetSubtype="0" fill="hold" nodeType="clickEffect">
+                                  <p:stCondLst>
+                                    <p:cond delay="0"/>
+                                  </p:stCondLst>
+                                  <p:childTnLst>
+                                    <p:set>
+                                      <p:cBhvr>
+                                        <p:cTn id="26" dur="1" fill="hold">
+                                          <p:stCondLst>
+                                            <p:cond delay="0"/>
+                                          </p:stCondLst>
+                                        </p:cTn>
+                                        <p:tgtEl>
+                                          <p:spTgt spid="21506"/>
+                                        </p:tgtEl>
+                                        <p:attrNameLst>
+                                          <p:attrName>style.visibility</p:attrName>
+                                        </p:attrNameLst>
+                                      </p:cBhvr>
+                                      <p:to>
+                                        <p:strVal val="visible"/>
+                                      </p:to>
+                                    </p:set>
+                                    <p:animEffect transition="in" filter="fade">
+                                      <p:cBhvr>
+                                        <p:cTn id="27" dur="500"/>
+                                        <p:tgtEl>
+                                          <p:spTgt spid="21506"/>
+                                        </p:tgtEl>
+                                      </p:cBhvr>
+                                    </p:animEffect>
+                                  </p:childTnLst>
+                                </p:cTn>
+                              </p:par>
+                            </p:childTnLst>
+                          </p:cTn>
+                        </p:par>
+                      </p:childTnLst>
+                    </p:cTn>
+                  </p:par>
+                </p:childTnLst>
+              </p:cTn>
+              <p:prevCondLst>
+                <p:cond evt="onPrev" delay="0">
+                  <p:tgtEl>
+                    <p:sldTgt/>
+                  </p:tgtEl>
+                </p:cond>
+              </p:prevCondLst>
+              <p:nextCondLst>
+                <p:cond evt="onNext" delay="0">
+                  <p:tgtEl>
+                    <p:sldTgt/>
+                  </p:tgtEl>
+                </p:cond>
+              </p:nextCondLst>
+            </p:seq>
+          </p:childTnLst>
+        </p:cTn>
+      </p:par>
+    </p:tnLst>
+  </p:timing>
+</p:sld>
+</file>
+
+<file path=ppt/slides/slide12.xml><?xml version="1.0" encoding="utf-8"?>
+<p:sld xmlns:a="http://schemas.openxmlformats.org/drawingml/2006/main" xmlns:r="http://schemas.openxmlformats.org/officeDocument/2006/relationships" xmlns:p="http://schemas.openxmlformats.org/presentationml/2006/main">
+  <p:cSld>
+    <p:spTree>
+      <p:nvGrpSpPr>
+        <p:cNvPr id="1" name=""/>
+        <p:cNvGrpSpPr/>
+        <p:nvPr/>
+      </p:nvGrpSpPr>
+      <p:grpSpPr>
+        <a:xfrm>
+          <a:off x="0" y="0"/>
+          <a:ext cx="0" cy="0"/>
+          <a:chOff x="0" y="0"/>
+          <a:chExt cx="0" cy="0"/>
+        </a:xfrm>
+      </p:grpSpPr>
+      <p:sp>
+        <p:nvSpPr>
+          <p:cNvPr id="2" name="Titel 1"/>
+          <p:cNvSpPr>
+            <a:spLocks noGrp="1"/>
+          </p:cNvSpPr>
+          <p:nvPr>
+            <p:ph type="title"/>
+          </p:nvPr>
+        </p:nvSpPr>
+        <p:spPr/>
+        <p:txBody>
+          <a:bodyPr/>
+          <a:lstStyle/>
+          <a:p>
+            <a:r>
+              <a:rPr lang="de-CH" dirty="0" err="1" smtClean="0"/>
+              <a:t>TestVorgehen</a:t>
+            </a:r>
+            <a:endParaRPr lang="de-CH" dirty="0"/>
+          </a:p>
+        </p:txBody>
+      </p:sp>
+      <p:sp>
+        <p:nvSpPr>
+          <p:cNvPr id="3" name="Inhaltsplatzhalter 2"/>
+          <p:cNvSpPr>
+            <a:spLocks noGrp="1"/>
+          </p:cNvSpPr>
+          <p:nvPr>
+            <p:ph sz="quarter" idx="13"/>
+          </p:nvPr>
+        </p:nvSpPr>
+        <p:spPr/>
+        <p:txBody>
+          <a:bodyPr/>
+          <a:lstStyle/>
+          <a:p>
+            <a:r>
+              <a:rPr lang="de-CH" dirty="0" smtClean="0"/>
+              <a:t>Testprotokoll anhand des </a:t>
+            </a:r>
+            <a:r>
+              <a:rPr lang="de-CH" dirty="0" err="1" smtClean="0"/>
+              <a:t>Plichtenhefts</a:t>
+            </a:r>
+            <a:r>
+              <a:rPr lang="de-CH" dirty="0" smtClean="0"/>
+              <a:t> entworfen</a:t>
+            </a:r>
+          </a:p>
+          <a:p>
+            <a:r>
+              <a:rPr lang="de-CH" dirty="0" smtClean="0"/>
+              <a:t>Version 1.0 getestet</a:t>
+            </a:r>
+          </a:p>
+          <a:p>
+            <a:r>
+              <a:rPr lang="de-CH" dirty="0" smtClean="0"/>
+              <a:t>Gefundene Fehler notiert und teilweise behoben</a:t>
+            </a:r>
+          </a:p>
+          <a:p>
+            <a:endParaRPr lang="de-CH" dirty="0" smtClean="0"/>
+          </a:p>
+          <a:p>
+            <a:endParaRPr lang="de-CH" dirty="0"/>
+          </a:p>
+        </p:txBody>
+      </p:sp>
+    </p:spTree>
+    <p:extLst>
+      <p:ext uri="{BB962C8B-B14F-4D97-AF65-F5344CB8AC3E}">
+        <p14:creationId xmlns:p14="http://schemas.microsoft.com/office/powerpoint/2010/main" xmlns="" val="1300663606"/>
+      </p:ext>
+    </p:extLst>
+  </p:cSld>
+  <p:clrMapOvr>
+    <a:masterClrMapping/>
+  </p:clrMapOvr>
+  <p:timing>
+    <p:tnLst>
+      <p:par>
+        <p:cTn id="1" dur="indefinite" restart="never" nodeType="tmRoot"/>
+      </p:par>
+    </p:tnLst>
+  </p:timing>
+</p:sld>
+</file>
+
+<file path=ppt/slides/slide13.xml><?xml version="1.0" encoding="utf-8"?>
+<p:sld xmlns:a="http://schemas.openxmlformats.org/drawingml/2006/main" xmlns:r="http://schemas.openxmlformats.org/officeDocument/2006/relationships" xmlns:p="http://schemas.openxmlformats.org/presentationml/2006/main">
+  <p:cSld>
+    <p:spTree>
+      <p:nvGrpSpPr>
+        <p:cNvPr id="1" name=""/>
+        <p:cNvGrpSpPr/>
+        <p:nvPr/>
+      </p:nvGrpSpPr>
+      <p:grpSpPr>
+        <a:xfrm>
+          <a:off x="0" y="0"/>
+          <a:ext cx="0" cy="0"/>
+          <a:chOff x="0" y="0"/>
+          <a:chExt cx="0" cy="0"/>
+        </a:xfrm>
+      </p:grpSpPr>
+      <p:sp>
+        <p:nvSpPr>
+          <p:cNvPr id="2" name="Titel 1"/>
+          <p:cNvSpPr>
+            <a:spLocks noGrp="1"/>
+          </p:cNvSpPr>
+          <p:nvPr>
+            <p:ph type="title"/>
+          </p:nvPr>
+        </p:nvSpPr>
+        <p:spPr/>
+        <p:txBody>
+          <a:bodyPr/>
+          <a:lstStyle/>
+          <a:p>
+            <a:r>
+              <a:rPr lang="de-CH" dirty="0" smtClean="0"/>
+              <a:t>Spieldemonstration</a:t>
+            </a:r>
+            <a:endParaRPr lang="de-CH" dirty="0"/>
+          </a:p>
+        </p:txBody>
+      </p:sp>
+      <p:sp>
+        <p:nvSpPr>
+          <p:cNvPr id="3" name="Inhaltsplatzhalter 2"/>
+          <p:cNvSpPr>
+            <a:spLocks noGrp="1"/>
+          </p:cNvSpPr>
+          <p:nvPr>
+            <p:ph sz="quarter" idx="13"/>
+          </p:nvPr>
+        </p:nvSpPr>
+        <p:spPr/>
+        <p:txBody>
+          <a:bodyPr/>
+          <a:lstStyle/>
+          <a:p>
+            <a:endParaRPr lang="de-CH" dirty="0" smtClean="0"/>
+          </a:p>
+          <a:p>
+            <a:endParaRPr lang="de-CH" dirty="0"/>
+          </a:p>
+        </p:txBody>
+      </p:sp>
+    </p:spTree>
+    <p:extLst>
+      <p:ext uri="{BB962C8B-B14F-4D97-AF65-F5344CB8AC3E}">
+        <p14:creationId xmlns:p14="http://schemas.microsoft.com/office/powerpoint/2010/main" xmlns="" val="1595990863"/>
       </p:ext>
     </p:extLst>
   </p:cSld>
@@ -4124,7 +8014,7 @@
     </p:spTree>
     <p:extLst>
       <p:ext uri="{BB962C8B-B14F-4D97-AF65-F5344CB8AC3E}">
-        <p14:creationId xmlns:p14="http://schemas.microsoft.com/office/powerpoint/2010/main" val="1387166899"/>
+        <p14:creationId xmlns:p14="http://schemas.microsoft.com/office/powerpoint/2010/main" xmlns="" val="1387166899"/>
       </p:ext>
     </p:extLst>
   </p:cSld>
@@ -4219,10 +8109,10 @@
           <p:nvPr/>
         </p:nvPicPr>
         <p:blipFill>
-          <a:blip r:embed="rId2">
+          <a:blip r:embed="rId2" cstate="print">
             <a:extLst>
               <a:ext uri="{BEBA8EAE-BF5A-486C-A8C5-ECC9F3942E4B}">
-                <a14:imgProps xmlns:a14="http://schemas.microsoft.com/office/drawing/2010/main">
+                <a14:imgProps xmlns:a14="http://schemas.microsoft.com/office/drawing/2010/main" xmlns="">
                   <a14:imgLayer r:embed="rId3">
                     <a14:imgEffect>
                       <a14:backgroundRemoval t="0" b="100000" l="0" r="100000"/>
@@ -4231,7 +8121,7 @@
                 </a14:imgProps>
               </a:ext>
               <a:ext uri="{28A0092B-C50C-407E-A947-70E740481C1C}">
-                <a14:useLocalDpi xmlns:a14="http://schemas.microsoft.com/office/drawing/2010/main" val="0"/>
+                <a14:useLocalDpi xmlns:a14="http://schemas.microsoft.com/office/drawing/2010/main" xmlns="" val="0"/>
               </a:ext>
             </a:extLst>
           </a:blip>
@@ -4255,14 +8145,14 @@
           <a:effectLst/>
           <a:extLst>
             <a:ext uri="{909E8E84-426E-40DD-AFC4-6F175D3DCCD1}">
-              <a14:hiddenFill xmlns:a14="http://schemas.microsoft.com/office/drawing/2010/main">
+              <a14:hiddenFill xmlns:a14="http://schemas.microsoft.com/office/drawing/2010/main" xmlns="">
                 <a:solidFill>
                   <a:schemeClr val="accent1"/>
                 </a:solidFill>
               </a14:hiddenFill>
             </a:ext>
             <a:ext uri="{91240B29-F687-4F45-9708-019B960494DF}">
-              <a14:hiddenLine xmlns:a14="http://schemas.microsoft.com/office/drawing/2010/main" w="9525">
+              <a14:hiddenLine xmlns:a14="http://schemas.microsoft.com/office/drawing/2010/main" xmlns="" w="9525">
                 <a:solidFill>
                   <a:schemeClr val="tx1"/>
                 </a:solidFill>
@@ -4272,7 +8162,7 @@
               </a14:hiddenLine>
             </a:ext>
             <a:ext uri="{AF507438-7753-43E0-B8FC-AC1667EBCBE1}">
-              <a14:hiddenEffects xmlns:a14="http://schemas.microsoft.com/office/drawing/2010/main">
+              <a14:hiddenEffects xmlns:a14="http://schemas.microsoft.com/office/drawing/2010/main" xmlns="">
                 <a:effectLst>
                   <a:outerShdw dist="35921" dir="2700000" algn="ctr" rotWithShape="0">
                     <a:schemeClr val="bg2"/>
@@ -4286,7 +8176,7 @@
     </p:spTree>
     <p:extLst>
       <p:ext uri="{BB962C8B-B14F-4D97-AF65-F5344CB8AC3E}">
-        <p14:creationId xmlns:p14="http://schemas.microsoft.com/office/powerpoint/2010/main" val="1599884037"/>
+        <p14:creationId xmlns:p14="http://schemas.microsoft.com/office/powerpoint/2010/main" xmlns="" val="1599884037"/>
       </p:ext>
     </p:extLst>
   </p:cSld>
@@ -4416,7 +8306,7 @@
     </p:spTree>
     <p:extLst>
       <p:ext uri="{BB962C8B-B14F-4D97-AF65-F5344CB8AC3E}">
-        <p14:creationId xmlns:p14="http://schemas.microsoft.com/office/powerpoint/2010/main" val="2756733679"/>
+        <p14:creationId xmlns:p14="http://schemas.microsoft.com/office/powerpoint/2010/main" xmlns="" val="2756733679"/>
       </p:ext>
     </p:extLst>
   </p:cSld>
@@ -4510,7 +8400,7 @@
           <p:nvPr>
             <p:extLst>
               <p:ext uri="{D42A27DB-BD31-4B8C-83A1-F6EECF244321}">
-                <p14:modId xmlns:p14="http://schemas.microsoft.com/office/powerpoint/2010/main" val="675548602"/>
+                <p14:modId xmlns:p14="http://schemas.microsoft.com/office/powerpoint/2010/main" xmlns="" val="675548602"/>
               </p:ext>
             </p:extLst>
           </p:nvPr>
@@ -4521,47 +8411,16 @@
         </p:xfrm>
         <a:graphic>
           <a:graphicData uri="http://schemas.openxmlformats.org/presentationml/2006/ole">
-            <mc:AlternateContent xmlns:mc="http://schemas.openxmlformats.org/markup-compatibility/2006">
-              <mc:Choice xmlns:v="urn:schemas-microsoft-com:vml" Requires="v">
-                <p:oleObj spid="_x0000_s2052" name="Visio" r:id="rId3" imgW="2436869" imgH="7241670" progId="Visio.Drawing.11">
-                  <p:embed/>
-                </p:oleObj>
-              </mc:Choice>
-              <mc:Fallback>
-                <p:oleObj name="Visio" r:id="rId3" imgW="2436869" imgH="7241670" progId="Visio.Drawing.11">
-                  <p:embed/>
-                  <p:pic>
-                    <p:nvPicPr>
-                      <p:cNvPr id="0" name=""/>
-                      <p:cNvPicPr/>
-                      <p:nvPr/>
-                    </p:nvPicPr>
-                    <p:blipFill>
-                      <a:blip r:embed="rId4"/>
-                      <a:stretch>
-                        <a:fillRect/>
-                      </a:stretch>
-                    </p:blipFill>
-                    <p:spPr>
-                      <a:xfrm>
-                        <a:off x="3422650" y="1557338"/>
-                        <a:ext cx="1420813" cy="4318000"/>
-                      </a:xfrm>
-                      <a:prstGeom prst="rect">
-                        <a:avLst/>
-                      </a:prstGeom>
-                    </p:spPr>
-                  </p:pic>
-                </p:oleObj>
-              </mc:Fallback>
-            </mc:AlternateContent>
+            <p:oleObj spid="_x0000_s2052" name="Visio" r:id="rId3" imgW="2436869" imgH="7241670" progId="">
+              <p:embed/>
+            </p:oleObj>
           </a:graphicData>
         </a:graphic>
       </p:graphicFrame>
     </p:spTree>
     <p:extLst>
       <p:ext uri="{BB962C8B-B14F-4D97-AF65-F5344CB8AC3E}">
-        <p14:creationId xmlns:p14="http://schemas.microsoft.com/office/powerpoint/2010/main" val="1334996816"/>
+        <p14:creationId xmlns:p14="http://schemas.microsoft.com/office/powerpoint/2010/main" xmlns="" val="1334996816"/>
       </p:ext>
     </p:extLst>
   </p:cSld>
@@ -4655,10 +8514,10 @@
           <p:nvPr/>
         </p:nvPicPr>
         <p:blipFill>
-          <a:blip r:embed="rId2">
+          <a:blip r:embed="rId2" cstate="print">
             <a:extLst>
               <a:ext uri="{28A0092B-C50C-407E-A947-70E740481C1C}">
-                <a14:useLocalDpi xmlns:a14="http://schemas.microsoft.com/office/drawing/2010/main" val="0"/>
+                <a14:useLocalDpi xmlns:a14="http://schemas.microsoft.com/office/drawing/2010/main" xmlns="" val="0"/>
               </a:ext>
             </a:extLst>
           </a:blip>
@@ -4682,14 +8541,14 @@
           <a:effectLst/>
           <a:extLst>
             <a:ext uri="{909E8E84-426E-40DD-AFC4-6F175D3DCCD1}">
-              <a14:hiddenFill xmlns:a14="http://schemas.microsoft.com/office/drawing/2010/main">
+              <a14:hiddenFill xmlns:a14="http://schemas.microsoft.com/office/drawing/2010/main" xmlns="">
                 <a:solidFill>
                   <a:schemeClr val="accent1"/>
                 </a:solidFill>
               </a14:hiddenFill>
             </a:ext>
             <a:ext uri="{91240B29-F687-4F45-9708-019B960494DF}">
-              <a14:hiddenLine xmlns:a14="http://schemas.microsoft.com/office/drawing/2010/main" w="9525">
+              <a14:hiddenLine xmlns:a14="http://schemas.microsoft.com/office/drawing/2010/main" xmlns="" w="9525">
                 <a:solidFill>
                   <a:schemeClr val="tx1"/>
                 </a:solidFill>
@@ -4699,7 +8558,7 @@
               </a14:hiddenLine>
             </a:ext>
             <a:ext uri="{AF507438-7753-43E0-B8FC-AC1667EBCBE1}">
-              <a14:hiddenEffects xmlns:a14="http://schemas.microsoft.com/office/drawing/2010/main">
+              <a14:hiddenEffects xmlns:a14="http://schemas.microsoft.com/office/drawing/2010/main" xmlns="">
                 <a:effectLst>
                   <a:outerShdw dist="35921" dir="2700000" algn="ctr" rotWithShape="0">
                     <a:schemeClr val="bg2"/>
@@ -4713,7 +8572,7 @@
     </p:spTree>
     <p:extLst>
       <p:ext uri="{BB962C8B-B14F-4D97-AF65-F5344CB8AC3E}">
-        <p14:creationId xmlns:p14="http://schemas.microsoft.com/office/powerpoint/2010/main" val="2375923500"/>
+        <p14:creationId xmlns:p14="http://schemas.microsoft.com/office/powerpoint/2010/main" xmlns="" val="2375923500"/>
       </p:ext>
     </p:extLst>
   </p:cSld>
@@ -4801,7 +8660,7 @@
     </p:spTree>
     <p:extLst>
       <p:ext uri="{BB962C8B-B14F-4D97-AF65-F5344CB8AC3E}">
-        <p14:creationId xmlns:p14="http://schemas.microsoft.com/office/powerpoint/2010/main" val="3950922658"/>
+        <p14:creationId xmlns:p14="http://schemas.microsoft.com/office/powerpoint/2010/main" xmlns="" val="3950922658"/>
       </p:ext>
     </p:extLst>
   </p:cSld>
@@ -4889,7 +8748,7 @@
     </p:spTree>
     <p:extLst>
       <p:ext uri="{BB962C8B-B14F-4D97-AF65-F5344CB8AC3E}">
-        <p14:creationId xmlns:p14="http://schemas.microsoft.com/office/powerpoint/2010/main" val="1184306671"/>
+        <p14:creationId xmlns:p14="http://schemas.microsoft.com/office/powerpoint/2010/main" xmlns="" val="1184306671"/>
       </p:ext>
     </p:extLst>
   </p:cSld>
@@ -4946,65 +8805,45 @@
           </a:p>
         </p:txBody>
       </p:sp>
-      <p:sp>
-        <p:nvSpPr>
-          <p:cNvPr id="3" name="Inhaltsplatzhalter 2"/>
-          <p:cNvSpPr>
-            <a:spLocks noGrp="1"/>
-          </p:cNvSpPr>
-          <p:nvPr>
-            <p:ph sz="quarter" idx="13"/>
-          </p:nvPr>
-        </p:nvSpPr>
-        <p:spPr/>
-        <p:txBody>
-          <a:bodyPr/>
-          <a:lstStyle/>
-          <a:p>
-            <a:r>
-              <a:rPr lang="de-CH" dirty="0" err="1" smtClean="0"/>
-              <a:t>Challange</a:t>
-            </a:r>
-            <a:r>
-              <a:rPr lang="de-CH" dirty="0" smtClean="0"/>
-              <a:t> </a:t>
-            </a:r>
-            <a:r>
-              <a:rPr lang="de-CH" dirty="0" err="1" smtClean="0"/>
-              <a:t>acceptet</a:t>
-            </a:r>
-            <a:endParaRPr lang="de-CH" dirty="0" smtClean="0"/>
-          </a:p>
-          <a:p>
-            <a:r>
-              <a:rPr lang="de-CH" dirty="0" err="1" smtClean="0"/>
-              <a:t>Git</a:t>
-            </a:r>
-            <a:r>
-              <a:rPr lang="de-CH" dirty="0" smtClean="0"/>
-              <a:t> Network </a:t>
-            </a:r>
-            <a:r>
-              <a:rPr lang="de-CH" dirty="0" err="1" smtClean="0"/>
-              <a:t>gehöie</a:t>
-            </a:r>
-            <a:endParaRPr lang="de-CH" dirty="0" smtClean="0"/>
-          </a:p>
-          <a:p>
-            <a:endParaRPr lang="de-CH" dirty="0" smtClean="0"/>
-          </a:p>
-          <a:p>
-            <a:endParaRPr lang="de-CH" dirty="0" smtClean="0"/>
-          </a:p>
-          <a:p>
-            <a:endParaRPr lang="de-CH" dirty="0"/>
-          </a:p>
-        </p:txBody>
-      </p:sp>
+      <p:pic>
+        <p:nvPicPr>
+          <p:cNvPr id="21507" name="Picture 3" descr="K:\DCIM\100MEDIA\IMAG0001.jpg"/>
+          <p:cNvPicPr>
+            <a:picLocks noChangeAspect="1" noChangeArrowheads="1"/>
+          </p:cNvPicPr>
+          <p:nvPr/>
+        </p:nvPicPr>
+        <p:blipFill>
+          <a:blip r:embed="rId3" cstate="print"/>
+          <a:srcRect/>
+          <a:stretch>
+            <a:fillRect/>
+          </a:stretch>
+        </p:blipFill>
+        <p:spPr bwMode="auto">
+          <a:xfrm>
+            <a:off x="1763688" y="1268760"/>
+            <a:ext cx="5774907" cy="3457816"/>
+          </a:xfrm>
+          <a:prstGeom prst="rect">
+            <a:avLst/>
+          </a:prstGeom>
+          <a:ln>
+            <a:noFill/>
+          </a:ln>
+          <a:effectLst>
+            <a:outerShdw blurRad="292100" dist="139700" dir="2700000" algn="tl" rotWithShape="0">
+              <a:srgbClr val="333333">
+                <a:alpha val="65000"/>
+              </a:srgbClr>
+            </a:outerShdw>
+          </a:effectLst>
+        </p:spPr>
+      </p:pic>
     </p:spTree>
     <p:extLst>
       <p:ext uri="{BB962C8B-B14F-4D97-AF65-F5344CB8AC3E}">
-        <p14:creationId xmlns:p14="http://schemas.microsoft.com/office/powerpoint/2010/main" val="3199722868"/>
+        <p14:creationId xmlns:p14="http://schemas.microsoft.com/office/powerpoint/2010/main" xmlns="" val="3199722868"/>
       </p:ext>
     </p:extLst>
   </p:cSld>
@@ -5310,4 +9149,287 @@
   <a:objectDefaults/>
   <a:extraClrSchemeLst/>
 </a:theme>
+</file>
+
+<file path=ppt/theme/theme2.xml><?xml version="1.0" encoding="utf-8"?>
+<a:theme xmlns:a="http://schemas.openxmlformats.org/drawingml/2006/main" name="Larissa-Design">
+  <a:themeElements>
+    <a:clrScheme name="Larissa">
+      <a:dk1>
+        <a:sysClr val="windowText" lastClr="000000"/>
+      </a:dk1>
+      <a:lt1>
+        <a:sysClr val="window" lastClr="FFFFFF"/>
+      </a:lt1>
+      <a:dk2>
+        <a:srgbClr val="1F497D"/>
+      </a:dk2>
+      <a:lt2>
+        <a:srgbClr val="EEECE1"/>
+      </a:lt2>
+      <a:accent1>
+        <a:srgbClr val="4F81BD"/>
+      </a:accent1>
+      <a:accent2>
+        <a:srgbClr val="C0504D"/>
+      </a:accent2>
+      <a:accent3>
+        <a:srgbClr val="9BBB59"/>
+      </a:accent3>
+      <a:accent4>
+        <a:srgbClr val="8064A2"/>
+      </a:accent4>
+      <a:accent5>
+        <a:srgbClr val="4BACC6"/>
+      </a:accent5>
+      <a:accent6>
+        <a:srgbClr val="F79646"/>
+      </a:accent6>
+      <a:hlink>
+        <a:srgbClr val="0000FF"/>
+      </a:hlink>
+      <a:folHlink>
+        <a:srgbClr val="800080"/>
+      </a:folHlink>
+    </a:clrScheme>
+    <a:fontScheme name="Larissa">
+      <a:majorFont>
+        <a:latin typeface="Calibri"/>
+        <a:ea typeface=""/>
+        <a:cs typeface=""/>
+        <a:font script="Jpan" typeface="ＭＳ Ｐゴシック"/>
+        <a:font script="Hang" typeface="맑은 고딕"/>
+        <a:font script="Hans" typeface="宋体"/>
+        <a:font script="Hant" typeface="新細明體"/>
+        <a:font script="Arab" typeface="Times New Roman"/>
+        <a:font script="Hebr" typeface="Times New Roman"/>
+        <a:font script="Thai" typeface="Angsana New"/>
+        <a:font script="Ethi" typeface="Nyala"/>
+        <a:font script="Beng" typeface="Vrinda"/>
+        <a:font script="Gujr" typeface="Shruti"/>
+        <a:font script="Khmr" typeface="MoolBoran"/>
+        <a:font script="Knda" typeface="Tunga"/>
+        <a:font script="Guru" typeface="Raavi"/>
+        <a:font script="Cans" typeface="Euphemia"/>
+        <a:font script="Cher" typeface="Plantagenet Cherokee"/>
+        <a:font script="Yiii" typeface="Microsoft Yi Baiti"/>
+        <a:font script="Tibt" typeface="Microsoft Himalaya"/>
+        <a:font script="Thaa" typeface="MV Boli"/>
+        <a:font script="Deva" typeface="Mangal"/>
+        <a:font script="Telu" typeface="Gautami"/>
+        <a:font script="Taml" typeface="Latha"/>
+        <a:font script="Syrc" typeface="Estrangelo Edessa"/>
+        <a:font script="Orya" typeface="Kalinga"/>
+        <a:font script="Mlym" typeface="Kartika"/>
+        <a:font script="Laoo" typeface="DokChampa"/>
+        <a:font script="Sinh" typeface="Iskoola Pota"/>
+        <a:font script="Mong" typeface="Mongolian Baiti"/>
+        <a:font script="Viet" typeface="Times New Roman"/>
+        <a:font script="Uigh" typeface="Microsoft Uighur"/>
+      </a:majorFont>
+      <a:minorFont>
+        <a:latin typeface="Calibri"/>
+        <a:ea typeface=""/>
+        <a:cs typeface=""/>
+        <a:font script="Jpan" typeface="ＭＳ Ｐゴシック"/>
+        <a:font script="Hang" typeface="맑은 고딕"/>
+        <a:font script="Hans" typeface="宋体"/>
+        <a:font script="Hant" typeface="新細明體"/>
+        <a:font script="Arab" typeface="Arial"/>
+        <a:font script="Hebr" typeface="Arial"/>
+        <a:font script="Thai" typeface="Cordia New"/>
+        <a:font script="Ethi" typeface="Nyala"/>
+        <a:font script="Beng" typeface="Vrinda"/>
+        <a:font script="Gujr" typeface="Shruti"/>
+        <a:font script="Khmr" typeface="DaunPenh"/>
+        <a:font script="Knda" typeface="Tunga"/>
+        <a:font script="Guru" typeface="Raavi"/>
+        <a:font script="Cans" typeface="Euphemia"/>
+        <a:font script="Cher" typeface="Plantagenet Cherokee"/>
+        <a:font script="Yiii" typeface="Microsoft Yi Baiti"/>
+        <a:font script="Tibt" typeface="Microsoft Himalaya"/>
+        <a:font script="Thaa" typeface="MV Boli"/>
+        <a:font script="Deva" typeface="Mangal"/>
+        <a:font script="Telu" typeface="Gautami"/>
+        <a:font script="Taml" typeface="Latha"/>
+        <a:font script="Syrc" typeface="Estrangelo Edessa"/>
+        <a:font script="Orya" typeface="Kalinga"/>
+        <a:font script="Mlym" typeface="Kartika"/>
+        <a:font script="Laoo" typeface="DokChampa"/>
+        <a:font script="Sinh" typeface="Iskoola Pota"/>
+        <a:font script="Mong" typeface="Mongolian Baiti"/>
+        <a:font script="Viet" typeface="Arial"/>
+        <a:font script="Uigh" typeface="Microsoft Uighur"/>
+      </a:minorFont>
+    </a:fontScheme>
+    <a:fmtScheme name="Larissa">
+      <a:fillStyleLst>
+        <a:solidFill>
+          <a:schemeClr val="phClr"/>
+        </a:solidFill>
+        <a:gradFill rotWithShape="1">
+          <a:gsLst>
+            <a:gs pos="0">
+              <a:schemeClr val="phClr">
+                <a:tint val="50000"/>
+                <a:satMod val="300000"/>
+              </a:schemeClr>
+            </a:gs>
+            <a:gs pos="35000">
+              <a:schemeClr val="phClr">
+                <a:tint val="37000"/>
+                <a:satMod val="300000"/>
+              </a:schemeClr>
+            </a:gs>
+            <a:gs pos="100000">
+              <a:schemeClr val="phClr">
+                <a:tint val="15000"/>
+                <a:satMod val="350000"/>
+              </a:schemeClr>
+            </a:gs>
+          </a:gsLst>
+          <a:lin ang="16200000" scaled="1"/>
+        </a:gradFill>
+        <a:gradFill rotWithShape="1">
+          <a:gsLst>
+            <a:gs pos="0">
+              <a:schemeClr val="phClr">
+                <a:shade val="51000"/>
+                <a:satMod val="130000"/>
+              </a:schemeClr>
+            </a:gs>
+            <a:gs pos="80000">
+              <a:schemeClr val="phClr">
+                <a:shade val="93000"/>
+                <a:satMod val="130000"/>
+              </a:schemeClr>
+            </a:gs>
+            <a:gs pos="100000">
+              <a:schemeClr val="phClr">
+                <a:shade val="94000"/>
+                <a:satMod val="135000"/>
+              </a:schemeClr>
+            </a:gs>
+          </a:gsLst>
+          <a:lin ang="16200000" scaled="0"/>
+        </a:gradFill>
+      </a:fillStyleLst>
+      <a:lnStyleLst>
+        <a:ln w="9525" cap="flat" cmpd="sng" algn="ctr">
+          <a:solidFill>
+            <a:schemeClr val="phClr">
+              <a:shade val="95000"/>
+              <a:satMod val="105000"/>
+            </a:schemeClr>
+          </a:solidFill>
+          <a:prstDash val="solid"/>
+        </a:ln>
+        <a:ln w="25400" cap="flat" cmpd="sng" algn="ctr">
+          <a:solidFill>
+            <a:schemeClr val="phClr"/>
+          </a:solidFill>
+          <a:prstDash val="solid"/>
+        </a:ln>
+        <a:ln w="38100" cap="flat" cmpd="sng" algn="ctr">
+          <a:solidFill>
+            <a:schemeClr val="phClr"/>
+          </a:solidFill>
+          <a:prstDash val="solid"/>
+        </a:ln>
+      </a:lnStyleLst>
+      <a:effectStyleLst>
+        <a:effectStyle>
+          <a:effectLst>
+            <a:outerShdw blurRad="40000" dist="20000" dir="5400000" rotWithShape="0">
+              <a:srgbClr val="000000">
+                <a:alpha val="38000"/>
+              </a:srgbClr>
+            </a:outerShdw>
+          </a:effectLst>
+        </a:effectStyle>
+        <a:effectStyle>
+          <a:effectLst>
+            <a:outerShdw blurRad="40000" dist="23000" dir="5400000" rotWithShape="0">
+              <a:srgbClr val="000000">
+                <a:alpha val="35000"/>
+              </a:srgbClr>
+            </a:outerShdw>
+          </a:effectLst>
+        </a:effectStyle>
+        <a:effectStyle>
+          <a:effectLst>
+            <a:outerShdw blurRad="40000" dist="23000" dir="5400000" rotWithShape="0">
+              <a:srgbClr val="000000">
+                <a:alpha val="35000"/>
+              </a:srgbClr>
+            </a:outerShdw>
+          </a:effectLst>
+          <a:scene3d>
+            <a:camera prst="orthographicFront">
+              <a:rot lat="0" lon="0" rev="0"/>
+            </a:camera>
+            <a:lightRig rig="threePt" dir="t">
+              <a:rot lat="0" lon="0" rev="1200000"/>
+            </a:lightRig>
+          </a:scene3d>
+          <a:sp3d>
+            <a:bevelT w="63500" h="25400"/>
+          </a:sp3d>
+        </a:effectStyle>
+      </a:effectStyleLst>
+      <a:bgFillStyleLst>
+        <a:solidFill>
+          <a:schemeClr val="phClr"/>
+        </a:solidFill>
+        <a:gradFill rotWithShape="1">
+          <a:gsLst>
+            <a:gs pos="0">
+              <a:schemeClr val="phClr">
+                <a:tint val="40000"/>
+                <a:satMod val="350000"/>
+              </a:schemeClr>
+            </a:gs>
+            <a:gs pos="40000">
+              <a:schemeClr val="phClr">
+                <a:tint val="45000"/>
+                <a:shade val="99000"/>
+                <a:satMod val="350000"/>
+              </a:schemeClr>
+            </a:gs>
+            <a:gs pos="100000">
+              <a:schemeClr val="phClr">
+                <a:shade val="20000"/>
+                <a:satMod val="255000"/>
+              </a:schemeClr>
+            </a:gs>
+          </a:gsLst>
+          <a:path path="circle">
+            <a:fillToRect l="50000" t="-80000" r="50000" b="180000"/>
+          </a:path>
+        </a:gradFill>
+        <a:gradFill rotWithShape="1">
+          <a:gsLst>
+            <a:gs pos="0">
+              <a:schemeClr val="phClr">
+                <a:tint val="80000"/>
+                <a:satMod val="300000"/>
+              </a:schemeClr>
+            </a:gs>
+            <a:gs pos="100000">
+              <a:schemeClr val="phClr">
+                <a:shade val="30000"/>
+                <a:satMod val="200000"/>
+              </a:schemeClr>
+            </a:gs>
+          </a:gsLst>
+          <a:path path="circle">
+            <a:fillToRect l="50000" t="50000" r="50000" b="50000"/>
+          </a:path>
+        </a:gradFill>
+      </a:bgFillStyleLst>
+    </a:fmtScheme>
+  </a:themeElements>
+  <a:objectDefaults/>
+  <a:extraClrSchemeLst/>
+</a:theme>
 </file>
</xml_diff>

<commit_message>
edited ppt, completed flowchart for laser
</commit_message>
<xml_diff>
--- a/docs/LaserChess.pptx
+++ b/docs/LaserChess.pptx
@@ -204,7 +204,8 @@
           <a:p>
             <a:fld id="{9CCF7261-FAE9-431D-A535-F0D32AAE8354}" type="datetimeFigureOut">
               <a:rPr lang="de-CH" smtClean="0"/>
-              <a:t>20.04.2012</a:t>
+              <a:pPr/>
+              <a:t>21.04.2012</a:t>
             </a:fld>
             <a:endParaRPr lang="de-CH"/>
           </a:p>
@@ -365,6 +366,7 @@
           <a:p>
             <a:fld id="{485DD82D-527C-48E8-9B47-36C7BFBD461B}" type="slidenum">
               <a:rPr lang="de-CH" smtClean="0"/>
+              <a:pPr/>
               <a:t>‹Nr.›</a:t>
             </a:fld>
             <a:endParaRPr lang="de-CH"/>
@@ -374,7 +376,7 @@
     </p:spTree>
     <p:extLst>
       <p:ext uri="{BB962C8B-B14F-4D97-AF65-F5344CB8AC3E}">
-        <p14:creationId xmlns:p14="http://schemas.microsoft.com/office/powerpoint/2010/main" val="352693751"/>
+        <p14:creationId xmlns:p14="http://schemas.microsoft.com/office/powerpoint/2010/main" xmlns="" val="352693751"/>
       </p:ext>
     </p:extLst>
   </p:cSld>
@@ -670,6 +672,7 @@
           <a:p>
             <a:fld id="{485DD82D-527C-48E8-9B47-36C7BFBD461B}" type="slidenum">
               <a:rPr lang="de-CH" smtClean="0"/>
+              <a:pPr/>
               <a:t>9</a:t>
             </a:fld>
             <a:endParaRPr lang="de-CH"/>
@@ -934,6 +937,7 @@
           <a:p>
             <a:fld id="{485DD82D-527C-48E8-9B47-36C7BFBD461B}" type="slidenum">
               <a:rPr lang="de-CH" smtClean="0"/>
+              <a:pPr/>
               <a:t>10</a:t>
             </a:fld>
             <a:endParaRPr lang="de-CH"/>
@@ -1398,6 +1402,7 @@
           <a:p>
             <a:fld id="{485DD82D-527C-48E8-9B47-36C7BFBD461B}" type="slidenum">
               <a:rPr lang="de-CH" smtClean="0"/>
+              <a:pPr/>
               <a:t>11</a:t>
             </a:fld>
             <a:endParaRPr lang="de-CH"/>
@@ -1472,7 +1477,7 @@
             <a:fld id="{0B8AC65F-F2B9-4AE9-880A-F19E8D9538B7}" type="datetimeFigureOut">
               <a:rPr lang="de-CH" smtClean="0"/>
               <a:pPr/>
-              <a:t>20.04.2012</a:t>
+              <a:t>21.04.2012</a:t>
             </a:fld>
             <a:endParaRPr lang="de-CH"/>
           </a:p>
@@ -1790,7 +1795,7 @@
             <a:fld id="{0B8AC65F-F2B9-4AE9-880A-F19E8D9538B7}" type="datetimeFigureOut">
               <a:rPr lang="de-CH" smtClean="0"/>
               <a:pPr/>
-              <a:t>20.04.2012</a:t>
+              <a:t>21.04.2012</a:t>
             </a:fld>
             <a:endParaRPr lang="de-CH"/>
           </a:p>
@@ -1967,7 +1972,7 @@
             <a:fld id="{0B8AC65F-F2B9-4AE9-880A-F19E8D9538B7}" type="datetimeFigureOut">
               <a:rPr lang="de-CH" smtClean="0"/>
               <a:pPr/>
-              <a:t>20.04.2012</a:t>
+              <a:t>21.04.2012</a:t>
             </a:fld>
             <a:endParaRPr lang="de-CH"/>
           </a:p>
@@ -2087,7 +2092,7 @@
             <a:fld id="{0B8AC65F-F2B9-4AE9-880A-F19E8D9538B7}" type="datetimeFigureOut">
               <a:rPr lang="de-CH" smtClean="0"/>
               <a:pPr/>
-              <a:t>20.04.2012</a:t>
+              <a:t>21.04.2012</a:t>
             </a:fld>
             <a:endParaRPr lang="de-CH"/>
           </a:p>
@@ -2387,7 +2392,7 @@
             <a:fld id="{0B8AC65F-F2B9-4AE9-880A-F19E8D9538B7}" type="datetimeFigureOut">
               <a:rPr lang="de-CH" smtClean="0"/>
               <a:pPr/>
-              <a:t>20.04.2012</a:t>
+              <a:t>21.04.2012</a:t>
             </a:fld>
             <a:endParaRPr lang="de-CH"/>
           </a:p>
@@ -2682,7 +2687,7 @@
             <a:fld id="{0B8AC65F-F2B9-4AE9-880A-F19E8D9538B7}" type="datetimeFigureOut">
               <a:rPr lang="de-CH" smtClean="0"/>
               <a:pPr/>
-              <a:t>20.04.2012</a:t>
+              <a:t>21.04.2012</a:t>
             </a:fld>
             <a:endParaRPr lang="de-CH"/>
           </a:p>
@@ -3112,7 +3117,7 @@
             <a:fld id="{0B8AC65F-F2B9-4AE9-880A-F19E8D9538B7}" type="datetimeFigureOut">
               <a:rPr lang="de-CH" smtClean="0"/>
               <a:pPr/>
-              <a:t>20.04.2012</a:t>
+              <a:t>21.04.2012</a:t>
             </a:fld>
             <a:endParaRPr lang="de-CH"/>
           </a:p>
@@ -3232,7 +3237,7 @@
             <a:fld id="{0B8AC65F-F2B9-4AE9-880A-F19E8D9538B7}" type="datetimeFigureOut">
               <a:rPr lang="de-CH" smtClean="0"/>
               <a:pPr/>
-              <a:t>20.04.2012</a:t>
+              <a:t>21.04.2012</a:t>
             </a:fld>
             <a:endParaRPr lang="de-CH"/>
           </a:p>
@@ -3324,7 +3329,7 @@
             <a:fld id="{0B8AC65F-F2B9-4AE9-880A-F19E8D9538B7}" type="datetimeFigureOut">
               <a:rPr lang="de-CH" smtClean="0"/>
               <a:pPr/>
-              <a:t>20.04.2012</a:t>
+              <a:t>21.04.2012</a:t>
             </a:fld>
             <a:endParaRPr lang="de-CH"/>
           </a:p>
@@ -3576,7 +3581,7 @@
             <a:fld id="{0B8AC65F-F2B9-4AE9-880A-F19E8D9538B7}" type="datetimeFigureOut">
               <a:rPr lang="de-CH" smtClean="0"/>
               <a:pPr/>
-              <a:t>20.04.2012</a:t>
+              <a:t>21.04.2012</a:t>
             </a:fld>
             <a:endParaRPr lang="de-CH"/>
           </a:p>
@@ -4094,7 +4099,7 @@
             <a:fld id="{0B8AC65F-F2B9-4AE9-880A-F19E8D9538B7}" type="datetimeFigureOut">
               <a:rPr lang="de-CH" smtClean="0"/>
               <a:pPr/>
-              <a:t>20.04.2012</a:t>
+              <a:t>21.04.2012</a:t>
             </a:fld>
             <a:endParaRPr lang="de-CH"/>
           </a:p>
@@ -4326,7 +4331,7 @@
             <a:fld id="{0B8AC65F-F2B9-4AE9-880A-F19E8D9538B7}" type="datetimeFigureOut">
               <a:rPr lang="de-CH" smtClean="0"/>
               <a:pPr/>
-              <a:t>20.04.2012</a:t>
+              <a:t>21.04.2012</a:t>
             </a:fld>
             <a:endParaRPr lang="de-CH"/>
           </a:p>
@@ -5105,7 +5110,7 @@
     </p:spTree>
     <p:extLst>
       <p:ext uri="{BB962C8B-B14F-4D97-AF65-F5344CB8AC3E}">
-        <p14:creationId xmlns:p14="http://schemas.microsoft.com/office/powerpoint/2010/main" val="1704400666"/>
+        <p14:creationId xmlns:p14="http://schemas.microsoft.com/office/powerpoint/2010/main" xmlns="" val="1704400666"/>
       </p:ext>
     </p:extLst>
   </p:cSld>
@@ -5192,7 +5197,7 @@
               <a:t>if</a:t>
             </a:r>
             <a:r>
-              <a:rPr lang="en-US" sz="1200" dirty="0" smtClean="0">
+              <a:rPr lang="en-US" sz="1200" b="1" dirty="0" smtClean="0">
                 <a:solidFill>
                   <a:srgbClr val="000000"/>
                 </a:solidFill>
@@ -5203,7 +5208,7 @@
               <a:t>((</a:t>
             </a:r>
             <a:r>
-              <a:rPr lang="en-US" sz="1200" dirty="0" err="1" smtClean="0">
+              <a:rPr lang="en-US" sz="1200" b="1" dirty="0" err="1" smtClean="0">
                 <a:solidFill>
                   <a:srgbClr val="000000"/>
                 </a:solidFill>
@@ -5214,7 +5219,7 @@
               <a:t>pos.</a:t>
             </a:r>
             <a:r>
-              <a:rPr lang="en-US" sz="1200" dirty="0" err="1" smtClean="0">
+              <a:rPr lang="en-US" sz="1200" b="1" dirty="0" err="1" smtClean="0">
                 <a:solidFill>
                   <a:srgbClr val="0000C0"/>
                 </a:solidFill>
@@ -5225,7 +5230,7 @@
               <a:t>x</a:t>
             </a:r>
             <a:r>
-              <a:rPr lang="en-US" sz="1200" dirty="0" smtClean="0">
+              <a:rPr lang="en-US" sz="1200" b="1" dirty="0" smtClean="0">
                 <a:solidFill>
                   <a:srgbClr val="000000"/>
                 </a:solidFill>
@@ -5236,7 +5241,7 @@
               <a:t> &lt; PLAYGROUND_X_MAX &amp;&amp; </a:t>
             </a:r>
             <a:r>
-              <a:rPr lang="en-US" sz="1200" dirty="0" err="1" smtClean="0">
+              <a:rPr lang="en-US" sz="1200" b="1" dirty="0" err="1" smtClean="0">
                 <a:solidFill>
                   <a:srgbClr val="000000"/>
                 </a:solidFill>
@@ -5247,7 +5252,7 @@
               <a:t>pos.</a:t>
             </a:r>
             <a:r>
-              <a:rPr lang="en-US" sz="1200" dirty="0" err="1" smtClean="0">
+              <a:rPr lang="en-US" sz="1200" b="1" dirty="0" err="1" smtClean="0">
                 <a:solidFill>
                   <a:srgbClr val="0000C0"/>
                 </a:solidFill>
@@ -5258,7 +5263,7 @@
               <a:t>x</a:t>
             </a:r>
             <a:r>
-              <a:rPr lang="en-US" sz="1200" dirty="0" smtClean="0">
+              <a:rPr lang="en-US" sz="1200" b="1" dirty="0" smtClean="0">
                 <a:solidFill>
                   <a:srgbClr val="000000"/>
                 </a:solidFill>
@@ -5268,7 +5273,7 @@
               </a:rPr>
               <a:t> &gt;= 0) &amp;&amp;</a:t>
             </a:r>
-            <a:endParaRPr lang="de-CH" sz="1200" dirty="0" smtClean="0">
+            <a:endParaRPr lang="de-CH" sz="1200" b="1" dirty="0" smtClean="0">
               <a:latin typeface="Calibri"/>
               <a:ea typeface="Calibri"/>
               <a:cs typeface="Times New Roman"/>
@@ -5284,7 +5289,7 @@
               </a:spcAft>
             </a:pPr>
             <a:r>
-              <a:rPr lang="en-US" sz="1200" dirty="0" smtClean="0">
+              <a:rPr lang="en-US" sz="1200" b="1" dirty="0" smtClean="0">
                 <a:solidFill>
                   <a:srgbClr val="000000"/>
                 </a:solidFill>
@@ -5295,7 +5300,7 @@
               <a:t>   (</a:t>
             </a:r>
             <a:r>
-              <a:rPr lang="en-US" sz="1200" dirty="0" err="1" smtClean="0">
+              <a:rPr lang="en-US" sz="1200" b="1" dirty="0" err="1" smtClean="0">
                 <a:solidFill>
                   <a:srgbClr val="000000"/>
                 </a:solidFill>
@@ -5306,7 +5311,7 @@
               <a:t>pos.</a:t>
             </a:r>
             <a:r>
-              <a:rPr lang="en-US" sz="1200" dirty="0" err="1" smtClean="0">
+              <a:rPr lang="en-US" sz="1200" b="1" dirty="0" err="1" smtClean="0">
                 <a:solidFill>
                   <a:srgbClr val="0000C0"/>
                 </a:solidFill>
@@ -5317,7 +5322,7 @@
               <a:t>y</a:t>
             </a:r>
             <a:r>
-              <a:rPr lang="en-US" sz="1200" dirty="0" smtClean="0">
+              <a:rPr lang="en-US" sz="1200" b="1" dirty="0" smtClean="0">
                 <a:solidFill>
                   <a:srgbClr val="000000"/>
                 </a:solidFill>
@@ -5328,7 +5333,7 @@
               <a:t> &lt; PLAYGROUND_Y_MAX &amp;&amp; </a:t>
             </a:r>
             <a:r>
-              <a:rPr lang="en-US" sz="1200" dirty="0" err="1" smtClean="0">
+              <a:rPr lang="en-US" sz="1200" b="1" dirty="0" err="1" smtClean="0">
                 <a:solidFill>
                   <a:srgbClr val="000000"/>
                 </a:solidFill>
@@ -5339,7 +5344,7 @@
               <a:t>pos.</a:t>
             </a:r>
             <a:r>
-              <a:rPr lang="en-US" sz="1200" dirty="0" err="1" smtClean="0">
+              <a:rPr lang="en-US" sz="1200" b="1" dirty="0" err="1" smtClean="0">
                 <a:solidFill>
                   <a:srgbClr val="0000C0"/>
                 </a:solidFill>
@@ -5350,7 +5355,7 @@
               <a:t>y</a:t>
             </a:r>
             <a:r>
-              <a:rPr lang="en-US" sz="1200" dirty="0" smtClean="0">
+              <a:rPr lang="en-US" sz="1200" b="1" dirty="0" smtClean="0">
                 <a:solidFill>
                   <a:srgbClr val="000000"/>
                 </a:solidFill>
@@ -5360,7 +5365,7 @@
               </a:rPr>
               <a:t> &gt;= 0))</a:t>
             </a:r>
-            <a:endParaRPr lang="de-CH" sz="1200" dirty="0" smtClean="0">
+            <a:endParaRPr lang="de-CH" sz="1200" b="1" dirty="0" smtClean="0">
               <a:latin typeface="Calibri"/>
               <a:ea typeface="Calibri"/>
               <a:cs typeface="Times New Roman"/>
@@ -5376,7 +5381,7 @@
               </a:spcAft>
             </a:pPr>
             <a:r>
-              <a:rPr lang="de-CH" sz="1200" dirty="0" smtClean="0">
+              <a:rPr lang="de-CH" sz="1200" b="1" dirty="0" smtClean="0">
                 <a:solidFill>
                   <a:srgbClr val="000000"/>
                 </a:solidFill>
@@ -5386,7 +5391,7 @@
               </a:rPr>
               <a:t>{</a:t>
             </a:r>
-            <a:endParaRPr lang="de-CH" sz="1200" dirty="0" smtClean="0">
+            <a:endParaRPr lang="de-CH" sz="1200" b="1" dirty="0" smtClean="0">
               <a:latin typeface="Calibri"/>
               <a:ea typeface="Calibri"/>
               <a:cs typeface="Times New Roman"/>
@@ -5402,7 +5407,7 @@
               </a:spcAft>
             </a:pPr>
             <a:r>
-              <a:rPr lang="de-CH" sz="1200" dirty="0" smtClean="0">
+              <a:rPr lang="de-CH" sz="1200" b="1" dirty="0" smtClean="0">
                 <a:solidFill>
                   <a:srgbClr val="000000"/>
                 </a:solidFill>
@@ -5413,7 +5418,7 @@
               <a:t>    </a:t>
             </a:r>
             <a:r>
-              <a:rPr lang="de-CH" sz="1200" dirty="0" smtClean="0">
+              <a:rPr lang="de-CH" sz="1200" b="1" dirty="0" smtClean="0">
                 <a:solidFill>
                   <a:srgbClr val="3F7F5F"/>
                 </a:solidFill>
@@ -5424,7 +5429,7 @@
               <a:t>// </a:t>
             </a:r>
             <a:r>
-              <a:rPr lang="de-CH" sz="1200" dirty="0" err="1" smtClean="0">
+              <a:rPr lang="de-CH" sz="1200" b="1" dirty="0" err="1" smtClean="0">
                 <a:solidFill>
                   <a:srgbClr val="3F7F5F"/>
                 </a:solidFill>
@@ -5435,7 +5440,7 @@
               <a:t>true</a:t>
             </a:r>
             <a:r>
-              <a:rPr lang="de-CH" sz="1200" dirty="0" smtClean="0">
+              <a:rPr lang="de-CH" sz="1200" b="1" dirty="0" smtClean="0">
                 <a:solidFill>
                   <a:srgbClr val="3F7F5F"/>
                 </a:solidFill>
@@ -5445,7 +5450,7 @@
               </a:rPr>
               <a:t> zurückgeben</a:t>
             </a:r>
-            <a:endParaRPr lang="de-CH" sz="1200" dirty="0" smtClean="0">
+            <a:endParaRPr lang="de-CH" sz="1200" b="1" dirty="0" smtClean="0">
               <a:latin typeface="Calibri"/>
               <a:ea typeface="Calibri"/>
               <a:cs typeface="Times New Roman"/>
@@ -5461,7 +5466,7 @@
               </a:spcAft>
             </a:pPr>
             <a:r>
-              <a:rPr lang="de-CH" sz="1200" dirty="0" smtClean="0">
+              <a:rPr lang="de-CH" sz="1200" b="1" dirty="0" smtClean="0">
                 <a:solidFill>
                   <a:srgbClr val="000000"/>
                 </a:solidFill>
@@ -5483,7 +5488,7 @@
               <a:t>return</a:t>
             </a:r>
             <a:r>
-              <a:rPr lang="de-CH" sz="1200" dirty="0" smtClean="0">
+              <a:rPr lang="de-CH" sz="1200" b="1" dirty="0" smtClean="0">
                 <a:solidFill>
                   <a:srgbClr val="000000"/>
                 </a:solidFill>
@@ -5493,7 +5498,7 @@
               </a:rPr>
               <a:t> 1;</a:t>
             </a:r>
-            <a:endParaRPr lang="de-CH" sz="1200" dirty="0" smtClean="0">
+            <a:endParaRPr lang="de-CH" sz="1200" b="1" dirty="0" smtClean="0">
               <a:latin typeface="Calibri"/>
               <a:ea typeface="Calibri"/>
               <a:cs typeface="Times New Roman"/>
@@ -5509,7 +5514,7 @@
               </a:spcAft>
             </a:pPr>
             <a:r>
-              <a:rPr lang="de-CH" sz="1200" dirty="0" smtClean="0">
+              <a:rPr lang="de-CH" sz="1200" b="1" dirty="0" smtClean="0">
                 <a:solidFill>
                   <a:srgbClr val="000000"/>
                 </a:solidFill>
@@ -5519,7 +5524,7 @@
               </a:rPr>
               <a:t>}</a:t>
             </a:r>
-            <a:endParaRPr lang="de-CH" sz="1200" dirty="0" smtClean="0">
+            <a:endParaRPr lang="de-CH" sz="1200" b="1" dirty="0" smtClean="0">
               <a:latin typeface="Calibri"/>
               <a:ea typeface="Calibri"/>
               <a:cs typeface="Times New Roman"/>
@@ -5545,7 +5550,7 @@
               </a:rPr>
               <a:t>else</a:t>
             </a:r>
-            <a:endParaRPr lang="de-CH" sz="1200" dirty="0" smtClean="0">
+            <a:endParaRPr lang="de-CH" sz="1200" b="1" dirty="0" smtClean="0">
               <a:latin typeface="Calibri"/>
               <a:ea typeface="Calibri"/>
               <a:cs typeface="Times New Roman"/>
@@ -5561,7 +5566,7 @@
               </a:spcAft>
             </a:pPr>
             <a:r>
-              <a:rPr lang="de-CH" sz="1200" dirty="0" smtClean="0">
+              <a:rPr lang="de-CH" sz="1200" b="1" dirty="0" smtClean="0">
                 <a:solidFill>
                   <a:srgbClr val="000000"/>
                 </a:solidFill>
@@ -5571,7 +5576,7 @@
               </a:rPr>
               <a:t>{</a:t>
             </a:r>
-            <a:endParaRPr lang="de-CH" sz="1200" dirty="0" smtClean="0">
+            <a:endParaRPr lang="de-CH" sz="1200" b="1" dirty="0" smtClean="0">
               <a:latin typeface="Calibri"/>
               <a:ea typeface="Calibri"/>
               <a:cs typeface="Times New Roman"/>
@@ -5587,7 +5592,7 @@
               </a:spcAft>
             </a:pPr>
             <a:r>
-              <a:rPr lang="en-US" sz="1200" dirty="0" smtClean="0">
+              <a:rPr lang="en-US" sz="1200" b="1" dirty="0" smtClean="0">
                 <a:solidFill>
                   <a:srgbClr val="000000"/>
                 </a:solidFill>
@@ -5598,7 +5603,7 @@
               <a:t>    </a:t>
             </a:r>
             <a:r>
-              <a:rPr lang="en-US" sz="1200" dirty="0" smtClean="0">
+              <a:rPr lang="en-US" sz="1200" b="1" dirty="0" smtClean="0">
                 <a:solidFill>
                   <a:srgbClr val="3F7F5F"/>
                 </a:solidFill>
@@ -5609,7 +5614,7 @@
               <a:t>// false </a:t>
             </a:r>
             <a:r>
-              <a:rPr lang="en-US" sz="1200" dirty="0" err="1" smtClean="0">
+              <a:rPr lang="en-US" sz="1200" b="1" dirty="0" err="1" smtClean="0">
                 <a:solidFill>
                   <a:srgbClr val="3F7F5F"/>
                 </a:solidFill>
@@ -5619,7 +5624,7 @@
               </a:rPr>
               <a:t>zurückgeben</a:t>
             </a:r>
-            <a:endParaRPr lang="de-CH" sz="1200" dirty="0" smtClean="0">
+            <a:endParaRPr lang="de-CH" sz="1200" b="1" dirty="0" smtClean="0">
               <a:latin typeface="Calibri"/>
               <a:ea typeface="Calibri"/>
               <a:cs typeface="Times New Roman"/>
@@ -5635,7 +5640,7 @@
               </a:spcAft>
             </a:pPr>
             <a:r>
-              <a:rPr lang="en-US" sz="1200" dirty="0" smtClean="0">
+              <a:rPr lang="en-US" sz="1200" b="1" dirty="0" smtClean="0">
                 <a:solidFill>
                   <a:srgbClr val="000000"/>
                 </a:solidFill>
@@ -5657,7 +5662,7 @@
               <a:t>return</a:t>
             </a:r>
             <a:r>
-              <a:rPr lang="en-US" sz="1200" dirty="0" smtClean="0">
+              <a:rPr lang="en-US" sz="1200" b="1" dirty="0" smtClean="0">
                 <a:solidFill>
                   <a:srgbClr val="000000"/>
                 </a:solidFill>
@@ -5667,7 +5672,7 @@
               </a:rPr>
               <a:t> 0;</a:t>
             </a:r>
-            <a:endParaRPr lang="de-CH" sz="1200" dirty="0" smtClean="0">
+            <a:endParaRPr lang="de-CH" sz="1200" b="1" dirty="0" smtClean="0">
               <a:latin typeface="Calibri"/>
               <a:ea typeface="Calibri"/>
               <a:cs typeface="Times New Roman"/>
@@ -5675,7 +5680,7 @@
           </a:p>
           <a:p>
             <a:r>
-              <a:rPr lang="en-US" sz="1200" dirty="0" smtClean="0">
+              <a:rPr lang="en-US" sz="1200" b="1" dirty="0" smtClean="0">
                 <a:solidFill>
                   <a:srgbClr val="000000"/>
                 </a:solidFill>
@@ -5684,7 +5689,7 @@
               </a:rPr>
               <a:t>}</a:t>
             </a:r>
-            <a:endParaRPr lang="de-CH" sz="1200" dirty="0"/>
+            <a:endParaRPr lang="de-CH" sz="1200" b="1" dirty="0"/>
           </a:p>
         </p:txBody>
       </p:sp>
@@ -5730,7 +5735,7 @@
               </a:spcAft>
             </a:pPr>
             <a:r>
-              <a:rPr lang="en-US" sz="1200" dirty="0" smtClean="0">
+              <a:rPr lang="en-US" sz="1200" b="1" dirty="0" smtClean="0">
                 <a:solidFill>
                   <a:srgbClr val="3F7F5F"/>
                 </a:solidFill>
@@ -5741,7 +5746,7 @@
               <a:t>// Python </a:t>
             </a:r>
             <a:r>
-              <a:rPr lang="en-US" sz="1200" dirty="0" err="1" smtClean="0">
+              <a:rPr lang="en-US" sz="1200" b="1" dirty="0" err="1" smtClean="0">
                 <a:solidFill>
                   <a:srgbClr val="3F7F5F"/>
                 </a:solidFill>
@@ -5752,7 +5757,7 @@
               <a:t>wär</a:t>
             </a:r>
             <a:r>
-              <a:rPr lang="en-US" sz="1200" dirty="0" smtClean="0">
+              <a:rPr lang="en-US" sz="1200" b="1" dirty="0" smtClean="0">
                 <a:solidFill>
                   <a:srgbClr val="3F7F5F"/>
                 </a:solidFill>
@@ -5763,7 +5768,7 @@
               <a:t> </a:t>
             </a:r>
             <a:r>
-              <a:rPr lang="en-US" sz="1200" dirty="0" err="1" smtClean="0">
+              <a:rPr lang="en-US" sz="1200" b="1" dirty="0" err="1" smtClean="0">
                 <a:solidFill>
                   <a:srgbClr val="3F7F5F"/>
                 </a:solidFill>
@@ -5774,7 +5779,7 @@
               <a:t>da</a:t>
             </a:r>
             <a:r>
-              <a:rPr lang="en-US" sz="1200" dirty="0" smtClean="0">
+              <a:rPr lang="en-US" sz="1200" b="1" dirty="0" smtClean="0">
                 <a:solidFill>
                   <a:srgbClr val="3F7F5F"/>
                 </a:solidFill>
@@ -5785,7 +5790,7 @@
               <a:t> </a:t>
             </a:r>
             <a:r>
-              <a:rPr lang="en-US" sz="1200" dirty="0" err="1" smtClean="0">
+              <a:rPr lang="en-US" sz="1200" b="1" dirty="0" err="1" smtClean="0">
                 <a:solidFill>
                   <a:srgbClr val="3F7F5F"/>
                 </a:solidFill>
@@ -5796,7 +5801,7 @@
               <a:t>imfau</a:t>
             </a:r>
             <a:r>
-              <a:rPr lang="en-US" sz="1200" dirty="0" smtClean="0">
+              <a:rPr lang="en-US" sz="1200" b="1" dirty="0" smtClean="0">
                 <a:solidFill>
                   <a:srgbClr val="3F7F5F"/>
                 </a:solidFill>
@@ -5807,7 +5812,7 @@
               <a:t> </a:t>
             </a:r>
             <a:r>
-              <a:rPr lang="en-US" sz="1200" dirty="0" err="1" smtClean="0">
+              <a:rPr lang="en-US" sz="1200" b="1" dirty="0" err="1" smtClean="0">
                 <a:solidFill>
                   <a:srgbClr val="3F7F5F"/>
                 </a:solidFill>
@@ -5818,7 +5823,7 @@
               <a:t>viiiiiu</a:t>
             </a:r>
             <a:r>
-              <a:rPr lang="en-US" sz="1200" dirty="0" smtClean="0">
+              <a:rPr lang="en-US" sz="1200" b="1" dirty="0" smtClean="0">
                 <a:solidFill>
                   <a:srgbClr val="3F7F5F"/>
                 </a:solidFill>
@@ -5829,7 +5834,7 @@
               <a:t> </a:t>
             </a:r>
             <a:r>
-              <a:rPr lang="en-US" sz="1200" dirty="0" err="1" smtClean="0">
+              <a:rPr lang="en-US" sz="1200" b="1" dirty="0" err="1" smtClean="0">
                 <a:solidFill>
                   <a:srgbClr val="3F7F5F"/>
                 </a:solidFill>
@@ -5840,7 +5845,7 @@
               <a:t>schöner</a:t>
             </a:r>
             <a:r>
-              <a:rPr lang="en-US" sz="1200" dirty="0" smtClean="0">
+              <a:rPr lang="en-US" sz="1200" b="1" dirty="0" smtClean="0">
                 <a:solidFill>
                   <a:srgbClr val="3F7F5F"/>
                 </a:solidFill>
@@ -5850,7 +5855,7 @@
               </a:rPr>
               <a:t>:</a:t>
             </a:r>
-            <a:endParaRPr lang="de-CH" sz="1600" dirty="0" smtClean="0">
+            <a:endParaRPr lang="de-CH" sz="1600" b="1" dirty="0" smtClean="0">
               <a:latin typeface="Calibri"/>
               <a:ea typeface="Calibri"/>
               <a:cs typeface="Times New Roman"/>
@@ -5866,7 +5871,7 @@
               </a:spcAft>
             </a:pPr>
             <a:r>
-              <a:rPr lang="en-US" sz="1200" dirty="0" smtClean="0">
+              <a:rPr lang="en-US" sz="1200" b="1" dirty="0" smtClean="0">
                 <a:solidFill>
                   <a:srgbClr val="3F7F5F"/>
                 </a:solidFill>
@@ -5874,10 +5879,10 @@
                 <a:ea typeface="Calibri"/>
                 <a:cs typeface="Times New Roman"/>
               </a:rPr>
-              <a:t>// return 1 if (0 &lt; </a:t>
-            </a:r>
-            <a:r>
-              <a:rPr lang="en-US" sz="1200" dirty="0" err="1" smtClean="0">
+              <a:t>// return 1 if (0 </a:t>
+            </a:r>
+            <a:r>
+              <a:rPr lang="en-US" sz="1200" b="1" dirty="0" smtClean="0">
                 <a:solidFill>
                   <a:srgbClr val="3F7F5F"/>
                 </a:solidFill>
@@ -5885,10 +5890,21 @@
                 <a:ea typeface="Calibri"/>
                 <a:cs typeface="Times New Roman"/>
               </a:rPr>
+              <a:t>&lt;= </a:t>
+            </a:r>
+            <a:r>
+              <a:rPr lang="en-US" sz="1200" b="1" dirty="0" err="1" smtClean="0">
+                <a:solidFill>
+                  <a:srgbClr val="3F7F5F"/>
+                </a:solidFill>
+                <a:latin typeface="Courier New"/>
+                <a:ea typeface="Calibri"/>
+                <a:cs typeface="Times New Roman"/>
+              </a:rPr>
               <a:t>pos.x</a:t>
             </a:r>
             <a:r>
-              <a:rPr lang="en-US" sz="1200" dirty="0" smtClean="0">
+              <a:rPr lang="en-US" sz="1200" b="1" dirty="0" smtClean="0">
                 <a:solidFill>
                   <a:srgbClr val="3F7F5F"/>
                 </a:solidFill>
@@ -5899,7 +5915,7 @@
               <a:t> &lt; PLAYGROUND_X_MAX) and</a:t>
             </a:r>
             <a:br>
-              <a:rPr lang="en-US" sz="1200" dirty="0" smtClean="0">
+              <a:rPr lang="en-US" sz="1200" b="1" dirty="0" smtClean="0">
                 <a:solidFill>
                   <a:srgbClr val="3F7F5F"/>
                 </a:solidFill>
@@ -5909,7 +5925,7 @@
               </a:rPr>
             </a:br>
             <a:r>
-              <a:rPr lang="en-US" sz="1200" dirty="0" smtClean="0">
+              <a:rPr lang="en-US" sz="1200" b="1" dirty="0" smtClean="0">
                 <a:solidFill>
                   <a:srgbClr val="3F7F5F"/>
                 </a:solidFill>
@@ -5917,10 +5933,10 @@
                 <a:ea typeface="Calibri"/>
                 <a:cs typeface="Times New Roman"/>
               </a:rPr>
-              <a:t>//             (0 &lt; </a:t>
-            </a:r>
-            <a:r>
-              <a:rPr lang="en-US" sz="1200" dirty="0" err="1" smtClean="0">
+              <a:t>//             (0 </a:t>
+            </a:r>
+            <a:r>
+              <a:rPr lang="en-US" sz="1200" b="1" dirty="0" smtClean="0">
                 <a:solidFill>
                   <a:srgbClr val="3F7F5F"/>
                 </a:solidFill>
@@ -5928,10 +5944,21 @@
                 <a:ea typeface="Calibri"/>
                 <a:cs typeface="Times New Roman"/>
               </a:rPr>
+              <a:t>&lt;= </a:t>
+            </a:r>
+            <a:r>
+              <a:rPr lang="en-US" sz="1200" b="1" dirty="0" err="1" smtClean="0">
+                <a:solidFill>
+                  <a:srgbClr val="3F7F5F"/>
+                </a:solidFill>
+                <a:latin typeface="Courier New"/>
+                <a:ea typeface="Calibri"/>
+                <a:cs typeface="Times New Roman"/>
+              </a:rPr>
               <a:t>pos.y</a:t>
             </a:r>
             <a:r>
-              <a:rPr lang="en-US" sz="1200" dirty="0" smtClean="0">
+              <a:rPr lang="en-US" sz="1200" b="1" dirty="0" smtClean="0">
                 <a:solidFill>
                   <a:srgbClr val="3F7F5F"/>
                 </a:solidFill>
@@ -5942,7 +5969,7 @@
               <a:t> &lt; PLAYGROUND_Y_MAX) else 0</a:t>
             </a:r>
             <a:br>
-              <a:rPr lang="en-US" sz="1200" dirty="0" smtClean="0">
+              <a:rPr lang="en-US" sz="1200" b="1" dirty="0" smtClean="0">
                 <a:solidFill>
                   <a:srgbClr val="3F7F5F"/>
                 </a:solidFill>
@@ -5951,7 +5978,7 @@
                 <a:cs typeface="Times New Roman"/>
               </a:rPr>
             </a:br>
-            <a:endParaRPr lang="de-CH" sz="1600" dirty="0" smtClean="0">
+            <a:endParaRPr lang="de-CH" sz="1600" b="1" dirty="0" smtClean="0">
               <a:latin typeface="Calibri"/>
               <a:ea typeface="Calibri"/>
               <a:cs typeface="Times New Roman"/>
@@ -5959,7 +5986,7 @@
           </a:p>
           <a:p>
             <a:r>
-              <a:rPr lang="en-US" sz="1200" dirty="0" smtClean="0">
+              <a:rPr lang="en-US" sz="1200" b="1" dirty="0" smtClean="0">
                 <a:solidFill>
                   <a:srgbClr val="3F7F5F"/>
                 </a:solidFill>
@@ -5969,7 +5996,7 @@
               <a:t>// # - just </a:t>
             </a:r>
             <a:r>
-              <a:rPr lang="en-US" sz="1200" dirty="0" err="1" smtClean="0">
+              <a:rPr lang="en-US" sz="1200" b="1" dirty="0" err="1" smtClean="0">
                 <a:solidFill>
                   <a:srgbClr val="3F7F5F"/>
                 </a:solidFill>
@@ -5979,7 +6006,7 @@
               <a:t>sayin</a:t>
             </a:r>
             <a:r>
-              <a:rPr lang="en-US" sz="1200" dirty="0" smtClean="0">
+              <a:rPr lang="en-US" sz="1200" b="1" dirty="0" smtClean="0">
                 <a:solidFill>
                   <a:srgbClr val="3F7F5F"/>
                 </a:solidFill>
@@ -5988,7 +6015,7 @@
               </a:rPr>
               <a:t>'</a:t>
             </a:r>
-            <a:endParaRPr lang="de-CH" sz="1200" dirty="0"/>
+            <a:endParaRPr lang="de-CH" sz="1200" b="1" dirty="0"/>
           </a:p>
         </p:txBody>
       </p:sp>
@@ -6034,7 +6061,7 @@
               </a:spcAft>
             </a:pPr>
             <a:r>
-              <a:rPr lang="en-US" sz="1200" dirty="0" smtClean="0">
+              <a:rPr lang="en-US" sz="1200" b="1" dirty="0" smtClean="0">
                 <a:solidFill>
                   <a:srgbClr val="3F7F5F"/>
                 </a:solidFill>
@@ -6044,7 +6071,7 @@
               <a:t>// # - Challenge accepted by kasen1, C:</a:t>
             </a:r>
             <a:br>
-              <a:rPr lang="en-US" sz="1200" dirty="0" smtClean="0">
+              <a:rPr lang="en-US" sz="1200" b="1" dirty="0" smtClean="0">
                 <a:solidFill>
                   <a:srgbClr val="3F7F5F"/>
                 </a:solidFill>
@@ -6053,7 +6080,7 @@
               </a:rPr>
             </a:br>
             <a:r>
-              <a:rPr lang="en-US" sz="1200" dirty="0" smtClean="0">
+              <a:rPr lang="en-US" sz="1200" b="1" dirty="0" smtClean="0">
                 <a:solidFill>
                   <a:srgbClr val="3F7F5F"/>
                 </a:solidFill>
@@ -6063,7 +6090,7 @@
               <a:t>// return !((</a:t>
             </a:r>
             <a:r>
-              <a:rPr lang="en-US" sz="1200" dirty="0" err="1" smtClean="0">
+              <a:rPr lang="en-US" sz="1200" b="1" dirty="0" err="1" smtClean="0">
                 <a:solidFill>
                   <a:srgbClr val="3F7F5F"/>
                 </a:solidFill>
@@ -6073,7 +6100,7 @@
               <a:t>pos.x</a:t>
             </a:r>
             <a:r>
-              <a:rPr lang="en-US" sz="1200" dirty="0" smtClean="0">
+              <a:rPr lang="en-US" sz="1200" b="1" dirty="0" smtClean="0">
                 <a:solidFill>
                   <a:srgbClr val="3F7F5F"/>
                 </a:solidFill>
@@ -6083,7 +6110,7 @@
               <a:t>&gt;PLAYGROUND_X_MAX)||(</a:t>
             </a:r>
             <a:r>
-              <a:rPr lang="en-US" sz="1200" dirty="0" err="1" smtClean="0">
+              <a:rPr lang="en-US" sz="1200" b="1" dirty="0" err="1" smtClean="0">
                 <a:solidFill>
                   <a:srgbClr val="3F7F5F"/>
                 </a:solidFill>
@@ -6093,7 +6120,7 @@
               <a:t>pos.y</a:t>
             </a:r>
             <a:r>
-              <a:rPr lang="en-US" sz="1200" dirty="0" smtClean="0">
+              <a:rPr lang="en-US" sz="1200" b="1" dirty="0" smtClean="0">
                 <a:solidFill>
                   <a:srgbClr val="3F7F5F"/>
                 </a:solidFill>
@@ -6103,7 +6130,7 @@
               <a:t>&gt;PLAYGROUND_Y_MAX)||</a:t>
             </a:r>
             <a:br>
-              <a:rPr lang="en-US" sz="1200" dirty="0" smtClean="0">
+              <a:rPr lang="en-US" sz="1200" b="1" dirty="0" smtClean="0">
                 <a:solidFill>
                   <a:srgbClr val="3F7F5F"/>
                 </a:solidFill>
@@ -6112,7 +6139,7 @@
               </a:rPr>
             </a:br>
             <a:r>
-              <a:rPr lang="en-US" sz="1200" dirty="0" smtClean="0">
+              <a:rPr lang="en-US" sz="1200" b="1" dirty="0" smtClean="0">
                 <a:solidFill>
                   <a:srgbClr val="3F7F5F"/>
                 </a:solidFill>
@@ -6122,7 +6149,7 @@
               <a:t>            (</a:t>
             </a:r>
             <a:r>
-              <a:rPr lang="en-US" sz="1200" dirty="0" err="1" smtClean="0">
+              <a:rPr lang="en-US" sz="1200" b="1" dirty="0" err="1" smtClean="0">
                 <a:solidFill>
                   <a:srgbClr val="3F7F5F"/>
                 </a:solidFill>
@@ -6132,7 +6159,7 @@
               <a:t>pos.x</a:t>
             </a:r>
             <a:r>
-              <a:rPr lang="en-US" sz="1200" dirty="0" smtClean="0">
+              <a:rPr lang="en-US" sz="1200" b="1" dirty="0" smtClean="0">
                 <a:solidFill>
                   <a:srgbClr val="3F7F5F"/>
                 </a:solidFill>
@@ -6142,7 +6169,7 @@
               <a:t>&lt;=0)||(</a:t>
             </a:r>
             <a:r>
-              <a:rPr lang="en-US" sz="1200" dirty="0" err="1" smtClean="0">
+              <a:rPr lang="en-US" sz="1200" b="1" dirty="0" err="1" smtClean="0">
                 <a:solidFill>
                   <a:srgbClr val="3F7F5F"/>
                 </a:solidFill>
@@ -6152,7 +6179,7 @@
               <a:t>pos.y</a:t>
             </a:r>
             <a:r>
-              <a:rPr lang="en-US" sz="1200" dirty="0" smtClean="0">
+              <a:rPr lang="en-US" sz="1200" b="1" dirty="0" smtClean="0">
                 <a:solidFill>
                   <a:srgbClr val="3F7F5F"/>
                 </a:solidFill>
@@ -6162,7 +6189,7 @@
               <a:t>&lt;=0));</a:t>
             </a:r>
             <a:br>
-              <a:rPr lang="en-US" sz="1200" dirty="0" smtClean="0">
+              <a:rPr lang="en-US" sz="1200" b="1" dirty="0" smtClean="0">
                 <a:solidFill>
                   <a:srgbClr val="3F7F5F"/>
                 </a:solidFill>
@@ -6171,7 +6198,7 @@
               </a:rPr>
             </a:br>
             <a:r>
-              <a:rPr lang="en-US" sz="1200" dirty="0" smtClean="0">
+              <a:rPr lang="en-US" sz="1200" b="1" dirty="0" smtClean="0">
                 <a:solidFill>
                   <a:srgbClr val="3F7F5F"/>
                 </a:solidFill>
@@ -6181,7 +6208,7 @@
               <a:t/>
             </a:r>
             <a:br>
-              <a:rPr lang="en-US" sz="1200" dirty="0" smtClean="0">
+              <a:rPr lang="en-US" sz="1200" b="1" dirty="0" smtClean="0">
                 <a:solidFill>
                   <a:srgbClr val="3F7F5F"/>
                 </a:solidFill>
@@ -6190,7 +6217,7 @@
               </a:rPr>
             </a:br>
             <a:r>
-              <a:rPr lang="en-US" sz="1200" dirty="0" smtClean="0">
+              <a:rPr lang="en-US" sz="1200" b="1" dirty="0" smtClean="0">
                 <a:solidFill>
                   <a:srgbClr val="3F7F5F"/>
                 </a:solidFill>
@@ -6199,7 +6226,7 @@
               </a:rPr>
               <a:t>// # - Like a Boss!</a:t>
             </a:r>
-            <a:endParaRPr lang="de-CH" sz="1200" dirty="0"/>
+            <a:endParaRPr lang="de-CH" sz="1200" b="1" dirty="0"/>
           </a:p>
         </p:txBody>
       </p:sp>
@@ -6318,7 +6345,7 @@
     </p:spTree>
     <p:extLst>
       <p:ext uri="{BB962C8B-B14F-4D97-AF65-F5344CB8AC3E}">
-        <p14:creationId xmlns:p14="http://schemas.microsoft.com/office/powerpoint/2010/main" val="3199722868"/>
+        <p14:creationId xmlns:p14="http://schemas.microsoft.com/office/powerpoint/2010/main" xmlns="" val="3199722868"/>
       </p:ext>
     </p:extLst>
   </p:cSld>
@@ -7317,7 +7344,7 @@
     </p:spTree>
     <p:extLst>
       <p:ext uri="{BB962C8B-B14F-4D97-AF65-F5344CB8AC3E}">
-        <p14:creationId xmlns:p14="http://schemas.microsoft.com/office/powerpoint/2010/main" val="3199722868"/>
+        <p14:creationId xmlns:p14="http://schemas.microsoft.com/office/powerpoint/2010/main" xmlns="" val="3199722868"/>
       </p:ext>
     </p:extLst>
   </p:cSld>
@@ -7713,7 +7740,7 @@
     </p:spTree>
     <p:extLst>
       <p:ext uri="{BB962C8B-B14F-4D97-AF65-F5344CB8AC3E}">
-        <p14:creationId xmlns:p14="http://schemas.microsoft.com/office/powerpoint/2010/main" val="1300663606"/>
+        <p14:creationId xmlns:p14="http://schemas.microsoft.com/office/powerpoint/2010/main" xmlns="" val="1300663606"/>
       </p:ext>
     </p:extLst>
   </p:cSld>
@@ -7795,7 +7822,7 @@
     </p:spTree>
     <p:extLst>
       <p:ext uri="{BB962C8B-B14F-4D97-AF65-F5344CB8AC3E}">
-        <p14:creationId xmlns:p14="http://schemas.microsoft.com/office/powerpoint/2010/main" val="1595990863"/>
+        <p14:creationId xmlns:p14="http://schemas.microsoft.com/office/powerpoint/2010/main" xmlns="" val="1595990863"/>
       </p:ext>
     </p:extLst>
   </p:cSld>
@@ -7877,14 +7904,12 @@
               <a:rPr lang="de-CH" dirty="0" smtClean="0"/>
               <a:t>Planung</a:t>
             </a:r>
-            <a:endParaRPr lang="de-CH" dirty="0" smtClean="0"/>
           </a:p>
           <a:p>
             <a:r>
               <a:rPr lang="de-CH" dirty="0" smtClean="0"/>
               <a:t>Programm Aufteilung</a:t>
             </a:r>
-            <a:endParaRPr lang="de-CH" dirty="0" smtClean="0"/>
           </a:p>
           <a:p>
             <a:pPr lvl="1"/>
@@ -7925,7 +7950,6 @@
               <a:rPr lang="de-CH" dirty="0" smtClean="0"/>
               <a:t>Test</a:t>
             </a:r>
-            <a:endParaRPr lang="de-CH" dirty="0" smtClean="0"/>
           </a:p>
           <a:p>
             <a:r>
@@ -7945,7 +7969,7 @@
     </p:spTree>
     <p:extLst>
       <p:ext uri="{BB962C8B-B14F-4D97-AF65-F5344CB8AC3E}">
-        <p14:creationId xmlns:p14="http://schemas.microsoft.com/office/powerpoint/2010/main" val="1387166899"/>
+        <p14:creationId xmlns:p14="http://schemas.microsoft.com/office/powerpoint/2010/main" xmlns="" val="1387166899"/>
       </p:ext>
     </p:extLst>
   </p:cSld>
@@ -8043,7 +8067,7 @@
           <a:blip r:embed="rId2" cstate="print">
             <a:extLst>
               <a:ext uri="{BEBA8EAE-BF5A-486C-A8C5-ECC9F3942E4B}">
-                <a14:imgProps xmlns:a14="http://schemas.microsoft.com/office/drawing/2010/main">
+                <a14:imgProps xmlns:a14="http://schemas.microsoft.com/office/drawing/2010/main" xmlns="">
                   <a14:imgLayer r:embed="rId3">
                     <a14:imgEffect>
                       <a14:backgroundRemoval t="0" b="100000" l="0" r="100000"/>
@@ -8052,7 +8076,7 @@
                 </a14:imgProps>
               </a:ext>
               <a:ext uri="{28A0092B-C50C-407E-A947-70E740481C1C}">
-                <a14:useLocalDpi xmlns:a14="http://schemas.microsoft.com/office/drawing/2010/main" val="0"/>
+                <a14:useLocalDpi xmlns:a14="http://schemas.microsoft.com/office/drawing/2010/main" xmlns="" val="0"/>
               </a:ext>
             </a:extLst>
           </a:blip>
@@ -8076,14 +8100,14 @@
           <a:effectLst/>
           <a:extLst>
             <a:ext uri="{909E8E84-426E-40DD-AFC4-6F175D3DCCD1}">
-              <a14:hiddenFill xmlns:a14="http://schemas.microsoft.com/office/drawing/2010/main">
+              <a14:hiddenFill xmlns:a14="http://schemas.microsoft.com/office/drawing/2010/main" xmlns="">
                 <a:solidFill>
                   <a:schemeClr val="accent1"/>
                 </a:solidFill>
               </a14:hiddenFill>
             </a:ext>
             <a:ext uri="{91240B29-F687-4F45-9708-019B960494DF}">
-              <a14:hiddenLine xmlns:a14="http://schemas.microsoft.com/office/drawing/2010/main" w="9525">
+              <a14:hiddenLine xmlns:a14="http://schemas.microsoft.com/office/drawing/2010/main" xmlns="" w="9525">
                 <a:solidFill>
                   <a:schemeClr val="tx1"/>
                 </a:solidFill>
@@ -8093,7 +8117,7 @@
               </a14:hiddenLine>
             </a:ext>
             <a:ext uri="{AF507438-7753-43E0-B8FC-AC1667EBCBE1}">
-              <a14:hiddenEffects xmlns:a14="http://schemas.microsoft.com/office/drawing/2010/main">
+              <a14:hiddenEffects xmlns:a14="http://schemas.microsoft.com/office/drawing/2010/main" xmlns="">
                 <a:effectLst>
                   <a:outerShdw dist="35921" dir="2700000" algn="ctr" rotWithShape="0">
                     <a:schemeClr val="bg2"/>
@@ -8107,7 +8131,7 @@
     </p:spTree>
     <p:extLst>
       <p:ext uri="{BB962C8B-B14F-4D97-AF65-F5344CB8AC3E}">
-        <p14:creationId xmlns:p14="http://schemas.microsoft.com/office/powerpoint/2010/main" val="1599884037"/>
+        <p14:creationId xmlns:p14="http://schemas.microsoft.com/office/powerpoint/2010/main" xmlns="" val="1599884037"/>
       </p:ext>
     </p:extLst>
   </p:cSld>
@@ -8237,7 +8261,7 @@
     </p:spTree>
     <p:extLst>
       <p:ext uri="{BB962C8B-B14F-4D97-AF65-F5344CB8AC3E}">
-        <p14:creationId xmlns:p14="http://schemas.microsoft.com/office/powerpoint/2010/main" val="2756733679"/>
+        <p14:creationId xmlns:p14="http://schemas.microsoft.com/office/powerpoint/2010/main" xmlns="" val="2756733679"/>
       </p:ext>
     </p:extLst>
   </p:cSld>
@@ -8288,7 +8312,15 @@
           <a:p>
             <a:r>
               <a:rPr lang="de-CH" dirty="0" smtClean="0"/>
-              <a:t>Übersicht Programm</a:t>
+              <a:t>Main-Funktion  (Modul </a:t>
+            </a:r>
+            <a:r>
+              <a:rPr lang="de-CH" dirty="0" err="1" smtClean="0"/>
+              <a:t>LaserChess.c</a:t>
+            </a:r>
+            <a:r>
+              <a:rPr lang="de-CH" dirty="0" smtClean="0"/>
+              <a:t>)</a:t>
             </a:r>
             <a:endParaRPr lang="de-CH" dirty="0"/>
           </a:p>
@@ -8311,8 +8343,37 @@
           <a:p>
             <a:r>
               <a:rPr lang="de-CH" dirty="0" smtClean="0"/>
-              <a:t>Main</a:t>
-            </a:r>
+              <a:t>Zuständig für:</a:t>
+            </a:r>
+          </a:p>
+          <a:p>
+            <a:pPr lvl="1"/>
+            <a:r>
+              <a:rPr lang="de-CH" dirty="0" smtClean="0"/>
+              <a:t>Menu</a:t>
+            </a:r>
+          </a:p>
+          <a:p>
+            <a:pPr lvl="1"/>
+            <a:r>
+              <a:rPr lang="de-CH" dirty="0" smtClean="0"/>
+              <a:t>Einstellungen</a:t>
+            </a:r>
+          </a:p>
+          <a:p>
+            <a:pPr lvl="1"/>
+            <a:r>
+              <a:rPr lang="de-CH" dirty="0" smtClean="0"/>
+              <a:t>Grafik-Initialisierung</a:t>
+            </a:r>
+          </a:p>
+          <a:p>
+            <a:pPr lvl="1"/>
+            <a:r>
+              <a:rPr lang="de-CH" dirty="0" smtClean="0"/>
+              <a:t>Spielstart</a:t>
+            </a:r>
+            <a:endParaRPr lang="de-CH" dirty="0" smtClean="0"/>
           </a:p>
           <a:p>
             <a:endParaRPr lang="de-CH" dirty="0" smtClean="0"/>
@@ -8331,7 +8392,7 @@
           <p:nvPr>
             <p:extLst>
               <p:ext uri="{D42A27DB-BD31-4B8C-83A1-F6EECF244321}">
-                <p14:modId xmlns:p14="http://schemas.microsoft.com/office/powerpoint/2010/main" val="675548602"/>
+                <p14:modId xmlns:p14="http://schemas.microsoft.com/office/powerpoint/2010/main" xmlns="" val="675548602"/>
               </p:ext>
             </p:extLst>
           </p:nvPr>
@@ -8342,66 +8403,16 @@
         </p:xfrm>
         <a:graphic>
           <a:graphicData uri="http://schemas.openxmlformats.org/presentationml/2006/ole">
-            <mc:AlternateContent xmlns:mc="http://schemas.openxmlformats.org/markup-compatibility/2006">
-              <mc:Choice xmlns:v="urn:schemas-microsoft-com:vml" Requires="v">
-                <p:oleObj spid="_x0000_s2054" name="Visio" r:id="rId3" imgW="2436869" imgH="7241670" progId="">
-                  <p:embed/>
-                </p:oleObj>
-              </mc:Choice>
-              <mc:Fallback>
-                <p:oleObj name="Visio" r:id="rId3" imgW="2436869" imgH="7241670" progId="">
-                  <p:embed/>
-                  <p:pic>
-                    <p:nvPicPr>
-                      <p:cNvPr id="0" name="Picture 4"/>
-                      <p:cNvPicPr>
-                        <a:picLocks noChangeAspect="1" noChangeArrowheads="1"/>
-                      </p:cNvPicPr>
-                      <p:nvPr/>
-                    </p:nvPicPr>
-                    <p:blipFill>
-                      <a:blip r:embed="rId4">
-                        <a:extLst>
-                          <a:ext uri="{28A0092B-C50C-407E-A947-70E740481C1C}">
-                            <a14:useLocalDpi xmlns:a14="http://schemas.microsoft.com/office/drawing/2010/main" val="0"/>
-                          </a:ext>
-                        </a:extLst>
-                      </a:blip>
-                      <a:srcRect/>
-                      <a:stretch>
-                        <a:fillRect/>
-                      </a:stretch>
-                    </p:blipFill>
-                    <p:spPr bwMode="auto">
-                      <a:xfrm>
-                        <a:off x="3422650" y="1557338"/>
-                        <a:ext cx="1420813" cy="4318000"/>
-                      </a:xfrm>
-                      <a:prstGeom prst="rect">
-                        <a:avLst/>
-                      </a:prstGeom>
-                      <a:noFill/>
-                      <a:extLst>
-                        <a:ext uri="{909E8E84-426E-40DD-AFC4-6F175D3DCCD1}">
-                          <a14:hiddenFill xmlns:a14="http://schemas.microsoft.com/office/drawing/2010/main">
-                            <a:solidFill>
-                              <a:srgbClr val="FFFFFF"/>
-                            </a:solidFill>
-                          </a14:hiddenFill>
-                        </a:ext>
-                      </a:extLst>
-                    </p:spPr>
-                  </p:pic>
-                </p:oleObj>
-              </mc:Fallback>
-            </mc:AlternateContent>
+            <p:oleObj spid="_x0000_s2054" name="Visio" r:id="rId3" imgW="2436869" imgH="7241670" progId="Visio.Drawing.11">
+              <p:embed/>
+            </p:oleObj>
           </a:graphicData>
         </a:graphic>
       </p:graphicFrame>
     </p:spTree>
     <p:extLst>
       <p:ext uri="{BB962C8B-B14F-4D97-AF65-F5344CB8AC3E}">
-        <p14:creationId xmlns:p14="http://schemas.microsoft.com/office/powerpoint/2010/main" val="1334996816"/>
+        <p14:creationId xmlns:p14="http://schemas.microsoft.com/office/powerpoint/2010/main" xmlns="" val="1334996816"/>
       </p:ext>
     </p:extLst>
   </p:cSld>
@@ -8452,7 +8463,15 @@
           <a:p>
             <a:r>
               <a:rPr lang="de-CH" dirty="0" smtClean="0"/>
-              <a:t>Übersicht Programm</a:t>
+              <a:t>Spielfunktion  (Modul </a:t>
+            </a:r>
+            <a:r>
+              <a:rPr lang="de-CH" dirty="0" err="1" smtClean="0"/>
+              <a:t>Spiel.c</a:t>
+            </a:r>
+            <a:r>
+              <a:rPr lang="de-CH" dirty="0" smtClean="0"/>
+              <a:t>)</a:t>
             </a:r>
             <a:endParaRPr lang="de-CH" dirty="0"/>
           </a:p>
@@ -8475,8 +8494,42 @@
           <a:p>
             <a:r>
               <a:rPr lang="de-CH" dirty="0" smtClean="0"/>
-              <a:t>Spiel</a:t>
-            </a:r>
+              <a:t>Zuständig für:</a:t>
+            </a:r>
+          </a:p>
+          <a:p>
+            <a:pPr lvl="1"/>
+            <a:r>
+              <a:rPr lang="de-CH" dirty="0" smtClean="0"/>
+              <a:t>Spielablauf</a:t>
+            </a:r>
+          </a:p>
+          <a:p>
+            <a:pPr lvl="1"/>
+            <a:r>
+              <a:rPr lang="de-CH" dirty="0" smtClean="0"/>
+              <a:t>Spielzüge / Spieler </a:t>
+            </a:r>
+            <a:r>
+              <a:rPr lang="de-CH" dirty="0" err="1" smtClean="0"/>
+              <a:t>toggeln</a:t>
+            </a:r>
+            <a:endParaRPr lang="de-CH" dirty="0" smtClean="0"/>
+          </a:p>
+          <a:p>
+            <a:pPr lvl="1"/>
+            <a:r>
+              <a:rPr lang="de-CH" dirty="0" smtClean="0"/>
+              <a:t>Laser abfeuern</a:t>
+            </a:r>
+          </a:p>
+          <a:p>
+            <a:pPr lvl="1"/>
+            <a:r>
+              <a:rPr lang="de-CH" dirty="0" smtClean="0"/>
+              <a:t>Gewinner anzeigen</a:t>
+            </a:r>
+            <a:endParaRPr lang="de-CH" dirty="0" smtClean="0"/>
           </a:p>
           <a:p>
             <a:endParaRPr lang="de-CH" dirty="0" smtClean="0"/>
@@ -8489,7 +8542,7 @@
     </p:spTree>
     <p:extLst>
       <p:ext uri="{BB962C8B-B14F-4D97-AF65-F5344CB8AC3E}">
-        <p14:creationId xmlns:p14="http://schemas.microsoft.com/office/powerpoint/2010/main" val="2375923500"/>
+        <p14:creationId xmlns:p14="http://schemas.microsoft.com/office/powerpoint/2010/main" xmlns="" val="2375923500"/>
       </p:ext>
     </p:extLst>
   </p:cSld>
@@ -8523,6 +8576,63 @@
           <a:chExt cx="0" cy="0"/>
         </a:xfrm>
       </p:grpSpPr>
+      <p:pic>
+        <p:nvPicPr>
+          <p:cNvPr id="20485" name="Picture 5" descr="D:\Programmieren\C\LaserChess\docs\Flowchart.png"/>
+          <p:cNvPicPr>
+            <a:picLocks noChangeAspect="1" noChangeArrowheads="1"/>
+          </p:cNvPicPr>
+          <p:nvPr/>
+        </p:nvPicPr>
+        <p:blipFill>
+          <a:blip r:embed="rId2" cstate="print"/>
+          <a:stretch>
+            <a:fillRect/>
+          </a:stretch>
+        </p:blipFill>
+        <p:spPr bwMode="auto">
+          <a:xfrm>
+            <a:off x="251953" y="3171363"/>
+            <a:ext cx="8450910" cy="8178517"/>
+          </a:xfrm>
+          <a:prstGeom prst="rect">
+            <a:avLst/>
+          </a:prstGeom>
+          <a:noFill/>
+        </p:spPr>
+      </p:pic>
+      <p:pic>
+        <p:nvPicPr>
+          <p:cNvPr id="20486" name="Picture 6"/>
+          <p:cNvPicPr>
+            <a:picLocks noChangeAspect="1" noChangeArrowheads="1"/>
+          </p:cNvPicPr>
+          <p:nvPr/>
+        </p:nvPicPr>
+        <p:blipFill>
+          <a:blip r:embed="rId3" cstate="print"/>
+          <a:srcRect l="12891" r="12109" b="54200"/>
+          <a:stretch>
+            <a:fillRect/>
+          </a:stretch>
+        </p:blipFill>
+        <p:spPr bwMode="auto">
+          <a:xfrm>
+            <a:off x="0" y="0"/>
+            <a:ext cx="9144000" cy="3140968"/>
+          </a:xfrm>
+          <a:prstGeom prst="rect">
+            <a:avLst/>
+          </a:prstGeom>
+          <a:noFill/>
+          <a:ln w="9525">
+            <a:noFill/>
+            <a:miter lim="800000"/>
+            <a:headEnd/>
+            <a:tailEnd/>
+          </a:ln>
+        </p:spPr>
+      </p:pic>
       <p:sp>
         <p:nvSpPr>
           <p:cNvPr id="2" name="Titel 1"/>
@@ -8540,7 +8650,15 @@
           <a:p>
             <a:r>
               <a:rPr lang="de-CH" dirty="0" smtClean="0"/>
-              <a:t>Übersicht Programm</a:t>
+              <a:t>Logik-Funktionen  (Modul </a:t>
+            </a:r>
+            <a:r>
+              <a:rPr lang="de-CH" dirty="0" err="1" smtClean="0"/>
+              <a:t>Logik.c</a:t>
+            </a:r>
+            <a:r>
+              <a:rPr lang="de-CH" dirty="0" smtClean="0"/>
+              <a:t>)</a:t>
             </a:r>
             <a:endParaRPr lang="de-CH" dirty="0"/>
           </a:p>
@@ -8563,13 +8681,28 @@
           <a:p>
             <a:r>
               <a:rPr lang="de-CH" dirty="0" smtClean="0"/>
-              <a:t>Logik</a:t>
-            </a:r>
-          </a:p>
-          <a:p>
+              <a:t>Zuständig für:</a:t>
+            </a:r>
+          </a:p>
+          <a:p>
+            <a:pPr lvl="1"/>
             <a:r>
               <a:rPr lang="de-CH" dirty="0" smtClean="0"/>
-              <a:t>LASER-ALGO</a:t>
+              <a:t>Laser abfeuern</a:t>
+            </a:r>
+          </a:p>
+          <a:p>
+            <a:pPr lvl="1"/>
+            <a:r>
+              <a:rPr lang="de-CH" dirty="0" smtClean="0"/>
+              <a:t>Diverse andere</a:t>
+            </a:r>
+            <a:br>
+              <a:rPr lang="de-CH" dirty="0" smtClean="0"/>
+            </a:br>
+            <a:r>
+              <a:rPr lang="de-CH" dirty="0" smtClean="0"/>
+              <a:t>Hilfsfunktionen</a:t>
             </a:r>
             <a:endParaRPr lang="de-CH" dirty="0" smtClean="0"/>
           </a:p>
@@ -8584,7 +8717,7 @@
     </p:spTree>
     <p:extLst>
       <p:ext uri="{BB962C8B-B14F-4D97-AF65-F5344CB8AC3E}">
-        <p14:creationId xmlns:p14="http://schemas.microsoft.com/office/powerpoint/2010/main" val="3950922658"/>
+        <p14:creationId xmlns:p14="http://schemas.microsoft.com/office/powerpoint/2010/main" xmlns="" val="3950922658"/>
       </p:ext>
     </p:extLst>
   </p:cSld>
@@ -8594,7 +8727,230 @@
   <p:timing>
     <p:tnLst>
       <p:par>
-        <p:cTn id="1" dur="indefinite" restart="never" nodeType="tmRoot"/>
+        <p:cTn id="1" dur="indefinite" restart="never" nodeType="tmRoot">
+          <p:childTnLst>
+            <p:seq concurrent="1" nextAc="seek">
+              <p:cTn id="2" dur="indefinite" nodeType="mainSeq">
+                <p:childTnLst>
+                  <p:par>
+                    <p:cTn id="3" fill="hold">
+                      <p:stCondLst>
+                        <p:cond delay="indefinite"/>
+                      </p:stCondLst>
+                      <p:childTnLst>
+                        <p:par>
+                          <p:cTn id="4" fill="hold">
+                            <p:stCondLst>
+                              <p:cond delay="0"/>
+                            </p:stCondLst>
+                            <p:childTnLst>
+                              <p:par>
+                                <p:cTn id="5" presetID="64" presetClass="path" presetSubtype="0" accel="50000" decel="50000" fill="hold" nodeType="clickEffect">
+                                  <p:stCondLst>
+                                    <p:cond delay="0"/>
+                                  </p:stCondLst>
+                                  <p:childTnLst>
+                                    <p:animMotion origin="layout" path="M -3.33333E-6 0 L -3.33333E-6 -0.14468 " pathEditMode="relative" rAng="0" ptsTypes="AA">
+                                      <p:cBhvr>
+                                        <p:cTn id="6" dur="600" fill="hold"/>
+                                        <p:tgtEl>
+                                          <p:spTgt spid="20485"/>
+                                        </p:tgtEl>
+                                        <p:attrNameLst>
+                                          <p:attrName>ppt_x</p:attrName>
+                                          <p:attrName>ppt_y</p:attrName>
+                                        </p:attrNameLst>
+                                      </p:cBhvr>
+                                      <p:rCtr x="0" y="-72"/>
+                                    </p:animMotion>
+                                  </p:childTnLst>
+                                </p:cTn>
+                              </p:par>
+                            </p:childTnLst>
+                          </p:cTn>
+                        </p:par>
+                      </p:childTnLst>
+                    </p:cTn>
+                  </p:par>
+                  <p:par>
+                    <p:cTn id="7" fill="hold">
+                      <p:stCondLst>
+                        <p:cond delay="indefinite"/>
+                      </p:stCondLst>
+                      <p:childTnLst>
+                        <p:par>
+                          <p:cTn id="8" fill="hold">
+                            <p:stCondLst>
+                              <p:cond delay="0"/>
+                            </p:stCondLst>
+                            <p:childTnLst>
+                              <p:par>
+                                <p:cTn id="9" presetID="64" presetClass="path" presetSubtype="0" accel="50000" decel="50000" fill="hold" nodeType="clickEffect">
+                                  <p:stCondLst>
+                                    <p:cond delay="0"/>
+                                  </p:stCondLst>
+                                  <p:childTnLst>
+                                    <p:animMotion origin="layout" path="M 2.5E-6 -0.14468 L 2.5E-6 -0.28936 " pathEditMode="relative" rAng="0" ptsTypes="AA">
+                                      <p:cBhvr>
+                                        <p:cTn id="10" dur="600" fill="hold"/>
+                                        <p:tgtEl>
+                                          <p:spTgt spid="20485"/>
+                                        </p:tgtEl>
+                                        <p:attrNameLst>
+                                          <p:attrName>ppt_x</p:attrName>
+                                          <p:attrName>ppt_y</p:attrName>
+                                        </p:attrNameLst>
+                                      </p:cBhvr>
+                                      <p:rCtr x="0" y="-72"/>
+                                    </p:animMotion>
+                                  </p:childTnLst>
+                                </p:cTn>
+                              </p:par>
+                            </p:childTnLst>
+                          </p:cTn>
+                        </p:par>
+                      </p:childTnLst>
+                    </p:cTn>
+                  </p:par>
+                  <p:par>
+                    <p:cTn id="11" fill="hold">
+                      <p:stCondLst>
+                        <p:cond delay="indefinite"/>
+                      </p:stCondLst>
+                      <p:childTnLst>
+                        <p:par>
+                          <p:cTn id="12" fill="hold">
+                            <p:stCondLst>
+                              <p:cond delay="0"/>
+                            </p:stCondLst>
+                            <p:childTnLst>
+                              <p:par>
+                                <p:cTn id="13" presetID="64" presetClass="path" presetSubtype="0" accel="50000" decel="50000" fill="hold" nodeType="clickEffect">
+                                  <p:stCondLst>
+                                    <p:cond delay="0"/>
+                                  </p:stCondLst>
+                                  <p:childTnLst>
+                                    <p:animMotion origin="layout" path="M -1.38889E-6 -0.28935 L -1.38889E-6 -0.43403 " pathEditMode="relative" rAng="0" ptsTypes="AA">
+                                      <p:cBhvr>
+                                        <p:cTn id="14" dur="600" fill="hold"/>
+                                        <p:tgtEl>
+                                          <p:spTgt spid="20485"/>
+                                        </p:tgtEl>
+                                        <p:attrNameLst>
+                                          <p:attrName>ppt_x</p:attrName>
+                                          <p:attrName>ppt_y</p:attrName>
+                                        </p:attrNameLst>
+                                      </p:cBhvr>
+                                      <p:rCtr x="0" y="-72"/>
+                                    </p:animMotion>
+                                  </p:childTnLst>
+                                </p:cTn>
+                              </p:par>
+                            </p:childTnLst>
+                          </p:cTn>
+                        </p:par>
+                      </p:childTnLst>
+                    </p:cTn>
+                  </p:par>
+                  <p:par>
+                    <p:cTn id="15" fill="hold">
+                      <p:stCondLst>
+                        <p:cond delay="indefinite"/>
+                      </p:stCondLst>
+                      <p:childTnLst>
+                        <p:par>
+                          <p:cTn id="16" fill="hold">
+                            <p:stCondLst>
+                              <p:cond delay="0"/>
+                            </p:stCondLst>
+                            <p:childTnLst>
+                              <p:par>
+                                <p:cTn id="17" presetID="64" presetClass="path" presetSubtype="0" accel="50000" decel="50000" fill="hold" nodeType="clickEffect">
+                                  <p:stCondLst>
+                                    <p:cond delay="0"/>
+                                  </p:stCondLst>
+                                  <p:childTnLst>
+                                    <p:animMotion origin="layout" path="M -1.38889E-6 -0.43403 L -1.38889E-6 -0.57871 " pathEditMode="relative" rAng="0" ptsTypes="AA">
+                                      <p:cBhvr>
+                                        <p:cTn id="18" dur="600" fill="hold"/>
+                                        <p:tgtEl>
+                                          <p:spTgt spid="20485"/>
+                                        </p:tgtEl>
+                                        <p:attrNameLst>
+                                          <p:attrName>ppt_x</p:attrName>
+                                          <p:attrName>ppt_y</p:attrName>
+                                        </p:attrNameLst>
+                                      </p:cBhvr>
+                                      <p:rCtr x="0" y="-72"/>
+                                    </p:animMotion>
+                                  </p:childTnLst>
+                                </p:cTn>
+                              </p:par>
+                            </p:childTnLst>
+                          </p:cTn>
+                        </p:par>
+                      </p:childTnLst>
+                    </p:cTn>
+                  </p:par>
+                  <p:par>
+                    <p:cTn id="19" fill="hold">
+                      <p:stCondLst>
+                        <p:cond delay="indefinite"/>
+                      </p:stCondLst>
+                      <p:childTnLst>
+                        <p:par>
+                          <p:cTn id="20" fill="hold">
+                            <p:stCondLst>
+                              <p:cond delay="0"/>
+                            </p:stCondLst>
+                            <p:childTnLst>
+                              <p:par>
+                                <p:cTn id="21" presetID="64" presetClass="path" presetSubtype="0" accel="50000" decel="50000" fill="hold" nodeType="clickEffect">
+                                  <p:stCondLst>
+                                    <p:cond delay="0"/>
+                                  </p:stCondLst>
+                                  <p:childTnLst>
+                                    <p:animMotion origin="layout" path="M -1.38889E-6 -0.57871 L -1.38889E-6 -0.72338 " pathEditMode="relative" rAng="0" ptsTypes="AA">
+                                      <p:cBhvr>
+                                        <p:cTn id="22" dur="600" fill="hold"/>
+                                        <p:tgtEl>
+                                          <p:spTgt spid="20485"/>
+                                        </p:tgtEl>
+                                        <p:attrNameLst>
+                                          <p:attrName>ppt_x</p:attrName>
+                                          <p:attrName>ppt_y</p:attrName>
+                                        </p:attrNameLst>
+                                      </p:cBhvr>
+                                      <p:rCtr x="0" y="-72"/>
+                                    </p:animMotion>
+                                  </p:childTnLst>
+                                </p:cTn>
+                              </p:par>
+                            </p:childTnLst>
+                          </p:cTn>
+                        </p:par>
+                      </p:childTnLst>
+                    </p:cTn>
+                  </p:par>
+                </p:childTnLst>
+              </p:cTn>
+              <p:prevCondLst>
+                <p:cond evt="onPrev" delay="0">
+                  <p:tgtEl>
+                    <p:sldTgt/>
+                  </p:tgtEl>
+                </p:cond>
+              </p:prevCondLst>
+              <p:nextCondLst>
+                <p:cond evt="onNext" delay="0">
+                  <p:tgtEl>
+                    <p:sldTgt/>
+                  </p:tgtEl>
+                </p:cond>
+              </p:nextCondLst>
+            </p:seq>
+          </p:childTnLst>
+        </p:cTn>
       </p:par>
     </p:tnLst>
   </p:timing>
@@ -8658,8 +9014,51 @@
           <a:p>
             <a:r>
               <a:rPr lang="de-CH" dirty="0" smtClean="0"/>
-              <a:t>Grafik</a:t>
-            </a:r>
+              <a:t>Zuständig für:</a:t>
+            </a:r>
+          </a:p>
+          <a:p>
+            <a:pPr lvl="1"/>
+            <a:r>
+              <a:rPr lang="de-CH" dirty="0" smtClean="0"/>
+              <a:t>Bilder importieren</a:t>
+            </a:r>
+          </a:p>
+          <a:p>
+            <a:pPr lvl="1"/>
+            <a:r>
+              <a:rPr lang="de-CH" dirty="0" smtClean="0"/>
+              <a:t>Figuren zeichnen</a:t>
+            </a:r>
+          </a:p>
+          <a:p>
+            <a:pPr lvl="1"/>
+            <a:r>
+              <a:rPr lang="de-CH" dirty="0" smtClean="0"/>
+              <a:t>Figuren löschen</a:t>
+            </a:r>
+          </a:p>
+          <a:p>
+            <a:pPr lvl="1"/>
+            <a:r>
+              <a:rPr lang="de-CH" dirty="0" smtClean="0"/>
+              <a:t>Spielfeld zeichnen</a:t>
+            </a:r>
+          </a:p>
+          <a:p>
+            <a:pPr lvl="1"/>
+            <a:r>
+              <a:rPr lang="de-CH" dirty="0" smtClean="0"/>
+              <a:t>Fokus zeichnen</a:t>
+            </a:r>
+          </a:p>
+          <a:p>
+            <a:pPr lvl="1"/>
+            <a:r>
+              <a:rPr lang="de-CH" dirty="0" smtClean="0"/>
+              <a:t>Laserlinien zeichnen</a:t>
+            </a:r>
+            <a:endParaRPr lang="de-CH" dirty="0" smtClean="0"/>
           </a:p>
           <a:p>
             <a:endParaRPr lang="de-CH" dirty="0" smtClean="0"/>
@@ -8672,7 +9071,7 @@
     </p:spTree>
     <p:extLst>
       <p:ext uri="{BB962C8B-B14F-4D97-AF65-F5344CB8AC3E}">
-        <p14:creationId xmlns:p14="http://schemas.microsoft.com/office/powerpoint/2010/main" val="1184306671"/>
+        <p14:creationId xmlns:p14="http://schemas.microsoft.com/office/powerpoint/2010/main" xmlns="" val="1184306671"/>
       </p:ext>
     </p:extLst>
   </p:cSld>
@@ -8767,7 +9166,7 @@
     </p:spTree>
     <p:extLst>
       <p:ext uri="{BB962C8B-B14F-4D97-AF65-F5344CB8AC3E}">
-        <p14:creationId xmlns:p14="http://schemas.microsoft.com/office/powerpoint/2010/main" val="3199722868"/>
+        <p14:creationId xmlns:p14="http://schemas.microsoft.com/office/powerpoint/2010/main" xmlns="" val="3199722868"/>
       </p:ext>
     </p:extLst>
   </p:cSld>

</xml_diff>

<commit_message>
updated PPTX for presentation tomorow
</commit_message>
<xml_diff>
--- a/docs/LaserChess.pptx
+++ b/docs/LaserChess.pptx
@@ -205,7 +205,7 @@
             <a:fld id="{9CCF7261-FAE9-431D-A535-F0D32AAE8354}" type="datetimeFigureOut">
               <a:rPr lang="de-CH" smtClean="0"/>
               <a:pPr/>
-              <a:t>21.04.2012</a:t>
+              <a:t>26.04.2012</a:t>
             </a:fld>
             <a:endParaRPr lang="de-CH"/>
           </a:p>
@@ -376,7 +376,7 @@
     </p:spTree>
     <p:extLst>
       <p:ext uri="{BB962C8B-B14F-4D97-AF65-F5344CB8AC3E}">
-        <p14:creationId xmlns:p14="http://schemas.microsoft.com/office/powerpoint/2010/main" xmlns="" val="352693751"/>
+        <p14:creationId xmlns:p14="http://schemas.microsoft.com/office/powerpoint/2010/main" val="352693751"/>
       </p:ext>
     </p:extLst>
   </p:cSld>
@@ -1477,7 +1477,7 @@
             <a:fld id="{0B8AC65F-F2B9-4AE9-880A-F19E8D9538B7}" type="datetimeFigureOut">
               <a:rPr lang="de-CH" smtClean="0"/>
               <a:pPr/>
-              <a:t>21.04.2012</a:t>
+              <a:t>26.04.2012</a:t>
             </a:fld>
             <a:endParaRPr lang="de-CH"/>
           </a:p>
@@ -1795,7 +1795,7 @@
             <a:fld id="{0B8AC65F-F2B9-4AE9-880A-F19E8D9538B7}" type="datetimeFigureOut">
               <a:rPr lang="de-CH" smtClean="0"/>
               <a:pPr/>
-              <a:t>21.04.2012</a:t>
+              <a:t>26.04.2012</a:t>
             </a:fld>
             <a:endParaRPr lang="de-CH"/>
           </a:p>
@@ -1972,7 +1972,7 @@
             <a:fld id="{0B8AC65F-F2B9-4AE9-880A-F19E8D9538B7}" type="datetimeFigureOut">
               <a:rPr lang="de-CH" smtClean="0"/>
               <a:pPr/>
-              <a:t>21.04.2012</a:t>
+              <a:t>26.04.2012</a:t>
             </a:fld>
             <a:endParaRPr lang="de-CH"/>
           </a:p>
@@ -2092,7 +2092,7 @@
             <a:fld id="{0B8AC65F-F2B9-4AE9-880A-F19E8D9538B7}" type="datetimeFigureOut">
               <a:rPr lang="de-CH" smtClean="0"/>
               <a:pPr/>
-              <a:t>21.04.2012</a:t>
+              <a:t>26.04.2012</a:t>
             </a:fld>
             <a:endParaRPr lang="de-CH"/>
           </a:p>
@@ -2392,7 +2392,7 @@
             <a:fld id="{0B8AC65F-F2B9-4AE9-880A-F19E8D9538B7}" type="datetimeFigureOut">
               <a:rPr lang="de-CH" smtClean="0"/>
               <a:pPr/>
-              <a:t>21.04.2012</a:t>
+              <a:t>26.04.2012</a:t>
             </a:fld>
             <a:endParaRPr lang="de-CH"/>
           </a:p>
@@ -2687,7 +2687,7 @@
             <a:fld id="{0B8AC65F-F2B9-4AE9-880A-F19E8D9538B7}" type="datetimeFigureOut">
               <a:rPr lang="de-CH" smtClean="0"/>
               <a:pPr/>
-              <a:t>21.04.2012</a:t>
+              <a:t>26.04.2012</a:t>
             </a:fld>
             <a:endParaRPr lang="de-CH"/>
           </a:p>
@@ -3117,7 +3117,7 @@
             <a:fld id="{0B8AC65F-F2B9-4AE9-880A-F19E8D9538B7}" type="datetimeFigureOut">
               <a:rPr lang="de-CH" smtClean="0"/>
               <a:pPr/>
-              <a:t>21.04.2012</a:t>
+              <a:t>26.04.2012</a:t>
             </a:fld>
             <a:endParaRPr lang="de-CH"/>
           </a:p>
@@ -3237,7 +3237,7 @@
             <a:fld id="{0B8AC65F-F2B9-4AE9-880A-F19E8D9538B7}" type="datetimeFigureOut">
               <a:rPr lang="de-CH" smtClean="0"/>
               <a:pPr/>
-              <a:t>21.04.2012</a:t>
+              <a:t>26.04.2012</a:t>
             </a:fld>
             <a:endParaRPr lang="de-CH"/>
           </a:p>
@@ -3329,7 +3329,7 @@
             <a:fld id="{0B8AC65F-F2B9-4AE9-880A-F19E8D9538B7}" type="datetimeFigureOut">
               <a:rPr lang="de-CH" smtClean="0"/>
               <a:pPr/>
-              <a:t>21.04.2012</a:t>
+              <a:t>26.04.2012</a:t>
             </a:fld>
             <a:endParaRPr lang="de-CH"/>
           </a:p>
@@ -3581,7 +3581,7 @@
             <a:fld id="{0B8AC65F-F2B9-4AE9-880A-F19E8D9538B7}" type="datetimeFigureOut">
               <a:rPr lang="de-CH" smtClean="0"/>
               <a:pPr/>
-              <a:t>21.04.2012</a:t>
+              <a:t>26.04.2012</a:t>
             </a:fld>
             <a:endParaRPr lang="de-CH"/>
           </a:p>
@@ -4099,7 +4099,7 @@
             <a:fld id="{0B8AC65F-F2B9-4AE9-880A-F19E8D9538B7}" type="datetimeFigureOut">
               <a:rPr lang="de-CH" smtClean="0"/>
               <a:pPr/>
-              <a:t>21.04.2012</a:t>
+              <a:t>26.04.2012</a:t>
             </a:fld>
             <a:endParaRPr lang="de-CH"/>
           </a:p>
@@ -4331,7 +4331,7 @@
             <a:fld id="{0B8AC65F-F2B9-4AE9-880A-F19E8D9538B7}" type="datetimeFigureOut">
               <a:rPr lang="de-CH" smtClean="0"/>
               <a:pPr/>
-              <a:t>21.04.2012</a:t>
+              <a:t>26.04.2012</a:t>
             </a:fld>
             <a:endParaRPr lang="de-CH"/>
           </a:p>
@@ -4897,7 +4897,7 @@
         </p:nvSpPr>
         <p:spPr>
           <a:xfrm>
-            <a:off x="1524000" y="4653136"/>
+            <a:off x="1331640" y="4653136"/>
             <a:ext cx="6400800" cy="1282080"/>
           </a:xfrm>
           <a:prstGeom prst="rect">
@@ -5110,7 +5110,7 @@
     </p:spTree>
     <p:extLst>
       <p:ext uri="{BB962C8B-B14F-4D97-AF65-F5344CB8AC3E}">
-        <p14:creationId xmlns:p14="http://schemas.microsoft.com/office/powerpoint/2010/main" xmlns="" val="1704400666"/>
+        <p14:creationId xmlns:p14="http://schemas.microsoft.com/office/powerpoint/2010/main" val="1704400666"/>
       </p:ext>
     </p:extLst>
   </p:cSld>
@@ -5879,18 +5879,7 @@
                 <a:ea typeface="Calibri"/>
                 <a:cs typeface="Times New Roman"/>
               </a:rPr>
-              <a:t>// return 1 if (0 </a:t>
-            </a:r>
-            <a:r>
-              <a:rPr lang="en-US" sz="1200" b="1" dirty="0" smtClean="0">
-                <a:solidFill>
-                  <a:srgbClr val="3F7F5F"/>
-                </a:solidFill>
-                <a:latin typeface="Courier New"/>
-                <a:ea typeface="Calibri"/>
-                <a:cs typeface="Times New Roman"/>
-              </a:rPr>
-              <a:t>&lt;= </a:t>
+              <a:t>// return 1 if (0 &lt;= </a:t>
             </a:r>
             <a:r>
               <a:rPr lang="en-US" sz="1200" b="1" dirty="0" err="1" smtClean="0">
@@ -5933,18 +5922,7 @@
                 <a:ea typeface="Calibri"/>
                 <a:cs typeface="Times New Roman"/>
               </a:rPr>
-              <a:t>//             (0 </a:t>
-            </a:r>
-            <a:r>
-              <a:rPr lang="en-US" sz="1200" b="1" dirty="0" smtClean="0">
-                <a:solidFill>
-                  <a:srgbClr val="3F7F5F"/>
-                </a:solidFill>
-                <a:latin typeface="Courier New"/>
-                <a:ea typeface="Calibri"/>
-                <a:cs typeface="Times New Roman"/>
-              </a:rPr>
-              <a:t>&lt;= </a:t>
+              <a:t>//             (0 &lt;= </a:t>
             </a:r>
             <a:r>
               <a:rPr lang="en-US" sz="1200" b="1" dirty="0" err="1" smtClean="0">
@@ -6345,7 +6323,7 @@
     </p:spTree>
     <p:extLst>
       <p:ext uri="{BB962C8B-B14F-4D97-AF65-F5344CB8AC3E}">
-        <p14:creationId xmlns:p14="http://schemas.microsoft.com/office/powerpoint/2010/main" xmlns="" val="3199722868"/>
+        <p14:creationId xmlns:p14="http://schemas.microsoft.com/office/powerpoint/2010/main" val="3199722868"/>
       </p:ext>
     </p:extLst>
   </p:cSld>
@@ -7344,7 +7322,7 @@
     </p:spTree>
     <p:extLst>
       <p:ext uri="{BB962C8B-B14F-4D97-AF65-F5344CB8AC3E}">
-        <p14:creationId xmlns:p14="http://schemas.microsoft.com/office/powerpoint/2010/main" xmlns="" val="3199722868"/>
+        <p14:creationId xmlns:p14="http://schemas.microsoft.com/office/powerpoint/2010/main" val="3199722868"/>
       </p:ext>
     </p:extLst>
   </p:cSld>
@@ -7726,8 +7704,26 @@
           <a:p>
             <a:r>
               <a:rPr lang="de-CH" dirty="0" smtClean="0"/>
-              <a:t>Gefundene Fehler notiert und teilweise behoben</a:t>
-            </a:r>
+              <a:t>Gefundene Fehler notiert und teilweise </a:t>
+            </a:r>
+            <a:r>
+              <a:rPr lang="de-CH" dirty="0" smtClean="0"/>
+              <a:t>behoben</a:t>
+            </a:r>
+          </a:p>
+          <a:p>
+            <a:endParaRPr lang="de-CH" dirty="0"/>
+          </a:p>
+          <a:p>
+            <a:r>
+              <a:rPr lang="de-CH" dirty="0" smtClean="0"/>
+              <a:t>Ergänzungen </a:t>
+            </a:r>
+            <a:r>
+              <a:rPr lang="de-CH" dirty="0" err="1" smtClean="0"/>
+              <a:t>cyril</a:t>
+            </a:r>
+            <a:endParaRPr lang="de-CH" dirty="0" smtClean="0"/>
           </a:p>
           <a:p>
             <a:endParaRPr lang="de-CH" dirty="0" smtClean="0"/>
@@ -7740,7 +7736,7 @@
     </p:spTree>
     <p:extLst>
       <p:ext uri="{BB962C8B-B14F-4D97-AF65-F5344CB8AC3E}">
-        <p14:creationId xmlns:p14="http://schemas.microsoft.com/office/powerpoint/2010/main" xmlns="" val="1300663606"/>
+        <p14:creationId xmlns:p14="http://schemas.microsoft.com/office/powerpoint/2010/main" val="1300663606"/>
       </p:ext>
     </p:extLst>
   </p:cSld>
@@ -7822,7 +7818,7 @@
     </p:spTree>
     <p:extLst>
       <p:ext uri="{BB962C8B-B14F-4D97-AF65-F5344CB8AC3E}">
-        <p14:creationId xmlns:p14="http://schemas.microsoft.com/office/powerpoint/2010/main" xmlns="" val="1595990863"/>
+        <p14:creationId xmlns:p14="http://schemas.microsoft.com/office/powerpoint/2010/main" val="1595990863"/>
       </p:ext>
     </p:extLst>
   </p:cSld>
@@ -7969,7 +7965,7 @@
     </p:spTree>
     <p:extLst>
       <p:ext uri="{BB962C8B-B14F-4D97-AF65-F5344CB8AC3E}">
-        <p14:creationId xmlns:p14="http://schemas.microsoft.com/office/powerpoint/2010/main" xmlns="" val="1387166899"/>
+        <p14:creationId xmlns:p14="http://schemas.microsoft.com/office/powerpoint/2010/main" val="1387166899"/>
       </p:ext>
     </p:extLst>
   </p:cSld>
@@ -8067,7 +8063,7 @@
           <a:blip r:embed="rId2" cstate="print">
             <a:extLst>
               <a:ext uri="{BEBA8EAE-BF5A-486C-A8C5-ECC9F3942E4B}">
-                <a14:imgProps xmlns:a14="http://schemas.microsoft.com/office/drawing/2010/main" xmlns="">
+                <a14:imgProps xmlns:a14="http://schemas.microsoft.com/office/drawing/2010/main">
                   <a14:imgLayer r:embed="rId3">
                     <a14:imgEffect>
                       <a14:backgroundRemoval t="0" b="100000" l="0" r="100000"/>
@@ -8076,7 +8072,7 @@
                 </a14:imgProps>
               </a:ext>
               <a:ext uri="{28A0092B-C50C-407E-A947-70E740481C1C}">
-                <a14:useLocalDpi xmlns:a14="http://schemas.microsoft.com/office/drawing/2010/main" xmlns="" val="0"/>
+                <a14:useLocalDpi xmlns:a14="http://schemas.microsoft.com/office/drawing/2010/main" val="0"/>
               </a:ext>
             </a:extLst>
           </a:blip>
@@ -8100,14 +8096,14 @@
           <a:effectLst/>
           <a:extLst>
             <a:ext uri="{909E8E84-426E-40DD-AFC4-6F175D3DCCD1}">
-              <a14:hiddenFill xmlns:a14="http://schemas.microsoft.com/office/drawing/2010/main" xmlns="">
+              <a14:hiddenFill xmlns:a14="http://schemas.microsoft.com/office/drawing/2010/main">
                 <a:solidFill>
                   <a:schemeClr val="accent1"/>
                 </a:solidFill>
               </a14:hiddenFill>
             </a:ext>
             <a:ext uri="{91240B29-F687-4F45-9708-019B960494DF}">
-              <a14:hiddenLine xmlns:a14="http://schemas.microsoft.com/office/drawing/2010/main" xmlns="" w="9525">
+              <a14:hiddenLine xmlns:a14="http://schemas.microsoft.com/office/drawing/2010/main" w="9525">
                 <a:solidFill>
                   <a:schemeClr val="tx1"/>
                 </a:solidFill>
@@ -8117,7 +8113,7 @@
               </a14:hiddenLine>
             </a:ext>
             <a:ext uri="{AF507438-7753-43E0-B8FC-AC1667EBCBE1}">
-              <a14:hiddenEffects xmlns:a14="http://schemas.microsoft.com/office/drawing/2010/main" xmlns="">
+              <a14:hiddenEffects xmlns:a14="http://schemas.microsoft.com/office/drawing/2010/main">
                 <a:effectLst>
                   <a:outerShdw dist="35921" dir="2700000" algn="ctr" rotWithShape="0">
                     <a:schemeClr val="bg2"/>
@@ -8131,7 +8127,7 @@
     </p:spTree>
     <p:extLst>
       <p:ext uri="{BB962C8B-B14F-4D97-AF65-F5344CB8AC3E}">
-        <p14:creationId xmlns:p14="http://schemas.microsoft.com/office/powerpoint/2010/main" xmlns="" val="1599884037"/>
+        <p14:creationId xmlns:p14="http://schemas.microsoft.com/office/powerpoint/2010/main" val="1599884037"/>
       </p:ext>
     </p:extLst>
   </p:cSld>
@@ -8261,7 +8257,7 @@
     </p:spTree>
     <p:extLst>
       <p:ext uri="{BB962C8B-B14F-4D97-AF65-F5344CB8AC3E}">
-        <p14:creationId xmlns:p14="http://schemas.microsoft.com/office/powerpoint/2010/main" xmlns="" val="2756733679"/>
+        <p14:creationId xmlns:p14="http://schemas.microsoft.com/office/powerpoint/2010/main" val="2756733679"/>
       </p:ext>
     </p:extLst>
   </p:cSld>
@@ -8373,7 +8369,6 @@
               <a:rPr lang="de-CH" dirty="0" smtClean="0"/>
               <a:t>Spielstart</a:t>
             </a:r>
-            <a:endParaRPr lang="de-CH" dirty="0" smtClean="0"/>
           </a:p>
           <a:p>
             <a:endParaRPr lang="de-CH" dirty="0" smtClean="0"/>
@@ -8392,7 +8387,7 @@
           <p:nvPr>
             <p:extLst>
               <p:ext uri="{D42A27DB-BD31-4B8C-83A1-F6EECF244321}">
-                <p14:modId xmlns:p14="http://schemas.microsoft.com/office/powerpoint/2010/main" xmlns="" val="675548602"/>
+                <p14:modId xmlns:p14="http://schemas.microsoft.com/office/powerpoint/2010/main" val="675548602"/>
               </p:ext>
             </p:extLst>
           </p:nvPr>
@@ -8403,16 +8398,66 @@
         </p:xfrm>
         <a:graphic>
           <a:graphicData uri="http://schemas.openxmlformats.org/presentationml/2006/ole">
-            <p:oleObj spid="_x0000_s2054" name="Visio" r:id="rId3" imgW="2436869" imgH="7241670" progId="Visio.Drawing.11">
-              <p:embed/>
-            </p:oleObj>
+            <mc:AlternateContent xmlns:mc="http://schemas.openxmlformats.org/markup-compatibility/2006">
+              <mc:Choice xmlns:v="urn:schemas-microsoft-com:vml" Requires="v">
+                <p:oleObj spid="_x0000_s2056" name="Visio" r:id="rId3" imgW="2436869" imgH="7241670" progId="Visio.Drawing.11">
+                  <p:embed/>
+                </p:oleObj>
+              </mc:Choice>
+              <mc:Fallback>
+                <p:oleObj name="Visio" r:id="rId3" imgW="2436869" imgH="7241670" progId="Visio.Drawing.11">
+                  <p:embed/>
+                  <p:pic>
+                    <p:nvPicPr>
+                      <p:cNvPr id="0" name="Picture 6"/>
+                      <p:cNvPicPr>
+                        <a:picLocks noChangeAspect="1" noChangeArrowheads="1"/>
+                      </p:cNvPicPr>
+                      <p:nvPr/>
+                    </p:nvPicPr>
+                    <p:blipFill>
+                      <a:blip r:embed="rId4">
+                        <a:extLst>
+                          <a:ext uri="{28A0092B-C50C-407E-A947-70E740481C1C}">
+                            <a14:useLocalDpi xmlns:a14="http://schemas.microsoft.com/office/drawing/2010/main" val="0"/>
+                          </a:ext>
+                        </a:extLst>
+                      </a:blip>
+                      <a:srcRect/>
+                      <a:stretch>
+                        <a:fillRect/>
+                      </a:stretch>
+                    </p:blipFill>
+                    <p:spPr bwMode="auto">
+                      <a:xfrm>
+                        <a:off x="3422650" y="1557338"/>
+                        <a:ext cx="1420813" cy="4318000"/>
+                      </a:xfrm>
+                      <a:prstGeom prst="rect">
+                        <a:avLst/>
+                      </a:prstGeom>
+                      <a:noFill/>
+                      <a:extLst>
+                        <a:ext uri="{909E8E84-426E-40DD-AFC4-6F175D3DCCD1}">
+                          <a14:hiddenFill xmlns:a14="http://schemas.microsoft.com/office/drawing/2010/main">
+                            <a:solidFill>
+                              <a:srgbClr val="FFFFFF"/>
+                            </a:solidFill>
+                          </a14:hiddenFill>
+                        </a:ext>
+                      </a:extLst>
+                    </p:spPr>
+                  </p:pic>
+                </p:oleObj>
+              </mc:Fallback>
+            </mc:AlternateContent>
           </a:graphicData>
         </a:graphic>
       </p:graphicFrame>
     </p:spTree>
     <p:extLst>
       <p:ext uri="{BB962C8B-B14F-4D97-AF65-F5344CB8AC3E}">
-        <p14:creationId xmlns:p14="http://schemas.microsoft.com/office/powerpoint/2010/main" xmlns="" val="1334996816"/>
+        <p14:creationId xmlns:p14="http://schemas.microsoft.com/office/powerpoint/2010/main" val="1334996816"/>
       </p:ext>
     </p:extLst>
   </p:cSld>
@@ -8529,7 +8574,6 @@
               <a:rPr lang="de-CH" dirty="0" smtClean="0"/>
               <a:t>Gewinner anzeigen</a:t>
             </a:r>
-            <a:endParaRPr lang="de-CH" dirty="0" smtClean="0"/>
           </a:p>
           <a:p>
             <a:endParaRPr lang="de-CH" dirty="0" smtClean="0"/>
@@ -8542,7 +8586,7 @@
     </p:spTree>
     <p:extLst>
       <p:ext uri="{BB962C8B-B14F-4D97-AF65-F5344CB8AC3E}">
-        <p14:creationId xmlns:p14="http://schemas.microsoft.com/office/powerpoint/2010/main" xmlns="" val="2375923500"/>
+        <p14:creationId xmlns:p14="http://schemas.microsoft.com/office/powerpoint/2010/main" val="2375923500"/>
       </p:ext>
     </p:extLst>
   </p:cSld>
@@ -8603,6 +8647,39 @@
       </p:pic>
       <p:pic>
         <p:nvPicPr>
+          <p:cNvPr id="6" name="Picture 6"/>
+          <p:cNvPicPr>
+            <a:picLocks noChangeAspect="1" noChangeArrowheads="1"/>
+          </p:cNvPicPr>
+          <p:nvPr/>
+        </p:nvPicPr>
+        <p:blipFill rotWithShape="1">
+          <a:blip r:embed="rId3" cstate="print"/>
+          <a:srcRect l="12891" r="12109" b="67555"/>
+          <a:stretch/>
+        </p:blipFill>
+        <p:spPr bwMode="auto">
+          <a:xfrm>
+            <a:off x="-1588" y="-20176"/>
+            <a:ext cx="9144000" cy="2225040"/>
+          </a:xfrm>
+          <a:prstGeom prst="rect">
+            <a:avLst/>
+          </a:prstGeom>
+          <a:solidFill>
+            <a:srgbClr val="000000">
+              <a:shade val="95000"/>
+            </a:srgbClr>
+          </a:solidFill>
+          <a:ln w="444500" cap="sq">
+            <a:noFill/>
+            <a:miter lim="800000"/>
+          </a:ln>
+          <a:effectLst/>
+        </p:spPr>
+      </p:pic>
+      <p:pic>
+        <p:nvPicPr>
           <p:cNvPr id="20486" name="Picture 6"/>
           <p:cNvPicPr>
             <a:picLocks noChangeAspect="1" noChangeArrowheads="1"/>
@@ -8624,13 +8701,12 @@
           <a:prstGeom prst="rect">
             <a:avLst/>
           </a:prstGeom>
-          <a:noFill/>
-          <a:ln w="9525">
+          <a:ln>
             <a:noFill/>
-            <a:miter lim="800000"/>
-            <a:headEnd/>
-            <a:tailEnd/>
           </a:ln>
+          <a:effectLst>
+            <a:softEdge rad="112500"/>
+          </a:effectLst>
         </p:spPr>
       </p:pic>
       <p:sp>
@@ -8704,7 +8780,6 @@
               <a:rPr lang="de-CH" dirty="0" smtClean="0"/>
               <a:t>Hilfsfunktionen</a:t>
             </a:r>
-            <a:endParaRPr lang="de-CH" dirty="0" smtClean="0"/>
           </a:p>
           <a:p>
             <a:endParaRPr lang="de-CH" dirty="0" smtClean="0"/>
@@ -8717,7 +8792,7 @@
     </p:spTree>
     <p:extLst>
       <p:ext uri="{BB962C8B-B14F-4D97-AF65-F5344CB8AC3E}">
-        <p14:creationId xmlns:p14="http://schemas.microsoft.com/office/powerpoint/2010/main" xmlns="" val="3950922658"/>
+        <p14:creationId xmlns:p14="http://schemas.microsoft.com/office/powerpoint/2010/main" val="3950922658"/>
       </p:ext>
     </p:extLst>
   </p:cSld>
@@ -8991,7 +9066,15 @@
           <a:p>
             <a:r>
               <a:rPr lang="de-CH" dirty="0" smtClean="0"/>
-              <a:t>Übersicht Programm</a:t>
+              <a:t>Grafik-Funktionen  (Modul </a:t>
+            </a:r>
+            <a:r>
+              <a:rPr lang="de-CH" dirty="0" err="1" smtClean="0"/>
+              <a:t>Grafik.c</a:t>
+            </a:r>
+            <a:r>
+              <a:rPr lang="de-CH" dirty="0" smtClean="0"/>
+              <a:t>)</a:t>
             </a:r>
             <a:endParaRPr lang="de-CH" dirty="0"/>
           </a:p>
@@ -9056,7 +9139,30 @@
             <a:pPr lvl="1"/>
             <a:r>
               <a:rPr lang="de-CH" dirty="0" smtClean="0"/>
-              <a:t>Laserlinien zeichnen</a:t>
+              <a:t>Laserlinien </a:t>
+            </a:r>
+            <a:r>
+              <a:rPr lang="de-CH" dirty="0" smtClean="0"/>
+              <a:t>zeichnen</a:t>
+            </a:r>
+          </a:p>
+          <a:p>
+            <a:pPr lvl="1"/>
+            <a:endParaRPr lang="de-CH" dirty="0"/>
+          </a:p>
+          <a:p>
+            <a:pPr lvl="1"/>
+            <a:r>
+              <a:rPr lang="de-CH" dirty="0" err="1" smtClean="0"/>
+              <a:t>chäser</a:t>
+            </a:r>
+            <a:r>
+              <a:rPr lang="de-CH" dirty="0" smtClean="0"/>
+              <a:t>: </a:t>
+            </a:r>
+            <a:r>
+              <a:rPr lang="de-CH" dirty="0" err="1" smtClean="0"/>
+              <a:t>prooven</a:t>
             </a:r>
             <a:endParaRPr lang="de-CH" dirty="0" smtClean="0"/>
           </a:p>
@@ -9071,7 +9177,7 @@
     </p:spTree>
     <p:extLst>
       <p:ext uri="{BB962C8B-B14F-4D97-AF65-F5344CB8AC3E}">
-        <p14:creationId xmlns:p14="http://schemas.microsoft.com/office/powerpoint/2010/main" xmlns="" val="1184306671"/>
+        <p14:creationId xmlns:p14="http://schemas.microsoft.com/office/powerpoint/2010/main" val="1184306671"/>
       </p:ext>
     </p:extLst>
   </p:cSld>
@@ -9166,7 +9272,7 @@
     </p:spTree>
     <p:extLst>
       <p:ext uri="{BB962C8B-B14F-4D97-AF65-F5344CB8AC3E}">
-        <p14:creationId xmlns:p14="http://schemas.microsoft.com/office/powerpoint/2010/main" xmlns="" val="3199722868"/>
+        <p14:creationId xmlns:p14="http://schemas.microsoft.com/office/powerpoint/2010/main" val="3199722868"/>
       </p:ext>
     </p:extLst>
   </p:cSld>

</xml_diff>

<commit_message>
PPTX updated with Kaesers updates, graphics cosmetics
</commit_message>
<xml_diff>
--- a/docs/LaserChess.pptx
+++ b/docs/LaserChess.pptx
@@ -376,7 +376,7 @@
     </p:spTree>
     <p:extLst>
       <p:ext uri="{BB962C8B-B14F-4D97-AF65-F5344CB8AC3E}">
-        <p14:creationId xmlns:p14="http://schemas.microsoft.com/office/powerpoint/2010/main" val="352693751"/>
+        <p14:creationId xmlns:p14="http://schemas.microsoft.com/office/powerpoint/2010/main" xmlns="" val="352693751"/>
       </p:ext>
     </p:extLst>
   </p:cSld>
@@ -5110,7 +5110,7 @@
     </p:spTree>
     <p:extLst>
       <p:ext uri="{BB962C8B-B14F-4D97-AF65-F5344CB8AC3E}">
-        <p14:creationId xmlns:p14="http://schemas.microsoft.com/office/powerpoint/2010/main" val="1704400666"/>
+        <p14:creationId xmlns:p14="http://schemas.microsoft.com/office/powerpoint/2010/main" xmlns="" val="1704400666"/>
       </p:ext>
     </p:extLst>
   </p:cSld>
@@ -5152,8 +5152,8 @@
         </p:nvSpPr>
         <p:spPr>
           <a:xfrm>
-            <a:off x="2051720" y="332656"/>
-            <a:ext cx="6696744" cy="2400657"/>
+            <a:off x="395536" y="332656"/>
+            <a:ext cx="8352928" cy="2400657"/>
           </a:xfrm>
           <a:prstGeom prst="rect">
             <a:avLst/>
@@ -5701,8 +5701,8 @@
         </p:nvSpPr>
         <p:spPr>
           <a:xfrm>
-            <a:off x="2051720" y="2967605"/>
-            <a:ext cx="6696744" cy="1325491"/>
+            <a:off x="395536" y="2967605"/>
+            <a:ext cx="8352928" cy="1113125"/>
           </a:xfrm>
           <a:prstGeom prst="rect">
             <a:avLst/>
@@ -5879,7 +5879,18 @@
                 <a:ea typeface="Calibri"/>
                 <a:cs typeface="Times New Roman"/>
               </a:rPr>
-              <a:t>// return 1 if (0 &lt;= </a:t>
+              <a:t>//return </a:t>
+            </a:r>
+            <a:r>
+              <a:rPr lang="en-US" sz="1200" b="1" dirty="0" smtClean="0">
+                <a:solidFill>
+                  <a:srgbClr val="3F7F5F"/>
+                </a:solidFill>
+                <a:latin typeface="Courier New"/>
+                <a:ea typeface="Calibri"/>
+                <a:cs typeface="Times New Roman"/>
+              </a:rPr>
+              <a:t>1 if (0 &lt;= </a:t>
             </a:r>
             <a:r>
               <a:rPr lang="en-US" sz="1200" b="1" dirty="0" err="1" smtClean="0">
@@ -5901,9 +5912,9 @@
                 <a:ea typeface="Calibri"/>
                 <a:cs typeface="Times New Roman"/>
               </a:rPr>
-              <a:t> &lt; PLAYGROUND_X_MAX) and</a:t>
-            </a:r>
-            <a:br>
+              <a:t> &lt; PLAYGROUND_X_MAX) </a:t>
+            </a:r>
+            <a:r>
               <a:rPr lang="en-US" sz="1200" b="1" dirty="0" smtClean="0">
                 <a:solidFill>
                   <a:srgbClr val="3F7F5F"/>
@@ -5912,7 +5923,8 @@
                 <a:ea typeface="Calibri"/>
                 <a:cs typeface="Times New Roman"/>
               </a:rPr>
-            </a:br>
+              <a:t>and (0 </a:t>
+            </a:r>
             <a:r>
               <a:rPr lang="en-US" sz="1200" b="1" dirty="0" smtClean="0">
                 <a:solidFill>
@@ -5922,7 +5934,7 @@
                 <a:ea typeface="Calibri"/>
                 <a:cs typeface="Times New Roman"/>
               </a:rPr>
-              <a:t>//             (0 &lt;= </a:t>
+              <a:t>&lt;= </a:t>
             </a:r>
             <a:r>
               <a:rPr lang="en-US" sz="1200" b="1" dirty="0" err="1" smtClean="0">
@@ -6005,8 +6017,8 @@
         </p:nvSpPr>
         <p:spPr>
           <a:xfrm>
-            <a:off x="2051720" y="4509120"/>
-            <a:ext cx="6696744" cy="1154162"/>
+            <a:off x="395536" y="4509120"/>
+            <a:ext cx="8352928" cy="941796"/>
           </a:xfrm>
           <a:prstGeom prst="rect">
             <a:avLst/>
@@ -6065,7 +6077,17 @@
                 <a:latin typeface="Courier New"/>
                 <a:ea typeface="Calibri"/>
               </a:rPr>
-              <a:t>// return !((</a:t>
+              <a:t>//return </a:t>
+            </a:r>
+            <a:r>
+              <a:rPr lang="en-US" sz="1200" b="1" dirty="0" smtClean="0">
+                <a:solidFill>
+                  <a:srgbClr val="3F7F5F"/>
+                </a:solidFill>
+                <a:latin typeface="Courier New"/>
+                <a:ea typeface="Calibri"/>
+              </a:rPr>
+              <a:t>!((</a:t>
             </a:r>
             <a:r>
               <a:rPr lang="en-US" sz="1200" b="1" dirty="0" err="1" smtClean="0">
@@ -6105,7 +6127,57 @@
                 <a:latin typeface="Courier New"/>
                 <a:ea typeface="Calibri"/>
               </a:rPr>
-              <a:t>&gt;PLAYGROUND_Y_MAX)||</a:t>
+              <a:t>&gt;PLAYGROUND_Y_MAX</a:t>
+            </a:r>
+            <a:r>
+              <a:rPr lang="en-US" sz="1200" b="1" dirty="0" smtClean="0">
+                <a:solidFill>
+                  <a:srgbClr val="3F7F5F"/>
+                </a:solidFill>
+                <a:latin typeface="Courier New"/>
+                <a:ea typeface="Calibri"/>
+              </a:rPr>
+              <a:t>)||(</a:t>
+            </a:r>
+            <a:r>
+              <a:rPr lang="en-US" sz="1200" b="1" dirty="0" err="1" smtClean="0">
+                <a:solidFill>
+                  <a:srgbClr val="3F7F5F"/>
+                </a:solidFill>
+                <a:latin typeface="Courier New"/>
+                <a:ea typeface="Calibri"/>
+              </a:rPr>
+              <a:t>pos.x</a:t>
+            </a:r>
+            <a:r>
+              <a:rPr lang="en-US" sz="1200" b="1" dirty="0" smtClean="0">
+                <a:solidFill>
+                  <a:srgbClr val="3F7F5F"/>
+                </a:solidFill>
+                <a:latin typeface="Courier New"/>
+                <a:ea typeface="Calibri"/>
+              </a:rPr>
+              <a:t>&lt;=0)||(</a:t>
+            </a:r>
+            <a:r>
+              <a:rPr lang="en-US" sz="1200" b="1" dirty="0" err="1" smtClean="0">
+                <a:solidFill>
+                  <a:srgbClr val="3F7F5F"/>
+                </a:solidFill>
+                <a:latin typeface="Courier New"/>
+                <a:ea typeface="Calibri"/>
+              </a:rPr>
+              <a:t>pos.y</a:t>
+            </a:r>
+            <a:r>
+              <a:rPr lang="en-US" sz="1200" b="1" dirty="0" smtClean="0">
+                <a:solidFill>
+                  <a:srgbClr val="3F7F5F"/>
+                </a:solidFill>
+                <a:latin typeface="Courier New"/>
+                <a:ea typeface="Calibri"/>
+              </a:rPr>
+              <a:t>&lt;=0));</a:t>
             </a:r>
             <a:br>
               <a:rPr lang="en-US" sz="1200" b="1" dirty="0" smtClean="0">
@@ -6124,47 +6196,7 @@
                 <a:latin typeface="Courier New"/>
                 <a:ea typeface="Calibri"/>
               </a:rPr>
-              <a:t>            (</a:t>
-            </a:r>
-            <a:r>
-              <a:rPr lang="en-US" sz="1200" b="1" dirty="0" err="1" smtClean="0">
-                <a:solidFill>
-                  <a:srgbClr val="3F7F5F"/>
-                </a:solidFill>
-                <a:latin typeface="Courier New"/>
-                <a:ea typeface="Calibri"/>
-              </a:rPr>
-              <a:t>pos.x</a:t>
-            </a:r>
-            <a:r>
-              <a:rPr lang="en-US" sz="1200" b="1" dirty="0" smtClean="0">
-                <a:solidFill>
-                  <a:srgbClr val="3F7F5F"/>
-                </a:solidFill>
-                <a:latin typeface="Courier New"/>
-                <a:ea typeface="Calibri"/>
-              </a:rPr>
-              <a:t>&lt;=0)||(</a:t>
-            </a:r>
-            <a:r>
-              <a:rPr lang="en-US" sz="1200" b="1" dirty="0" err="1" smtClean="0">
-                <a:solidFill>
-                  <a:srgbClr val="3F7F5F"/>
-                </a:solidFill>
-                <a:latin typeface="Courier New"/>
-                <a:ea typeface="Calibri"/>
-              </a:rPr>
-              <a:t>pos.y</a:t>
-            </a:r>
-            <a:r>
-              <a:rPr lang="en-US" sz="1200" b="1" dirty="0" smtClean="0">
-                <a:solidFill>
-                  <a:srgbClr val="3F7F5F"/>
-                </a:solidFill>
-                <a:latin typeface="Courier New"/>
-                <a:ea typeface="Calibri"/>
-              </a:rPr>
-              <a:t>&lt;=0));</a:t>
+              <a:t/>
             </a:r>
             <a:br>
               <a:rPr lang="en-US" sz="1200" b="1" dirty="0" smtClean="0">
@@ -6183,147 +6215,16 @@
                 <a:latin typeface="Courier New"/>
                 <a:ea typeface="Calibri"/>
               </a:rPr>
-              <a:t/>
-            </a:r>
-            <a:br>
-              <a:rPr lang="en-US" sz="1200" b="1" dirty="0" smtClean="0">
-                <a:solidFill>
-                  <a:srgbClr val="3F7F5F"/>
-                </a:solidFill>
-                <a:latin typeface="Courier New"/>
-                <a:ea typeface="Calibri"/>
-              </a:rPr>
-            </a:br>
-            <a:r>
-              <a:rPr lang="en-US" sz="1200" b="1" dirty="0" smtClean="0">
-                <a:solidFill>
-                  <a:srgbClr val="3F7F5F"/>
-                </a:solidFill>
-                <a:latin typeface="Courier New"/>
-                <a:ea typeface="Calibri"/>
-              </a:rPr>
               <a:t>// # - Like a Boss!</a:t>
             </a:r>
             <a:endParaRPr lang="de-CH" sz="1200" b="1" dirty="0"/>
-          </a:p>
-        </p:txBody>
-      </p:sp>
-      <p:sp>
-        <p:nvSpPr>
-          <p:cNvPr id="12" name="Textfeld 11"/>
-          <p:cNvSpPr txBox="1"/>
-          <p:nvPr/>
-        </p:nvSpPr>
-        <p:spPr>
-          <a:xfrm>
-            <a:off x="179512" y="332656"/>
-            <a:ext cx="1728192" cy="584775"/>
-          </a:xfrm>
-          <a:prstGeom prst="rect">
-            <a:avLst/>
-          </a:prstGeom>
-          <a:noFill/>
-        </p:spPr>
-        <p:txBody>
-          <a:bodyPr wrap="square" rtlCol="0">
-            <a:spAutoFit/>
-          </a:bodyPr>
-          <a:lstStyle/>
-          <a:p>
-            <a:r>
-              <a:rPr lang="de-CH" sz="1600" dirty="0" smtClean="0">
-                <a:latin typeface="Consolas" pitchFamily="49" charset="0"/>
-                <a:cs typeface="Consolas" pitchFamily="49" charset="0"/>
-              </a:rPr>
-              <a:t>19.03.2012 – </a:t>
-            </a:r>
-            <a:br>
-              <a:rPr lang="de-CH" sz="1600" dirty="0" smtClean="0">
-                <a:latin typeface="Consolas" pitchFamily="49" charset="0"/>
-                <a:cs typeface="Consolas" pitchFamily="49" charset="0"/>
-              </a:rPr>
-            </a:br>
-            <a:r>
-              <a:rPr lang="de-CH" sz="1600" dirty="0" err="1" smtClean="0">
-                <a:latin typeface="Consolas" pitchFamily="49" charset="0"/>
-                <a:cs typeface="Consolas" pitchFamily="49" charset="0"/>
-              </a:rPr>
-              <a:t>by</a:t>
-            </a:r>
-            <a:r>
-              <a:rPr lang="de-CH" sz="1600" dirty="0" smtClean="0">
-                <a:latin typeface="Consolas" pitchFamily="49" charset="0"/>
-                <a:cs typeface="Consolas" pitchFamily="49" charset="0"/>
-              </a:rPr>
-              <a:t> Stoller</a:t>
-            </a:r>
-            <a:endParaRPr lang="de-CH" sz="1600" dirty="0">
-              <a:latin typeface="Consolas" pitchFamily="49" charset="0"/>
-              <a:cs typeface="Consolas" pitchFamily="49" charset="0"/>
-            </a:endParaRPr>
-          </a:p>
-        </p:txBody>
-      </p:sp>
-      <p:sp>
-        <p:nvSpPr>
-          <p:cNvPr id="14" name="Textfeld 13"/>
-          <p:cNvSpPr txBox="1"/>
-          <p:nvPr/>
-        </p:nvSpPr>
-        <p:spPr>
-          <a:xfrm>
-            <a:off x="179512" y="4509120"/>
-            <a:ext cx="1728192" cy="584775"/>
-          </a:xfrm>
-          <a:prstGeom prst="rect">
-            <a:avLst/>
-          </a:prstGeom>
-          <a:noFill/>
-        </p:spPr>
-        <p:txBody>
-          <a:bodyPr wrap="square" rtlCol="0">
-            <a:spAutoFit/>
-          </a:bodyPr>
-          <a:lstStyle/>
-          <a:p>
-            <a:r>
-              <a:rPr lang="de-CH" sz="1600" dirty="0" smtClean="0">
-                <a:latin typeface="Consolas" pitchFamily="49" charset="0"/>
-                <a:cs typeface="Consolas" pitchFamily="49" charset="0"/>
-              </a:rPr>
-              <a:t>31.03.2012 – </a:t>
-            </a:r>
-            <a:br>
-              <a:rPr lang="de-CH" sz="1600" dirty="0" smtClean="0">
-                <a:latin typeface="Consolas" pitchFamily="49" charset="0"/>
-                <a:cs typeface="Consolas" pitchFamily="49" charset="0"/>
-              </a:rPr>
-            </a:br>
-            <a:r>
-              <a:rPr lang="de-CH" sz="1600" dirty="0" err="1" smtClean="0">
-                <a:latin typeface="Consolas" pitchFamily="49" charset="0"/>
-                <a:cs typeface="Consolas" pitchFamily="49" charset="0"/>
-              </a:rPr>
-              <a:t>by</a:t>
-            </a:r>
-            <a:r>
-              <a:rPr lang="de-CH" sz="1600" dirty="0" smtClean="0">
-                <a:latin typeface="Consolas" pitchFamily="49" charset="0"/>
-                <a:cs typeface="Consolas" pitchFamily="49" charset="0"/>
-              </a:rPr>
-              <a:t> Käser</a:t>
-            </a:r>
-            <a:endParaRPr lang="de-CH" sz="1600" dirty="0">
-              <a:latin typeface="Consolas" pitchFamily="49" charset="0"/>
-              <a:cs typeface="Consolas" pitchFamily="49" charset="0"/>
-            </a:endParaRPr>
           </a:p>
         </p:txBody>
       </p:sp>
     </p:spTree>
     <p:extLst>
       <p:ext uri="{BB962C8B-B14F-4D97-AF65-F5344CB8AC3E}">
-        <p14:creationId xmlns:p14="http://schemas.microsoft.com/office/powerpoint/2010/main" val="3199722868"/>
+        <p14:creationId xmlns:p14="http://schemas.microsoft.com/office/powerpoint/2010/main" xmlns="" val="3199722868"/>
       </p:ext>
     </p:extLst>
   </p:cSld>
@@ -6385,41 +6286,6 @@
                                   </p:childTnLst>
                                 </p:cTn>
                               </p:par>
-                              <p:par>
-                                <p:cTn id="8" presetID="10" presetClass="entr" presetSubtype="0" fill="hold" grpId="0" nodeType="withEffect">
-                                  <p:stCondLst>
-                                    <p:cond delay="0"/>
-                                  </p:stCondLst>
-                                  <p:childTnLst>
-                                    <p:set>
-                                      <p:cBhvr>
-                                        <p:cTn id="9" dur="1" fill="hold">
-                                          <p:stCondLst>
-                                            <p:cond delay="0"/>
-                                          </p:stCondLst>
-                                        </p:cTn>
-                                        <p:tgtEl>
-                                          <p:spTgt spid="12"/>
-                                        </p:tgtEl>
-                                        <p:attrNameLst>
-                                          <p:attrName>style.visibility</p:attrName>
-                                        </p:attrNameLst>
-                                      </p:cBhvr>
-                                      <p:to>
-                                        <p:strVal val="visible"/>
-                                      </p:to>
-                                    </p:set>
-                                    <p:animEffect transition="in" filter="fade">
-                                      <p:cBhvr>
-                                        <p:cTn id="10" dur="500"/>
-                                        <p:tgtEl>
-                                          <p:spTgt spid="12"/>
-                                        </p:tgtEl>
-                                      </p:cBhvr>
-                                    </p:animEffect>
-                                  </p:childTnLst>
-                                </p:cTn>
-                              </p:par>
                             </p:childTnLst>
                           </p:cTn>
                         </p:par>
@@ -6427,26 +6293,26 @@
                     </p:cTn>
                   </p:par>
                   <p:par>
-                    <p:cTn id="11" fill="hold">
+                    <p:cTn id="8" fill="hold">
                       <p:stCondLst>
                         <p:cond delay="indefinite"/>
                       </p:stCondLst>
                       <p:childTnLst>
                         <p:par>
-                          <p:cTn id="12" fill="hold">
+                          <p:cTn id="9" fill="hold">
                             <p:stCondLst>
                               <p:cond delay="0"/>
                             </p:stCondLst>
                             <p:childTnLst>
                               <p:par>
-                                <p:cTn id="13" presetID="10" presetClass="entr" presetSubtype="0" fill="hold" grpId="0" nodeType="clickEffect">
+                                <p:cTn id="10" presetID="10" presetClass="entr" presetSubtype="0" fill="hold" grpId="0" nodeType="clickEffect">
                                   <p:stCondLst>
                                     <p:cond delay="0"/>
                                   </p:stCondLst>
                                   <p:childTnLst>
                                     <p:set>
                                       <p:cBhvr>
-                                        <p:cTn id="14" dur="1" fill="hold">
+                                        <p:cTn id="11" dur="1" fill="hold">
                                           <p:stCondLst>
                                             <p:cond delay="0"/>
                                           </p:stCondLst>
@@ -6464,7 +6330,7 @@
                                     </p:set>
                                     <p:animEffect transition="in" filter="fade">
                                       <p:cBhvr>
-                                        <p:cTn id="15" dur="500"/>
+                                        <p:cTn id="12" dur="500"/>
                                         <p:tgtEl>
                                           <p:spTgt spid="10"/>
                                         </p:tgtEl>
@@ -6480,26 +6346,26 @@
                     </p:cTn>
                   </p:par>
                   <p:par>
-                    <p:cTn id="16" fill="hold">
+                    <p:cTn id="13" fill="hold">
                       <p:stCondLst>
                         <p:cond delay="indefinite"/>
                       </p:stCondLst>
                       <p:childTnLst>
                         <p:par>
-                          <p:cTn id="17" fill="hold">
+                          <p:cTn id="14" fill="hold">
                             <p:stCondLst>
                               <p:cond delay="0"/>
                             </p:stCondLst>
                             <p:childTnLst>
                               <p:par>
-                                <p:cTn id="18" presetID="10" presetClass="entr" presetSubtype="0" fill="hold" grpId="0" nodeType="clickEffect">
+                                <p:cTn id="15" presetID="10" presetClass="entr" presetSubtype="0" fill="hold" grpId="0" nodeType="clickEffect">
                                   <p:stCondLst>
                                     <p:cond delay="0"/>
                                   </p:stCondLst>
                                   <p:childTnLst>
                                     <p:set>
                                       <p:cBhvr>
-                                        <p:cTn id="19" dur="1" fill="hold">
+                                        <p:cTn id="16" dur="1" fill="hold">
                                           <p:stCondLst>
                                             <p:cond delay="0"/>
                                           </p:stCondLst>
@@ -6517,44 +6383,9 @@
                                     </p:set>
                                     <p:animEffect transition="in" filter="fade">
                                       <p:cBhvr>
-                                        <p:cTn id="20" dur="500"/>
+                                        <p:cTn id="17" dur="500"/>
                                         <p:tgtEl>
                                           <p:spTgt spid="11"/>
-                                        </p:tgtEl>
-                                      </p:cBhvr>
-                                    </p:animEffect>
-                                  </p:childTnLst>
-                                </p:cTn>
-                              </p:par>
-                              <p:par>
-                                <p:cTn id="21" presetID="10" presetClass="entr" presetSubtype="0" fill="hold" grpId="0" nodeType="withEffect">
-                                  <p:stCondLst>
-                                    <p:cond delay="0"/>
-                                  </p:stCondLst>
-                                  <p:childTnLst>
-                                    <p:set>
-                                      <p:cBhvr>
-                                        <p:cTn id="22" dur="1" fill="hold">
-                                          <p:stCondLst>
-                                            <p:cond delay="0"/>
-                                          </p:stCondLst>
-                                        </p:cTn>
-                                        <p:tgtEl>
-                                          <p:spTgt spid="14"/>
-                                        </p:tgtEl>
-                                        <p:attrNameLst>
-                                          <p:attrName>style.visibility</p:attrName>
-                                        </p:attrNameLst>
-                                      </p:cBhvr>
-                                      <p:to>
-                                        <p:strVal val="visible"/>
-                                      </p:to>
-                                    </p:set>
-                                    <p:animEffect transition="in" filter="fade">
-                                      <p:cBhvr>
-                                        <p:cTn id="23" dur="500"/>
-                                        <p:tgtEl>
-                                          <p:spTgt spid="14"/>
                                         </p:tgtEl>
                                       </p:cBhvr>
                                     </p:animEffect>
@@ -6592,8 +6423,6 @@
       <p:bldP spid="6" grpId="0" animBg="1"/>
       <p:bldP spid="10" grpId="0" animBg="1"/>
       <p:bldP spid="11" grpId="0" animBg="1"/>
-      <p:bldP spid="12" grpId="0"/>
-      <p:bldP spid="14" grpId="0"/>
     </p:bldLst>
   </p:timing>
 </p:sld>
@@ -6616,548 +6445,6 @@
           <a:chExt cx="0" cy="0"/>
         </a:xfrm>
       </p:grpSpPr>
-      <p:sp>
-        <p:nvSpPr>
-          <p:cNvPr id="6" name="Textfeld 5"/>
-          <p:cNvSpPr txBox="1"/>
-          <p:nvPr/>
-        </p:nvSpPr>
-        <p:spPr>
-          <a:xfrm>
-            <a:off x="9612560" y="1412776"/>
-            <a:ext cx="6696744" cy="2400657"/>
-          </a:xfrm>
-          <a:prstGeom prst="rect">
-            <a:avLst/>
-          </a:prstGeom>
-          <a:solidFill>
-            <a:srgbClr val="FFFFFF">
-              <a:alpha val="74118"/>
-            </a:srgbClr>
-          </a:solidFill>
-        </p:spPr>
-        <p:txBody>
-          <a:bodyPr wrap="square" rtlCol="0">
-            <a:spAutoFit/>
-          </a:bodyPr>
-          <a:lstStyle/>
-          <a:p>
-            <a:pPr>
-              <a:lnSpc>
-                <a:spcPct val="115000"/>
-              </a:lnSpc>
-              <a:spcAft>
-                <a:spcPts val="0"/>
-              </a:spcAft>
-            </a:pPr>
-            <a:r>
-              <a:rPr lang="en-US" sz="1200" b="1" dirty="0" smtClean="0">
-                <a:solidFill>
-                  <a:srgbClr val="7F0055"/>
-                </a:solidFill>
-                <a:latin typeface="Courier New"/>
-                <a:ea typeface="Calibri"/>
-                <a:cs typeface="Times New Roman"/>
-              </a:rPr>
-              <a:t>if</a:t>
-            </a:r>
-            <a:r>
-              <a:rPr lang="en-US" sz="1200" dirty="0" smtClean="0">
-                <a:solidFill>
-                  <a:srgbClr val="000000"/>
-                </a:solidFill>
-                <a:latin typeface="Courier New"/>
-                <a:ea typeface="Calibri"/>
-                <a:cs typeface="Times New Roman"/>
-              </a:rPr>
-              <a:t>((</a:t>
-            </a:r>
-            <a:r>
-              <a:rPr lang="en-US" sz="1200" dirty="0" err="1" smtClean="0">
-                <a:solidFill>
-                  <a:srgbClr val="000000"/>
-                </a:solidFill>
-                <a:latin typeface="Courier New"/>
-                <a:ea typeface="Calibri"/>
-                <a:cs typeface="Times New Roman"/>
-              </a:rPr>
-              <a:t>pos.</a:t>
-            </a:r>
-            <a:r>
-              <a:rPr lang="en-US" sz="1200" dirty="0" err="1" smtClean="0">
-                <a:solidFill>
-                  <a:srgbClr val="0000C0"/>
-                </a:solidFill>
-                <a:latin typeface="Courier New"/>
-                <a:ea typeface="Calibri"/>
-                <a:cs typeface="Times New Roman"/>
-              </a:rPr>
-              <a:t>x</a:t>
-            </a:r>
-            <a:r>
-              <a:rPr lang="en-US" sz="1200" dirty="0" smtClean="0">
-                <a:solidFill>
-                  <a:srgbClr val="000000"/>
-                </a:solidFill>
-                <a:latin typeface="Courier New"/>
-                <a:ea typeface="Calibri"/>
-                <a:cs typeface="Times New Roman"/>
-              </a:rPr>
-              <a:t> &lt; PLAYGROUND_X_MAX &amp;&amp; </a:t>
-            </a:r>
-            <a:r>
-              <a:rPr lang="en-US" sz="1200" dirty="0" err="1" smtClean="0">
-                <a:solidFill>
-                  <a:srgbClr val="000000"/>
-                </a:solidFill>
-                <a:latin typeface="Courier New"/>
-                <a:ea typeface="Calibri"/>
-                <a:cs typeface="Times New Roman"/>
-              </a:rPr>
-              <a:t>pos.</a:t>
-            </a:r>
-            <a:r>
-              <a:rPr lang="en-US" sz="1200" dirty="0" err="1" smtClean="0">
-                <a:solidFill>
-                  <a:srgbClr val="0000C0"/>
-                </a:solidFill>
-                <a:latin typeface="Courier New"/>
-                <a:ea typeface="Calibri"/>
-                <a:cs typeface="Times New Roman"/>
-              </a:rPr>
-              <a:t>x</a:t>
-            </a:r>
-            <a:r>
-              <a:rPr lang="en-US" sz="1200" dirty="0" smtClean="0">
-                <a:solidFill>
-                  <a:srgbClr val="000000"/>
-                </a:solidFill>
-                <a:latin typeface="Courier New"/>
-                <a:ea typeface="Calibri"/>
-                <a:cs typeface="Times New Roman"/>
-              </a:rPr>
-              <a:t> &gt;= 0) &amp;&amp;</a:t>
-            </a:r>
-            <a:endParaRPr lang="de-CH" sz="1200" dirty="0" smtClean="0">
-              <a:latin typeface="Calibri"/>
-              <a:ea typeface="Calibri"/>
-              <a:cs typeface="Times New Roman"/>
-            </a:endParaRPr>
-          </a:p>
-          <a:p>
-            <a:pPr>
-              <a:lnSpc>
-                <a:spcPct val="115000"/>
-              </a:lnSpc>
-              <a:spcAft>
-                <a:spcPts val="0"/>
-              </a:spcAft>
-            </a:pPr>
-            <a:r>
-              <a:rPr lang="en-US" sz="1200" dirty="0" smtClean="0">
-                <a:solidFill>
-                  <a:srgbClr val="000000"/>
-                </a:solidFill>
-                <a:latin typeface="Courier New"/>
-                <a:ea typeface="Calibri"/>
-                <a:cs typeface="Times New Roman"/>
-              </a:rPr>
-              <a:t>   (</a:t>
-            </a:r>
-            <a:r>
-              <a:rPr lang="en-US" sz="1200" dirty="0" err="1" smtClean="0">
-                <a:solidFill>
-                  <a:srgbClr val="000000"/>
-                </a:solidFill>
-                <a:latin typeface="Courier New"/>
-                <a:ea typeface="Calibri"/>
-                <a:cs typeface="Times New Roman"/>
-              </a:rPr>
-              <a:t>pos.</a:t>
-            </a:r>
-            <a:r>
-              <a:rPr lang="en-US" sz="1200" dirty="0" err="1" smtClean="0">
-                <a:solidFill>
-                  <a:srgbClr val="0000C0"/>
-                </a:solidFill>
-                <a:latin typeface="Courier New"/>
-                <a:ea typeface="Calibri"/>
-                <a:cs typeface="Times New Roman"/>
-              </a:rPr>
-              <a:t>y</a:t>
-            </a:r>
-            <a:r>
-              <a:rPr lang="en-US" sz="1200" dirty="0" smtClean="0">
-                <a:solidFill>
-                  <a:srgbClr val="000000"/>
-                </a:solidFill>
-                <a:latin typeface="Courier New"/>
-                <a:ea typeface="Calibri"/>
-                <a:cs typeface="Times New Roman"/>
-              </a:rPr>
-              <a:t> &lt; PLAYGROUND_Y_MAX &amp;&amp; </a:t>
-            </a:r>
-            <a:r>
-              <a:rPr lang="en-US" sz="1200" dirty="0" err="1" smtClean="0">
-                <a:solidFill>
-                  <a:srgbClr val="000000"/>
-                </a:solidFill>
-                <a:latin typeface="Courier New"/>
-                <a:ea typeface="Calibri"/>
-                <a:cs typeface="Times New Roman"/>
-              </a:rPr>
-              <a:t>pos.</a:t>
-            </a:r>
-            <a:r>
-              <a:rPr lang="en-US" sz="1200" dirty="0" err="1" smtClean="0">
-                <a:solidFill>
-                  <a:srgbClr val="0000C0"/>
-                </a:solidFill>
-                <a:latin typeface="Courier New"/>
-                <a:ea typeface="Calibri"/>
-                <a:cs typeface="Times New Roman"/>
-              </a:rPr>
-              <a:t>y</a:t>
-            </a:r>
-            <a:r>
-              <a:rPr lang="en-US" sz="1200" dirty="0" smtClean="0">
-                <a:solidFill>
-                  <a:srgbClr val="000000"/>
-                </a:solidFill>
-                <a:latin typeface="Courier New"/>
-                <a:ea typeface="Calibri"/>
-                <a:cs typeface="Times New Roman"/>
-              </a:rPr>
-              <a:t> &gt;= 0))</a:t>
-            </a:r>
-            <a:endParaRPr lang="de-CH" sz="1200" dirty="0" smtClean="0">
-              <a:latin typeface="Calibri"/>
-              <a:ea typeface="Calibri"/>
-              <a:cs typeface="Times New Roman"/>
-            </a:endParaRPr>
-          </a:p>
-          <a:p>
-            <a:pPr>
-              <a:lnSpc>
-                <a:spcPct val="115000"/>
-              </a:lnSpc>
-              <a:spcAft>
-                <a:spcPts val="0"/>
-              </a:spcAft>
-            </a:pPr>
-            <a:r>
-              <a:rPr lang="de-CH" sz="1200" dirty="0" smtClean="0">
-                <a:solidFill>
-                  <a:srgbClr val="000000"/>
-                </a:solidFill>
-                <a:latin typeface="Courier New"/>
-                <a:ea typeface="Calibri"/>
-                <a:cs typeface="Times New Roman"/>
-              </a:rPr>
-              <a:t>{</a:t>
-            </a:r>
-            <a:endParaRPr lang="de-CH" sz="1200" dirty="0" smtClean="0">
-              <a:latin typeface="Calibri"/>
-              <a:ea typeface="Calibri"/>
-              <a:cs typeface="Times New Roman"/>
-            </a:endParaRPr>
-          </a:p>
-          <a:p>
-            <a:pPr>
-              <a:lnSpc>
-                <a:spcPct val="115000"/>
-              </a:lnSpc>
-              <a:spcAft>
-                <a:spcPts val="0"/>
-              </a:spcAft>
-            </a:pPr>
-            <a:r>
-              <a:rPr lang="de-CH" sz="1200" dirty="0" smtClean="0">
-                <a:solidFill>
-                  <a:srgbClr val="000000"/>
-                </a:solidFill>
-                <a:latin typeface="Courier New"/>
-                <a:ea typeface="Calibri"/>
-                <a:cs typeface="Times New Roman"/>
-              </a:rPr>
-              <a:t>    </a:t>
-            </a:r>
-            <a:r>
-              <a:rPr lang="de-CH" sz="1200" dirty="0" smtClean="0">
-                <a:solidFill>
-                  <a:srgbClr val="3F7F5F"/>
-                </a:solidFill>
-                <a:latin typeface="Courier New"/>
-                <a:ea typeface="Calibri"/>
-                <a:cs typeface="Times New Roman"/>
-              </a:rPr>
-              <a:t>// </a:t>
-            </a:r>
-            <a:r>
-              <a:rPr lang="de-CH" sz="1200" dirty="0" err="1" smtClean="0">
-                <a:solidFill>
-                  <a:srgbClr val="3F7F5F"/>
-                </a:solidFill>
-                <a:latin typeface="Courier New"/>
-                <a:ea typeface="Calibri"/>
-                <a:cs typeface="Times New Roman"/>
-              </a:rPr>
-              <a:t>true</a:t>
-            </a:r>
-            <a:r>
-              <a:rPr lang="de-CH" sz="1200" dirty="0" smtClean="0">
-                <a:solidFill>
-                  <a:srgbClr val="3F7F5F"/>
-                </a:solidFill>
-                <a:latin typeface="Courier New"/>
-                <a:ea typeface="Calibri"/>
-                <a:cs typeface="Times New Roman"/>
-              </a:rPr>
-              <a:t> zurückgeben</a:t>
-            </a:r>
-            <a:endParaRPr lang="de-CH" sz="1200" dirty="0" smtClean="0">
-              <a:latin typeface="Calibri"/>
-              <a:ea typeface="Calibri"/>
-              <a:cs typeface="Times New Roman"/>
-            </a:endParaRPr>
-          </a:p>
-          <a:p>
-            <a:pPr>
-              <a:lnSpc>
-                <a:spcPct val="115000"/>
-              </a:lnSpc>
-              <a:spcAft>
-                <a:spcPts val="0"/>
-              </a:spcAft>
-            </a:pPr>
-            <a:r>
-              <a:rPr lang="de-CH" sz="1200" dirty="0" smtClean="0">
-                <a:solidFill>
-                  <a:srgbClr val="000000"/>
-                </a:solidFill>
-                <a:latin typeface="Courier New"/>
-                <a:ea typeface="Calibri"/>
-                <a:cs typeface="Times New Roman"/>
-              </a:rPr>
-              <a:t>    </a:t>
-            </a:r>
-            <a:r>
-              <a:rPr lang="de-CH" sz="1200" b="1" dirty="0" err="1" smtClean="0">
-                <a:solidFill>
-                  <a:srgbClr val="7F0055"/>
-                </a:solidFill>
-                <a:latin typeface="Courier New"/>
-                <a:ea typeface="Calibri"/>
-                <a:cs typeface="Times New Roman"/>
-              </a:rPr>
-              <a:t>return</a:t>
-            </a:r>
-            <a:r>
-              <a:rPr lang="de-CH" sz="1200" dirty="0" smtClean="0">
-                <a:solidFill>
-                  <a:srgbClr val="000000"/>
-                </a:solidFill>
-                <a:latin typeface="Courier New"/>
-                <a:ea typeface="Calibri"/>
-                <a:cs typeface="Times New Roman"/>
-              </a:rPr>
-              <a:t> 1;</a:t>
-            </a:r>
-            <a:endParaRPr lang="de-CH" sz="1200" dirty="0" smtClean="0">
-              <a:latin typeface="Calibri"/>
-              <a:ea typeface="Calibri"/>
-              <a:cs typeface="Times New Roman"/>
-            </a:endParaRPr>
-          </a:p>
-          <a:p>
-            <a:pPr>
-              <a:lnSpc>
-                <a:spcPct val="115000"/>
-              </a:lnSpc>
-              <a:spcAft>
-                <a:spcPts val="0"/>
-              </a:spcAft>
-            </a:pPr>
-            <a:r>
-              <a:rPr lang="de-CH" sz="1200" dirty="0" smtClean="0">
-                <a:solidFill>
-                  <a:srgbClr val="000000"/>
-                </a:solidFill>
-                <a:latin typeface="Courier New"/>
-                <a:ea typeface="Calibri"/>
-                <a:cs typeface="Times New Roman"/>
-              </a:rPr>
-              <a:t>}</a:t>
-            </a:r>
-            <a:endParaRPr lang="de-CH" sz="1200" dirty="0" smtClean="0">
-              <a:latin typeface="Calibri"/>
-              <a:ea typeface="Calibri"/>
-              <a:cs typeface="Times New Roman"/>
-            </a:endParaRPr>
-          </a:p>
-          <a:p>
-            <a:pPr>
-              <a:lnSpc>
-                <a:spcPct val="115000"/>
-              </a:lnSpc>
-              <a:spcAft>
-                <a:spcPts val="0"/>
-              </a:spcAft>
-            </a:pPr>
-            <a:r>
-              <a:rPr lang="de-CH" sz="1200" b="1" dirty="0" err="1" smtClean="0">
-                <a:solidFill>
-                  <a:srgbClr val="7F0055"/>
-                </a:solidFill>
-                <a:latin typeface="Courier New"/>
-                <a:ea typeface="Calibri"/>
-                <a:cs typeface="Times New Roman"/>
-              </a:rPr>
-              <a:t>else</a:t>
-            </a:r>
-            <a:endParaRPr lang="de-CH" sz="1200" dirty="0" smtClean="0">
-              <a:latin typeface="Calibri"/>
-              <a:ea typeface="Calibri"/>
-              <a:cs typeface="Times New Roman"/>
-            </a:endParaRPr>
-          </a:p>
-          <a:p>
-            <a:pPr>
-              <a:lnSpc>
-                <a:spcPct val="115000"/>
-              </a:lnSpc>
-              <a:spcAft>
-                <a:spcPts val="0"/>
-              </a:spcAft>
-            </a:pPr>
-            <a:r>
-              <a:rPr lang="de-CH" sz="1200" dirty="0" smtClean="0">
-                <a:solidFill>
-                  <a:srgbClr val="000000"/>
-                </a:solidFill>
-                <a:latin typeface="Courier New"/>
-                <a:ea typeface="Calibri"/>
-                <a:cs typeface="Times New Roman"/>
-              </a:rPr>
-              <a:t>{</a:t>
-            </a:r>
-            <a:endParaRPr lang="de-CH" sz="1200" dirty="0" smtClean="0">
-              <a:latin typeface="Calibri"/>
-              <a:ea typeface="Calibri"/>
-              <a:cs typeface="Times New Roman"/>
-            </a:endParaRPr>
-          </a:p>
-          <a:p>
-            <a:pPr>
-              <a:lnSpc>
-                <a:spcPct val="115000"/>
-              </a:lnSpc>
-              <a:spcAft>
-                <a:spcPts val="0"/>
-              </a:spcAft>
-            </a:pPr>
-            <a:r>
-              <a:rPr lang="en-US" sz="1200" dirty="0" smtClean="0">
-                <a:solidFill>
-                  <a:srgbClr val="000000"/>
-                </a:solidFill>
-                <a:latin typeface="Courier New"/>
-                <a:ea typeface="Calibri"/>
-                <a:cs typeface="Times New Roman"/>
-              </a:rPr>
-              <a:t>    </a:t>
-            </a:r>
-            <a:r>
-              <a:rPr lang="en-US" sz="1200" dirty="0" smtClean="0">
-                <a:solidFill>
-                  <a:srgbClr val="3F7F5F"/>
-                </a:solidFill>
-                <a:latin typeface="Courier New"/>
-                <a:ea typeface="Calibri"/>
-                <a:cs typeface="Times New Roman"/>
-              </a:rPr>
-              <a:t>// false </a:t>
-            </a:r>
-            <a:r>
-              <a:rPr lang="en-US" sz="1200" dirty="0" err="1" smtClean="0">
-                <a:solidFill>
-                  <a:srgbClr val="3F7F5F"/>
-                </a:solidFill>
-                <a:latin typeface="Courier New"/>
-                <a:ea typeface="Calibri"/>
-                <a:cs typeface="Times New Roman"/>
-              </a:rPr>
-              <a:t>zurückgeben</a:t>
-            </a:r>
-            <a:endParaRPr lang="de-CH" sz="1200" dirty="0" smtClean="0">
-              <a:latin typeface="Calibri"/>
-              <a:ea typeface="Calibri"/>
-              <a:cs typeface="Times New Roman"/>
-            </a:endParaRPr>
-          </a:p>
-          <a:p>
-            <a:pPr>
-              <a:lnSpc>
-                <a:spcPct val="115000"/>
-              </a:lnSpc>
-              <a:spcAft>
-                <a:spcPts val="0"/>
-              </a:spcAft>
-            </a:pPr>
-            <a:r>
-              <a:rPr lang="en-US" sz="1200" dirty="0" smtClean="0">
-                <a:solidFill>
-                  <a:srgbClr val="000000"/>
-                </a:solidFill>
-                <a:latin typeface="Courier New"/>
-                <a:ea typeface="Calibri"/>
-                <a:cs typeface="Times New Roman"/>
-              </a:rPr>
-              <a:t>    </a:t>
-            </a:r>
-            <a:r>
-              <a:rPr lang="en-US" sz="1200" b="1" dirty="0" smtClean="0">
-                <a:solidFill>
-                  <a:srgbClr val="7F0055"/>
-                </a:solidFill>
-                <a:latin typeface="Courier New"/>
-                <a:ea typeface="Calibri"/>
-                <a:cs typeface="Times New Roman"/>
-              </a:rPr>
-              <a:t>return</a:t>
-            </a:r>
-            <a:r>
-              <a:rPr lang="en-US" sz="1200" dirty="0" smtClean="0">
-                <a:solidFill>
-                  <a:srgbClr val="000000"/>
-                </a:solidFill>
-                <a:latin typeface="Courier New"/>
-                <a:ea typeface="Calibri"/>
-                <a:cs typeface="Times New Roman"/>
-              </a:rPr>
-              <a:t> 0;</a:t>
-            </a:r>
-            <a:endParaRPr lang="de-CH" sz="1200" dirty="0" smtClean="0">
-              <a:latin typeface="Calibri"/>
-              <a:ea typeface="Calibri"/>
-              <a:cs typeface="Times New Roman"/>
-            </a:endParaRPr>
-          </a:p>
-          <a:p>
-            <a:r>
-              <a:rPr lang="en-US" sz="1200" dirty="0" smtClean="0">
-                <a:solidFill>
-                  <a:srgbClr val="000000"/>
-                </a:solidFill>
-                <a:latin typeface="Courier New"/>
-                <a:ea typeface="Calibri"/>
-              </a:rPr>
-              <a:t>}</a:t>
-            </a:r>
-            <a:endParaRPr lang="de-CH" sz="1200" dirty="0"/>
-          </a:p>
-        </p:txBody>
-      </p:sp>
       <p:pic>
         <p:nvPicPr>
           <p:cNvPr id="21512" name="Picture 8" descr="http://blog.eogn.com/.a/6a00d8341c767353ef016762f7c808970b-800wi"/>
@@ -7178,10 +6465,22 @@
             <a:off x="179512" y="188640"/>
             <a:ext cx="1805947" cy="2708920"/>
           </a:xfrm>
-          <a:prstGeom prst="rect">
-            <a:avLst/>
+          <a:prstGeom prst="roundRect">
+            <a:avLst>
+              <a:gd name="adj" fmla="val 8594"/>
+            </a:avLst>
           </a:prstGeom>
-          <a:noFill/>
+          <a:solidFill>
+            <a:srgbClr val="FFFFFF">
+              <a:shade val="85000"/>
+            </a:srgbClr>
+          </a:solidFill>
+          <a:ln>
+            <a:noFill/>
+          </a:ln>
+          <a:effectLst>
+            <a:reflection blurRad="12700" stA="38000" endPos="28000" dist="5000" dir="5400000" sy="-100000" algn="bl" rotWithShape="0"/>
+          </a:effectLst>
         </p:spPr>
       </p:pic>
       <p:pic>
@@ -7204,18 +6503,21 @@
             <a:off x="2555776" y="260648"/>
             <a:ext cx="6316662" cy="1962150"/>
           </a:xfrm>
-          <a:prstGeom prst="rect">
-            <a:avLst/>
+          <a:prstGeom prst="roundRect">
+            <a:avLst>
+              <a:gd name="adj" fmla="val 8594"/>
+            </a:avLst>
           </a:prstGeom>
+          <a:solidFill>
+            <a:srgbClr val="FFFFFF">
+              <a:shade val="85000"/>
+            </a:srgbClr>
+          </a:solidFill>
           <a:ln>
             <a:noFill/>
           </a:ln>
           <a:effectLst>
-            <a:outerShdw blurRad="292100" dist="139700" dir="2700000" algn="tl" rotWithShape="0">
-              <a:schemeClr val="bg1">
-                <a:alpha val="65000"/>
-              </a:schemeClr>
-            </a:outerShdw>
+            <a:reflection blurRad="12700" stA="38000" endPos="28000" dist="5000" dir="5400000" sy="-100000" algn="bl" rotWithShape="0"/>
           </a:effectLst>
         </p:spPr>
       </p:pic>
@@ -7229,28 +6531,141 @@
         </p:nvPicPr>
         <p:blipFill>
           <a:blip r:embed="rId5" cstate="print"/>
-          <a:srcRect/>
           <a:stretch>
             <a:fillRect/>
           </a:stretch>
         </p:blipFill>
         <p:spPr bwMode="auto">
           <a:xfrm>
-            <a:off x="2305844" y="2346945"/>
-            <a:ext cx="6564312" cy="2162175"/>
+            <a:off x="3347864" y="2636912"/>
+            <a:ext cx="4714428" cy="1253324"/>
           </a:xfrm>
-          <a:prstGeom prst="rect">
-            <a:avLst/>
+          <a:prstGeom prst="roundRect">
+            <a:avLst>
+              <a:gd name="adj" fmla="val 8594"/>
+            </a:avLst>
           </a:prstGeom>
+          <a:solidFill>
+            <a:srgbClr val="FFFFFF">
+              <a:shade val="85000"/>
+            </a:srgbClr>
+          </a:solidFill>
           <a:ln>
             <a:noFill/>
           </a:ln>
           <a:effectLst>
-            <a:outerShdw blurRad="292100" dist="139700" dir="2700000" algn="tl" rotWithShape="0">
-              <a:schemeClr val="bg1">
-                <a:alpha val="65000"/>
-              </a:schemeClr>
-            </a:outerShdw>
+            <a:reflection blurRad="12700" stA="38000" endPos="28000" dist="5000" dir="5400000" sy="-100000" algn="bl" rotWithShape="0"/>
+          </a:effectLst>
+        </p:spPr>
+      </p:pic>
+      <p:pic>
+        <p:nvPicPr>
+          <p:cNvPr id="8" name="Grafik 7" descr="2012-04-26 23h20_46.png"/>
+          <p:cNvPicPr>
+            <a:picLocks noChangeAspect="1"/>
+          </p:cNvPicPr>
+          <p:nvPr/>
+        </p:nvPicPr>
+        <p:blipFill>
+          <a:blip r:embed="rId6" cstate="print"/>
+          <a:stretch>
+            <a:fillRect/>
+          </a:stretch>
+        </p:blipFill>
+        <p:spPr>
+          <a:xfrm>
+            <a:off x="1835696" y="4653136"/>
+            <a:ext cx="5534798" cy="1190791"/>
+          </a:xfrm>
+          <a:prstGeom prst="roundRect">
+            <a:avLst>
+              <a:gd name="adj" fmla="val 8594"/>
+            </a:avLst>
+          </a:prstGeom>
+          <a:solidFill>
+            <a:srgbClr val="FFFFFF">
+              <a:shade val="85000"/>
+            </a:srgbClr>
+          </a:solidFill>
+          <a:ln>
+            <a:noFill/>
+          </a:ln>
+          <a:effectLst>
+            <a:reflection blurRad="12700" stA="38000" endPos="28000" dist="5000" dir="5400000" sy="-100000" algn="bl" rotWithShape="0"/>
+          </a:effectLst>
+        </p:spPr>
+      </p:pic>
+      <p:pic>
+        <p:nvPicPr>
+          <p:cNvPr id="9" name="Grafik 8" descr="2012-04-26 23h20_59.png"/>
+          <p:cNvPicPr>
+            <a:picLocks noChangeAspect="1"/>
+          </p:cNvPicPr>
+          <p:nvPr/>
+        </p:nvPicPr>
+        <p:blipFill>
+          <a:blip r:embed="rId7" cstate="print"/>
+          <a:stretch>
+            <a:fillRect/>
+          </a:stretch>
+        </p:blipFill>
+        <p:spPr>
+          <a:xfrm>
+            <a:off x="1619672" y="4653136"/>
+            <a:ext cx="5915851" cy="1238423"/>
+          </a:xfrm>
+          <a:prstGeom prst="roundRect">
+            <a:avLst>
+              <a:gd name="adj" fmla="val 8594"/>
+            </a:avLst>
+          </a:prstGeom>
+          <a:solidFill>
+            <a:srgbClr val="FFFFFF">
+              <a:shade val="85000"/>
+            </a:srgbClr>
+          </a:solidFill>
+          <a:ln>
+            <a:noFill/>
+          </a:ln>
+          <a:effectLst>
+            <a:reflection blurRad="12700" stA="38000" endPos="28000" dist="5000" dir="5400000" sy="-100000" algn="bl" rotWithShape="0"/>
+          </a:effectLst>
+        </p:spPr>
+      </p:pic>
+      <p:pic>
+        <p:nvPicPr>
+          <p:cNvPr id="10" name="Grafik 9" descr="2012-04-26 23h21_18.png"/>
+          <p:cNvPicPr>
+            <a:picLocks noChangeAspect="1"/>
+          </p:cNvPicPr>
+          <p:nvPr/>
+        </p:nvPicPr>
+        <p:blipFill>
+          <a:blip r:embed="rId8" cstate="print"/>
+          <a:stretch>
+            <a:fillRect/>
+          </a:stretch>
+        </p:blipFill>
+        <p:spPr>
+          <a:xfrm>
+            <a:off x="1187624" y="4581128"/>
+            <a:ext cx="6668431" cy="1314634"/>
+          </a:xfrm>
+          <a:prstGeom prst="roundRect">
+            <a:avLst>
+              <a:gd name="adj" fmla="val 8594"/>
+            </a:avLst>
+          </a:prstGeom>
+          <a:solidFill>
+            <a:srgbClr val="FFFFFF">
+              <a:shade val="85000"/>
+            </a:srgbClr>
+          </a:solidFill>
+          <a:ln>
+            <a:noFill/>
+          </a:ln>
+          <a:effectLst>
+            <a:reflection blurRad="12700" stA="38000" endPos="28000" dist="5000" dir="5400000" sy="-100000" algn="bl" rotWithShape="0"/>
           </a:effectLst>
         </p:spPr>
       </p:pic>
@@ -7263,7 +6678,7 @@
           <p:nvPr/>
         </p:nvPicPr>
         <p:blipFill>
-          <a:blip r:embed="rId6" cstate="print"/>
+          <a:blip r:embed="rId9" cstate="print"/>
           <a:srcRect/>
           <a:stretch>
             <a:fillRect/>
@@ -7271,13 +6686,25 @@
         </p:blipFill>
         <p:spPr bwMode="auto">
           <a:xfrm>
-            <a:off x="1432223" y="4641676"/>
+            <a:off x="755576" y="4149080"/>
             <a:ext cx="7440612" cy="2171700"/>
           </a:xfrm>
-          <a:prstGeom prst="rect">
-            <a:avLst/>
+          <a:prstGeom prst="roundRect">
+            <a:avLst>
+              <a:gd name="adj" fmla="val 8594"/>
+            </a:avLst>
           </a:prstGeom>
-          <a:noFill/>
+          <a:solidFill>
+            <a:srgbClr val="FFFFFF">
+              <a:shade val="85000"/>
+            </a:srgbClr>
+          </a:solidFill>
+          <a:ln>
+            <a:noFill/>
+          </a:ln>
+          <a:effectLst>
+            <a:reflection blurRad="12700" stA="38000" endPos="28000" dist="5000" dir="5400000" sy="-100000" algn="bl" rotWithShape="0"/>
+          </a:effectLst>
         </p:spPr>
       </p:pic>
       <p:pic>
@@ -7289,7 +6716,7 @@
           <p:nvPr/>
         </p:nvPicPr>
         <p:blipFill>
-          <a:blip r:embed="rId7" cstate="print"/>
+          <a:blip r:embed="rId10" cstate="print"/>
           <a:srcRect/>
           <a:stretch>
             <a:fillRect/>
@@ -7297,32 +6724,56 @@
         </p:blipFill>
         <p:spPr bwMode="auto">
           <a:xfrm>
-            <a:off x="3923928" y="2420888"/>
+            <a:off x="3635896" y="2348880"/>
             <a:ext cx="2438400" cy="2438400"/>
           </a:xfrm>
           <a:prstGeom prst="rect">
             <a:avLst/>
           </a:prstGeom>
-          <a:ln w="38100" cap="sq">
+          <a:solidFill>
+            <a:srgbClr val="FFFFFF">
+              <a:shade val="85000"/>
+            </a:srgbClr>
+          </a:solidFill>
+          <a:ln w="190500" cap="sq">
             <a:solidFill>
-              <a:srgbClr val="000000"/>
+              <a:srgbClr val="C00000"/>
             </a:solidFill>
-            <a:prstDash val="solid"/>
             <a:miter lim="800000"/>
           </a:ln>
           <a:effectLst>
-            <a:outerShdw blurRad="330200" dir="2700000" sx="110000" sy="110000" algn="tl" rotWithShape="0">
-              <a:prstClr val="black">
-                <a:alpha val="74000"/>
-              </a:prstClr>
+            <a:glow rad="228600">
+              <a:schemeClr val="accent6">
+                <a:satMod val="175000"/>
+                <a:alpha val="40000"/>
+              </a:schemeClr>
+            </a:glow>
+            <a:outerShdw blurRad="65000" dist="50800" dir="12900000" kx="195000" ky="145000" algn="tl" rotWithShape="0">
+              <a:srgbClr val="000000">
+                <a:alpha val="30000"/>
+              </a:srgbClr>
             </a:outerShdw>
           </a:effectLst>
+          <a:scene3d>
+            <a:camera prst="orthographicFront">
+              <a:rot lat="0" lon="0" rev="360000"/>
+            </a:camera>
+            <a:lightRig rig="twoPt" dir="t">
+              <a:rot lat="0" lon="0" rev="7200000"/>
+            </a:lightRig>
+          </a:scene3d>
+          <a:sp3d contourW="12700">
+            <a:bevelT w="25400" h="19050"/>
+            <a:contourClr>
+              <a:srgbClr val="969696"/>
+            </a:contourClr>
+          </a:sp3d>
         </p:spPr>
       </p:pic>
     </p:spTree>
     <p:extLst>
       <p:ext uri="{BB962C8B-B14F-4D97-AF65-F5344CB8AC3E}">
-        <p14:creationId xmlns:p14="http://schemas.microsoft.com/office/powerpoint/2010/main" val="3199722868"/>
+        <p14:creationId xmlns:p14="http://schemas.microsoft.com/office/powerpoint/2010/main" xmlns="" val="3199722868"/>
       </p:ext>
     </p:extLst>
   </p:cSld>
@@ -7522,7 +6973,7 @@
                                           </p:stCondLst>
                                         </p:cTn>
                                         <p:tgtEl>
-                                          <p:spTgt spid="21515"/>
+                                          <p:spTgt spid="8"/>
                                         </p:tgtEl>
                                         <p:attrNameLst>
                                           <p:attrName>style.visibility</p:attrName>
@@ -7536,7 +6987,7 @@
                                       <p:cBhvr>
                                         <p:cTn id="22" dur="500"/>
                                         <p:tgtEl>
-                                          <p:spTgt spid="21515"/>
+                                          <p:spTgt spid="8"/>
                                         </p:tgtEl>
                                       </p:cBhvr>
                                     </p:animEffect>
@@ -7575,6 +7026,165 @@
                                           </p:stCondLst>
                                         </p:cTn>
                                         <p:tgtEl>
+                                          <p:spTgt spid="9"/>
+                                        </p:tgtEl>
+                                        <p:attrNameLst>
+                                          <p:attrName>style.visibility</p:attrName>
+                                        </p:attrNameLst>
+                                      </p:cBhvr>
+                                      <p:to>
+                                        <p:strVal val="visible"/>
+                                      </p:to>
+                                    </p:set>
+                                    <p:animEffect transition="in" filter="fade">
+                                      <p:cBhvr>
+                                        <p:cTn id="27" dur="500"/>
+                                        <p:tgtEl>
+                                          <p:spTgt spid="9"/>
+                                        </p:tgtEl>
+                                      </p:cBhvr>
+                                    </p:animEffect>
+                                  </p:childTnLst>
+                                </p:cTn>
+                              </p:par>
+                            </p:childTnLst>
+                          </p:cTn>
+                        </p:par>
+                      </p:childTnLst>
+                    </p:cTn>
+                  </p:par>
+                  <p:par>
+                    <p:cTn id="28" fill="hold">
+                      <p:stCondLst>
+                        <p:cond delay="indefinite"/>
+                      </p:stCondLst>
+                      <p:childTnLst>
+                        <p:par>
+                          <p:cTn id="29" fill="hold">
+                            <p:stCondLst>
+                              <p:cond delay="0"/>
+                            </p:stCondLst>
+                            <p:childTnLst>
+                              <p:par>
+                                <p:cTn id="30" presetID="10" presetClass="entr" presetSubtype="0" fill="hold" nodeType="clickEffect">
+                                  <p:stCondLst>
+                                    <p:cond delay="0"/>
+                                  </p:stCondLst>
+                                  <p:childTnLst>
+                                    <p:set>
+                                      <p:cBhvr>
+                                        <p:cTn id="31" dur="1" fill="hold">
+                                          <p:stCondLst>
+                                            <p:cond delay="0"/>
+                                          </p:stCondLst>
+                                        </p:cTn>
+                                        <p:tgtEl>
+                                          <p:spTgt spid="10"/>
+                                        </p:tgtEl>
+                                        <p:attrNameLst>
+                                          <p:attrName>style.visibility</p:attrName>
+                                        </p:attrNameLst>
+                                      </p:cBhvr>
+                                      <p:to>
+                                        <p:strVal val="visible"/>
+                                      </p:to>
+                                    </p:set>
+                                    <p:animEffect transition="in" filter="fade">
+                                      <p:cBhvr>
+                                        <p:cTn id="32" dur="500"/>
+                                        <p:tgtEl>
+                                          <p:spTgt spid="10"/>
+                                        </p:tgtEl>
+                                      </p:cBhvr>
+                                    </p:animEffect>
+                                  </p:childTnLst>
+                                </p:cTn>
+                              </p:par>
+                            </p:childTnLst>
+                          </p:cTn>
+                        </p:par>
+                      </p:childTnLst>
+                    </p:cTn>
+                  </p:par>
+                  <p:par>
+                    <p:cTn id="33" fill="hold">
+                      <p:stCondLst>
+                        <p:cond delay="indefinite"/>
+                      </p:stCondLst>
+                      <p:childTnLst>
+                        <p:par>
+                          <p:cTn id="34" fill="hold">
+                            <p:stCondLst>
+                              <p:cond delay="0"/>
+                            </p:stCondLst>
+                            <p:childTnLst>
+                              <p:par>
+                                <p:cTn id="35" presetID="10" presetClass="entr" presetSubtype="0" fill="hold" nodeType="clickEffect">
+                                  <p:stCondLst>
+                                    <p:cond delay="0"/>
+                                  </p:stCondLst>
+                                  <p:childTnLst>
+                                    <p:set>
+                                      <p:cBhvr>
+                                        <p:cTn id="36" dur="1" fill="hold">
+                                          <p:stCondLst>
+                                            <p:cond delay="0"/>
+                                          </p:stCondLst>
+                                        </p:cTn>
+                                        <p:tgtEl>
+                                          <p:spTgt spid="21515"/>
+                                        </p:tgtEl>
+                                        <p:attrNameLst>
+                                          <p:attrName>style.visibility</p:attrName>
+                                        </p:attrNameLst>
+                                      </p:cBhvr>
+                                      <p:to>
+                                        <p:strVal val="visible"/>
+                                      </p:to>
+                                    </p:set>
+                                    <p:animEffect transition="in" filter="fade">
+                                      <p:cBhvr>
+                                        <p:cTn id="37" dur="500"/>
+                                        <p:tgtEl>
+                                          <p:spTgt spid="21515"/>
+                                        </p:tgtEl>
+                                      </p:cBhvr>
+                                    </p:animEffect>
+                                  </p:childTnLst>
+                                </p:cTn>
+                              </p:par>
+                            </p:childTnLst>
+                          </p:cTn>
+                        </p:par>
+                      </p:childTnLst>
+                    </p:cTn>
+                  </p:par>
+                  <p:par>
+                    <p:cTn id="38" fill="hold">
+                      <p:stCondLst>
+                        <p:cond delay="indefinite"/>
+                      </p:stCondLst>
+                      <p:childTnLst>
+                        <p:par>
+                          <p:cTn id="39" fill="hold">
+                            <p:stCondLst>
+                              <p:cond delay="0"/>
+                            </p:stCondLst>
+                            <p:childTnLst>
+                              <p:par>
+                                <p:cTn id="40" presetID="10" presetClass="entr" presetSubtype="0" fill="hold" nodeType="clickEffect">
+                                  <p:stCondLst>
+                                    <p:cond delay="0"/>
+                                  </p:stCondLst>
+                                  <p:childTnLst>
+                                    <p:set>
+                                      <p:cBhvr>
+                                        <p:cTn id="41" dur="1" fill="hold">
+                                          <p:stCondLst>
+                                            <p:cond delay="0"/>
+                                          </p:stCondLst>
+                                        </p:cTn>
+                                        <p:tgtEl>
                                           <p:spTgt spid="21506"/>
                                         </p:tgtEl>
                                         <p:attrNameLst>
@@ -7587,7 +7197,7 @@
                                     </p:set>
                                     <p:animEffect transition="in" filter="fade">
                                       <p:cBhvr>
-                                        <p:cTn id="27" dur="500"/>
+                                        <p:cTn id="42" dur="500"/>
                                         <p:tgtEl>
                                           <p:spTgt spid="21506"/>
                                         </p:tgtEl>
@@ -7712,31 +7322,132 @@
             </a:r>
           </a:p>
           <a:p>
+            <a:r>
+              <a:rPr lang="de-CH" dirty="0" smtClean="0"/>
+              <a:t>Version 1.1 getestet</a:t>
+            </a:r>
+          </a:p>
+          <a:p>
+            <a:r>
+              <a:rPr lang="de-CH" dirty="0" smtClean="0"/>
+              <a:t>Gefundene Fehler notiert und als „</a:t>
+            </a:r>
+            <a:r>
+              <a:rPr lang="de-CH" dirty="0" err="1" smtClean="0"/>
+              <a:t>Issues</a:t>
+            </a:r>
+            <a:r>
+              <a:rPr lang="de-CH" dirty="0" smtClean="0"/>
+              <a:t>“ in </a:t>
+            </a:r>
+            <a:r>
+              <a:rPr lang="de-CH" dirty="0" err="1" smtClean="0"/>
+              <a:t>GitHub</a:t>
+            </a:r>
+            <a:r>
+              <a:rPr lang="de-CH" dirty="0" smtClean="0"/>
+              <a:t/>
+            </a:r>
+            <a:br>
+              <a:rPr lang="de-CH" dirty="0" smtClean="0"/>
+            </a:br>
+            <a:r>
+              <a:rPr lang="de-CH" dirty="0" smtClean="0"/>
+              <a:t>erfasst </a:t>
+            </a:r>
+            <a:r>
+              <a:rPr lang="de-CH" dirty="0" smtClean="0">
+                <a:sym typeface="Wingdings" pitchFamily="2" charset="2"/>
+              </a:rPr>
+              <a:t> Diese dann zugewiesen:</a:t>
+            </a:r>
+            <a:endParaRPr lang="de-CH" dirty="0" smtClean="0"/>
+          </a:p>
+          <a:p>
             <a:endParaRPr lang="de-CH" dirty="0"/>
           </a:p>
-          <a:p>
-            <a:r>
-              <a:rPr lang="de-CH" dirty="0" smtClean="0"/>
-              <a:t>Ergänzungen </a:t>
-            </a:r>
-            <a:r>
-              <a:rPr lang="de-CH" dirty="0" err="1" smtClean="0"/>
-              <a:t>cyril</a:t>
-            </a:r>
-            <a:endParaRPr lang="de-CH" dirty="0" smtClean="0"/>
-          </a:p>
-          <a:p>
-            <a:endParaRPr lang="de-CH" dirty="0" smtClean="0"/>
-          </a:p>
-          <a:p>
-            <a:endParaRPr lang="de-CH" dirty="0"/>
-          </a:p>
-        </p:txBody>
-      </p:sp>
+        </p:txBody>
+      </p:sp>
+      <p:pic>
+        <p:nvPicPr>
+          <p:cNvPr id="20482" name="Picture 2" descr="C:\Users\Cyril\Pictures\Screenpresso\2012-04-26 23h29_26.png"/>
+          <p:cNvPicPr>
+            <a:picLocks noChangeAspect="1" noChangeArrowheads="1"/>
+          </p:cNvPicPr>
+          <p:nvPr/>
+        </p:nvPicPr>
+        <p:blipFill>
+          <a:blip r:embed="rId2" cstate="print"/>
+          <a:srcRect/>
+          <a:stretch>
+            <a:fillRect/>
+          </a:stretch>
+        </p:blipFill>
+        <p:spPr bwMode="auto">
+          <a:xfrm>
+            <a:off x="5580112" y="1018034"/>
+            <a:ext cx="3228975" cy="2266950"/>
+          </a:xfrm>
+          <a:prstGeom prst="roundRect">
+            <a:avLst>
+              <a:gd name="adj" fmla="val 8594"/>
+            </a:avLst>
+          </a:prstGeom>
+          <a:solidFill>
+            <a:srgbClr val="FFFFFF">
+              <a:shade val="85000"/>
+            </a:srgbClr>
+          </a:solidFill>
+          <a:ln>
+            <a:noFill/>
+          </a:ln>
+          <a:effectLst>
+            <a:reflection blurRad="12700" stA="38000" endPos="28000" dist="5000" dir="5400000" sy="-100000" algn="bl" rotWithShape="0"/>
+          </a:effectLst>
+        </p:spPr>
+      </p:pic>
+      <p:pic>
+        <p:nvPicPr>
+          <p:cNvPr id="20485" name="Picture 5" descr="C:\Users\Cyril\Pictures\Screenpresso\2012-04-26 23h36_14.png"/>
+          <p:cNvPicPr>
+            <a:picLocks noChangeAspect="1" noChangeArrowheads="1"/>
+          </p:cNvPicPr>
+          <p:nvPr/>
+        </p:nvPicPr>
+        <p:blipFill>
+          <a:blip r:embed="rId3" cstate="print"/>
+          <a:srcRect/>
+          <a:stretch>
+            <a:fillRect/>
+          </a:stretch>
+        </p:blipFill>
+        <p:spPr bwMode="auto">
+          <a:xfrm>
+            <a:off x="1438547" y="4005064"/>
+            <a:ext cx="6373813" cy="2076450"/>
+          </a:xfrm>
+          <a:prstGeom prst="roundRect">
+            <a:avLst>
+              <a:gd name="adj" fmla="val 3548"/>
+            </a:avLst>
+          </a:prstGeom>
+          <a:solidFill>
+            <a:srgbClr val="FFFFFF">
+              <a:shade val="85000"/>
+            </a:srgbClr>
+          </a:solidFill>
+          <a:ln>
+            <a:noFill/>
+          </a:ln>
+          <a:effectLst>
+            <a:reflection blurRad="12700" stA="38000" endPos="28000" dist="5000" dir="5400000" sy="-100000" algn="bl" rotWithShape="0"/>
+          </a:effectLst>
+        </p:spPr>
+      </p:pic>
     </p:spTree>
     <p:extLst>
       <p:ext uri="{BB962C8B-B14F-4D97-AF65-F5344CB8AC3E}">
-        <p14:creationId xmlns:p14="http://schemas.microsoft.com/office/powerpoint/2010/main" val="1300663606"/>
+        <p14:creationId xmlns:p14="http://schemas.microsoft.com/office/powerpoint/2010/main" xmlns="" val="1300663606"/>
       </p:ext>
     </p:extLst>
   </p:cSld>
@@ -7815,10 +7526,57 @@
           </a:p>
         </p:txBody>
       </p:sp>
+      <p:pic>
+        <p:nvPicPr>
+          <p:cNvPr id="21507" name="Picture 3"/>
+          <p:cNvPicPr>
+            <a:picLocks noChangeAspect="1" noChangeArrowheads="1"/>
+          </p:cNvPicPr>
+          <p:nvPr/>
+        </p:nvPicPr>
+        <p:blipFill>
+          <a:blip r:embed="rId2" cstate="print"/>
+          <a:srcRect/>
+          <a:stretch>
+            <a:fillRect/>
+          </a:stretch>
+        </p:blipFill>
+        <p:spPr bwMode="auto">
+          <a:xfrm>
+            <a:off x="1907704" y="1844824"/>
+            <a:ext cx="5616624" cy="4392929"/>
+          </a:xfrm>
+          <a:prstGeom prst="rect">
+            <a:avLst/>
+          </a:prstGeom>
+          <a:noFill/>
+          <a:ln w="9525">
+            <a:noFill/>
+            <a:miter lim="800000"/>
+            <a:headEnd/>
+            <a:tailEnd/>
+          </a:ln>
+          <a:effectLst>
+            <a:glow rad="228600">
+              <a:schemeClr val="accent5">
+                <a:satMod val="175000"/>
+                <a:alpha val="40000"/>
+              </a:schemeClr>
+            </a:glow>
+          </a:effectLst>
+          <a:scene3d>
+            <a:camera prst="orthographicFront"/>
+            <a:lightRig rig="threePt" dir="t"/>
+          </a:scene3d>
+          <a:sp3d>
+            <a:bevelT/>
+          </a:sp3d>
+        </p:spPr>
+      </p:pic>
     </p:spTree>
     <p:extLst>
       <p:ext uri="{BB962C8B-B14F-4D97-AF65-F5344CB8AC3E}">
-        <p14:creationId xmlns:p14="http://schemas.microsoft.com/office/powerpoint/2010/main" val="1595990863"/>
+        <p14:creationId xmlns:p14="http://schemas.microsoft.com/office/powerpoint/2010/main" xmlns="" val="1595990863"/>
       </p:ext>
     </p:extLst>
   </p:cSld>
@@ -7965,7 +7723,7 @@
     </p:spTree>
     <p:extLst>
       <p:ext uri="{BB962C8B-B14F-4D97-AF65-F5344CB8AC3E}">
-        <p14:creationId xmlns:p14="http://schemas.microsoft.com/office/powerpoint/2010/main" val="1387166899"/>
+        <p14:creationId xmlns:p14="http://schemas.microsoft.com/office/powerpoint/2010/main" xmlns="" val="1387166899"/>
       </p:ext>
     </p:extLst>
   </p:cSld>
@@ -8063,7 +7821,7 @@
           <a:blip r:embed="rId2" cstate="print">
             <a:extLst>
               <a:ext uri="{BEBA8EAE-BF5A-486C-A8C5-ECC9F3942E4B}">
-                <a14:imgProps xmlns:a14="http://schemas.microsoft.com/office/drawing/2010/main">
+                <a14:imgProps xmlns:a14="http://schemas.microsoft.com/office/drawing/2010/main" xmlns="">
                   <a14:imgLayer r:embed="rId3">
                     <a14:imgEffect>
                       <a14:backgroundRemoval t="0" b="100000" l="0" r="100000"/>
@@ -8072,7 +7830,7 @@
                 </a14:imgProps>
               </a:ext>
               <a:ext uri="{28A0092B-C50C-407E-A947-70E740481C1C}">
-                <a14:useLocalDpi xmlns:a14="http://schemas.microsoft.com/office/drawing/2010/main" val="0"/>
+                <a14:useLocalDpi xmlns:a14="http://schemas.microsoft.com/office/drawing/2010/main" xmlns="" val="0"/>
               </a:ext>
             </a:extLst>
           </a:blip>
@@ -8096,14 +7854,14 @@
           <a:effectLst/>
           <a:extLst>
             <a:ext uri="{909E8E84-426E-40DD-AFC4-6F175D3DCCD1}">
-              <a14:hiddenFill xmlns:a14="http://schemas.microsoft.com/office/drawing/2010/main">
+              <a14:hiddenFill xmlns:a14="http://schemas.microsoft.com/office/drawing/2010/main" xmlns="">
                 <a:solidFill>
                   <a:schemeClr val="accent1"/>
                 </a:solidFill>
               </a14:hiddenFill>
             </a:ext>
             <a:ext uri="{91240B29-F687-4F45-9708-019B960494DF}">
-              <a14:hiddenLine xmlns:a14="http://schemas.microsoft.com/office/drawing/2010/main" w="9525">
+              <a14:hiddenLine xmlns:a14="http://schemas.microsoft.com/office/drawing/2010/main" xmlns="" w="9525">
                 <a:solidFill>
                   <a:schemeClr val="tx1"/>
                 </a:solidFill>
@@ -8113,7 +7871,7 @@
               </a14:hiddenLine>
             </a:ext>
             <a:ext uri="{AF507438-7753-43E0-B8FC-AC1667EBCBE1}">
-              <a14:hiddenEffects xmlns:a14="http://schemas.microsoft.com/office/drawing/2010/main">
+              <a14:hiddenEffects xmlns:a14="http://schemas.microsoft.com/office/drawing/2010/main" xmlns="">
                 <a:effectLst>
                   <a:outerShdw dist="35921" dir="2700000" algn="ctr" rotWithShape="0">
                     <a:schemeClr val="bg2"/>
@@ -8127,7 +7885,7 @@
     </p:spTree>
     <p:extLst>
       <p:ext uri="{BB962C8B-B14F-4D97-AF65-F5344CB8AC3E}">
-        <p14:creationId xmlns:p14="http://schemas.microsoft.com/office/powerpoint/2010/main" val="1599884037"/>
+        <p14:creationId xmlns:p14="http://schemas.microsoft.com/office/powerpoint/2010/main" xmlns="" val="1599884037"/>
       </p:ext>
     </p:extLst>
   </p:cSld>
@@ -8254,10 +8012,86 @@
           </a:p>
         </p:txBody>
       </p:sp>
+      <p:pic>
+        <p:nvPicPr>
+          <p:cNvPr id="3073" name="Picture 1" descr="D:\Programming\C\LaserChess\docs\punchcard.png"/>
+          <p:cNvPicPr>
+            <a:picLocks noChangeAspect="1" noChangeArrowheads="1"/>
+          </p:cNvPicPr>
+          <p:nvPr/>
+        </p:nvPicPr>
+        <p:blipFill>
+          <a:blip r:embed="rId2" cstate="print"/>
+          <a:srcRect/>
+          <a:stretch>
+            <a:fillRect/>
+          </a:stretch>
+        </p:blipFill>
+        <p:spPr bwMode="auto">
+          <a:xfrm>
+            <a:off x="3707904" y="620689"/>
+            <a:ext cx="5212532" cy="1415678"/>
+          </a:xfrm>
+          <a:prstGeom prst="roundRect">
+            <a:avLst>
+              <a:gd name="adj" fmla="val 8594"/>
+            </a:avLst>
+          </a:prstGeom>
+          <a:solidFill>
+            <a:srgbClr val="FFFFFF">
+              <a:shade val="85000"/>
+            </a:srgbClr>
+          </a:solidFill>
+          <a:ln>
+            <a:noFill/>
+          </a:ln>
+          <a:effectLst>
+            <a:reflection blurRad="12700" stA="38000" endPos="28000" dist="5000" dir="5400000" sy="-100000" algn="bl" rotWithShape="0"/>
+          </a:effectLst>
+        </p:spPr>
+      </p:pic>
+      <p:pic>
+        <p:nvPicPr>
+          <p:cNvPr id="3074" name="Picture 2" descr="D:\Programming\C\LaserChess\docs\Impact.png"/>
+          <p:cNvPicPr>
+            <a:picLocks noChangeAspect="1" noChangeArrowheads="1"/>
+          </p:cNvPicPr>
+          <p:nvPr/>
+        </p:nvPicPr>
+        <p:blipFill>
+          <a:blip r:embed="rId3" cstate="print"/>
+          <a:srcRect/>
+          <a:stretch>
+            <a:fillRect/>
+          </a:stretch>
+        </p:blipFill>
+        <p:spPr bwMode="auto">
+          <a:xfrm>
+            <a:off x="323528" y="4149080"/>
+            <a:ext cx="8552449" cy="1800200"/>
+          </a:xfrm>
+          <a:prstGeom prst="roundRect">
+            <a:avLst>
+              <a:gd name="adj" fmla="val 8594"/>
+            </a:avLst>
+          </a:prstGeom>
+          <a:solidFill>
+            <a:srgbClr val="FFFFFF">
+              <a:shade val="85000"/>
+            </a:srgbClr>
+          </a:solidFill>
+          <a:ln>
+            <a:noFill/>
+          </a:ln>
+          <a:effectLst>
+            <a:reflection blurRad="12700" stA="38000" endPos="28000" dist="5000" dir="5400000" sy="-100000" algn="bl" rotWithShape="0"/>
+          </a:effectLst>
+        </p:spPr>
+      </p:pic>
     </p:spTree>
     <p:extLst>
       <p:ext uri="{BB962C8B-B14F-4D97-AF65-F5344CB8AC3E}">
-        <p14:creationId xmlns:p14="http://schemas.microsoft.com/office/powerpoint/2010/main" val="2756733679"/>
+        <p14:creationId xmlns:p14="http://schemas.microsoft.com/office/powerpoint/2010/main" xmlns="" val="2756733679"/>
       </p:ext>
     </p:extLst>
   </p:cSld>
@@ -8311,7 +8145,11 @@
               <a:t>Main-Funktion  (Modul </a:t>
             </a:r>
             <a:r>
-              <a:rPr lang="de-CH" dirty="0" err="1" smtClean="0"/>
+              <a:rPr lang="de-CH" dirty="0" smtClean="0"/>
+              <a:t> </a:t>
+            </a:r>
+            <a:r>
+              <a:rPr lang="de-CH" i="1" dirty="0" err="1" smtClean="0"/>
               <a:t>LaserChess.c</a:t>
             </a:r>
             <a:r>
@@ -8387,7 +8225,7 @@
           <p:nvPr>
             <p:extLst>
               <p:ext uri="{D42A27DB-BD31-4B8C-83A1-F6EECF244321}">
-                <p14:modId xmlns:p14="http://schemas.microsoft.com/office/powerpoint/2010/main" val="675548602"/>
+                <p14:modId xmlns:p14="http://schemas.microsoft.com/office/powerpoint/2010/main" xmlns="" val="675548602"/>
               </p:ext>
             </p:extLst>
           </p:nvPr>
@@ -8398,66 +8236,16 @@
         </p:xfrm>
         <a:graphic>
           <a:graphicData uri="http://schemas.openxmlformats.org/presentationml/2006/ole">
-            <mc:AlternateContent xmlns:mc="http://schemas.openxmlformats.org/markup-compatibility/2006">
-              <mc:Choice xmlns:v="urn:schemas-microsoft-com:vml" Requires="v">
-                <p:oleObj spid="_x0000_s2056" name="Visio" r:id="rId3" imgW="2436869" imgH="7241670" progId="Visio.Drawing.11">
-                  <p:embed/>
-                </p:oleObj>
-              </mc:Choice>
-              <mc:Fallback>
-                <p:oleObj name="Visio" r:id="rId3" imgW="2436869" imgH="7241670" progId="Visio.Drawing.11">
-                  <p:embed/>
-                  <p:pic>
-                    <p:nvPicPr>
-                      <p:cNvPr id="0" name="Picture 6"/>
-                      <p:cNvPicPr>
-                        <a:picLocks noChangeAspect="1" noChangeArrowheads="1"/>
-                      </p:cNvPicPr>
-                      <p:nvPr/>
-                    </p:nvPicPr>
-                    <p:blipFill>
-                      <a:blip r:embed="rId4">
-                        <a:extLst>
-                          <a:ext uri="{28A0092B-C50C-407E-A947-70E740481C1C}">
-                            <a14:useLocalDpi xmlns:a14="http://schemas.microsoft.com/office/drawing/2010/main" val="0"/>
-                          </a:ext>
-                        </a:extLst>
-                      </a:blip>
-                      <a:srcRect/>
-                      <a:stretch>
-                        <a:fillRect/>
-                      </a:stretch>
-                    </p:blipFill>
-                    <p:spPr bwMode="auto">
-                      <a:xfrm>
-                        <a:off x="3422650" y="1557338"/>
-                        <a:ext cx="1420813" cy="4318000"/>
-                      </a:xfrm>
-                      <a:prstGeom prst="rect">
-                        <a:avLst/>
-                      </a:prstGeom>
-                      <a:noFill/>
-                      <a:extLst>
-                        <a:ext uri="{909E8E84-426E-40DD-AFC4-6F175D3DCCD1}">
-                          <a14:hiddenFill xmlns:a14="http://schemas.microsoft.com/office/drawing/2010/main">
-                            <a:solidFill>
-                              <a:srgbClr val="FFFFFF"/>
-                            </a:solidFill>
-                          </a14:hiddenFill>
-                        </a:ext>
-                      </a:extLst>
-                    </p:spPr>
-                  </p:pic>
-                </p:oleObj>
-              </mc:Fallback>
-            </mc:AlternateContent>
+            <p:oleObj spid="_x0000_s2056" name="Visio" r:id="rId3" imgW="2436869" imgH="7241670" progId="">
+              <p:embed/>
+            </p:oleObj>
           </a:graphicData>
         </a:graphic>
       </p:graphicFrame>
     </p:spTree>
     <p:extLst>
       <p:ext uri="{BB962C8B-B14F-4D97-AF65-F5344CB8AC3E}">
-        <p14:creationId xmlns:p14="http://schemas.microsoft.com/office/powerpoint/2010/main" val="1334996816"/>
+        <p14:creationId xmlns:p14="http://schemas.microsoft.com/office/powerpoint/2010/main" xmlns="" val="1334996816"/>
       </p:ext>
     </p:extLst>
   </p:cSld>
@@ -8511,7 +8299,11 @@
               <a:t>Spielfunktion  (Modul </a:t>
             </a:r>
             <a:r>
-              <a:rPr lang="de-CH" dirty="0" err="1" smtClean="0"/>
+              <a:rPr lang="de-CH" dirty="0" smtClean="0"/>
+              <a:t> </a:t>
+            </a:r>
+            <a:r>
+              <a:rPr lang="de-CH" i="1" dirty="0" err="1" smtClean="0"/>
               <a:t>Spiel.c</a:t>
             </a:r>
             <a:r>
@@ -8586,7 +8378,7 @@
     </p:spTree>
     <p:extLst>
       <p:ext uri="{BB962C8B-B14F-4D97-AF65-F5344CB8AC3E}">
-        <p14:creationId xmlns:p14="http://schemas.microsoft.com/office/powerpoint/2010/main" val="2375923500"/>
+        <p14:creationId xmlns:p14="http://schemas.microsoft.com/office/powerpoint/2010/main" xmlns="" val="2375923500"/>
       </p:ext>
     </p:extLst>
   </p:cSld>
@@ -8729,7 +8521,11 @@
               <a:t>Logik-Funktionen  (Modul </a:t>
             </a:r>
             <a:r>
-              <a:rPr lang="de-CH" dirty="0" err="1" smtClean="0"/>
+              <a:rPr lang="de-CH" dirty="0" smtClean="0"/>
+              <a:t> </a:t>
+            </a:r>
+            <a:r>
+              <a:rPr lang="de-CH" i="1" dirty="0" err="1" smtClean="0"/>
               <a:t>Logik.c</a:t>
             </a:r>
             <a:r>
@@ -8764,22 +8560,31 @@
             <a:pPr lvl="1"/>
             <a:r>
               <a:rPr lang="de-CH" dirty="0" smtClean="0"/>
-              <a:t>Laser abfeuern</a:t>
-            </a:r>
+              <a:t>Laser </a:t>
+            </a:r>
+            <a:r>
+              <a:rPr lang="de-CH" dirty="0" smtClean="0"/>
+              <a:t>abfeuern </a:t>
+            </a:r>
+            <a:r>
+              <a:rPr lang="de-CH" dirty="0" smtClean="0">
+                <a:sym typeface="Wingdings" pitchFamily="2" charset="2"/>
+              </a:rPr>
+              <a:t> Laser zeichnen und auf alle Hindernisse reagieren</a:t>
+            </a:r>
+            <a:endParaRPr lang="de-CH" dirty="0" smtClean="0"/>
           </a:p>
           <a:p>
             <a:pPr lvl="1"/>
             <a:r>
               <a:rPr lang="de-CH" dirty="0" smtClean="0"/>
-              <a:t>Diverse andere</a:t>
-            </a:r>
-            <a:br>
+              <a:t>Diverse </a:t>
+            </a:r>
+            <a:r>
               <a:rPr lang="de-CH" dirty="0" smtClean="0"/>
-            </a:br>
-            <a:r>
-              <a:rPr lang="de-CH" dirty="0" smtClean="0"/>
-              <a:t>Hilfsfunktionen</a:t>
-            </a:r>
+              <a:t>andere Hilfsfunktionen („Logik“ – Funktionen)</a:t>
+            </a:r>
+            <a:endParaRPr lang="de-CH" dirty="0" smtClean="0"/>
           </a:p>
           <a:p>
             <a:endParaRPr lang="de-CH" dirty="0" smtClean="0"/>
@@ -8792,7 +8597,7 @@
     </p:spTree>
     <p:extLst>
       <p:ext uri="{BB962C8B-B14F-4D97-AF65-F5344CB8AC3E}">
-        <p14:creationId xmlns:p14="http://schemas.microsoft.com/office/powerpoint/2010/main" val="3950922658"/>
+        <p14:creationId xmlns:p14="http://schemas.microsoft.com/office/powerpoint/2010/main" xmlns="" val="3950922658"/>
       </p:ext>
     </p:extLst>
   </p:cSld>
@@ -9069,7 +8874,11 @@
               <a:t>Grafik-Funktionen  (Modul </a:t>
             </a:r>
             <a:r>
-              <a:rPr lang="de-CH" dirty="0" err="1" smtClean="0"/>
+              <a:rPr lang="de-CH" dirty="0" smtClean="0"/>
+              <a:t> </a:t>
+            </a:r>
+            <a:r>
+              <a:rPr lang="de-CH" i="1" dirty="0" err="1" smtClean="0"/>
               <a:t>Grafik.c</a:t>
             </a:r>
             <a:r>
@@ -9092,7 +8901,9 @@
         </p:nvSpPr>
         <p:spPr/>
         <p:txBody>
-          <a:bodyPr/>
+          <a:bodyPr>
+            <a:normAutofit/>
+          </a:bodyPr>
           <a:lstStyle/>
           <a:p>
             <a:r>
@@ -9118,8 +8929,13 @@
             <a:pPr lvl="1"/>
             <a:r>
               <a:rPr lang="de-CH" dirty="0" smtClean="0"/>
-              <a:t>Figuren löschen</a:t>
-            </a:r>
+              <a:t>Figuren </a:t>
+            </a:r>
+            <a:r>
+              <a:rPr lang="de-CH" dirty="0" smtClean="0"/>
+              <a:t>löschen (und Zerstörung zeichnen)</a:t>
+            </a:r>
+            <a:endParaRPr lang="de-CH" dirty="0" smtClean="0"/>
           </a:p>
           <a:p>
             <a:pPr lvl="1"/>
@@ -9148,25 +8964,33 @@
           </a:p>
           <a:p>
             <a:pPr lvl="1"/>
-            <a:endParaRPr lang="de-CH" dirty="0"/>
+            <a:r>
+              <a:rPr lang="de-CH" dirty="0" smtClean="0"/>
+              <a:t>Koordinaten-Umwandlung </a:t>
+            </a:r>
+            <a:r>
+              <a:rPr lang="de-CH" dirty="0" err="1" smtClean="0"/>
+              <a:t>Map</a:t>
+            </a:r>
+            <a:r>
+              <a:rPr lang="de-CH" dirty="0" smtClean="0"/>
+              <a:t> </a:t>
+            </a:r>
+            <a:r>
+              <a:rPr lang="de-CH" dirty="0" smtClean="0">
+                <a:sym typeface="Wingdings" pitchFamily="2" charset="2"/>
+              </a:rPr>
+              <a:t> Pixel</a:t>
+            </a:r>
           </a:p>
           <a:p>
             <a:pPr lvl="1"/>
             <a:r>
-              <a:rPr lang="de-CH" dirty="0" err="1" smtClean="0"/>
-              <a:t>chäser</a:t>
-            </a:r>
-            <a:r>
-              <a:rPr lang="de-CH" dirty="0" smtClean="0"/>
-              <a:t>: </a:t>
-            </a:r>
-            <a:r>
-              <a:rPr lang="de-CH" dirty="0" err="1" smtClean="0"/>
-              <a:t>prooven</a:t>
-            </a:r>
-            <a:endParaRPr lang="de-CH" dirty="0" smtClean="0"/>
-          </a:p>
-          <a:p>
+              <a:rPr lang="de-CH" dirty="0" smtClean="0">
+                <a:sym typeface="Wingdings" pitchFamily="2" charset="2"/>
+              </a:rPr>
+              <a:t>Gewinner-Text anzeigen</a:t>
+            </a:r>
             <a:endParaRPr lang="de-CH" dirty="0" smtClean="0"/>
           </a:p>
           <a:p>
@@ -9177,7 +9001,7 @@
     </p:spTree>
     <p:extLst>
       <p:ext uri="{BB962C8B-B14F-4D97-AF65-F5344CB8AC3E}">
-        <p14:creationId xmlns:p14="http://schemas.microsoft.com/office/powerpoint/2010/main" val="1184306671"/>
+        <p14:creationId xmlns:p14="http://schemas.microsoft.com/office/powerpoint/2010/main" xmlns="" val="1184306671"/>
       </p:ext>
     </p:extLst>
   </p:cSld>
@@ -9254,25 +9078,28 @@
             <a:off x="1763688" y="1268760"/>
             <a:ext cx="5774907" cy="3457816"/>
           </a:xfrm>
-          <a:prstGeom prst="rect">
-            <a:avLst/>
+          <a:prstGeom prst="roundRect">
+            <a:avLst>
+              <a:gd name="adj" fmla="val 2258"/>
+            </a:avLst>
           </a:prstGeom>
+          <a:solidFill>
+            <a:srgbClr val="FFFFFF">
+              <a:shade val="85000"/>
+            </a:srgbClr>
+          </a:solidFill>
           <a:ln>
             <a:noFill/>
           </a:ln>
           <a:effectLst>
-            <a:outerShdw blurRad="292100" dist="139700" dir="2700000" algn="tl" rotWithShape="0">
-              <a:srgbClr val="333333">
-                <a:alpha val="65000"/>
-              </a:srgbClr>
-            </a:outerShdw>
+            <a:reflection blurRad="12700" stA="38000" endPos="28000" dist="5000" dir="5400000" sy="-100000" algn="bl" rotWithShape="0"/>
           </a:effectLst>
         </p:spPr>
       </p:pic>
     </p:spTree>
     <p:extLst>
       <p:ext uri="{BB962C8B-B14F-4D97-AF65-F5344CB8AC3E}">
-        <p14:creationId xmlns:p14="http://schemas.microsoft.com/office/powerpoint/2010/main" val="3199722868"/>
+        <p14:creationId xmlns:p14="http://schemas.microsoft.com/office/powerpoint/2010/main" xmlns="" val="3199722868"/>
       </p:ext>
     </p:extLst>
   </p:cSld>

</xml_diff>

<commit_message>
edited PPTX for TODAY
</commit_message>
<xml_diff>
--- a/docs/LaserChess.pptx
+++ b/docs/LaserChess.pptx
@@ -13,7 +13,7 @@
     <p:sldId id="258" r:id="rId4"/>
     <p:sldId id="259" r:id="rId5"/>
     <p:sldId id="260" r:id="rId6"/>
-    <p:sldId id="261" r:id="rId7"/>
+    <p:sldId id="269" r:id="rId7"/>
     <p:sldId id="262" r:id="rId8"/>
     <p:sldId id="263" r:id="rId9"/>
     <p:sldId id="268" r:id="rId10"/>
@@ -205,7 +205,7 @@
             <a:fld id="{9CCF7261-FAE9-431D-A535-F0D32AAE8354}" type="datetimeFigureOut">
               <a:rPr lang="de-CH" smtClean="0"/>
               <a:pPr/>
-              <a:t>26.04.2012</a:t>
+              <a:t>27.04.2012</a:t>
             </a:fld>
             <a:endParaRPr lang="de-CH"/>
           </a:p>
@@ -376,7 +376,7 @@
     </p:spTree>
     <p:extLst>
       <p:ext uri="{BB962C8B-B14F-4D97-AF65-F5344CB8AC3E}">
-        <p14:creationId xmlns:p14="http://schemas.microsoft.com/office/powerpoint/2010/main" xmlns="" val="352693751"/>
+        <p14:creationId xmlns:p14="http://schemas.microsoft.com/office/powerpoint/2010/main" val="352693751"/>
       </p:ext>
     </p:extLst>
   </p:cSld>
@@ -1477,7 +1477,7 @@
             <a:fld id="{0B8AC65F-F2B9-4AE9-880A-F19E8D9538B7}" type="datetimeFigureOut">
               <a:rPr lang="de-CH" smtClean="0"/>
               <a:pPr/>
-              <a:t>26.04.2012</a:t>
+              <a:t>27.04.2012</a:t>
             </a:fld>
             <a:endParaRPr lang="de-CH"/>
           </a:p>
@@ -1795,7 +1795,7 @@
             <a:fld id="{0B8AC65F-F2B9-4AE9-880A-F19E8D9538B7}" type="datetimeFigureOut">
               <a:rPr lang="de-CH" smtClean="0"/>
               <a:pPr/>
-              <a:t>26.04.2012</a:t>
+              <a:t>27.04.2012</a:t>
             </a:fld>
             <a:endParaRPr lang="de-CH"/>
           </a:p>
@@ -1972,7 +1972,7 @@
             <a:fld id="{0B8AC65F-F2B9-4AE9-880A-F19E8D9538B7}" type="datetimeFigureOut">
               <a:rPr lang="de-CH" smtClean="0"/>
               <a:pPr/>
-              <a:t>26.04.2012</a:t>
+              <a:t>27.04.2012</a:t>
             </a:fld>
             <a:endParaRPr lang="de-CH"/>
           </a:p>
@@ -2092,7 +2092,7 @@
             <a:fld id="{0B8AC65F-F2B9-4AE9-880A-F19E8D9538B7}" type="datetimeFigureOut">
               <a:rPr lang="de-CH" smtClean="0"/>
               <a:pPr/>
-              <a:t>26.04.2012</a:t>
+              <a:t>27.04.2012</a:t>
             </a:fld>
             <a:endParaRPr lang="de-CH"/>
           </a:p>
@@ -2392,7 +2392,7 @@
             <a:fld id="{0B8AC65F-F2B9-4AE9-880A-F19E8D9538B7}" type="datetimeFigureOut">
               <a:rPr lang="de-CH" smtClean="0"/>
               <a:pPr/>
-              <a:t>26.04.2012</a:t>
+              <a:t>27.04.2012</a:t>
             </a:fld>
             <a:endParaRPr lang="de-CH"/>
           </a:p>
@@ -2687,7 +2687,7 @@
             <a:fld id="{0B8AC65F-F2B9-4AE9-880A-F19E8D9538B7}" type="datetimeFigureOut">
               <a:rPr lang="de-CH" smtClean="0"/>
               <a:pPr/>
-              <a:t>26.04.2012</a:t>
+              <a:t>27.04.2012</a:t>
             </a:fld>
             <a:endParaRPr lang="de-CH"/>
           </a:p>
@@ -3117,7 +3117,7 @@
             <a:fld id="{0B8AC65F-F2B9-4AE9-880A-F19E8D9538B7}" type="datetimeFigureOut">
               <a:rPr lang="de-CH" smtClean="0"/>
               <a:pPr/>
-              <a:t>26.04.2012</a:t>
+              <a:t>27.04.2012</a:t>
             </a:fld>
             <a:endParaRPr lang="de-CH"/>
           </a:p>
@@ -3237,7 +3237,7 @@
             <a:fld id="{0B8AC65F-F2B9-4AE9-880A-F19E8D9538B7}" type="datetimeFigureOut">
               <a:rPr lang="de-CH" smtClean="0"/>
               <a:pPr/>
-              <a:t>26.04.2012</a:t>
+              <a:t>27.04.2012</a:t>
             </a:fld>
             <a:endParaRPr lang="de-CH"/>
           </a:p>
@@ -3329,7 +3329,7 @@
             <a:fld id="{0B8AC65F-F2B9-4AE9-880A-F19E8D9538B7}" type="datetimeFigureOut">
               <a:rPr lang="de-CH" smtClean="0"/>
               <a:pPr/>
-              <a:t>26.04.2012</a:t>
+              <a:t>27.04.2012</a:t>
             </a:fld>
             <a:endParaRPr lang="de-CH"/>
           </a:p>
@@ -3581,7 +3581,7 @@
             <a:fld id="{0B8AC65F-F2B9-4AE9-880A-F19E8D9538B7}" type="datetimeFigureOut">
               <a:rPr lang="de-CH" smtClean="0"/>
               <a:pPr/>
-              <a:t>26.04.2012</a:t>
+              <a:t>27.04.2012</a:t>
             </a:fld>
             <a:endParaRPr lang="de-CH"/>
           </a:p>
@@ -4099,7 +4099,7 @@
             <a:fld id="{0B8AC65F-F2B9-4AE9-880A-F19E8D9538B7}" type="datetimeFigureOut">
               <a:rPr lang="de-CH" smtClean="0"/>
               <a:pPr/>
-              <a:t>26.04.2012</a:t>
+              <a:t>27.04.2012</a:t>
             </a:fld>
             <a:endParaRPr lang="de-CH"/>
           </a:p>
@@ -4331,7 +4331,7 @@
             <a:fld id="{0B8AC65F-F2B9-4AE9-880A-F19E8D9538B7}" type="datetimeFigureOut">
               <a:rPr lang="de-CH" smtClean="0"/>
               <a:pPr/>
-              <a:t>26.04.2012</a:t>
+              <a:t>27.04.2012</a:t>
             </a:fld>
             <a:endParaRPr lang="de-CH"/>
           </a:p>
@@ -5110,7 +5110,7 @@
     </p:spTree>
     <p:extLst>
       <p:ext uri="{BB962C8B-B14F-4D97-AF65-F5344CB8AC3E}">
-        <p14:creationId xmlns:p14="http://schemas.microsoft.com/office/powerpoint/2010/main" xmlns="" val="1704400666"/>
+        <p14:creationId xmlns:p14="http://schemas.microsoft.com/office/powerpoint/2010/main" val="1704400666"/>
       </p:ext>
     </p:extLst>
   </p:cSld>
@@ -5879,18 +5879,7 @@
                 <a:ea typeface="Calibri"/>
                 <a:cs typeface="Times New Roman"/>
               </a:rPr>
-              <a:t>//return </a:t>
-            </a:r>
-            <a:r>
-              <a:rPr lang="en-US" sz="1200" b="1" dirty="0" smtClean="0">
-                <a:solidFill>
-                  <a:srgbClr val="3F7F5F"/>
-                </a:solidFill>
-                <a:latin typeface="Courier New"/>
-                <a:ea typeface="Calibri"/>
-                <a:cs typeface="Times New Roman"/>
-              </a:rPr>
-              <a:t>1 if (0 &lt;= </a:t>
+              <a:t>//return 1 if (0 &lt;= </a:t>
             </a:r>
             <a:r>
               <a:rPr lang="en-US" sz="1200" b="1" dirty="0" err="1" smtClean="0">
@@ -5912,29 +5901,7 @@
                 <a:ea typeface="Calibri"/>
                 <a:cs typeface="Times New Roman"/>
               </a:rPr>
-              <a:t> &lt; PLAYGROUND_X_MAX) </a:t>
-            </a:r>
-            <a:r>
-              <a:rPr lang="en-US" sz="1200" b="1" dirty="0" smtClean="0">
-                <a:solidFill>
-                  <a:srgbClr val="3F7F5F"/>
-                </a:solidFill>
-                <a:latin typeface="Courier New"/>
-                <a:ea typeface="Calibri"/>
-                <a:cs typeface="Times New Roman"/>
-              </a:rPr>
-              <a:t>and (0 </a:t>
-            </a:r>
-            <a:r>
-              <a:rPr lang="en-US" sz="1200" b="1" dirty="0" smtClean="0">
-                <a:solidFill>
-                  <a:srgbClr val="3F7F5F"/>
-                </a:solidFill>
-                <a:latin typeface="Courier New"/>
-                <a:ea typeface="Calibri"/>
-                <a:cs typeface="Times New Roman"/>
-              </a:rPr>
-              <a:t>&lt;= </a:t>
+              <a:t> &lt; PLAYGROUND_X_MAX) and (0 &lt;= </a:t>
             </a:r>
             <a:r>
               <a:rPr lang="en-US" sz="1200" b="1" dirty="0" err="1" smtClean="0">
@@ -6077,17 +6044,7 @@
                 <a:latin typeface="Courier New"/>
                 <a:ea typeface="Calibri"/>
               </a:rPr>
-              <a:t>//return </a:t>
-            </a:r>
-            <a:r>
-              <a:rPr lang="en-US" sz="1200" b="1" dirty="0" smtClean="0">
-                <a:solidFill>
-                  <a:srgbClr val="3F7F5F"/>
-                </a:solidFill>
-                <a:latin typeface="Courier New"/>
-                <a:ea typeface="Calibri"/>
-              </a:rPr>
-              <a:t>!((</a:t>
+              <a:t>//return !((</a:t>
             </a:r>
             <a:r>
               <a:rPr lang="en-US" sz="1200" b="1" dirty="0" err="1" smtClean="0">
@@ -6127,17 +6084,7 @@
                 <a:latin typeface="Courier New"/>
                 <a:ea typeface="Calibri"/>
               </a:rPr>
-              <a:t>&gt;PLAYGROUND_Y_MAX</a:t>
-            </a:r>
-            <a:r>
-              <a:rPr lang="en-US" sz="1200" b="1" dirty="0" smtClean="0">
-                <a:solidFill>
-                  <a:srgbClr val="3F7F5F"/>
-                </a:solidFill>
-                <a:latin typeface="Courier New"/>
-                <a:ea typeface="Calibri"/>
-              </a:rPr>
-              <a:t>)||(</a:t>
+              <a:t>&gt;PLAYGROUND_Y_MAX)||(</a:t>
             </a:r>
             <a:r>
               <a:rPr lang="en-US" sz="1200" b="1" dirty="0" err="1" smtClean="0">
@@ -6224,7 +6171,7 @@
     </p:spTree>
     <p:extLst>
       <p:ext uri="{BB962C8B-B14F-4D97-AF65-F5344CB8AC3E}">
-        <p14:creationId xmlns:p14="http://schemas.microsoft.com/office/powerpoint/2010/main" xmlns="" val="3199722868"/>
+        <p14:creationId xmlns:p14="http://schemas.microsoft.com/office/powerpoint/2010/main" val="3199722868"/>
       </p:ext>
     </p:extLst>
   </p:cSld>
@@ -6773,7 +6720,7 @@
     </p:spTree>
     <p:extLst>
       <p:ext uri="{BB962C8B-B14F-4D97-AF65-F5344CB8AC3E}">
-        <p14:creationId xmlns:p14="http://schemas.microsoft.com/office/powerpoint/2010/main" xmlns="" val="3199722868"/>
+        <p14:creationId xmlns:p14="http://schemas.microsoft.com/office/powerpoint/2010/main" val="3199722868"/>
       </p:ext>
     </p:extLst>
   </p:cSld>
@@ -7314,11 +7261,7 @@
           <a:p>
             <a:r>
               <a:rPr lang="de-CH" dirty="0" smtClean="0"/>
-              <a:t>Gefundene Fehler notiert und teilweise </a:t>
-            </a:r>
-            <a:r>
-              <a:rPr lang="de-CH" dirty="0" smtClean="0"/>
-              <a:t>behoben</a:t>
+              <a:t>Gefundene Fehler notiert und teilweise behoben</a:t>
             </a:r>
           </a:p>
           <a:p>
@@ -7447,7 +7390,7 @@
     </p:spTree>
     <p:extLst>
       <p:ext uri="{BB962C8B-B14F-4D97-AF65-F5344CB8AC3E}">
-        <p14:creationId xmlns:p14="http://schemas.microsoft.com/office/powerpoint/2010/main" xmlns="" val="1300663606"/>
+        <p14:creationId xmlns:p14="http://schemas.microsoft.com/office/powerpoint/2010/main" val="1300663606"/>
       </p:ext>
     </p:extLst>
   </p:cSld>
@@ -7457,9 +7400,334 @@
   <p:timing>
     <p:tnLst>
       <p:par>
-        <p:cTn id="1" dur="indefinite" restart="never" nodeType="tmRoot"/>
+        <p:cTn id="1" dur="indefinite" restart="never" nodeType="tmRoot">
+          <p:childTnLst>
+            <p:seq concurrent="1" nextAc="seek">
+              <p:cTn id="2" dur="indefinite" nodeType="mainSeq">
+                <p:childTnLst>
+                  <p:par>
+                    <p:cTn id="3" fill="hold">
+                      <p:stCondLst>
+                        <p:cond delay="indefinite"/>
+                      </p:stCondLst>
+                      <p:childTnLst>
+                        <p:par>
+                          <p:cTn id="4" fill="hold">
+                            <p:stCondLst>
+                              <p:cond delay="0"/>
+                            </p:stCondLst>
+                            <p:childTnLst>
+                              <p:par>
+                                <p:cTn id="5" presetID="1" presetClass="entr" presetSubtype="0" fill="hold" grpId="0" nodeType="clickEffect">
+                                  <p:stCondLst>
+                                    <p:cond delay="0"/>
+                                  </p:stCondLst>
+                                  <p:childTnLst>
+                                    <p:set>
+                                      <p:cBhvr>
+                                        <p:cTn id="6" dur="1" fill="hold">
+                                          <p:stCondLst>
+                                            <p:cond delay="0"/>
+                                          </p:stCondLst>
+                                        </p:cTn>
+                                        <p:tgtEl>
+                                          <p:spTgt spid="3">
+                                            <p:txEl>
+                                              <p:pRg st="0" end="0"/>
+                                            </p:txEl>
+                                          </p:spTgt>
+                                        </p:tgtEl>
+                                        <p:attrNameLst>
+                                          <p:attrName>style.visibility</p:attrName>
+                                        </p:attrNameLst>
+                                      </p:cBhvr>
+                                      <p:to>
+                                        <p:strVal val="visible"/>
+                                      </p:to>
+                                    </p:set>
+                                  </p:childTnLst>
+                                </p:cTn>
+                              </p:par>
+                              <p:par>
+                                <p:cTn id="7" presetID="1" presetClass="entr" presetSubtype="0" fill="hold" nodeType="withEffect">
+                                  <p:stCondLst>
+                                    <p:cond delay="0"/>
+                                  </p:stCondLst>
+                                  <p:childTnLst>
+                                    <p:set>
+                                      <p:cBhvr>
+                                        <p:cTn id="8" dur="1" fill="hold">
+                                          <p:stCondLst>
+                                            <p:cond delay="0"/>
+                                          </p:stCondLst>
+                                        </p:cTn>
+                                        <p:tgtEl>
+                                          <p:spTgt spid="20482"/>
+                                        </p:tgtEl>
+                                        <p:attrNameLst>
+                                          <p:attrName>style.visibility</p:attrName>
+                                        </p:attrNameLst>
+                                      </p:cBhvr>
+                                      <p:to>
+                                        <p:strVal val="visible"/>
+                                      </p:to>
+                                    </p:set>
+                                  </p:childTnLst>
+                                </p:cTn>
+                              </p:par>
+                            </p:childTnLst>
+                          </p:cTn>
+                        </p:par>
+                      </p:childTnLst>
+                    </p:cTn>
+                  </p:par>
+                  <p:par>
+                    <p:cTn id="9" fill="hold">
+                      <p:stCondLst>
+                        <p:cond delay="indefinite"/>
+                      </p:stCondLst>
+                      <p:childTnLst>
+                        <p:par>
+                          <p:cTn id="10" fill="hold">
+                            <p:stCondLst>
+                              <p:cond delay="0"/>
+                            </p:stCondLst>
+                            <p:childTnLst>
+                              <p:par>
+                                <p:cTn id="11" presetID="1" presetClass="entr" presetSubtype="0" fill="hold" grpId="0" nodeType="clickEffect">
+                                  <p:stCondLst>
+                                    <p:cond delay="0"/>
+                                  </p:stCondLst>
+                                  <p:childTnLst>
+                                    <p:set>
+                                      <p:cBhvr>
+                                        <p:cTn id="12" dur="1" fill="hold">
+                                          <p:stCondLst>
+                                            <p:cond delay="0"/>
+                                          </p:stCondLst>
+                                        </p:cTn>
+                                        <p:tgtEl>
+                                          <p:spTgt spid="3">
+                                            <p:txEl>
+                                              <p:pRg st="1" end="1"/>
+                                            </p:txEl>
+                                          </p:spTgt>
+                                        </p:tgtEl>
+                                        <p:attrNameLst>
+                                          <p:attrName>style.visibility</p:attrName>
+                                        </p:attrNameLst>
+                                      </p:cBhvr>
+                                      <p:to>
+                                        <p:strVal val="visible"/>
+                                      </p:to>
+                                    </p:set>
+                                  </p:childTnLst>
+                                </p:cTn>
+                              </p:par>
+                            </p:childTnLst>
+                          </p:cTn>
+                        </p:par>
+                      </p:childTnLst>
+                    </p:cTn>
+                  </p:par>
+                  <p:par>
+                    <p:cTn id="13" fill="hold">
+                      <p:stCondLst>
+                        <p:cond delay="indefinite"/>
+                      </p:stCondLst>
+                      <p:childTnLst>
+                        <p:par>
+                          <p:cTn id="14" fill="hold">
+                            <p:stCondLst>
+                              <p:cond delay="0"/>
+                            </p:stCondLst>
+                            <p:childTnLst>
+                              <p:par>
+                                <p:cTn id="15" presetID="1" presetClass="entr" presetSubtype="0" fill="hold" grpId="0" nodeType="clickEffect">
+                                  <p:stCondLst>
+                                    <p:cond delay="0"/>
+                                  </p:stCondLst>
+                                  <p:childTnLst>
+                                    <p:set>
+                                      <p:cBhvr>
+                                        <p:cTn id="16" dur="1" fill="hold">
+                                          <p:stCondLst>
+                                            <p:cond delay="0"/>
+                                          </p:stCondLst>
+                                        </p:cTn>
+                                        <p:tgtEl>
+                                          <p:spTgt spid="3">
+                                            <p:txEl>
+                                              <p:pRg st="2" end="2"/>
+                                            </p:txEl>
+                                          </p:spTgt>
+                                        </p:tgtEl>
+                                        <p:attrNameLst>
+                                          <p:attrName>style.visibility</p:attrName>
+                                        </p:attrNameLst>
+                                      </p:cBhvr>
+                                      <p:to>
+                                        <p:strVal val="visible"/>
+                                      </p:to>
+                                    </p:set>
+                                  </p:childTnLst>
+                                </p:cTn>
+                              </p:par>
+                            </p:childTnLst>
+                          </p:cTn>
+                        </p:par>
+                      </p:childTnLst>
+                    </p:cTn>
+                  </p:par>
+                  <p:par>
+                    <p:cTn id="17" fill="hold">
+                      <p:stCondLst>
+                        <p:cond delay="indefinite"/>
+                      </p:stCondLst>
+                      <p:childTnLst>
+                        <p:par>
+                          <p:cTn id="18" fill="hold">
+                            <p:stCondLst>
+                              <p:cond delay="0"/>
+                            </p:stCondLst>
+                            <p:childTnLst>
+                              <p:par>
+                                <p:cTn id="19" presetID="1" presetClass="entr" presetSubtype="0" fill="hold" grpId="0" nodeType="clickEffect">
+                                  <p:stCondLst>
+                                    <p:cond delay="0"/>
+                                  </p:stCondLst>
+                                  <p:childTnLst>
+                                    <p:set>
+                                      <p:cBhvr>
+                                        <p:cTn id="20" dur="1" fill="hold">
+                                          <p:stCondLst>
+                                            <p:cond delay="0"/>
+                                          </p:stCondLst>
+                                        </p:cTn>
+                                        <p:tgtEl>
+                                          <p:spTgt spid="3">
+                                            <p:txEl>
+                                              <p:pRg st="3" end="3"/>
+                                            </p:txEl>
+                                          </p:spTgt>
+                                        </p:tgtEl>
+                                        <p:attrNameLst>
+                                          <p:attrName>style.visibility</p:attrName>
+                                        </p:attrNameLst>
+                                      </p:cBhvr>
+                                      <p:to>
+                                        <p:strVal val="visible"/>
+                                      </p:to>
+                                    </p:set>
+                                  </p:childTnLst>
+                                </p:cTn>
+                              </p:par>
+                            </p:childTnLst>
+                          </p:cTn>
+                        </p:par>
+                      </p:childTnLst>
+                    </p:cTn>
+                  </p:par>
+                  <p:par>
+                    <p:cTn id="21" fill="hold">
+                      <p:stCondLst>
+                        <p:cond delay="indefinite"/>
+                      </p:stCondLst>
+                      <p:childTnLst>
+                        <p:par>
+                          <p:cTn id="22" fill="hold">
+                            <p:stCondLst>
+                              <p:cond delay="0"/>
+                            </p:stCondLst>
+                            <p:childTnLst>
+                              <p:par>
+                                <p:cTn id="23" presetID="1" presetClass="entr" presetSubtype="0" fill="hold" grpId="0" nodeType="clickEffect">
+                                  <p:stCondLst>
+                                    <p:cond delay="0"/>
+                                  </p:stCondLst>
+                                  <p:childTnLst>
+                                    <p:set>
+                                      <p:cBhvr>
+                                        <p:cTn id="24" dur="1" fill="hold">
+                                          <p:stCondLst>
+                                            <p:cond delay="0"/>
+                                          </p:stCondLst>
+                                        </p:cTn>
+                                        <p:tgtEl>
+                                          <p:spTgt spid="3">
+                                            <p:txEl>
+                                              <p:pRg st="4" end="4"/>
+                                            </p:txEl>
+                                          </p:spTgt>
+                                        </p:tgtEl>
+                                        <p:attrNameLst>
+                                          <p:attrName>style.visibility</p:attrName>
+                                        </p:attrNameLst>
+                                      </p:cBhvr>
+                                      <p:to>
+                                        <p:strVal val="visible"/>
+                                      </p:to>
+                                    </p:set>
+                                  </p:childTnLst>
+                                </p:cTn>
+                              </p:par>
+                              <p:par>
+                                <p:cTn id="25" presetID="1" presetClass="entr" presetSubtype="0" fill="hold" nodeType="withEffect">
+                                  <p:stCondLst>
+                                    <p:cond delay="0"/>
+                                  </p:stCondLst>
+                                  <p:childTnLst>
+                                    <p:set>
+                                      <p:cBhvr>
+                                        <p:cTn id="26" dur="1" fill="hold">
+                                          <p:stCondLst>
+                                            <p:cond delay="0"/>
+                                          </p:stCondLst>
+                                        </p:cTn>
+                                        <p:tgtEl>
+                                          <p:spTgt spid="20485"/>
+                                        </p:tgtEl>
+                                        <p:attrNameLst>
+                                          <p:attrName>style.visibility</p:attrName>
+                                        </p:attrNameLst>
+                                      </p:cBhvr>
+                                      <p:to>
+                                        <p:strVal val="visible"/>
+                                      </p:to>
+                                    </p:set>
+                                  </p:childTnLst>
+                                </p:cTn>
+                              </p:par>
+                            </p:childTnLst>
+                          </p:cTn>
+                        </p:par>
+                      </p:childTnLst>
+                    </p:cTn>
+                  </p:par>
+                </p:childTnLst>
+              </p:cTn>
+              <p:prevCondLst>
+                <p:cond evt="onPrev" delay="0">
+                  <p:tgtEl>
+                    <p:sldTgt/>
+                  </p:tgtEl>
+                </p:cond>
+              </p:prevCondLst>
+              <p:nextCondLst>
+                <p:cond evt="onNext" delay="0">
+                  <p:tgtEl>
+                    <p:sldTgt/>
+                  </p:tgtEl>
+                </p:cond>
+              </p:nextCondLst>
+            </p:seq>
+          </p:childTnLst>
+        </p:cTn>
       </p:par>
     </p:tnLst>
+    <p:bldLst>
+      <p:bldP spid="3" grpId="0" uiExpand="1" build="p"/>
+    </p:bldLst>
   </p:timing>
 </p:sld>
 </file>
@@ -7576,7 +7844,7 @@
     </p:spTree>
     <p:extLst>
       <p:ext uri="{BB962C8B-B14F-4D97-AF65-F5344CB8AC3E}">
-        <p14:creationId xmlns:p14="http://schemas.microsoft.com/office/powerpoint/2010/main" xmlns="" val="1595990863"/>
+        <p14:creationId xmlns:p14="http://schemas.microsoft.com/office/powerpoint/2010/main" val="1595990863"/>
       </p:ext>
     </p:extLst>
   </p:cSld>
@@ -7723,7 +7991,7 @@
     </p:spTree>
     <p:extLst>
       <p:ext uri="{BB962C8B-B14F-4D97-AF65-F5344CB8AC3E}">
-        <p14:creationId xmlns:p14="http://schemas.microsoft.com/office/powerpoint/2010/main" xmlns="" val="1387166899"/>
+        <p14:creationId xmlns:p14="http://schemas.microsoft.com/office/powerpoint/2010/main" val="1387166899"/>
       </p:ext>
     </p:extLst>
   </p:cSld>
@@ -7733,9 +8001,453 @@
   <p:timing>
     <p:tnLst>
       <p:par>
-        <p:cTn id="1" dur="indefinite" restart="never" nodeType="tmRoot"/>
+        <p:cTn id="1" dur="indefinite" restart="never" nodeType="tmRoot">
+          <p:childTnLst>
+            <p:seq concurrent="1" nextAc="seek">
+              <p:cTn id="2" dur="indefinite" nodeType="mainSeq">
+                <p:childTnLst>
+                  <p:par>
+                    <p:cTn id="3" fill="hold">
+                      <p:stCondLst>
+                        <p:cond delay="indefinite"/>
+                      </p:stCondLst>
+                      <p:childTnLst>
+                        <p:par>
+                          <p:cTn id="4" fill="hold">
+                            <p:stCondLst>
+                              <p:cond delay="0"/>
+                            </p:stCondLst>
+                            <p:childTnLst>
+                              <p:par>
+                                <p:cTn id="5" presetID="1" presetClass="entr" presetSubtype="0" fill="hold" grpId="0" nodeType="clickEffect">
+                                  <p:stCondLst>
+                                    <p:cond delay="0"/>
+                                  </p:stCondLst>
+                                  <p:childTnLst>
+                                    <p:set>
+                                      <p:cBhvr>
+                                        <p:cTn id="6" dur="1" fill="hold">
+                                          <p:stCondLst>
+                                            <p:cond delay="0"/>
+                                          </p:stCondLst>
+                                        </p:cTn>
+                                        <p:tgtEl>
+                                          <p:spTgt spid="3">
+                                            <p:txEl>
+                                              <p:pRg st="0" end="0"/>
+                                            </p:txEl>
+                                          </p:spTgt>
+                                        </p:tgtEl>
+                                        <p:attrNameLst>
+                                          <p:attrName>style.visibility</p:attrName>
+                                        </p:attrNameLst>
+                                      </p:cBhvr>
+                                      <p:to>
+                                        <p:strVal val="visible"/>
+                                      </p:to>
+                                    </p:set>
+                                  </p:childTnLst>
+                                </p:cTn>
+                              </p:par>
+                            </p:childTnLst>
+                          </p:cTn>
+                        </p:par>
+                      </p:childTnLst>
+                    </p:cTn>
+                  </p:par>
+                  <p:par>
+                    <p:cTn id="7" fill="hold">
+                      <p:stCondLst>
+                        <p:cond delay="indefinite"/>
+                      </p:stCondLst>
+                      <p:childTnLst>
+                        <p:par>
+                          <p:cTn id="8" fill="hold">
+                            <p:stCondLst>
+                              <p:cond delay="0"/>
+                            </p:stCondLst>
+                            <p:childTnLst>
+                              <p:par>
+                                <p:cTn id="9" presetID="1" presetClass="entr" presetSubtype="0" fill="hold" grpId="0" nodeType="clickEffect">
+                                  <p:stCondLst>
+                                    <p:cond delay="0"/>
+                                  </p:stCondLst>
+                                  <p:childTnLst>
+                                    <p:set>
+                                      <p:cBhvr>
+                                        <p:cTn id="10" dur="1" fill="hold">
+                                          <p:stCondLst>
+                                            <p:cond delay="0"/>
+                                          </p:stCondLst>
+                                        </p:cTn>
+                                        <p:tgtEl>
+                                          <p:spTgt spid="3">
+                                            <p:txEl>
+                                              <p:pRg st="1" end="1"/>
+                                            </p:txEl>
+                                          </p:spTgt>
+                                        </p:tgtEl>
+                                        <p:attrNameLst>
+                                          <p:attrName>style.visibility</p:attrName>
+                                        </p:attrNameLst>
+                                      </p:cBhvr>
+                                      <p:to>
+                                        <p:strVal val="visible"/>
+                                      </p:to>
+                                    </p:set>
+                                  </p:childTnLst>
+                                </p:cTn>
+                              </p:par>
+                            </p:childTnLst>
+                          </p:cTn>
+                        </p:par>
+                      </p:childTnLst>
+                    </p:cTn>
+                  </p:par>
+                  <p:par>
+                    <p:cTn id="11" fill="hold">
+                      <p:stCondLst>
+                        <p:cond delay="indefinite"/>
+                      </p:stCondLst>
+                      <p:childTnLst>
+                        <p:par>
+                          <p:cTn id="12" fill="hold">
+                            <p:stCondLst>
+                              <p:cond delay="0"/>
+                            </p:stCondLst>
+                            <p:childTnLst>
+                              <p:par>
+                                <p:cTn id="13" presetID="1" presetClass="entr" presetSubtype="0" fill="hold" grpId="0" nodeType="clickEffect">
+                                  <p:stCondLst>
+                                    <p:cond delay="0"/>
+                                  </p:stCondLst>
+                                  <p:childTnLst>
+                                    <p:set>
+                                      <p:cBhvr>
+                                        <p:cTn id="14" dur="1" fill="hold">
+                                          <p:stCondLst>
+                                            <p:cond delay="0"/>
+                                          </p:stCondLst>
+                                        </p:cTn>
+                                        <p:tgtEl>
+                                          <p:spTgt spid="3">
+                                            <p:txEl>
+                                              <p:pRg st="2" end="2"/>
+                                            </p:txEl>
+                                          </p:spTgt>
+                                        </p:tgtEl>
+                                        <p:attrNameLst>
+                                          <p:attrName>style.visibility</p:attrName>
+                                        </p:attrNameLst>
+                                      </p:cBhvr>
+                                      <p:to>
+                                        <p:strVal val="visible"/>
+                                      </p:to>
+                                    </p:set>
+                                  </p:childTnLst>
+                                </p:cTn>
+                              </p:par>
+                              <p:par>
+                                <p:cTn id="15" presetID="1" presetClass="entr" presetSubtype="0" fill="hold" grpId="0" nodeType="withEffect">
+                                  <p:stCondLst>
+                                    <p:cond delay="0"/>
+                                  </p:stCondLst>
+                                  <p:childTnLst>
+                                    <p:set>
+                                      <p:cBhvr>
+                                        <p:cTn id="16" dur="1" fill="hold">
+                                          <p:stCondLst>
+                                            <p:cond delay="0"/>
+                                          </p:stCondLst>
+                                        </p:cTn>
+                                        <p:tgtEl>
+                                          <p:spTgt spid="3">
+                                            <p:txEl>
+                                              <p:pRg st="3" end="3"/>
+                                            </p:txEl>
+                                          </p:spTgt>
+                                        </p:tgtEl>
+                                        <p:attrNameLst>
+                                          <p:attrName>style.visibility</p:attrName>
+                                        </p:attrNameLst>
+                                      </p:cBhvr>
+                                      <p:to>
+                                        <p:strVal val="visible"/>
+                                      </p:to>
+                                    </p:set>
+                                  </p:childTnLst>
+                                </p:cTn>
+                              </p:par>
+                              <p:par>
+                                <p:cTn id="17" presetID="1" presetClass="entr" presetSubtype="0" fill="hold" grpId="0" nodeType="withEffect">
+                                  <p:stCondLst>
+                                    <p:cond delay="0"/>
+                                  </p:stCondLst>
+                                  <p:childTnLst>
+                                    <p:set>
+                                      <p:cBhvr>
+                                        <p:cTn id="18" dur="1" fill="hold">
+                                          <p:stCondLst>
+                                            <p:cond delay="0"/>
+                                          </p:stCondLst>
+                                        </p:cTn>
+                                        <p:tgtEl>
+                                          <p:spTgt spid="3">
+                                            <p:txEl>
+                                              <p:pRg st="4" end="4"/>
+                                            </p:txEl>
+                                          </p:spTgt>
+                                        </p:tgtEl>
+                                        <p:attrNameLst>
+                                          <p:attrName>style.visibility</p:attrName>
+                                        </p:attrNameLst>
+                                      </p:cBhvr>
+                                      <p:to>
+                                        <p:strVal val="visible"/>
+                                      </p:to>
+                                    </p:set>
+                                  </p:childTnLst>
+                                </p:cTn>
+                              </p:par>
+                              <p:par>
+                                <p:cTn id="19" presetID="1" presetClass="entr" presetSubtype="0" fill="hold" grpId="0" nodeType="withEffect">
+                                  <p:stCondLst>
+                                    <p:cond delay="0"/>
+                                  </p:stCondLst>
+                                  <p:childTnLst>
+                                    <p:set>
+                                      <p:cBhvr>
+                                        <p:cTn id="20" dur="1" fill="hold">
+                                          <p:stCondLst>
+                                            <p:cond delay="0"/>
+                                          </p:stCondLst>
+                                        </p:cTn>
+                                        <p:tgtEl>
+                                          <p:spTgt spid="3">
+                                            <p:txEl>
+                                              <p:pRg st="5" end="5"/>
+                                            </p:txEl>
+                                          </p:spTgt>
+                                        </p:tgtEl>
+                                        <p:attrNameLst>
+                                          <p:attrName>style.visibility</p:attrName>
+                                        </p:attrNameLst>
+                                      </p:cBhvr>
+                                      <p:to>
+                                        <p:strVal val="visible"/>
+                                      </p:to>
+                                    </p:set>
+                                  </p:childTnLst>
+                                </p:cTn>
+                              </p:par>
+                              <p:par>
+                                <p:cTn id="21" presetID="1" presetClass="entr" presetSubtype="0" fill="hold" grpId="0" nodeType="withEffect">
+                                  <p:stCondLst>
+                                    <p:cond delay="0"/>
+                                  </p:stCondLst>
+                                  <p:childTnLst>
+                                    <p:set>
+                                      <p:cBhvr>
+                                        <p:cTn id="22" dur="1" fill="hold">
+                                          <p:stCondLst>
+                                            <p:cond delay="0"/>
+                                          </p:stCondLst>
+                                        </p:cTn>
+                                        <p:tgtEl>
+                                          <p:spTgt spid="3">
+                                            <p:txEl>
+                                              <p:pRg st="6" end="6"/>
+                                            </p:txEl>
+                                          </p:spTgt>
+                                        </p:tgtEl>
+                                        <p:attrNameLst>
+                                          <p:attrName>style.visibility</p:attrName>
+                                        </p:attrNameLst>
+                                      </p:cBhvr>
+                                      <p:to>
+                                        <p:strVal val="visible"/>
+                                      </p:to>
+                                    </p:set>
+                                  </p:childTnLst>
+                                </p:cTn>
+                              </p:par>
+                            </p:childTnLst>
+                          </p:cTn>
+                        </p:par>
+                      </p:childTnLst>
+                    </p:cTn>
+                  </p:par>
+                  <p:par>
+                    <p:cTn id="23" fill="hold">
+                      <p:stCondLst>
+                        <p:cond delay="indefinite"/>
+                      </p:stCondLst>
+                      <p:childTnLst>
+                        <p:par>
+                          <p:cTn id="24" fill="hold">
+                            <p:stCondLst>
+                              <p:cond delay="0"/>
+                            </p:stCondLst>
+                            <p:childTnLst>
+                              <p:par>
+                                <p:cTn id="25" presetID="1" presetClass="entr" presetSubtype="0" fill="hold" grpId="0" nodeType="clickEffect">
+                                  <p:stCondLst>
+                                    <p:cond delay="0"/>
+                                  </p:stCondLst>
+                                  <p:childTnLst>
+                                    <p:set>
+                                      <p:cBhvr>
+                                        <p:cTn id="26" dur="1" fill="hold">
+                                          <p:stCondLst>
+                                            <p:cond delay="0"/>
+                                          </p:stCondLst>
+                                        </p:cTn>
+                                        <p:tgtEl>
+                                          <p:spTgt spid="3">
+                                            <p:txEl>
+                                              <p:pRg st="7" end="7"/>
+                                            </p:txEl>
+                                          </p:spTgt>
+                                        </p:tgtEl>
+                                        <p:attrNameLst>
+                                          <p:attrName>style.visibility</p:attrName>
+                                        </p:attrNameLst>
+                                      </p:cBhvr>
+                                      <p:to>
+                                        <p:strVal val="visible"/>
+                                      </p:to>
+                                    </p:set>
+                                  </p:childTnLst>
+                                </p:cTn>
+                              </p:par>
+                            </p:childTnLst>
+                          </p:cTn>
+                        </p:par>
+                      </p:childTnLst>
+                    </p:cTn>
+                  </p:par>
+                  <p:par>
+                    <p:cTn id="27" fill="hold">
+                      <p:stCondLst>
+                        <p:cond delay="indefinite"/>
+                      </p:stCondLst>
+                      <p:childTnLst>
+                        <p:par>
+                          <p:cTn id="28" fill="hold">
+                            <p:stCondLst>
+                              <p:cond delay="0"/>
+                            </p:stCondLst>
+                            <p:childTnLst>
+                              <p:par>
+                                <p:cTn id="29" presetID="1" presetClass="entr" presetSubtype="0" fill="hold" grpId="0" nodeType="clickEffect">
+                                  <p:stCondLst>
+                                    <p:cond delay="0"/>
+                                  </p:stCondLst>
+                                  <p:childTnLst>
+                                    <p:set>
+                                      <p:cBhvr>
+                                        <p:cTn id="30" dur="1" fill="hold">
+                                          <p:stCondLst>
+                                            <p:cond delay="0"/>
+                                          </p:stCondLst>
+                                        </p:cTn>
+                                        <p:tgtEl>
+                                          <p:spTgt spid="3">
+                                            <p:txEl>
+                                              <p:pRg st="8" end="8"/>
+                                            </p:txEl>
+                                          </p:spTgt>
+                                        </p:tgtEl>
+                                        <p:attrNameLst>
+                                          <p:attrName>style.visibility</p:attrName>
+                                        </p:attrNameLst>
+                                      </p:cBhvr>
+                                      <p:to>
+                                        <p:strVal val="visible"/>
+                                      </p:to>
+                                    </p:set>
+                                  </p:childTnLst>
+                                </p:cTn>
+                              </p:par>
+                            </p:childTnLst>
+                          </p:cTn>
+                        </p:par>
+                      </p:childTnLst>
+                    </p:cTn>
+                  </p:par>
+                  <p:par>
+                    <p:cTn id="31" fill="hold">
+                      <p:stCondLst>
+                        <p:cond delay="indefinite"/>
+                      </p:stCondLst>
+                      <p:childTnLst>
+                        <p:par>
+                          <p:cTn id="32" fill="hold">
+                            <p:stCondLst>
+                              <p:cond delay="0"/>
+                            </p:stCondLst>
+                            <p:childTnLst>
+                              <p:par>
+                                <p:cTn id="33" presetID="1" presetClass="entr" presetSubtype="0" fill="hold" grpId="0" nodeType="clickEffect">
+                                  <p:stCondLst>
+                                    <p:cond delay="0"/>
+                                  </p:stCondLst>
+                                  <p:childTnLst>
+                                    <p:set>
+                                      <p:cBhvr>
+                                        <p:cTn id="34" dur="1" fill="hold">
+                                          <p:stCondLst>
+                                            <p:cond delay="0"/>
+                                          </p:stCondLst>
+                                        </p:cTn>
+                                        <p:tgtEl>
+                                          <p:spTgt spid="3">
+                                            <p:txEl>
+                                              <p:pRg st="9" end="9"/>
+                                            </p:txEl>
+                                          </p:spTgt>
+                                        </p:tgtEl>
+                                        <p:attrNameLst>
+                                          <p:attrName>style.visibility</p:attrName>
+                                        </p:attrNameLst>
+                                      </p:cBhvr>
+                                      <p:to>
+                                        <p:strVal val="visible"/>
+                                      </p:to>
+                                    </p:set>
+                                  </p:childTnLst>
+                                </p:cTn>
+                              </p:par>
+                            </p:childTnLst>
+                          </p:cTn>
+                        </p:par>
+                      </p:childTnLst>
+                    </p:cTn>
+                  </p:par>
+                </p:childTnLst>
+              </p:cTn>
+              <p:prevCondLst>
+                <p:cond evt="onPrev" delay="0">
+                  <p:tgtEl>
+                    <p:sldTgt/>
+                  </p:tgtEl>
+                </p:cond>
+              </p:prevCondLst>
+              <p:nextCondLst>
+                <p:cond evt="onNext" delay="0">
+                  <p:tgtEl>
+                    <p:sldTgt/>
+                  </p:tgtEl>
+                </p:cond>
+              </p:nextCondLst>
+            </p:seq>
+          </p:childTnLst>
+        </p:cTn>
       </p:par>
     </p:tnLst>
+    <p:bldLst>
+      <p:bldP spid="3" grpId="0" build="p"/>
+    </p:bldLst>
   </p:timing>
 </p:sld>
 </file>
@@ -7821,7 +8533,7 @@
           <a:blip r:embed="rId2" cstate="print">
             <a:extLst>
               <a:ext uri="{BEBA8EAE-BF5A-486C-A8C5-ECC9F3942E4B}">
-                <a14:imgProps xmlns:a14="http://schemas.microsoft.com/office/drawing/2010/main" xmlns="">
+                <a14:imgProps xmlns:a14="http://schemas.microsoft.com/office/drawing/2010/main">
                   <a14:imgLayer r:embed="rId3">
                     <a14:imgEffect>
                       <a14:backgroundRemoval t="0" b="100000" l="0" r="100000"/>
@@ -7830,7 +8542,7 @@
                 </a14:imgProps>
               </a:ext>
               <a:ext uri="{28A0092B-C50C-407E-A947-70E740481C1C}">
-                <a14:useLocalDpi xmlns:a14="http://schemas.microsoft.com/office/drawing/2010/main" xmlns="" val="0"/>
+                <a14:useLocalDpi xmlns:a14="http://schemas.microsoft.com/office/drawing/2010/main" val="0"/>
               </a:ext>
             </a:extLst>
           </a:blip>
@@ -7854,14 +8566,14 @@
           <a:effectLst/>
           <a:extLst>
             <a:ext uri="{909E8E84-426E-40DD-AFC4-6F175D3DCCD1}">
-              <a14:hiddenFill xmlns:a14="http://schemas.microsoft.com/office/drawing/2010/main" xmlns="">
+              <a14:hiddenFill xmlns:a14="http://schemas.microsoft.com/office/drawing/2010/main">
                 <a:solidFill>
                   <a:schemeClr val="accent1"/>
                 </a:solidFill>
               </a14:hiddenFill>
             </a:ext>
             <a:ext uri="{91240B29-F687-4F45-9708-019B960494DF}">
-              <a14:hiddenLine xmlns:a14="http://schemas.microsoft.com/office/drawing/2010/main" xmlns="" w="9525">
+              <a14:hiddenLine xmlns:a14="http://schemas.microsoft.com/office/drawing/2010/main" w="9525">
                 <a:solidFill>
                   <a:schemeClr val="tx1"/>
                 </a:solidFill>
@@ -7871,7 +8583,7 @@
               </a14:hiddenLine>
             </a:ext>
             <a:ext uri="{AF507438-7753-43E0-B8FC-AC1667EBCBE1}">
-              <a14:hiddenEffects xmlns:a14="http://schemas.microsoft.com/office/drawing/2010/main" xmlns="">
+              <a14:hiddenEffects xmlns:a14="http://schemas.microsoft.com/office/drawing/2010/main">
                 <a:effectLst>
                   <a:outerShdw dist="35921" dir="2700000" algn="ctr" rotWithShape="0">
                     <a:schemeClr val="bg2"/>
@@ -7885,7 +8597,7 @@
     </p:spTree>
     <p:extLst>
       <p:ext uri="{BB962C8B-B14F-4D97-AF65-F5344CB8AC3E}">
-        <p14:creationId xmlns:p14="http://schemas.microsoft.com/office/powerpoint/2010/main" xmlns="" val="1599884037"/>
+        <p14:creationId xmlns:p14="http://schemas.microsoft.com/office/powerpoint/2010/main" val="1599884037"/>
       </p:ext>
     </p:extLst>
   </p:cSld>
@@ -7895,9 +8607,133 @@
   <p:timing>
     <p:tnLst>
       <p:par>
-        <p:cTn id="1" dur="indefinite" restart="never" nodeType="tmRoot"/>
+        <p:cTn id="1" dur="indefinite" restart="never" nodeType="tmRoot">
+          <p:childTnLst>
+            <p:seq concurrent="1" nextAc="seek">
+              <p:cTn id="2" dur="indefinite" nodeType="mainSeq">
+                <p:childTnLst>
+                  <p:par>
+                    <p:cTn id="3" fill="hold">
+                      <p:stCondLst>
+                        <p:cond delay="indefinite"/>
+                      </p:stCondLst>
+                      <p:childTnLst>
+                        <p:par>
+                          <p:cTn id="4" fill="hold">
+                            <p:stCondLst>
+                              <p:cond delay="0"/>
+                            </p:stCondLst>
+                            <p:childTnLst>
+                              <p:par>
+                                <p:cTn id="5" presetID="1" presetClass="entr" presetSubtype="0" fill="hold" grpId="0" nodeType="clickEffect">
+                                  <p:stCondLst>
+                                    <p:cond delay="0"/>
+                                  </p:stCondLst>
+                                  <p:childTnLst>
+                                    <p:set>
+                                      <p:cBhvr>
+                                        <p:cTn id="6" dur="1" fill="hold">
+                                          <p:stCondLst>
+                                            <p:cond delay="0"/>
+                                          </p:stCondLst>
+                                        </p:cTn>
+                                        <p:tgtEl>
+                                          <p:spTgt spid="3">
+                                            <p:txEl>
+                                              <p:pRg st="0" end="0"/>
+                                            </p:txEl>
+                                          </p:spTgt>
+                                        </p:tgtEl>
+                                        <p:attrNameLst>
+                                          <p:attrName>style.visibility</p:attrName>
+                                        </p:attrNameLst>
+                                      </p:cBhvr>
+                                      <p:to>
+                                        <p:strVal val="visible"/>
+                                      </p:to>
+                                    </p:set>
+                                  </p:childTnLst>
+                                </p:cTn>
+                              </p:par>
+                            </p:childTnLst>
+                          </p:cTn>
+                        </p:par>
+                      </p:childTnLst>
+                    </p:cTn>
+                  </p:par>
+                  <p:par>
+                    <p:cTn id="7" fill="hold">
+                      <p:stCondLst>
+                        <p:cond delay="indefinite"/>
+                      </p:stCondLst>
+                      <p:childTnLst>
+                        <p:par>
+                          <p:cTn id="8" fill="hold">
+                            <p:stCondLst>
+                              <p:cond delay="0"/>
+                            </p:stCondLst>
+                            <p:childTnLst>
+                              <p:par>
+                                <p:cTn id="9" presetID="1" presetClass="entr" presetSubtype="0" fill="hold" grpId="0" nodeType="clickEffect">
+                                  <p:stCondLst>
+                                    <p:cond delay="0"/>
+                                  </p:stCondLst>
+                                  <p:childTnLst>
+                                    <p:set>
+                                      <p:cBhvr>
+                                        <p:cTn id="10" dur="1" fill="hold">
+                                          <p:stCondLst>
+                                            <p:cond delay="0"/>
+                                          </p:stCondLst>
+                                        </p:cTn>
+                                        <p:tgtEl>
+                                          <p:spTgt spid="3">
+                                            <p:txEl>
+                                              <p:pRg st="1" end="1"/>
+                                            </p:txEl>
+                                          </p:spTgt>
+                                        </p:tgtEl>
+                                        <p:attrNameLst>
+                                          <p:attrName>style.visibility</p:attrName>
+                                        </p:attrNameLst>
+                                      </p:cBhvr>
+                                      <p:to>
+                                        <p:strVal val="visible"/>
+                                      </p:to>
+                                    </p:set>
+                                  </p:childTnLst>
+                                </p:cTn>
+                              </p:par>
+                            </p:childTnLst>
+                          </p:cTn>
+                        </p:par>
+                      </p:childTnLst>
+                    </p:cTn>
+                  </p:par>
+                </p:childTnLst>
+              </p:cTn>
+              <p:prevCondLst>
+                <p:cond evt="onPrev" delay="0">
+                  <p:tgtEl>
+                    <p:sldTgt/>
+                  </p:tgtEl>
+                </p:cond>
+              </p:prevCondLst>
+              <p:nextCondLst>
+                <p:cond evt="onNext" delay="0">
+                  <p:tgtEl>
+                    <p:sldTgt/>
+                  </p:tgtEl>
+                </p:cond>
+              </p:nextCondLst>
+            </p:seq>
+          </p:childTnLst>
+        </p:cTn>
       </p:par>
     </p:tnLst>
+    <p:bldLst>
+      <p:bldP spid="3" grpId="0" build="p"/>
+    </p:bldLst>
   </p:timing>
 </p:sld>
 </file>
@@ -8088,10 +8924,53 @@
           </a:effectLst>
         </p:spPr>
       </p:pic>
+      <p:pic>
+        <p:nvPicPr>
+          <p:cNvPr id="6" name="Grafik 5"/>
+          <p:cNvPicPr>
+            <a:picLocks noChangeAspect="1"/>
+          </p:cNvPicPr>
+          <p:nvPr/>
+        </p:nvPicPr>
+        <p:blipFill>
+          <a:blip r:embed="rId4" cstate="print">
+            <a:extLst>
+              <a:ext uri="{28A0092B-C50C-407E-A947-70E740481C1C}">
+                <a14:useLocalDpi xmlns:a14="http://schemas.microsoft.com/office/drawing/2010/main" val="0"/>
+              </a:ext>
+            </a:extLst>
+          </a:blip>
+          <a:stretch>
+            <a:fillRect/>
+          </a:stretch>
+        </p:blipFill>
+        <p:spPr>
+          <a:xfrm>
+            <a:off x="3707904" y="1141760"/>
+            <a:ext cx="5220197" cy="3899036"/>
+          </a:xfrm>
+          <a:prstGeom prst="roundRect">
+            <a:avLst>
+              <a:gd name="adj" fmla="val 8594"/>
+            </a:avLst>
+          </a:prstGeom>
+          <a:solidFill>
+            <a:srgbClr val="FFFFFF">
+              <a:shade val="85000"/>
+            </a:srgbClr>
+          </a:solidFill>
+          <a:ln>
+            <a:noFill/>
+          </a:ln>
+          <a:effectLst>
+            <a:reflection blurRad="12700" stA="38000" endPos="28000" dist="5000" dir="5400000" sy="-100000" algn="bl" rotWithShape="0"/>
+          </a:effectLst>
+        </p:spPr>
+      </p:pic>
     </p:spTree>
     <p:extLst>
       <p:ext uri="{BB962C8B-B14F-4D97-AF65-F5344CB8AC3E}">
-        <p14:creationId xmlns:p14="http://schemas.microsoft.com/office/powerpoint/2010/main" xmlns="" val="2756733679"/>
+        <p14:creationId xmlns:p14="http://schemas.microsoft.com/office/powerpoint/2010/main" val="2756733679"/>
       </p:ext>
     </p:extLst>
   </p:cSld>
@@ -8101,9 +8980,454 @@
   <p:timing>
     <p:tnLst>
       <p:par>
-        <p:cTn id="1" dur="indefinite" restart="never" nodeType="tmRoot"/>
+        <p:cTn id="1" dur="indefinite" restart="never" nodeType="tmRoot">
+          <p:childTnLst>
+            <p:seq concurrent="1" nextAc="seek">
+              <p:cTn id="2" dur="indefinite" nodeType="mainSeq">
+                <p:childTnLst>
+                  <p:par>
+                    <p:cTn id="3" fill="hold">
+                      <p:stCondLst>
+                        <p:cond delay="indefinite"/>
+                      </p:stCondLst>
+                      <p:childTnLst>
+                        <p:par>
+                          <p:cTn id="4" fill="hold">
+                            <p:stCondLst>
+                              <p:cond delay="0"/>
+                            </p:stCondLst>
+                            <p:childTnLst>
+                              <p:par>
+                                <p:cTn id="5" presetID="1" presetClass="entr" presetSubtype="0" fill="hold" grpId="0" nodeType="clickEffect">
+                                  <p:stCondLst>
+                                    <p:cond delay="0"/>
+                                  </p:stCondLst>
+                                  <p:childTnLst>
+                                    <p:set>
+                                      <p:cBhvr>
+                                        <p:cTn id="6" dur="1" fill="hold">
+                                          <p:stCondLst>
+                                            <p:cond delay="0"/>
+                                          </p:stCondLst>
+                                        </p:cTn>
+                                        <p:tgtEl>
+                                          <p:spTgt spid="3">
+                                            <p:txEl>
+                                              <p:pRg st="0" end="0"/>
+                                            </p:txEl>
+                                          </p:spTgt>
+                                        </p:tgtEl>
+                                        <p:attrNameLst>
+                                          <p:attrName>style.visibility</p:attrName>
+                                        </p:attrNameLst>
+                                      </p:cBhvr>
+                                      <p:to>
+                                        <p:strVal val="visible"/>
+                                      </p:to>
+                                    </p:set>
+                                  </p:childTnLst>
+                                </p:cTn>
+                              </p:par>
+                            </p:childTnLst>
+                          </p:cTn>
+                        </p:par>
+                      </p:childTnLst>
+                    </p:cTn>
+                  </p:par>
+                  <p:par>
+                    <p:cTn id="7" fill="hold">
+                      <p:stCondLst>
+                        <p:cond delay="indefinite"/>
+                      </p:stCondLst>
+                      <p:childTnLst>
+                        <p:par>
+                          <p:cTn id="8" fill="hold">
+                            <p:stCondLst>
+                              <p:cond delay="0"/>
+                            </p:stCondLst>
+                            <p:childTnLst>
+                              <p:par>
+                                <p:cTn id="9" presetID="1" presetClass="entr" presetSubtype="0" fill="hold" grpId="0" nodeType="clickEffect">
+                                  <p:stCondLst>
+                                    <p:cond delay="0"/>
+                                  </p:stCondLst>
+                                  <p:childTnLst>
+                                    <p:set>
+                                      <p:cBhvr>
+                                        <p:cTn id="10" dur="1" fill="hold">
+                                          <p:stCondLst>
+                                            <p:cond delay="0"/>
+                                          </p:stCondLst>
+                                        </p:cTn>
+                                        <p:tgtEl>
+                                          <p:spTgt spid="3">
+                                            <p:txEl>
+                                              <p:pRg st="1" end="1"/>
+                                            </p:txEl>
+                                          </p:spTgt>
+                                        </p:tgtEl>
+                                        <p:attrNameLst>
+                                          <p:attrName>style.visibility</p:attrName>
+                                        </p:attrNameLst>
+                                      </p:cBhvr>
+                                      <p:to>
+                                        <p:strVal val="visible"/>
+                                      </p:to>
+                                    </p:set>
+                                  </p:childTnLst>
+                                </p:cTn>
+                              </p:par>
+                            </p:childTnLst>
+                          </p:cTn>
+                        </p:par>
+                      </p:childTnLst>
+                    </p:cTn>
+                  </p:par>
+                  <p:par>
+                    <p:cTn id="11" fill="hold">
+                      <p:stCondLst>
+                        <p:cond delay="indefinite"/>
+                      </p:stCondLst>
+                      <p:childTnLst>
+                        <p:par>
+                          <p:cTn id="12" fill="hold">
+                            <p:stCondLst>
+                              <p:cond delay="0"/>
+                            </p:stCondLst>
+                            <p:childTnLst>
+                              <p:par>
+                                <p:cTn id="13" presetID="1" presetClass="entr" presetSubtype="0" fill="hold" grpId="0" nodeType="clickEffect">
+                                  <p:stCondLst>
+                                    <p:cond delay="0"/>
+                                  </p:stCondLst>
+                                  <p:childTnLst>
+                                    <p:set>
+                                      <p:cBhvr>
+                                        <p:cTn id="14" dur="1" fill="hold">
+                                          <p:stCondLst>
+                                            <p:cond delay="0"/>
+                                          </p:stCondLst>
+                                        </p:cTn>
+                                        <p:tgtEl>
+                                          <p:spTgt spid="3">
+                                            <p:txEl>
+                                              <p:pRg st="2" end="2"/>
+                                            </p:txEl>
+                                          </p:spTgt>
+                                        </p:tgtEl>
+                                        <p:attrNameLst>
+                                          <p:attrName>style.visibility</p:attrName>
+                                        </p:attrNameLst>
+                                      </p:cBhvr>
+                                      <p:to>
+                                        <p:strVal val="visible"/>
+                                      </p:to>
+                                    </p:set>
+                                  </p:childTnLst>
+                                </p:cTn>
+                              </p:par>
+                            </p:childTnLst>
+                          </p:cTn>
+                        </p:par>
+                      </p:childTnLst>
+                    </p:cTn>
+                  </p:par>
+                  <p:par>
+                    <p:cTn id="15" fill="hold">
+                      <p:stCondLst>
+                        <p:cond delay="indefinite"/>
+                      </p:stCondLst>
+                      <p:childTnLst>
+                        <p:par>
+                          <p:cTn id="16" fill="hold">
+                            <p:stCondLst>
+                              <p:cond delay="0"/>
+                            </p:stCondLst>
+                            <p:childTnLst>
+                              <p:par>
+                                <p:cTn id="17" presetID="1" presetClass="entr" presetSubtype="0" fill="hold" grpId="0" nodeType="clickEffect">
+                                  <p:stCondLst>
+                                    <p:cond delay="0"/>
+                                  </p:stCondLst>
+                                  <p:childTnLst>
+                                    <p:set>
+                                      <p:cBhvr>
+                                        <p:cTn id="18" dur="1" fill="hold">
+                                          <p:stCondLst>
+                                            <p:cond delay="0"/>
+                                          </p:stCondLst>
+                                        </p:cTn>
+                                        <p:tgtEl>
+                                          <p:spTgt spid="3">
+                                            <p:txEl>
+                                              <p:pRg st="3" end="3"/>
+                                            </p:txEl>
+                                          </p:spTgt>
+                                        </p:tgtEl>
+                                        <p:attrNameLst>
+                                          <p:attrName>style.visibility</p:attrName>
+                                        </p:attrNameLst>
+                                      </p:cBhvr>
+                                      <p:to>
+                                        <p:strVal val="visible"/>
+                                      </p:to>
+                                    </p:set>
+                                  </p:childTnLst>
+                                </p:cTn>
+                              </p:par>
+                              <p:par>
+                                <p:cTn id="19" presetID="1" presetClass="entr" presetSubtype="0" fill="hold" nodeType="withEffect">
+                                  <p:stCondLst>
+                                    <p:cond delay="0"/>
+                                  </p:stCondLst>
+                                  <p:childTnLst>
+                                    <p:set>
+                                      <p:cBhvr>
+                                        <p:cTn id="20" dur="1" fill="hold">
+                                          <p:stCondLst>
+                                            <p:cond delay="0"/>
+                                          </p:stCondLst>
+                                        </p:cTn>
+                                        <p:tgtEl>
+                                          <p:spTgt spid="6"/>
+                                        </p:tgtEl>
+                                        <p:attrNameLst>
+                                          <p:attrName>style.visibility</p:attrName>
+                                        </p:attrNameLst>
+                                      </p:cBhvr>
+                                      <p:to>
+                                        <p:strVal val="visible"/>
+                                      </p:to>
+                                    </p:set>
+                                  </p:childTnLst>
+                                </p:cTn>
+                              </p:par>
+                            </p:childTnLst>
+                          </p:cTn>
+                        </p:par>
+                      </p:childTnLst>
+                    </p:cTn>
+                  </p:par>
+                  <p:par>
+                    <p:cTn id="21" fill="hold">
+                      <p:stCondLst>
+                        <p:cond delay="indefinite"/>
+                      </p:stCondLst>
+                      <p:childTnLst>
+                        <p:par>
+                          <p:cTn id="22" fill="hold">
+                            <p:stCondLst>
+                              <p:cond delay="0"/>
+                            </p:stCondLst>
+                            <p:childTnLst>
+                              <p:par>
+                                <p:cTn id="23" presetID="1" presetClass="entr" presetSubtype="0" fill="hold" grpId="0" nodeType="clickEffect">
+                                  <p:stCondLst>
+                                    <p:cond delay="0"/>
+                                  </p:stCondLst>
+                                  <p:childTnLst>
+                                    <p:set>
+                                      <p:cBhvr>
+                                        <p:cTn id="24" dur="1" fill="hold">
+                                          <p:stCondLst>
+                                            <p:cond delay="0"/>
+                                          </p:stCondLst>
+                                        </p:cTn>
+                                        <p:tgtEl>
+                                          <p:spTgt spid="3">
+                                            <p:txEl>
+                                              <p:pRg st="4" end="4"/>
+                                            </p:txEl>
+                                          </p:spTgt>
+                                        </p:tgtEl>
+                                        <p:attrNameLst>
+                                          <p:attrName>style.visibility</p:attrName>
+                                        </p:attrNameLst>
+                                      </p:cBhvr>
+                                      <p:to>
+                                        <p:strVal val="visible"/>
+                                      </p:to>
+                                    </p:set>
+                                  </p:childTnLst>
+                                </p:cTn>
+                              </p:par>
+                              <p:par>
+                                <p:cTn id="25" presetID="10" presetClass="exit" presetSubtype="0" fill="hold" nodeType="withEffect">
+                                  <p:stCondLst>
+                                    <p:cond delay="0"/>
+                                  </p:stCondLst>
+                                  <p:childTnLst>
+                                    <p:animEffect transition="out" filter="fade">
+                                      <p:cBhvr>
+                                        <p:cTn id="26" dur="500"/>
+                                        <p:tgtEl>
+                                          <p:spTgt spid="6"/>
+                                        </p:tgtEl>
+                                      </p:cBhvr>
+                                    </p:animEffect>
+                                    <p:set>
+                                      <p:cBhvr>
+                                        <p:cTn id="27" dur="1" fill="hold">
+                                          <p:stCondLst>
+                                            <p:cond delay="499"/>
+                                          </p:stCondLst>
+                                        </p:cTn>
+                                        <p:tgtEl>
+                                          <p:spTgt spid="6"/>
+                                        </p:tgtEl>
+                                        <p:attrNameLst>
+                                          <p:attrName>style.visibility</p:attrName>
+                                        </p:attrNameLst>
+                                      </p:cBhvr>
+                                      <p:to>
+                                        <p:strVal val="hidden"/>
+                                      </p:to>
+                                    </p:set>
+                                  </p:childTnLst>
+                                </p:cTn>
+                              </p:par>
+                            </p:childTnLst>
+                          </p:cTn>
+                        </p:par>
+                        <p:par>
+                          <p:cTn id="28" fill="hold">
+                            <p:stCondLst>
+                              <p:cond delay="500"/>
+                            </p:stCondLst>
+                            <p:childTnLst>
+                              <p:par>
+                                <p:cTn id="29" presetID="1" presetClass="entr" presetSubtype="0" fill="hold" nodeType="afterEffect">
+                                  <p:stCondLst>
+                                    <p:cond delay="0"/>
+                                  </p:stCondLst>
+                                  <p:childTnLst>
+                                    <p:set>
+                                      <p:cBhvr>
+                                        <p:cTn id="30" dur="1" fill="hold">
+                                          <p:stCondLst>
+                                            <p:cond delay="0"/>
+                                          </p:stCondLst>
+                                        </p:cTn>
+                                        <p:tgtEl>
+                                          <p:spTgt spid="3073"/>
+                                        </p:tgtEl>
+                                        <p:attrNameLst>
+                                          <p:attrName>style.visibility</p:attrName>
+                                        </p:attrNameLst>
+                                      </p:cBhvr>
+                                      <p:to>
+                                        <p:strVal val="visible"/>
+                                      </p:to>
+                                    </p:set>
+                                  </p:childTnLst>
+                                </p:cTn>
+                              </p:par>
+                            </p:childTnLst>
+                          </p:cTn>
+                        </p:par>
+                      </p:childTnLst>
+                    </p:cTn>
+                  </p:par>
+                  <p:par>
+                    <p:cTn id="31" fill="hold">
+                      <p:stCondLst>
+                        <p:cond delay="indefinite"/>
+                      </p:stCondLst>
+                      <p:childTnLst>
+                        <p:par>
+                          <p:cTn id="32" fill="hold">
+                            <p:stCondLst>
+                              <p:cond delay="0"/>
+                            </p:stCondLst>
+                            <p:childTnLst>
+                              <p:par>
+                                <p:cTn id="33" presetID="1" presetClass="entr" presetSubtype="0" fill="hold" grpId="0" nodeType="clickEffect">
+                                  <p:stCondLst>
+                                    <p:cond delay="0"/>
+                                  </p:stCondLst>
+                                  <p:childTnLst>
+                                    <p:set>
+                                      <p:cBhvr>
+                                        <p:cTn id="34" dur="1" fill="hold">
+                                          <p:stCondLst>
+                                            <p:cond delay="0"/>
+                                          </p:stCondLst>
+                                        </p:cTn>
+                                        <p:tgtEl>
+                                          <p:spTgt spid="3">
+                                            <p:txEl>
+                                              <p:pRg st="5" end="5"/>
+                                            </p:txEl>
+                                          </p:spTgt>
+                                        </p:tgtEl>
+                                        <p:attrNameLst>
+                                          <p:attrName>style.visibility</p:attrName>
+                                        </p:attrNameLst>
+                                      </p:cBhvr>
+                                      <p:to>
+                                        <p:strVal val="visible"/>
+                                      </p:to>
+                                    </p:set>
+                                  </p:childTnLst>
+                                </p:cTn>
+                              </p:par>
+                              <p:par>
+                                <p:cTn id="35" presetID="1" presetClass="entr" presetSubtype="0" fill="hold" nodeType="withEffect">
+                                  <p:stCondLst>
+                                    <p:cond delay="0"/>
+                                  </p:stCondLst>
+                                  <p:childTnLst>
+                                    <p:set>
+                                      <p:cBhvr>
+                                        <p:cTn id="36" dur="1" fill="hold">
+                                          <p:stCondLst>
+                                            <p:cond delay="0"/>
+                                          </p:stCondLst>
+                                        </p:cTn>
+                                        <p:tgtEl>
+                                          <p:spTgt spid="3074"/>
+                                        </p:tgtEl>
+                                        <p:attrNameLst>
+                                          <p:attrName>style.visibility</p:attrName>
+                                        </p:attrNameLst>
+                                      </p:cBhvr>
+                                      <p:to>
+                                        <p:strVal val="visible"/>
+                                      </p:to>
+                                    </p:set>
+                                  </p:childTnLst>
+                                </p:cTn>
+                              </p:par>
+                            </p:childTnLst>
+                          </p:cTn>
+                        </p:par>
+                      </p:childTnLst>
+                    </p:cTn>
+                  </p:par>
+                </p:childTnLst>
+              </p:cTn>
+              <p:prevCondLst>
+                <p:cond evt="onPrev" delay="0">
+                  <p:tgtEl>
+                    <p:sldTgt/>
+                  </p:tgtEl>
+                </p:cond>
+              </p:prevCondLst>
+              <p:nextCondLst>
+                <p:cond evt="onNext" delay="0">
+                  <p:tgtEl>
+                    <p:sldTgt/>
+                  </p:tgtEl>
+                </p:cond>
+              </p:nextCondLst>
+            </p:seq>
+          </p:childTnLst>
+        </p:cTn>
       </p:par>
     </p:tnLst>
+    <p:bldLst>
+      <p:bldP spid="3" grpId="0" uiExpand="1" build="p"/>
+    </p:bldLst>
   </p:timing>
 </p:sld>
 </file>
@@ -8142,11 +9466,7 @@
           <a:p>
             <a:r>
               <a:rPr lang="de-CH" dirty="0" smtClean="0"/>
-              <a:t>Main-Funktion  (Modul </a:t>
-            </a:r>
-            <a:r>
-              <a:rPr lang="de-CH" dirty="0" smtClean="0"/>
-              <a:t> </a:t>
+              <a:t>Main-Funktion  (Modul  </a:t>
             </a:r>
             <a:r>
               <a:rPr lang="de-CH" i="1" dirty="0" err="1" smtClean="0"/>
@@ -8216,36 +9536,10 @@
           </a:p>
         </p:txBody>
       </p:sp>
-      <p:graphicFrame>
-        <p:nvGraphicFramePr>
-          <p:cNvPr id="4" name="Objekt 3"/>
-          <p:cNvGraphicFramePr>
-            <a:graphicFrameLocks noChangeAspect="1"/>
-          </p:cNvGraphicFramePr>
-          <p:nvPr>
-            <p:extLst>
-              <p:ext uri="{D42A27DB-BD31-4B8C-83A1-F6EECF244321}">
-                <p14:modId xmlns:p14="http://schemas.microsoft.com/office/powerpoint/2010/main" xmlns="" val="675548602"/>
-              </p:ext>
-            </p:extLst>
-          </p:nvPr>
-        </p:nvGraphicFramePr>
-        <p:xfrm>
-          <a:off x="3422650" y="1557338"/>
-          <a:ext cx="1420813" cy="4318000"/>
-        </p:xfrm>
-        <a:graphic>
-          <a:graphicData uri="http://schemas.openxmlformats.org/presentationml/2006/ole">
-            <p:oleObj spid="_x0000_s2056" name="Visio" r:id="rId3" imgW="2436869" imgH="7241670" progId="">
-              <p:embed/>
-            </p:oleObj>
-          </a:graphicData>
-        </a:graphic>
-      </p:graphicFrame>
     </p:spTree>
     <p:extLst>
       <p:ext uri="{BB962C8B-B14F-4D97-AF65-F5344CB8AC3E}">
-        <p14:creationId xmlns:p14="http://schemas.microsoft.com/office/powerpoint/2010/main" xmlns="" val="1334996816"/>
+        <p14:creationId xmlns:p14="http://schemas.microsoft.com/office/powerpoint/2010/main" val="1334996816"/>
       </p:ext>
     </p:extLst>
   </p:cSld>
@@ -8255,9 +9549,208 @@
   <p:timing>
     <p:tnLst>
       <p:par>
-        <p:cTn id="1" dur="indefinite" restart="never" nodeType="tmRoot"/>
+        <p:cTn id="1" dur="indefinite" restart="never" nodeType="tmRoot">
+          <p:childTnLst>
+            <p:seq concurrent="1" nextAc="seek">
+              <p:cTn id="2" dur="indefinite" nodeType="mainSeq">
+                <p:childTnLst>
+                  <p:par>
+                    <p:cTn id="3" fill="hold">
+                      <p:stCondLst>
+                        <p:cond delay="indefinite"/>
+                      </p:stCondLst>
+                      <p:childTnLst>
+                        <p:par>
+                          <p:cTn id="4" fill="hold">
+                            <p:stCondLst>
+                              <p:cond delay="0"/>
+                            </p:stCondLst>
+                            <p:childTnLst>
+                              <p:par>
+                                <p:cTn id="5" presetID="1" presetClass="entr" presetSubtype="0" fill="hold" grpId="0" nodeType="clickEffect">
+                                  <p:stCondLst>
+                                    <p:cond delay="0"/>
+                                  </p:stCondLst>
+                                  <p:childTnLst>
+                                    <p:set>
+                                      <p:cBhvr>
+                                        <p:cTn id="6" dur="1" fill="hold">
+                                          <p:stCondLst>
+                                            <p:cond delay="0"/>
+                                          </p:stCondLst>
+                                        </p:cTn>
+                                        <p:tgtEl>
+                                          <p:spTgt spid="3">
+                                            <p:txEl>
+                                              <p:pRg st="0" end="0"/>
+                                            </p:txEl>
+                                          </p:spTgt>
+                                        </p:tgtEl>
+                                        <p:attrNameLst>
+                                          <p:attrName>style.visibility</p:attrName>
+                                        </p:attrNameLst>
+                                      </p:cBhvr>
+                                      <p:to>
+                                        <p:strVal val="visible"/>
+                                      </p:to>
+                                    </p:set>
+                                  </p:childTnLst>
+                                </p:cTn>
+                              </p:par>
+                              <p:par>
+                                <p:cTn id="7" presetID="1" presetClass="entr" presetSubtype="0" fill="hold" grpId="0" nodeType="withEffect">
+                                  <p:stCondLst>
+                                    <p:cond delay="0"/>
+                                  </p:stCondLst>
+                                  <p:childTnLst>
+                                    <p:set>
+                                      <p:cBhvr>
+                                        <p:cTn id="8" dur="1" fill="hold">
+                                          <p:stCondLst>
+                                            <p:cond delay="0"/>
+                                          </p:stCondLst>
+                                        </p:cTn>
+                                        <p:tgtEl>
+                                          <p:spTgt spid="3">
+                                            <p:txEl>
+                                              <p:pRg st="1" end="1"/>
+                                            </p:txEl>
+                                          </p:spTgt>
+                                        </p:tgtEl>
+                                        <p:attrNameLst>
+                                          <p:attrName>style.visibility</p:attrName>
+                                        </p:attrNameLst>
+                                      </p:cBhvr>
+                                      <p:to>
+                                        <p:strVal val="visible"/>
+                                      </p:to>
+                                    </p:set>
+                                  </p:childTnLst>
+                                </p:cTn>
+                              </p:par>
+                              <p:par>
+                                <p:cTn id="9" presetID="1" presetClass="entr" presetSubtype="0" fill="hold" grpId="0" nodeType="withEffect">
+                                  <p:stCondLst>
+                                    <p:cond delay="0"/>
+                                  </p:stCondLst>
+                                  <p:childTnLst>
+                                    <p:set>
+                                      <p:cBhvr>
+                                        <p:cTn id="10" dur="1" fill="hold">
+                                          <p:stCondLst>
+                                            <p:cond delay="0"/>
+                                          </p:stCondLst>
+                                        </p:cTn>
+                                        <p:tgtEl>
+                                          <p:spTgt spid="3">
+                                            <p:txEl>
+                                              <p:pRg st="2" end="2"/>
+                                            </p:txEl>
+                                          </p:spTgt>
+                                        </p:tgtEl>
+                                        <p:attrNameLst>
+                                          <p:attrName>style.visibility</p:attrName>
+                                        </p:attrNameLst>
+                                      </p:cBhvr>
+                                      <p:to>
+                                        <p:strVal val="visible"/>
+                                      </p:to>
+                                    </p:set>
+                                  </p:childTnLst>
+                                </p:cTn>
+                              </p:par>
+                              <p:par>
+                                <p:cTn id="11" presetID="1" presetClass="entr" presetSubtype="0" fill="hold" grpId="0" nodeType="withEffect">
+                                  <p:stCondLst>
+                                    <p:cond delay="0"/>
+                                  </p:stCondLst>
+                                  <p:childTnLst>
+                                    <p:set>
+                                      <p:cBhvr>
+                                        <p:cTn id="12" dur="1" fill="hold">
+                                          <p:stCondLst>
+                                            <p:cond delay="0"/>
+                                          </p:stCondLst>
+                                        </p:cTn>
+                                        <p:tgtEl>
+                                          <p:spTgt spid="3">
+                                            <p:txEl>
+                                              <p:pRg st="3" end="3"/>
+                                            </p:txEl>
+                                          </p:spTgt>
+                                        </p:tgtEl>
+                                        <p:attrNameLst>
+                                          <p:attrName>style.visibility</p:attrName>
+                                        </p:attrNameLst>
+                                      </p:cBhvr>
+                                      <p:to>
+                                        <p:strVal val="visible"/>
+                                      </p:to>
+                                    </p:set>
+                                  </p:childTnLst>
+                                </p:cTn>
+                              </p:par>
+                              <p:par>
+                                <p:cTn id="13" presetID="1" presetClass="entr" presetSubtype="0" fill="hold" grpId="0" nodeType="withEffect">
+                                  <p:stCondLst>
+                                    <p:cond delay="0"/>
+                                  </p:stCondLst>
+                                  <p:childTnLst>
+                                    <p:set>
+                                      <p:cBhvr>
+                                        <p:cTn id="14" dur="1" fill="hold">
+                                          <p:stCondLst>
+                                            <p:cond delay="0"/>
+                                          </p:stCondLst>
+                                        </p:cTn>
+                                        <p:tgtEl>
+                                          <p:spTgt spid="3">
+                                            <p:txEl>
+                                              <p:pRg st="4" end="4"/>
+                                            </p:txEl>
+                                          </p:spTgt>
+                                        </p:tgtEl>
+                                        <p:attrNameLst>
+                                          <p:attrName>style.visibility</p:attrName>
+                                        </p:attrNameLst>
+                                      </p:cBhvr>
+                                      <p:to>
+                                        <p:strVal val="visible"/>
+                                      </p:to>
+                                    </p:set>
+                                  </p:childTnLst>
+                                </p:cTn>
+                              </p:par>
+                            </p:childTnLst>
+                          </p:cTn>
+                        </p:par>
+                      </p:childTnLst>
+                    </p:cTn>
+                  </p:par>
+                </p:childTnLst>
+              </p:cTn>
+              <p:prevCondLst>
+                <p:cond evt="onPrev" delay="0">
+                  <p:tgtEl>
+                    <p:sldTgt/>
+                  </p:tgtEl>
+                </p:cond>
+              </p:prevCondLst>
+              <p:nextCondLst>
+                <p:cond evt="onNext" delay="0">
+                  <p:tgtEl>
+                    <p:sldTgt/>
+                  </p:tgtEl>
+                </p:cond>
+              </p:nextCondLst>
+            </p:seq>
+          </p:childTnLst>
+        </p:cTn>
       </p:par>
     </p:tnLst>
+    <p:bldLst>
+      <p:bldP spid="3" grpId="0" uiExpand="1" build="p"/>
+    </p:bldLst>
   </p:timing>
 </p:sld>
 </file>
@@ -8279,6 +9772,457 @@
           <a:chExt cx="0" cy="0"/>
         </a:xfrm>
       </p:grpSpPr>
+      <p:grpSp>
+        <p:nvGrpSpPr>
+          <p:cNvPr id="7" name="Gruppieren 6"/>
+          <p:cNvGrpSpPr/>
+          <p:nvPr/>
+        </p:nvGrpSpPr>
+        <p:grpSpPr>
+          <a:xfrm>
+            <a:off x="827584" y="3653339"/>
+            <a:ext cx="7344816" cy="8632645"/>
+            <a:chOff x="827584" y="3501008"/>
+            <a:chExt cx="7344816" cy="8632645"/>
+          </a:xfrm>
+        </p:grpSpPr>
+        <p:pic>
+          <p:nvPicPr>
+            <p:cNvPr id="5" name="Grafik 4"/>
+            <p:cNvPicPr>
+              <a:picLocks noChangeAspect="1"/>
+            </p:cNvPicPr>
+            <p:nvPr/>
+          </p:nvPicPr>
+          <p:blipFill>
+            <a:blip r:embed="rId2">
+              <a:extLst>
+                <a:ext uri="{28A0092B-C50C-407E-A947-70E740481C1C}">
+                  <a14:useLocalDpi xmlns:a14="http://schemas.microsoft.com/office/drawing/2010/main" val="0"/>
+                </a:ext>
+              </a:extLst>
+            </a:blip>
+            <a:stretch>
+              <a:fillRect/>
+            </a:stretch>
+          </p:blipFill>
+          <p:spPr>
+            <a:xfrm>
+              <a:off x="827584" y="3501008"/>
+              <a:ext cx="7344816" cy="8632645"/>
+            </a:xfrm>
+            <a:prstGeom prst="rect">
+              <a:avLst/>
+            </a:prstGeom>
+          </p:spPr>
+        </p:pic>
+        <p:sp>
+          <p:nvSpPr>
+            <p:cNvPr id="6" name="Textfeld 5"/>
+            <p:cNvSpPr txBox="1"/>
+            <p:nvPr/>
+          </p:nvSpPr>
+          <p:spPr>
+            <a:xfrm>
+              <a:off x="4094336" y="4941168"/>
+              <a:ext cx="360040" cy="261610"/>
+            </a:xfrm>
+            <a:prstGeom prst="rect">
+              <a:avLst/>
+            </a:prstGeom>
+            <a:noFill/>
+          </p:spPr>
+          <p:txBody>
+            <a:bodyPr wrap="square" rtlCol="0">
+              <a:spAutoFit/>
+            </a:bodyPr>
+            <a:lstStyle/>
+            <a:p>
+              <a:r>
+                <a:rPr lang="de-CH" sz="1100" dirty="0" smtClean="0"/>
+                <a:t>ja</a:t>
+              </a:r>
+              <a:endParaRPr lang="de-CH" sz="1100" dirty="0"/>
+            </a:p>
+          </p:txBody>
+        </p:sp>
+        <p:sp>
+          <p:nvSpPr>
+            <p:cNvPr id="11" name="Textfeld 10"/>
+            <p:cNvSpPr txBox="1"/>
+            <p:nvPr/>
+          </p:nvSpPr>
+          <p:spPr>
+            <a:xfrm>
+              <a:off x="2051720" y="7173416"/>
+              <a:ext cx="360040" cy="261610"/>
+            </a:xfrm>
+            <a:prstGeom prst="rect">
+              <a:avLst/>
+            </a:prstGeom>
+            <a:noFill/>
+          </p:spPr>
+          <p:txBody>
+            <a:bodyPr wrap="square" rtlCol="0">
+              <a:spAutoFit/>
+            </a:bodyPr>
+            <a:lstStyle/>
+            <a:p>
+              <a:r>
+                <a:rPr lang="de-CH" sz="1100" dirty="0" smtClean="0"/>
+                <a:t>ja</a:t>
+              </a:r>
+              <a:endParaRPr lang="de-CH" sz="1100" dirty="0"/>
+            </a:p>
+          </p:txBody>
+        </p:sp>
+        <p:sp>
+          <p:nvSpPr>
+            <p:cNvPr id="12" name="Textfeld 11"/>
+            <p:cNvSpPr txBox="1"/>
+            <p:nvPr/>
+          </p:nvSpPr>
+          <p:spPr>
+            <a:xfrm>
+              <a:off x="2051720" y="9765704"/>
+              <a:ext cx="360040" cy="261610"/>
+            </a:xfrm>
+            <a:prstGeom prst="rect">
+              <a:avLst/>
+            </a:prstGeom>
+            <a:noFill/>
+          </p:spPr>
+          <p:txBody>
+            <a:bodyPr wrap="square" rtlCol="0">
+              <a:spAutoFit/>
+            </a:bodyPr>
+            <a:lstStyle/>
+            <a:p>
+              <a:r>
+                <a:rPr lang="de-CH" sz="1100" dirty="0" smtClean="0"/>
+                <a:t>ja</a:t>
+              </a:r>
+              <a:endParaRPr lang="de-CH" sz="1100" dirty="0"/>
+            </a:p>
+          </p:txBody>
+        </p:sp>
+        <p:sp>
+          <p:nvSpPr>
+            <p:cNvPr id="13" name="Textfeld 12"/>
+            <p:cNvSpPr txBox="1"/>
+            <p:nvPr/>
+          </p:nvSpPr>
+          <p:spPr>
+            <a:xfrm>
+              <a:off x="3779912" y="7182355"/>
+              <a:ext cx="360040" cy="261610"/>
+            </a:xfrm>
+            <a:prstGeom prst="rect">
+              <a:avLst/>
+            </a:prstGeom>
+            <a:noFill/>
+          </p:spPr>
+          <p:txBody>
+            <a:bodyPr wrap="square" rtlCol="0">
+              <a:spAutoFit/>
+            </a:bodyPr>
+            <a:lstStyle/>
+            <a:p>
+              <a:r>
+                <a:rPr lang="de-CH" sz="1100" dirty="0" smtClean="0"/>
+                <a:t>ja</a:t>
+              </a:r>
+              <a:endParaRPr lang="de-CH" sz="1100" dirty="0"/>
+            </a:p>
+          </p:txBody>
+        </p:sp>
+        <p:sp>
+          <p:nvSpPr>
+            <p:cNvPr id="14" name="Textfeld 13"/>
+            <p:cNvSpPr txBox="1"/>
+            <p:nvPr/>
+          </p:nvSpPr>
+          <p:spPr>
+            <a:xfrm>
+              <a:off x="5436096" y="7182355"/>
+              <a:ext cx="360040" cy="261610"/>
+            </a:xfrm>
+            <a:prstGeom prst="rect">
+              <a:avLst/>
+            </a:prstGeom>
+            <a:noFill/>
+          </p:spPr>
+          <p:txBody>
+            <a:bodyPr wrap="square" rtlCol="0">
+              <a:spAutoFit/>
+            </a:bodyPr>
+            <a:lstStyle/>
+            <a:p>
+              <a:r>
+                <a:rPr lang="de-CH" sz="1100" dirty="0" smtClean="0"/>
+                <a:t>ja</a:t>
+              </a:r>
+              <a:endParaRPr lang="de-CH" sz="1100" dirty="0"/>
+            </a:p>
+          </p:txBody>
+        </p:sp>
+        <p:sp>
+          <p:nvSpPr>
+            <p:cNvPr id="15" name="Textfeld 14"/>
+            <p:cNvSpPr txBox="1"/>
+            <p:nvPr/>
+          </p:nvSpPr>
+          <p:spPr>
+            <a:xfrm>
+              <a:off x="7092280" y="7182355"/>
+              <a:ext cx="360040" cy="261610"/>
+            </a:xfrm>
+            <a:prstGeom prst="rect">
+              <a:avLst/>
+            </a:prstGeom>
+            <a:noFill/>
+          </p:spPr>
+          <p:txBody>
+            <a:bodyPr wrap="square" rtlCol="0">
+              <a:spAutoFit/>
+            </a:bodyPr>
+            <a:lstStyle/>
+            <a:p>
+              <a:r>
+                <a:rPr lang="de-CH" sz="1100" dirty="0" smtClean="0"/>
+                <a:t>ja</a:t>
+              </a:r>
+              <a:endParaRPr lang="de-CH" sz="1100" dirty="0"/>
+            </a:p>
+          </p:txBody>
+        </p:sp>
+        <p:sp>
+          <p:nvSpPr>
+            <p:cNvPr id="16" name="Textfeld 15"/>
+            <p:cNvSpPr txBox="1"/>
+            <p:nvPr/>
+          </p:nvSpPr>
+          <p:spPr>
+            <a:xfrm>
+              <a:off x="7471692" y="6584195"/>
+              <a:ext cx="432048" cy="261610"/>
+            </a:xfrm>
+            <a:prstGeom prst="rect">
+              <a:avLst/>
+            </a:prstGeom>
+            <a:noFill/>
+          </p:spPr>
+          <p:txBody>
+            <a:bodyPr wrap="square" rtlCol="0">
+              <a:spAutoFit/>
+            </a:bodyPr>
+            <a:lstStyle/>
+            <a:p>
+              <a:r>
+                <a:rPr lang="de-CH" sz="1100" dirty="0" smtClean="0"/>
+                <a:t>nein</a:t>
+              </a:r>
+              <a:endParaRPr lang="de-CH" sz="1100" dirty="0"/>
+            </a:p>
+          </p:txBody>
+        </p:sp>
+        <p:sp>
+          <p:nvSpPr>
+            <p:cNvPr id="17" name="Textfeld 16"/>
+            <p:cNvSpPr txBox="1"/>
+            <p:nvPr/>
+          </p:nvSpPr>
+          <p:spPr>
+            <a:xfrm>
+              <a:off x="5796136" y="6584195"/>
+              <a:ext cx="432048" cy="261610"/>
+            </a:xfrm>
+            <a:prstGeom prst="rect">
+              <a:avLst/>
+            </a:prstGeom>
+            <a:noFill/>
+          </p:spPr>
+          <p:txBody>
+            <a:bodyPr wrap="square" rtlCol="0">
+              <a:spAutoFit/>
+            </a:bodyPr>
+            <a:lstStyle/>
+            <a:p>
+              <a:r>
+                <a:rPr lang="de-CH" sz="1100" dirty="0" smtClean="0"/>
+                <a:t>nein</a:t>
+              </a:r>
+              <a:endParaRPr lang="de-CH" sz="1100" dirty="0"/>
+            </a:p>
+          </p:txBody>
+        </p:sp>
+        <p:sp>
+          <p:nvSpPr>
+            <p:cNvPr id="18" name="Textfeld 17"/>
+            <p:cNvSpPr txBox="1"/>
+            <p:nvPr/>
+          </p:nvSpPr>
+          <p:spPr>
+            <a:xfrm>
+              <a:off x="4094336" y="6584195"/>
+              <a:ext cx="432048" cy="261610"/>
+            </a:xfrm>
+            <a:prstGeom prst="rect">
+              <a:avLst/>
+            </a:prstGeom>
+            <a:noFill/>
+          </p:spPr>
+          <p:txBody>
+            <a:bodyPr wrap="square" rtlCol="0">
+              <a:spAutoFit/>
+            </a:bodyPr>
+            <a:lstStyle/>
+            <a:p>
+              <a:r>
+                <a:rPr lang="de-CH" sz="1100" dirty="0" smtClean="0"/>
+                <a:t>nein</a:t>
+              </a:r>
+              <a:endParaRPr lang="de-CH" sz="1100" dirty="0"/>
+            </a:p>
+          </p:txBody>
+        </p:sp>
+        <p:sp>
+          <p:nvSpPr>
+            <p:cNvPr id="19" name="Textfeld 18"/>
+            <p:cNvSpPr txBox="1"/>
+            <p:nvPr/>
+          </p:nvSpPr>
+          <p:spPr>
+            <a:xfrm>
+              <a:off x="2392536" y="6584195"/>
+              <a:ext cx="432048" cy="261610"/>
+            </a:xfrm>
+            <a:prstGeom prst="rect">
+              <a:avLst/>
+            </a:prstGeom>
+            <a:noFill/>
+          </p:spPr>
+          <p:txBody>
+            <a:bodyPr wrap="square" rtlCol="0">
+              <a:spAutoFit/>
+            </a:bodyPr>
+            <a:lstStyle/>
+            <a:p>
+              <a:r>
+                <a:rPr lang="de-CH" sz="1100" dirty="0" smtClean="0"/>
+                <a:t>nein</a:t>
+              </a:r>
+              <a:endParaRPr lang="de-CH" sz="1100" dirty="0"/>
+            </a:p>
+          </p:txBody>
+        </p:sp>
+        <p:sp>
+          <p:nvSpPr>
+            <p:cNvPr id="20" name="Textfeld 19"/>
+            <p:cNvSpPr txBox="1"/>
+            <p:nvPr/>
+          </p:nvSpPr>
+          <p:spPr>
+            <a:xfrm>
+              <a:off x="1187624" y="9189640"/>
+              <a:ext cx="432048" cy="261610"/>
+            </a:xfrm>
+            <a:prstGeom prst="rect">
+              <a:avLst/>
+            </a:prstGeom>
+            <a:noFill/>
+          </p:spPr>
+          <p:txBody>
+            <a:bodyPr wrap="square" rtlCol="0">
+              <a:spAutoFit/>
+            </a:bodyPr>
+            <a:lstStyle/>
+            <a:p>
+              <a:r>
+                <a:rPr lang="de-CH" sz="1100" dirty="0" smtClean="0"/>
+                <a:t>nein</a:t>
+              </a:r>
+              <a:endParaRPr lang="de-CH" sz="1100" dirty="0"/>
+            </a:p>
+          </p:txBody>
+        </p:sp>
+        <p:sp>
+          <p:nvSpPr>
+            <p:cNvPr id="22" name="Textfeld 21"/>
+            <p:cNvSpPr txBox="1"/>
+            <p:nvPr/>
+          </p:nvSpPr>
+          <p:spPr>
+            <a:xfrm>
+              <a:off x="3275856" y="4365104"/>
+              <a:ext cx="432048" cy="261610"/>
+            </a:xfrm>
+            <a:prstGeom prst="rect">
+              <a:avLst/>
+            </a:prstGeom>
+            <a:noFill/>
+          </p:spPr>
+          <p:txBody>
+            <a:bodyPr wrap="square" rtlCol="0">
+              <a:spAutoFit/>
+            </a:bodyPr>
+            <a:lstStyle/>
+            <a:p>
+              <a:r>
+                <a:rPr lang="de-CH" sz="1100" dirty="0" smtClean="0"/>
+                <a:t>nein</a:t>
+              </a:r>
+              <a:endParaRPr lang="de-CH" sz="1100" dirty="0"/>
+            </a:p>
+          </p:txBody>
+        </p:sp>
+      </p:grpSp>
+      <p:sp>
+        <p:nvSpPr>
+          <p:cNvPr id="25" name="Rechteck 24"/>
+          <p:cNvSpPr/>
+          <p:nvPr/>
+        </p:nvSpPr>
+        <p:spPr>
+          <a:xfrm>
+            <a:off x="-406164" y="3212976"/>
+            <a:ext cx="9865096" cy="450796"/>
+          </a:xfrm>
+          <a:prstGeom prst="rect">
+            <a:avLst/>
+          </a:prstGeom>
+          <a:solidFill>
+            <a:schemeClr val="bg1"/>
+          </a:solidFill>
+          <a:effectLst>
+            <a:softEdge rad="127000"/>
+          </a:effectLst>
+        </p:spPr>
+        <p:style>
+          <a:lnRef idx="2">
+            <a:schemeClr val="accent1">
+              <a:shade val="50000"/>
+            </a:schemeClr>
+          </a:lnRef>
+          <a:fillRef idx="1">
+            <a:schemeClr val="accent1"/>
+          </a:fillRef>
+          <a:effectRef idx="0">
+            <a:schemeClr val="accent1"/>
+          </a:effectRef>
+          <a:fontRef idx="minor">
+            <a:schemeClr val="lt1"/>
+          </a:fontRef>
+        </p:style>
+        <p:txBody>
+          <a:bodyPr rtlCol="0" anchor="ctr"/>
+          <a:lstStyle/>
+          <a:p>
+            <a:pPr algn="ctr"/>
+            <a:endParaRPr lang="de-CH"/>
+          </a:p>
+        </p:txBody>
+      </p:sp>
       <p:sp>
         <p:nvSpPr>
           <p:cNvPr id="2" name="Titel 1"/>
@@ -8299,11 +10243,7 @@
               <a:t>Spielfunktion  (Modul </a:t>
             </a:r>
             <a:r>
-              <a:rPr lang="de-CH" dirty="0" smtClean="0"/>
-              <a:t> </a:t>
-            </a:r>
-            <a:r>
-              <a:rPr lang="de-CH" i="1" dirty="0" err="1" smtClean="0"/>
+              <a:rPr lang="de-CH" dirty="0" err="1" smtClean="0"/>
               <a:t>Spiel.c</a:t>
             </a:r>
             <a:r>
@@ -8375,10 +10315,118 @@
           </a:p>
         </p:txBody>
       </p:sp>
+      <p:sp>
+        <p:nvSpPr>
+          <p:cNvPr id="8" name="Rechteck 7"/>
+          <p:cNvSpPr/>
+          <p:nvPr/>
+        </p:nvSpPr>
+        <p:spPr>
+          <a:xfrm>
+            <a:off x="-324544" y="6578602"/>
+            <a:ext cx="9865096" cy="1368152"/>
+          </a:xfrm>
+          <a:prstGeom prst="rect">
+            <a:avLst/>
+          </a:prstGeom>
+          <a:solidFill>
+            <a:schemeClr val="bg1"/>
+          </a:solidFill>
+          <a:effectLst>
+            <a:softEdge rad="127000"/>
+          </a:effectLst>
+        </p:spPr>
+        <p:style>
+          <a:lnRef idx="2">
+            <a:schemeClr val="accent1">
+              <a:shade val="50000"/>
+            </a:schemeClr>
+          </a:lnRef>
+          <a:fillRef idx="1">
+            <a:schemeClr val="accent1"/>
+          </a:fillRef>
+          <a:effectRef idx="0">
+            <a:schemeClr val="accent1"/>
+          </a:effectRef>
+          <a:fontRef idx="minor">
+            <a:schemeClr val="lt1"/>
+          </a:fontRef>
+        </p:style>
+        <p:txBody>
+          <a:bodyPr rtlCol="0" anchor="ctr"/>
+          <a:lstStyle/>
+          <a:p>
+            <a:pPr algn="ctr"/>
+            <a:endParaRPr lang="de-CH"/>
+          </a:p>
+        </p:txBody>
+      </p:sp>
+      <p:pic>
+        <p:nvPicPr>
+          <p:cNvPr id="3078" name="Picture 6"/>
+          <p:cNvPicPr>
+            <a:picLocks noChangeAspect="1" noChangeArrowheads="1"/>
+          </p:cNvPicPr>
+          <p:nvPr/>
+        </p:nvPicPr>
+        <p:blipFill rotWithShape="1">
+          <a:blip r:embed="rId3">
+            <a:extLst>
+              <a:ext uri="{28A0092B-C50C-407E-A947-70E740481C1C}">
+                <a14:useLocalDpi xmlns:a14="http://schemas.microsoft.com/office/drawing/2010/main" val="0"/>
+              </a:ext>
+            </a:extLst>
+          </a:blip>
+          <a:srcRect l="12534" r="12452" b="47943"/>
+          <a:stretch/>
+        </p:blipFill>
+        <p:spPr bwMode="auto">
+          <a:xfrm>
+            <a:off x="0" y="-1364"/>
+            <a:ext cx="9153345" cy="3573015"/>
+          </a:xfrm>
+          <a:prstGeom prst="rect">
+            <a:avLst/>
+          </a:prstGeom>
+          <a:noFill/>
+          <a:ln>
+            <a:noFill/>
+          </a:ln>
+          <a:effectLst/>
+          <a:extLst>
+            <a:ext uri="{909E8E84-426E-40DD-AFC4-6F175D3DCCD1}">
+              <a14:hiddenFill xmlns:a14="http://schemas.microsoft.com/office/drawing/2010/main">
+                <a:solidFill>
+                  <a:schemeClr val="accent1"/>
+                </a:solidFill>
+              </a14:hiddenFill>
+            </a:ext>
+            <a:ext uri="{91240B29-F687-4F45-9708-019B960494DF}">
+              <a14:hiddenLine xmlns:a14="http://schemas.microsoft.com/office/drawing/2010/main" w="9525">
+                <a:solidFill>
+                  <a:schemeClr val="tx1"/>
+                </a:solidFill>
+                <a:miter lim="800000"/>
+                <a:headEnd/>
+                <a:tailEnd/>
+              </a14:hiddenLine>
+            </a:ext>
+            <a:ext uri="{AF507438-7753-43E0-B8FC-AC1667EBCBE1}">
+              <a14:hiddenEffects xmlns:a14="http://schemas.microsoft.com/office/drawing/2010/main">
+                <a:effectLst>
+                  <a:outerShdw dist="35921" dir="2700000" algn="ctr" rotWithShape="0">
+                    <a:schemeClr val="bg2"/>
+                  </a:outerShdw>
+                </a:effectLst>
+              </a14:hiddenEffects>
+            </a:ext>
+          </a:extLst>
+        </p:spPr>
+      </p:pic>
     </p:spTree>
     <p:extLst>
       <p:ext uri="{BB962C8B-B14F-4D97-AF65-F5344CB8AC3E}">
-        <p14:creationId xmlns:p14="http://schemas.microsoft.com/office/powerpoint/2010/main" xmlns="" val="2375923500"/>
+        <p14:creationId xmlns:p14="http://schemas.microsoft.com/office/powerpoint/2010/main" val="3986502252"/>
       </p:ext>
     </p:extLst>
   </p:cSld>
@@ -8388,9 +10436,400 @@
   <p:timing>
     <p:tnLst>
       <p:par>
-        <p:cTn id="1" dur="indefinite" restart="never" nodeType="tmRoot"/>
+        <p:cTn id="1" dur="indefinite" restart="never" nodeType="tmRoot">
+          <p:childTnLst>
+            <p:seq concurrent="1" nextAc="seek">
+              <p:cTn id="2" dur="indefinite" nodeType="mainSeq">
+                <p:childTnLst>
+                  <p:par>
+                    <p:cTn id="3" fill="hold">
+                      <p:stCondLst>
+                        <p:cond delay="indefinite"/>
+                      </p:stCondLst>
+                      <p:childTnLst>
+                        <p:par>
+                          <p:cTn id="4" fill="hold">
+                            <p:stCondLst>
+                              <p:cond delay="0"/>
+                            </p:stCondLst>
+                            <p:childTnLst>
+                              <p:par>
+                                <p:cTn id="5" presetID="1" presetClass="entr" presetSubtype="0" fill="hold" grpId="0" nodeType="clickEffect">
+                                  <p:stCondLst>
+                                    <p:cond delay="0"/>
+                                  </p:stCondLst>
+                                  <p:childTnLst>
+                                    <p:set>
+                                      <p:cBhvr>
+                                        <p:cTn id="6" dur="1" fill="hold">
+                                          <p:stCondLst>
+                                            <p:cond delay="0"/>
+                                          </p:stCondLst>
+                                        </p:cTn>
+                                        <p:tgtEl>
+                                          <p:spTgt spid="3">
+                                            <p:txEl>
+                                              <p:pRg st="0" end="0"/>
+                                            </p:txEl>
+                                          </p:spTgt>
+                                        </p:tgtEl>
+                                        <p:attrNameLst>
+                                          <p:attrName>style.visibility</p:attrName>
+                                        </p:attrNameLst>
+                                      </p:cBhvr>
+                                      <p:to>
+                                        <p:strVal val="visible"/>
+                                      </p:to>
+                                    </p:set>
+                                  </p:childTnLst>
+                                </p:cTn>
+                              </p:par>
+                              <p:par>
+                                <p:cTn id="7" presetID="1" presetClass="entr" presetSubtype="0" fill="hold" grpId="0" nodeType="withEffect">
+                                  <p:stCondLst>
+                                    <p:cond delay="0"/>
+                                  </p:stCondLst>
+                                  <p:childTnLst>
+                                    <p:set>
+                                      <p:cBhvr>
+                                        <p:cTn id="8" dur="1" fill="hold">
+                                          <p:stCondLst>
+                                            <p:cond delay="0"/>
+                                          </p:stCondLst>
+                                        </p:cTn>
+                                        <p:tgtEl>
+                                          <p:spTgt spid="3">
+                                            <p:txEl>
+                                              <p:pRg st="1" end="1"/>
+                                            </p:txEl>
+                                          </p:spTgt>
+                                        </p:tgtEl>
+                                        <p:attrNameLst>
+                                          <p:attrName>style.visibility</p:attrName>
+                                        </p:attrNameLst>
+                                      </p:cBhvr>
+                                      <p:to>
+                                        <p:strVal val="visible"/>
+                                      </p:to>
+                                    </p:set>
+                                  </p:childTnLst>
+                                </p:cTn>
+                              </p:par>
+                              <p:par>
+                                <p:cTn id="9" presetID="1" presetClass="entr" presetSubtype="0" fill="hold" grpId="0" nodeType="withEffect">
+                                  <p:stCondLst>
+                                    <p:cond delay="0"/>
+                                  </p:stCondLst>
+                                  <p:childTnLst>
+                                    <p:set>
+                                      <p:cBhvr>
+                                        <p:cTn id="10" dur="1" fill="hold">
+                                          <p:stCondLst>
+                                            <p:cond delay="0"/>
+                                          </p:stCondLst>
+                                        </p:cTn>
+                                        <p:tgtEl>
+                                          <p:spTgt spid="3">
+                                            <p:txEl>
+                                              <p:pRg st="2" end="2"/>
+                                            </p:txEl>
+                                          </p:spTgt>
+                                        </p:tgtEl>
+                                        <p:attrNameLst>
+                                          <p:attrName>style.visibility</p:attrName>
+                                        </p:attrNameLst>
+                                      </p:cBhvr>
+                                      <p:to>
+                                        <p:strVal val="visible"/>
+                                      </p:to>
+                                    </p:set>
+                                  </p:childTnLst>
+                                </p:cTn>
+                              </p:par>
+                              <p:par>
+                                <p:cTn id="11" presetID="1" presetClass="entr" presetSubtype="0" fill="hold" grpId="0" nodeType="withEffect">
+                                  <p:stCondLst>
+                                    <p:cond delay="0"/>
+                                  </p:stCondLst>
+                                  <p:childTnLst>
+                                    <p:set>
+                                      <p:cBhvr>
+                                        <p:cTn id="12" dur="1" fill="hold">
+                                          <p:stCondLst>
+                                            <p:cond delay="0"/>
+                                          </p:stCondLst>
+                                        </p:cTn>
+                                        <p:tgtEl>
+                                          <p:spTgt spid="3">
+                                            <p:txEl>
+                                              <p:pRg st="3" end="3"/>
+                                            </p:txEl>
+                                          </p:spTgt>
+                                        </p:tgtEl>
+                                        <p:attrNameLst>
+                                          <p:attrName>style.visibility</p:attrName>
+                                        </p:attrNameLst>
+                                      </p:cBhvr>
+                                      <p:to>
+                                        <p:strVal val="visible"/>
+                                      </p:to>
+                                    </p:set>
+                                  </p:childTnLst>
+                                </p:cTn>
+                              </p:par>
+                              <p:par>
+                                <p:cTn id="13" presetID="1" presetClass="entr" presetSubtype="0" fill="hold" grpId="0" nodeType="withEffect">
+                                  <p:stCondLst>
+                                    <p:cond delay="0"/>
+                                  </p:stCondLst>
+                                  <p:childTnLst>
+                                    <p:set>
+                                      <p:cBhvr>
+                                        <p:cTn id="14" dur="1" fill="hold">
+                                          <p:stCondLst>
+                                            <p:cond delay="0"/>
+                                          </p:stCondLst>
+                                        </p:cTn>
+                                        <p:tgtEl>
+                                          <p:spTgt spid="3">
+                                            <p:txEl>
+                                              <p:pRg st="4" end="4"/>
+                                            </p:txEl>
+                                          </p:spTgt>
+                                        </p:tgtEl>
+                                        <p:attrNameLst>
+                                          <p:attrName>style.visibility</p:attrName>
+                                        </p:attrNameLst>
+                                      </p:cBhvr>
+                                      <p:to>
+                                        <p:strVal val="visible"/>
+                                      </p:to>
+                                    </p:set>
+                                  </p:childTnLst>
+                                </p:cTn>
+                              </p:par>
+                            </p:childTnLst>
+                          </p:cTn>
+                        </p:par>
+                      </p:childTnLst>
+                    </p:cTn>
+                  </p:par>
+                  <p:par>
+                    <p:cTn id="15" fill="hold">
+                      <p:stCondLst>
+                        <p:cond delay="indefinite"/>
+                      </p:stCondLst>
+                      <p:childTnLst>
+                        <p:par>
+                          <p:cTn id="16" fill="hold">
+                            <p:stCondLst>
+                              <p:cond delay="0"/>
+                            </p:stCondLst>
+                            <p:childTnLst>
+                              <p:par>
+                                <p:cTn id="17" presetID="1" presetClass="entr" presetSubtype="0" fill="hold" nodeType="clickEffect">
+                                  <p:stCondLst>
+                                    <p:cond delay="0"/>
+                                  </p:stCondLst>
+                                  <p:childTnLst>
+                                    <p:set>
+                                      <p:cBhvr>
+                                        <p:cTn id="18" dur="1" fill="hold">
+                                          <p:stCondLst>
+                                            <p:cond delay="0"/>
+                                          </p:stCondLst>
+                                        </p:cTn>
+                                        <p:tgtEl>
+                                          <p:spTgt spid="3078"/>
+                                        </p:tgtEl>
+                                        <p:attrNameLst>
+                                          <p:attrName>style.visibility</p:attrName>
+                                        </p:attrNameLst>
+                                      </p:cBhvr>
+                                      <p:to>
+                                        <p:strVal val="visible"/>
+                                      </p:to>
+                                    </p:set>
+                                  </p:childTnLst>
+                                </p:cTn>
+                              </p:par>
+                              <p:par>
+                                <p:cTn id="19" presetID="1" presetClass="entr" presetSubtype="0" fill="hold" nodeType="withEffect">
+                                  <p:stCondLst>
+                                    <p:cond delay="0"/>
+                                  </p:stCondLst>
+                                  <p:childTnLst>
+                                    <p:set>
+                                      <p:cBhvr>
+                                        <p:cTn id="20" dur="1" fill="hold">
+                                          <p:stCondLst>
+                                            <p:cond delay="0"/>
+                                          </p:stCondLst>
+                                        </p:cTn>
+                                        <p:tgtEl>
+                                          <p:spTgt spid="7"/>
+                                        </p:tgtEl>
+                                        <p:attrNameLst>
+                                          <p:attrName>style.visibility</p:attrName>
+                                        </p:attrNameLst>
+                                      </p:cBhvr>
+                                      <p:to>
+                                        <p:strVal val="visible"/>
+                                      </p:to>
+                                    </p:set>
+                                  </p:childTnLst>
+                                </p:cTn>
+                              </p:par>
+                            </p:childTnLst>
+                          </p:cTn>
+                        </p:par>
+                      </p:childTnLst>
+                    </p:cTn>
+                  </p:par>
+                  <p:par>
+                    <p:cTn id="21" fill="hold">
+                      <p:stCondLst>
+                        <p:cond delay="indefinite"/>
+                      </p:stCondLst>
+                      <p:childTnLst>
+                        <p:par>
+                          <p:cTn id="22" fill="hold">
+                            <p:stCondLst>
+                              <p:cond delay="0"/>
+                            </p:stCondLst>
+                            <p:childTnLst>
+                              <p:par>
+                                <p:cTn id="23" presetID="64" presetClass="path" presetSubtype="0" accel="50000" decel="50000" fill="hold" nodeType="clickEffect">
+                                  <p:stCondLst>
+                                    <p:cond delay="0"/>
+                                  </p:stCondLst>
+                                  <p:childTnLst>
+                                    <p:animMotion origin="layout" path="M 2.5E-6 -6.47698E-8 L 0.00017 -0.28383 " pathEditMode="relative" rAng="0" ptsTypes="AA">
+                                      <p:cBhvr>
+                                        <p:cTn id="24" dur="750" fill="hold"/>
+                                        <p:tgtEl>
+                                          <p:spTgt spid="7"/>
+                                        </p:tgtEl>
+                                        <p:attrNameLst>
+                                          <p:attrName>ppt_x</p:attrName>
+                                          <p:attrName>ppt_y</p:attrName>
+                                        </p:attrNameLst>
+                                      </p:cBhvr>
+                                      <p:rCtr x="0" y="-14203"/>
+                                    </p:animMotion>
+                                  </p:childTnLst>
+                                </p:cTn>
+                              </p:par>
+                            </p:childTnLst>
+                          </p:cTn>
+                        </p:par>
+                      </p:childTnLst>
+                    </p:cTn>
+                  </p:par>
+                  <p:par>
+                    <p:cTn id="25" fill="hold">
+                      <p:stCondLst>
+                        <p:cond delay="indefinite"/>
+                      </p:stCondLst>
+                      <p:childTnLst>
+                        <p:par>
+                          <p:cTn id="26" fill="hold">
+                            <p:stCondLst>
+                              <p:cond delay="0"/>
+                            </p:stCondLst>
+                            <p:childTnLst>
+                              <p:par>
+                                <p:cTn id="27" presetID="64" presetClass="path" presetSubtype="0" accel="50000" decel="50000" fill="hold" nodeType="clickEffect">
+                                  <p:stCondLst>
+                                    <p:cond delay="0"/>
+                                  </p:stCondLst>
+                                  <p:childTnLst>
+                                    <p:animMotion origin="layout" path="M 0.00017 -0.28383 L 0.00035 -0.55887 " pathEditMode="relative" rAng="0" ptsTypes="AA">
+                                      <p:cBhvr>
+                                        <p:cTn id="28" dur="750" fill="hold"/>
+                                        <p:tgtEl>
+                                          <p:spTgt spid="7"/>
+                                        </p:tgtEl>
+                                        <p:attrNameLst>
+                                          <p:attrName>ppt_x</p:attrName>
+                                          <p:attrName>ppt_y</p:attrName>
+                                        </p:attrNameLst>
+                                      </p:cBhvr>
+                                      <p:rCtr x="0" y="-13764"/>
+                                    </p:animMotion>
+                                  </p:childTnLst>
+                                </p:cTn>
+                              </p:par>
+                            </p:childTnLst>
+                          </p:cTn>
+                        </p:par>
+                      </p:childTnLst>
+                    </p:cTn>
+                  </p:par>
+                  <p:par>
+                    <p:cTn id="29" fill="hold">
+                      <p:stCondLst>
+                        <p:cond delay="indefinite"/>
+                      </p:stCondLst>
+                      <p:childTnLst>
+                        <p:par>
+                          <p:cTn id="30" fill="hold">
+                            <p:stCondLst>
+                              <p:cond delay="0"/>
+                            </p:stCondLst>
+                            <p:childTnLst>
+                              <p:par>
+                                <p:cTn id="31" presetID="64" presetClass="path" presetSubtype="0" accel="50000" decel="50000" fill="hold" nodeType="clickEffect">
+                                  <p:stCondLst>
+                                    <p:cond delay="0"/>
+                                  </p:stCondLst>
+                                  <p:childTnLst>
+                                    <p:animMotion origin="layout" path="M 0.00035 -0.55887 L 0.00052 -0.83577 " pathEditMode="relative" rAng="0" ptsTypes="AA">
+                                      <p:cBhvr>
+                                        <p:cTn id="32" dur="750" fill="hold"/>
+                                        <p:tgtEl>
+                                          <p:spTgt spid="7"/>
+                                        </p:tgtEl>
+                                        <p:attrNameLst>
+                                          <p:attrName>ppt_x</p:attrName>
+                                          <p:attrName>ppt_y</p:attrName>
+                                        </p:attrNameLst>
+                                      </p:cBhvr>
+                                      <p:rCtr x="0" y="-13856"/>
+                                    </p:animMotion>
+                                  </p:childTnLst>
+                                </p:cTn>
+                              </p:par>
+                            </p:childTnLst>
+                          </p:cTn>
+                        </p:par>
+                      </p:childTnLst>
+                    </p:cTn>
+                  </p:par>
+                </p:childTnLst>
+              </p:cTn>
+              <p:prevCondLst>
+                <p:cond evt="onPrev" delay="0">
+                  <p:tgtEl>
+                    <p:sldTgt/>
+                  </p:tgtEl>
+                </p:cond>
+              </p:prevCondLst>
+              <p:nextCondLst>
+                <p:cond evt="onNext" delay="0">
+                  <p:tgtEl>
+                    <p:sldTgt/>
+                  </p:tgtEl>
+                </p:cond>
+              </p:nextCondLst>
+            </p:seq>
+          </p:childTnLst>
+        </p:cTn>
       </p:par>
     </p:tnLst>
+    <p:bldLst>
+      <p:bldP spid="3" grpId="0" uiExpand="1" build="p"/>
+    </p:bldLst>
   </p:timing>
 </p:sld>
 </file>
@@ -8518,11 +10957,7 @@
           <a:p>
             <a:r>
               <a:rPr lang="de-CH" dirty="0" smtClean="0"/>
-              <a:t>Logik-Funktionen  (Modul </a:t>
-            </a:r>
-            <a:r>
-              <a:rPr lang="de-CH" dirty="0" smtClean="0"/>
-              <a:t> </a:t>
+              <a:t>Logik-Funktionen  (Modul  </a:t>
             </a:r>
             <a:r>
               <a:rPr lang="de-CH" i="1" dirty="0" err="1" smtClean="0"/>
@@ -8560,11 +10995,7 @@
             <a:pPr lvl="1"/>
             <a:r>
               <a:rPr lang="de-CH" dirty="0" smtClean="0"/>
-              <a:t>Laser </a:t>
-            </a:r>
-            <a:r>
-              <a:rPr lang="de-CH" dirty="0" smtClean="0"/>
-              <a:t>abfeuern </a:t>
+              <a:t>Laser abfeuern </a:t>
             </a:r>
             <a:r>
               <a:rPr lang="de-CH" dirty="0" smtClean="0">
@@ -8578,13 +11009,8 @@
             <a:pPr lvl="1"/>
             <a:r>
               <a:rPr lang="de-CH" dirty="0" smtClean="0"/>
-              <a:t>Diverse </a:t>
-            </a:r>
-            <a:r>
-              <a:rPr lang="de-CH" dirty="0" smtClean="0"/>
-              <a:t>andere Hilfsfunktionen („Logik“ – Funktionen)</a:t>
-            </a:r>
-            <a:endParaRPr lang="de-CH" dirty="0" smtClean="0"/>
+              <a:t>Diverse andere Hilfsfunktionen („Logik“ – Funktionen)</a:t>
+            </a:r>
           </a:p>
           <a:p>
             <a:endParaRPr lang="de-CH" dirty="0" smtClean="0"/>
@@ -8597,7 +11023,7 @@
     </p:spTree>
     <p:extLst>
       <p:ext uri="{BB962C8B-B14F-4D97-AF65-F5344CB8AC3E}">
-        <p14:creationId xmlns:p14="http://schemas.microsoft.com/office/powerpoint/2010/main" xmlns="" val="3950922658"/>
+        <p14:creationId xmlns:p14="http://schemas.microsoft.com/office/powerpoint/2010/main" val="3950922658"/>
       </p:ext>
     </p:extLst>
   </p:cSld>
@@ -8625,64 +11051,95 @@
                             </p:stCondLst>
                             <p:childTnLst>
                               <p:par>
-                                <p:cTn id="5" presetID="64" presetClass="path" presetSubtype="0" accel="50000" decel="50000" fill="hold" nodeType="clickEffect">
+                                <p:cTn id="5" presetID="1" presetClass="entr" presetSubtype="0" fill="hold" grpId="0" nodeType="clickEffect">
                                   <p:stCondLst>
                                     <p:cond delay="0"/>
                                   </p:stCondLst>
                                   <p:childTnLst>
-                                    <p:animMotion origin="layout" path="M -3.33333E-6 0 L -3.33333E-6 -0.14468 " pathEditMode="relative" rAng="0" ptsTypes="AA">
+                                    <p:set>
                                       <p:cBhvr>
-                                        <p:cTn id="6" dur="600" fill="hold"/>
+                                        <p:cTn id="6" dur="1" fill="hold">
+                                          <p:stCondLst>
+                                            <p:cond delay="0"/>
+                                          </p:stCondLst>
+                                        </p:cTn>
                                         <p:tgtEl>
-                                          <p:spTgt spid="20485"/>
+                                          <p:spTgt spid="3">
+                                            <p:txEl>
+                                              <p:pRg st="0" end="0"/>
+                                            </p:txEl>
+                                          </p:spTgt>
                                         </p:tgtEl>
                                         <p:attrNameLst>
-                                          <p:attrName>ppt_x</p:attrName>
-                                          <p:attrName>ppt_y</p:attrName>
+                                          <p:attrName>style.visibility</p:attrName>
                                         </p:attrNameLst>
                                       </p:cBhvr>
-                                      <p:rCtr x="0" y="-72"/>
-                                    </p:animMotion>
+                                      <p:to>
+                                        <p:strVal val="visible"/>
+                                      </p:to>
+                                    </p:set>
                                   </p:childTnLst>
                                 </p:cTn>
                               </p:par>
-                            </p:childTnLst>
-                          </p:cTn>
-                        </p:par>
-                      </p:childTnLst>
-                    </p:cTn>
-                  </p:par>
-                  <p:par>
-                    <p:cTn id="7" fill="hold">
-                      <p:stCondLst>
-                        <p:cond delay="indefinite"/>
-                      </p:stCondLst>
-                      <p:childTnLst>
-                        <p:par>
-                          <p:cTn id="8" fill="hold">
-                            <p:stCondLst>
-                              <p:cond delay="0"/>
-                            </p:stCondLst>
-                            <p:childTnLst>
                               <p:par>
-                                <p:cTn id="9" presetID="64" presetClass="path" presetSubtype="0" accel="50000" decel="50000" fill="hold" nodeType="clickEffect">
+                                <p:cTn id="7" presetID="1" presetClass="entr" presetSubtype="0" fill="hold" grpId="0" nodeType="withEffect">
                                   <p:stCondLst>
                                     <p:cond delay="0"/>
                                   </p:stCondLst>
                                   <p:childTnLst>
-                                    <p:animMotion origin="layout" path="M 2.5E-6 -0.14468 L 2.5E-6 -0.28936 " pathEditMode="relative" rAng="0" ptsTypes="AA">
+                                    <p:set>
                                       <p:cBhvr>
-                                        <p:cTn id="10" dur="600" fill="hold"/>
+                                        <p:cTn id="8" dur="1" fill="hold">
+                                          <p:stCondLst>
+                                            <p:cond delay="0"/>
+                                          </p:stCondLst>
+                                        </p:cTn>
                                         <p:tgtEl>
-                                          <p:spTgt spid="20485"/>
+                                          <p:spTgt spid="3">
+                                            <p:txEl>
+                                              <p:pRg st="1" end="1"/>
+                                            </p:txEl>
+                                          </p:spTgt>
                                         </p:tgtEl>
                                         <p:attrNameLst>
-                                          <p:attrName>ppt_x</p:attrName>
-                                          <p:attrName>ppt_y</p:attrName>
+                                          <p:attrName>style.visibility</p:attrName>
                                         </p:attrNameLst>
                                       </p:cBhvr>
-                                      <p:rCtr x="0" y="-72"/>
-                                    </p:animMotion>
+                                      <p:to>
+                                        <p:strVal val="visible"/>
+                                      </p:to>
+                                    </p:set>
+                                  </p:childTnLst>
+                                </p:cTn>
+                              </p:par>
+                              <p:par>
+                                <p:cTn id="9" presetID="1" presetClass="entr" presetSubtype="0" fill="hold" grpId="0" nodeType="withEffect">
+                                  <p:stCondLst>
+                                    <p:cond delay="0"/>
+                                  </p:stCondLst>
+                                  <p:childTnLst>
+                                    <p:set>
+                                      <p:cBhvr>
+                                        <p:cTn id="10" dur="1" fill="hold">
+                                          <p:stCondLst>
+                                            <p:cond delay="0"/>
+                                          </p:stCondLst>
+                                        </p:cTn>
+                                        <p:tgtEl>
+                                          <p:spTgt spid="3">
+                                            <p:txEl>
+                                              <p:pRg st="2" end="2"/>
+                                            </p:txEl>
+                                          </p:spTgt>
+                                        </p:tgtEl>
+                                        <p:attrNameLst>
+                                          <p:attrName>style.visibility</p:attrName>
+                                        </p:attrNameLst>
+                                      </p:cBhvr>
+                                      <p:to>
+                                        <p:strVal val="visible"/>
+                                      </p:to>
+                                    </p:set>
                                   </p:childTnLst>
                                 </p:cTn>
                               </p:par>
@@ -8705,24 +11162,29 @@
                             </p:stCondLst>
                             <p:childTnLst>
                               <p:par>
-                                <p:cTn id="13" presetID="64" presetClass="path" presetSubtype="0" accel="50000" decel="50000" fill="hold" nodeType="clickEffect">
+                                <p:cTn id="13" presetID="1" presetClass="entr" presetSubtype="0" fill="hold" nodeType="clickEffect">
                                   <p:stCondLst>
                                     <p:cond delay="0"/>
                                   </p:stCondLst>
                                   <p:childTnLst>
-                                    <p:animMotion origin="layout" path="M -1.38889E-6 -0.28935 L -1.38889E-6 -0.43403 " pathEditMode="relative" rAng="0" ptsTypes="AA">
+                                    <p:set>
                                       <p:cBhvr>
-                                        <p:cTn id="14" dur="600" fill="hold"/>
+                                        <p:cTn id="14" dur="1" fill="hold">
+                                          <p:stCondLst>
+                                            <p:cond delay="0"/>
+                                          </p:stCondLst>
+                                        </p:cTn>
                                         <p:tgtEl>
                                           <p:spTgt spid="20485"/>
                                         </p:tgtEl>
                                         <p:attrNameLst>
-                                          <p:attrName>ppt_x</p:attrName>
-                                          <p:attrName>ppt_y</p:attrName>
+                                          <p:attrName>style.visibility</p:attrName>
                                         </p:attrNameLst>
                                       </p:cBhvr>
-                                      <p:rCtr x="0" y="-72"/>
-                                    </p:animMotion>
+                                      <p:to>
+                                        <p:strVal val="visible"/>
+                                      </p:to>
+                                    </p:set>
                                   </p:childTnLst>
                                 </p:cTn>
                               </p:par>
@@ -8750,7 +11212,7 @@
                                     <p:cond delay="0"/>
                                   </p:stCondLst>
                                   <p:childTnLst>
-                                    <p:animMotion origin="layout" path="M -1.38889E-6 -0.43403 L -1.38889E-6 -0.57871 " pathEditMode="relative" rAng="0" ptsTypes="AA">
+                                    <p:animMotion origin="layout" path="M -3.33333E-6 0 L -3.33333E-6 -0.14468 " pathEditMode="relative" rAng="0" ptsTypes="AA">
                                       <p:cBhvr>
                                         <p:cTn id="18" dur="600" fill="hold"/>
                                         <p:tgtEl>
@@ -8790,9 +11252,129 @@
                                     <p:cond delay="0"/>
                                   </p:stCondLst>
                                   <p:childTnLst>
+                                    <p:animMotion origin="layout" path="M 2.5E-6 -0.14468 L 2.5E-6 -0.28936 " pathEditMode="relative" rAng="0" ptsTypes="AA">
+                                      <p:cBhvr>
+                                        <p:cTn id="22" dur="600" fill="hold"/>
+                                        <p:tgtEl>
+                                          <p:spTgt spid="20485"/>
+                                        </p:tgtEl>
+                                        <p:attrNameLst>
+                                          <p:attrName>ppt_x</p:attrName>
+                                          <p:attrName>ppt_y</p:attrName>
+                                        </p:attrNameLst>
+                                      </p:cBhvr>
+                                      <p:rCtr x="0" y="-72"/>
+                                    </p:animMotion>
+                                  </p:childTnLst>
+                                </p:cTn>
+                              </p:par>
+                            </p:childTnLst>
+                          </p:cTn>
+                        </p:par>
+                      </p:childTnLst>
+                    </p:cTn>
+                  </p:par>
+                  <p:par>
+                    <p:cTn id="23" fill="hold">
+                      <p:stCondLst>
+                        <p:cond delay="indefinite"/>
+                      </p:stCondLst>
+                      <p:childTnLst>
+                        <p:par>
+                          <p:cTn id="24" fill="hold">
+                            <p:stCondLst>
+                              <p:cond delay="0"/>
+                            </p:stCondLst>
+                            <p:childTnLst>
+                              <p:par>
+                                <p:cTn id="25" presetID="64" presetClass="path" presetSubtype="0" accel="50000" decel="50000" fill="hold" nodeType="clickEffect">
+                                  <p:stCondLst>
+                                    <p:cond delay="0"/>
+                                  </p:stCondLst>
+                                  <p:childTnLst>
+                                    <p:animMotion origin="layout" path="M -1.38889E-6 -0.28935 L -1.38889E-6 -0.43403 " pathEditMode="relative" rAng="0" ptsTypes="AA">
+                                      <p:cBhvr>
+                                        <p:cTn id="26" dur="600" fill="hold"/>
+                                        <p:tgtEl>
+                                          <p:spTgt spid="20485"/>
+                                        </p:tgtEl>
+                                        <p:attrNameLst>
+                                          <p:attrName>ppt_x</p:attrName>
+                                          <p:attrName>ppt_y</p:attrName>
+                                        </p:attrNameLst>
+                                      </p:cBhvr>
+                                      <p:rCtr x="0" y="-72"/>
+                                    </p:animMotion>
+                                  </p:childTnLst>
+                                </p:cTn>
+                              </p:par>
+                            </p:childTnLst>
+                          </p:cTn>
+                        </p:par>
+                      </p:childTnLst>
+                    </p:cTn>
+                  </p:par>
+                  <p:par>
+                    <p:cTn id="27" fill="hold">
+                      <p:stCondLst>
+                        <p:cond delay="indefinite"/>
+                      </p:stCondLst>
+                      <p:childTnLst>
+                        <p:par>
+                          <p:cTn id="28" fill="hold">
+                            <p:stCondLst>
+                              <p:cond delay="0"/>
+                            </p:stCondLst>
+                            <p:childTnLst>
+                              <p:par>
+                                <p:cTn id="29" presetID="64" presetClass="path" presetSubtype="0" accel="50000" decel="50000" fill="hold" nodeType="clickEffect">
+                                  <p:stCondLst>
+                                    <p:cond delay="0"/>
+                                  </p:stCondLst>
+                                  <p:childTnLst>
+                                    <p:animMotion origin="layout" path="M -1.38889E-6 -0.43403 L -1.38889E-6 -0.57871 " pathEditMode="relative" rAng="0" ptsTypes="AA">
+                                      <p:cBhvr>
+                                        <p:cTn id="30" dur="600" fill="hold"/>
+                                        <p:tgtEl>
+                                          <p:spTgt spid="20485"/>
+                                        </p:tgtEl>
+                                        <p:attrNameLst>
+                                          <p:attrName>ppt_x</p:attrName>
+                                          <p:attrName>ppt_y</p:attrName>
+                                        </p:attrNameLst>
+                                      </p:cBhvr>
+                                      <p:rCtr x="0" y="-72"/>
+                                    </p:animMotion>
+                                  </p:childTnLst>
+                                </p:cTn>
+                              </p:par>
+                            </p:childTnLst>
+                          </p:cTn>
+                        </p:par>
+                      </p:childTnLst>
+                    </p:cTn>
+                  </p:par>
+                  <p:par>
+                    <p:cTn id="31" fill="hold">
+                      <p:stCondLst>
+                        <p:cond delay="indefinite"/>
+                      </p:stCondLst>
+                      <p:childTnLst>
+                        <p:par>
+                          <p:cTn id="32" fill="hold">
+                            <p:stCondLst>
+                              <p:cond delay="0"/>
+                            </p:stCondLst>
+                            <p:childTnLst>
+                              <p:par>
+                                <p:cTn id="33" presetID="64" presetClass="path" presetSubtype="0" accel="50000" decel="50000" fill="hold" nodeType="clickEffect">
+                                  <p:stCondLst>
+                                    <p:cond delay="0"/>
+                                  </p:stCondLst>
+                                  <p:childTnLst>
                                     <p:animMotion origin="layout" path="M -1.38889E-6 -0.57871 L -1.38889E-6 -0.72338 " pathEditMode="relative" rAng="0" ptsTypes="AA">
                                       <p:cBhvr>
-                                        <p:cTn id="22" dur="600" fill="hold"/>
+                                        <p:cTn id="34" dur="600" fill="hold"/>
                                         <p:tgtEl>
                                           <p:spTgt spid="20485"/>
                                         </p:tgtEl>
@@ -8833,6 +11415,9 @@
         </p:cTn>
       </p:par>
     </p:tnLst>
+    <p:bldLst>
+      <p:bldP spid="3" grpId="0" build="p"/>
+    </p:bldLst>
   </p:timing>
 </p:sld>
 </file>
@@ -8871,11 +11456,7 @@
           <a:p>
             <a:r>
               <a:rPr lang="de-CH" dirty="0" smtClean="0"/>
-              <a:t>Grafik-Funktionen  (Modul </a:t>
-            </a:r>
-            <a:r>
-              <a:rPr lang="de-CH" dirty="0" smtClean="0"/>
-              <a:t> </a:t>
+              <a:t>Grafik-Funktionen  (Modul  </a:t>
             </a:r>
             <a:r>
               <a:rPr lang="de-CH" i="1" dirty="0" err="1" smtClean="0"/>
@@ -8929,13 +11510,8 @@
             <a:pPr lvl="1"/>
             <a:r>
               <a:rPr lang="de-CH" dirty="0" smtClean="0"/>
-              <a:t>Figuren </a:t>
-            </a:r>
-            <a:r>
-              <a:rPr lang="de-CH" dirty="0" smtClean="0"/>
-              <a:t>löschen (und Zerstörung zeichnen)</a:t>
-            </a:r>
-            <a:endParaRPr lang="de-CH" dirty="0" smtClean="0"/>
+              <a:t>Figuren löschen (und Zerstörung zeichnen)</a:t>
+            </a:r>
           </a:p>
           <a:p>
             <a:pPr lvl="1"/>
@@ -8955,11 +11531,7 @@
             <a:pPr lvl="1"/>
             <a:r>
               <a:rPr lang="de-CH" dirty="0" smtClean="0"/>
-              <a:t>Laserlinien </a:t>
-            </a:r>
-            <a:r>
-              <a:rPr lang="de-CH" dirty="0" smtClean="0"/>
-              <a:t>zeichnen</a:t>
+              <a:t>Laserlinien zeichnen</a:t>
             </a:r>
           </a:p>
           <a:p>
@@ -9001,7 +11573,7 @@
     </p:spTree>
     <p:extLst>
       <p:ext uri="{BB962C8B-B14F-4D97-AF65-F5344CB8AC3E}">
-        <p14:creationId xmlns:p14="http://schemas.microsoft.com/office/powerpoint/2010/main" xmlns="" val="1184306671"/>
+        <p14:creationId xmlns:p14="http://schemas.microsoft.com/office/powerpoint/2010/main" val="1184306671"/>
       </p:ext>
     </p:extLst>
   </p:cSld>
@@ -9011,9 +11583,332 @@
   <p:timing>
     <p:tnLst>
       <p:par>
-        <p:cTn id="1" dur="indefinite" restart="never" nodeType="tmRoot"/>
+        <p:cTn id="1" dur="indefinite" restart="never" nodeType="tmRoot">
+          <p:childTnLst>
+            <p:seq concurrent="1" nextAc="seek">
+              <p:cTn id="2" dur="indefinite" nodeType="mainSeq">
+                <p:childTnLst>
+                  <p:par>
+                    <p:cTn id="3" fill="hold">
+                      <p:stCondLst>
+                        <p:cond delay="indefinite"/>
+                      </p:stCondLst>
+                      <p:childTnLst>
+                        <p:par>
+                          <p:cTn id="4" fill="hold">
+                            <p:stCondLst>
+                              <p:cond delay="0"/>
+                            </p:stCondLst>
+                            <p:childTnLst>
+                              <p:par>
+                                <p:cTn id="5" presetID="1" presetClass="entr" presetSubtype="0" fill="hold" grpId="0" nodeType="clickEffect">
+                                  <p:stCondLst>
+                                    <p:cond delay="0"/>
+                                  </p:stCondLst>
+                                  <p:childTnLst>
+                                    <p:set>
+                                      <p:cBhvr>
+                                        <p:cTn id="6" dur="1" fill="hold">
+                                          <p:stCondLst>
+                                            <p:cond delay="0"/>
+                                          </p:stCondLst>
+                                        </p:cTn>
+                                        <p:tgtEl>
+                                          <p:spTgt spid="3">
+                                            <p:txEl>
+                                              <p:pRg st="0" end="0"/>
+                                            </p:txEl>
+                                          </p:spTgt>
+                                        </p:tgtEl>
+                                        <p:attrNameLst>
+                                          <p:attrName>style.visibility</p:attrName>
+                                        </p:attrNameLst>
+                                      </p:cBhvr>
+                                      <p:to>
+                                        <p:strVal val="visible"/>
+                                      </p:to>
+                                    </p:set>
+                                  </p:childTnLst>
+                                </p:cTn>
+                              </p:par>
+                              <p:par>
+                                <p:cTn id="7" presetID="1" presetClass="entr" presetSubtype="0" fill="hold" grpId="0" nodeType="withEffect">
+                                  <p:stCondLst>
+                                    <p:cond delay="0"/>
+                                  </p:stCondLst>
+                                  <p:childTnLst>
+                                    <p:set>
+                                      <p:cBhvr>
+                                        <p:cTn id="8" dur="1" fill="hold">
+                                          <p:stCondLst>
+                                            <p:cond delay="0"/>
+                                          </p:stCondLst>
+                                        </p:cTn>
+                                        <p:tgtEl>
+                                          <p:spTgt spid="3">
+                                            <p:txEl>
+                                              <p:pRg st="1" end="1"/>
+                                            </p:txEl>
+                                          </p:spTgt>
+                                        </p:tgtEl>
+                                        <p:attrNameLst>
+                                          <p:attrName>style.visibility</p:attrName>
+                                        </p:attrNameLst>
+                                      </p:cBhvr>
+                                      <p:to>
+                                        <p:strVal val="visible"/>
+                                      </p:to>
+                                    </p:set>
+                                  </p:childTnLst>
+                                </p:cTn>
+                              </p:par>
+                              <p:par>
+                                <p:cTn id="9" presetID="1" presetClass="entr" presetSubtype="0" fill="hold" grpId="0" nodeType="withEffect">
+                                  <p:stCondLst>
+                                    <p:cond delay="0"/>
+                                  </p:stCondLst>
+                                  <p:childTnLst>
+                                    <p:set>
+                                      <p:cBhvr>
+                                        <p:cTn id="10" dur="1" fill="hold">
+                                          <p:stCondLst>
+                                            <p:cond delay="0"/>
+                                          </p:stCondLst>
+                                        </p:cTn>
+                                        <p:tgtEl>
+                                          <p:spTgt spid="3">
+                                            <p:txEl>
+                                              <p:pRg st="2" end="2"/>
+                                            </p:txEl>
+                                          </p:spTgt>
+                                        </p:tgtEl>
+                                        <p:attrNameLst>
+                                          <p:attrName>style.visibility</p:attrName>
+                                        </p:attrNameLst>
+                                      </p:cBhvr>
+                                      <p:to>
+                                        <p:strVal val="visible"/>
+                                      </p:to>
+                                    </p:set>
+                                  </p:childTnLst>
+                                </p:cTn>
+                              </p:par>
+                              <p:par>
+                                <p:cTn id="11" presetID="1" presetClass="entr" presetSubtype="0" fill="hold" grpId="0" nodeType="withEffect">
+                                  <p:stCondLst>
+                                    <p:cond delay="0"/>
+                                  </p:stCondLst>
+                                  <p:childTnLst>
+                                    <p:set>
+                                      <p:cBhvr>
+                                        <p:cTn id="12" dur="1" fill="hold">
+                                          <p:stCondLst>
+                                            <p:cond delay="0"/>
+                                          </p:stCondLst>
+                                        </p:cTn>
+                                        <p:tgtEl>
+                                          <p:spTgt spid="3">
+                                            <p:txEl>
+                                              <p:pRg st="3" end="3"/>
+                                            </p:txEl>
+                                          </p:spTgt>
+                                        </p:tgtEl>
+                                        <p:attrNameLst>
+                                          <p:attrName>style.visibility</p:attrName>
+                                        </p:attrNameLst>
+                                      </p:cBhvr>
+                                      <p:to>
+                                        <p:strVal val="visible"/>
+                                      </p:to>
+                                    </p:set>
+                                  </p:childTnLst>
+                                </p:cTn>
+                              </p:par>
+                              <p:par>
+                                <p:cTn id="13" presetID="1" presetClass="entr" presetSubtype="0" fill="hold" grpId="0" nodeType="withEffect">
+                                  <p:stCondLst>
+                                    <p:cond delay="0"/>
+                                  </p:stCondLst>
+                                  <p:childTnLst>
+                                    <p:set>
+                                      <p:cBhvr>
+                                        <p:cTn id="14" dur="1" fill="hold">
+                                          <p:stCondLst>
+                                            <p:cond delay="0"/>
+                                          </p:stCondLst>
+                                        </p:cTn>
+                                        <p:tgtEl>
+                                          <p:spTgt spid="3">
+                                            <p:txEl>
+                                              <p:pRg st="4" end="4"/>
+                                            </p:txEl>
+                                          </p:spTgt>
+                                        </p:tgtEl>
+                                        <p:attrNameLst>
+                                          <p:attrName>style.visibility</p:attrName>
+                                        </p:attrNameLst>
+                                      </p:cBhvr>
+                                      <p:to>
+                                        <p:strVal val="visible"/>
+                                      </p:to>
+                                    </p:set>
+                                  </p:childTnLst>
+                                </p:cTn>
+                              </p:par>
+                              <p:par>
+                                <p:cTn id="15" presetID="1" presetClass="entr" presetSubtype="0" fill="hold" grpId="0" nodeType="withEffect">
+                                  <p:stCondLst>
+                                    <p:cond delay="0"/>
+                                  </p:stCondLst>
+                                  <p:childTnLst>
+                                    <p:set>
+                                      <p:cBhvr>
+                                        <p:cTn id="16" dur="1" fill="hold">
+                                          <p:stCondLst>
+                                            <p:cond delay="0"/>
+                                          </p:stCondLst>
+                                        </p:cTn>
+                                        <p:tgtEl>
+                                          <p:spTgt spid="3">
+                                            <p:txEl>
+                                              <p:pRg st="5" end="5"/>
+                                            </p:txEl>
+                                          </p:spTgt>
+                                        </p:tgtEl>
+                                        <p:attrNameLst>
+                                          <p:attrName>style.visibility</p:attrName>
+                                        </p:attrNameLst>
+                                      </p:cBhvr>
+                                      <p:to>
+                                        <p:strVal val="visible"/>
+                                      </p:to>
+                                    </p:set>
+                                  </p:childTnLst>
+                                </p:cTn>
+                              </p:par>
+                              <p:par>
+                                <p:cTn id="17" presetID="1" presetClass="entr" presetSubtype="0" fill="hold" grpId="0" nodeType="withEffect">
+                                  <p:stCondLst>
+                                    <p:cond delay="0"/>
+                                  </p:stCondLst>
+                                  <p:childTnLst>
+                                    <p:set>
+                                      <p:cBhvr>
+                                        <p:cTn id="18" dur="1" fill="hold">
+                                          <p:stCondLst>
+                                            <p:cond delay="0"/>
+                                          </p:stCondLst>
+                                        </p:cTn>
+                                        <p:tgtEl>
+                                          <p:spTgt spid="3">
+                                            <p:txEl>
+                                              <p:pRg st="6" end="6"/>
+                                            </p:txEl>
+                                          </p:spTgt>
+                                        </p:tgtEl>
+                                        <p:attrNameLst>
+                                          <p:attrName>style.visibility</p:attrName>
+                                        </p:attrNameLst>
+                                      </p:cBhvr>
+                                      <p:to>
+                                        <p:strVal val="visible"/>
+                                      </p:to>
+                                    </p:set>
+                                  </p:childTnLst>
+                                </p:cTn>
+                              </p:par>
+                              <p:par>
+                                <p:cTn id="19" presetID="1" presetClass="entr" presetSubtype="0" fill="hold" grpId="0" nodeType="withEffect">
+                                  <p:stCondLst>
+                                    <p:cond delay="0"/>
+                                  </p:stCondLst>
+                                  <p:childTnLst>
+                                    <p:set>
+                                      <p:cBhvr>
+                                        <p:cTn id="20" dur="1" fill="hold">
+                                          <p:stCondLst>
+                                            <p:cond delay="0"/>
+                                          </p:stCondLst>
+                                        </p:cTn>
+                                        <p:tgtEl>
+                                          <p:spTgt spid="3">
+                                            <p:txEl>
+                                              <p:pRg st="7" end="7"/>
+                                            </p:txEl>
+                                          </p:spTgt>
+                                        </p:tgtEl>
+                                        <p:attrNameLst>
+                                          <p:attrName>style.visibility</p:attrName>
+                                        </p:attrNameLst>
+                                      </p:cBhvr>
+                                      <p:to>
+                                        <p:strVal val="visible"/>
+                                      </p:to>
+                                    </p:set>
+                                  </p:childTnLst>
+                                </p:cTn>
+                              </p:par>
+                              <p:par>
+                                <p:cTn id="21" presetID="1" presetClass="entr" presetSubtype="0" fill="hold" grpId="0" nodeType="withEffect">
+                                  <p:stCondLst>
+                                    <p:cond delay="0"/>
+                                  </p:stCondLst>
+                                  <p:childTnLst>
+                                    <p:set>
+                                      <p:cBhvr>
+                                        <p:cTn id="22" dur="1" fill="hold">
+                                          <p:stCondLst>
+                                            <p:cond delay="0"/>
+                                          </p:stCondLst>
+                                        </p:cTn>
+                                        <p:tgtEl>
+                                          <p:spTgt spid="3">
+                                            <p:txEl>
+                                              <p:pRg st="8" end="8"/>
+                                            </p:txEl>
+                                          </p:spTgt>
+                                        </p:tgtEl>
+                                        <p:attrNameLst>
+                                          <p:attrName>style.visibility</p:attrName>
+                                        </p:attrNameLst>
+                                      </p:cBhvr>
+                                      <p:to>
+                                        <p:strVal val="visible"/>
+                                      </p:to>
+                                    </p:set>
+                                  </p:childTnLst>
+                                </p:cTn>
+                              </p:par>
+                            </p:childTnLst>
+                          </p:cTn>
+                        </p:par>
+                      </p:childTnLst>
+                    </p:cTn>
+                  </p:par>
+                </p:childTnLst>
+              </p:cTn>
+              <p:prevCondLst>
+                <p:cond evt="onPrev" delay="0">
+                  <p:tgtEl>
+                    <p:sldTgt/>
+                  </p:tgtEl>
+                </p:cond>
+              </p:prevCondLst>
+              <p:nextCondLst>
+                <p:cond evt="onNext" delay="0">
+                  <p:tgtEl>
+                    <p:sldTgt/>
+                  </p:tgtEl>
+                </p:cond>
+              </p:nextCondLst>
+            </p:seq>
+          </p:childTnLst>
+        </p:cTn>
       </p:par>
     </p:tnLst>
+    <p:bldLst>
+      <p:bldP spid="3" grpId="0" build="p"/>
+    </p:bldLst>
   </p:timing>
 </p:sld>
 </file>
@@ -9099,7 +11994,7 @@
     </p:spTree>
     <p:extLst>
       <p:ext uri="{BB962C8B-B14F-4D97-AF65-F5344CB8AC3E}">
-        <p14:creationId xmlns:p14="http://schemas.microsoft.com/office/powerpoint/2010/main" xmlns="" val="3199722868"/>
+        <p14:creationId xmlns:p14="http://schemas.microsoft.com/office/powerpoint/2010/main" val="3199722868"/>
       </p:ext>
     </p:extLst>
   </p:cSld>
@@ -9109,7 +12004,75 @@
   <p:timing>
     <p:tnLst>
       <p:par>
-        <p:cTn id="1" dur="indefinite" restart="never" nodeType="tmRoot"/>
+        <p:cTn id="1" dur="indefinite" restart="never" nodeType="tmRoot">
+          <p:childTnLst>
+            <p:seq concurrent="1" nextAc="seek">
+              <p:cTn id="2" dur="indefinite" nodeType="mainSeq">
+                <p:childTnLst>
+                  <p:par>
+                    <p:cTn id="3" fill="hold">
+                      <p:stCondLst>
+                        <p:cond delay="indefinite"/>
+                      </p:stCondLst>
+                      <p:childTnLst>
+                        <p:par>
+                          <p:cTn id="4" fill="hold">
+                            <p:stCondLst>
+                              <p:cond delay="0"/>
+                            </p:stCondLst>
+                            <p:childTnLst>
+                              <p:par>
+                                <p:cTn id="5" presetID="1" presetClass="entr" presetSubtype="0" fill="hold" nodeType="clickEffect">
+                                  <p:stCondLst>
+                                    <p:cond delay="0"/>
+                                  </p:stCondLst>
+                                  <p:childTnLst>
+                                    <p:set>
+                                      <p:cBhvr>
+                                        <p:cTn id="6" dur="1" fill="hold">
+                                          <p:stCondLst>
+                                            <p:cond delay="0"/>
+                                          </p:stCondLst>
+                                        </p:cTn>
+                                        <p:tgtEl>
+                                          <p:spTgt spid="21507"/>
+                                        </p:tgtEl>
+                                        <p:attrNameLst>
+                                          <p:attrName>style.visibility</p:attrName>
+                                        </p:attrNameLst>
+                                      </p:cBhvr>
+                                      <p:to>
+                                        <p:strVal val="visible"/>
+                                      </p:to>
+                                    </p:set>
+                                  </p:childTnLst>
+                                </p:cTn>
+                              </p:par>
+                            </p:childTnLst>
+                          </p:cTn>
+                        </p:par>
+                      </p:childTnLst>
+                    </p:cTn>
+                  </p:par>
+                </p:childTnLst>
+              </p:cTn>
+              <p:prevCondLst>
+                <p:cond evt="onPrev" delay="0">
+                  <p:tgtEl>
+                    <p:sldTgt/>
+                  </p:tgtEl>
+                </p:cond>
+              </p:prevCondLst>
+              <p:nextCondLst>
+                <p:cond evt="onNext" delay="0">
+                  <p:tgtEl>
+                    <p:sldTgt/>
+                  </p:tgtEl>
+                </p:cond>
+              </p:nextCondLst>
+            </p:seq>
+          </p:childTnLst>
+        </p:cTn>
       </p:par>
     </p:tnLst>
   </p:timing>

</xml_diff>

<commit_message>
last update on PPTX
</commit_message>
<xml_diff>
--- a/docs/LaserChess.pptx
+++ b/docs/LaserChess.pptx
@@ -376,7 +376,7 @@
     </p:spTree>
     <p:extLst>
       <p:ext uri="{BB962C8B-B14F-4D97-AF65-F5344CB8AC3E}">
-        <p14:creationId xmlns:p14="http://schemas.microsoft.com/office/powerpoint/2010/main" val="352693751"/>
+        <p14:creationId xmlns:p14="http://schemas.microsoft.com/office/powerpoint/2010/main" xmlns="" val="352693751"/>
       </p:ext>
     </p:extLst>
   </p:cSld>
@@ -5110,7 +5110,7 @@
     </p:spTree>
     <p:extLst>
       <p:ext uri="{BB962C8B-B14F-4D97-AF65-F5344CB8AC3E}">
-        <p14:creationId xmlns:p14="http://schemas.microsoft.com/office/powerpoint/2010/main" val="1704400666"/>
+        <p14:creationId xmlns:p14="http://schemas.microsoft.com/office/powerpoint/2010/main" xmlns="" val="1704400666"/>
       </p:ext>
     </p:extLst>
   </p:cSld>
@@ -6171,7 +6171,7 @@
     </p:spTree>
     <p:extLst>
       <p:ext uri="{BB962C8B-B14F-4D97-AF65-F5344CB8AC3E}">
-        <p14:creationId xmlns:p14="http://schemas.microsoft.com/office/powerpoint/2010/main" val="3199722868"/>
+        <p14:creationId xmlns:p14="http://schemas.microsoft.com/office/powerpoint/2010/main" xmlns="" val="3199722868"/>
       </p:ext>
     </p:extLst>
   </p:cSld>
@@ -6720,7 +6720,7 @@
     </p:spTree>
     <p:extLst>
       <p:ext uri="{BB962C8B-B14F-4D97-AF65-F5344CB8AC3E}">
-        <p14:creationId xmlns:p14="http://schemas.microsoft.com/office/powerpoint/2010/main" val="3199722868"/>
+        <p14:creationId xmlns:p14="http://schemas.microsoft.com/office/powerpoint/2010/main" xmlns="" val="3199722868"/>
       </p:ext>
     </p:extLst>
   </p:cSld>
@@ -7255,7 +7255,15 @@
           <a:p>
             <a:r>
               <a:rPr lang="de-CH" dirty="0" smtClean="0"/>
-              <a:t>Version 1.0 getestet</a:t>
+              <a:t>Version </a:t>
+            </a:r>
+            <a:r>
+              <a:rPr lang="de-CH" dirty="0" smtClean="0"/>
+              <a:t>1.0: mit Tag versehen, </a:t>
+            </a:r>
+            <a:r>
+              <a:rPr lang="de-CH" dirty="0" smtClean="0"/>
+              <a:t>getestet</a:t>
             </a:r>
           </a:p>
           <a:p>
@@ -7267,8 +7275,13 @@
           <a:p>
             <a:r>
               <a:rPr lang="de-CH" dirty="0" smtClean="0"/>
-              <a:t>Version 1.1 getestet</a:t>
-            </a:r>
+              <a:t>Version 1.1 </a:t>
+            </a:r>
+            <a:r>
+              <a:rPr lang="de-CH" dirty="0" smtClean="0"/>
+              <a:t>mit Tag versehen, getestet</a:t>
+            </a:r>
+            <a:endParaRPr lang="de-CH" dirty="0" smtClean="0"/>
           </a:p>
           <a:p>
             <a:r>
@@ -7390,7 +7403,7 @@
     </p:spTree>
     <p:extLst>
       <p:ext uri="{BB962C8B-B14F-4D97-AF65-F5344CB8AC3E}">
-        <p14:creationId xmlns:p14="http://schemas.microsoft.com/office/powerpoint/2010/main" val="1300663606"/>
+        <p14:creationId xmlns:p14="http://schemas.microsoft.com/office/powerpoint/2010/main" xmlns="" val="1300663606"/>
       </p:ext>
     </p:extLst>
   </p:cSld>
@@ -7448,21 +7461,43 @@
                                   </p:childTnLst>
                                 </p:cTn>
                               </p:par>
+                            </p:childTnLst>
+                          </p:cTn>
+                        </p:par>
+                      </p:childTnLst>
+                    </p:cTn>
+                  </p:par>
+                  <p:par>
+                    <p:cTn id="7" fill="hold">
+                      <p:stCondLst>
+                        <p:cond delay="indefinite"/>
+                      </p:stCondLst>
+                      <p:childTnLst>
+                        <p:par>
+                          <p:cTn id="8" fill="hold">
+                            <p:stCondLst>
+                              <p:cond delay="0"/>
+                            </p:stCondLst>
+                            <p:childTnLst>
                               <p:par>
-                                <p:cTn id="7" presetID="1" presetClass="entr" presetSubtype="0" fill="hold" nodeType="withEffect">
+                                <p:cTn id="9" presetID="1" presetClass="entr" presetSubtype="0" fill="hold" grpId="0" nodeType="clickEffect">
                                   <p:stCondLst>
                                     <p:cond delay="0"/>
                                   </p:stCondLst>
                                   <p:childTnLst>
                                     <p:set>
                                       <p:cBhvr>
-                                        <p:cTn id="8" dur="1" fill="hold">
+                                        <p:cTn id="10" dur="1" fill="hold">
                                           <p:stCondLst>
                                             <p:cond delay="0"/>
                                           </p:stCondLst>
                                         </p:cTn>
                                         <p:tgtEl>
-                                          <p:spTgt spid="20482"/>
+                                          <p:spTgt spid="3">
+                                            <p:txEl>
+                                              <p:pRg st="1" end="1"/>
+                                            </p:txEl>
+                                          </p:spTgt>
                                         </p:tgtEl>
                                         <p:attrNameLst>
                                           <p:attrName>style.visibility</p:attrName>
@@ -7475,26 +7510,8 @@
                                   </p:childTnLst>
                                 </p:cTn>
                               </p:par>
-                            </p:childTnLst>
-                          </p:cTn>
-                        </p:par>
-                      </p:childTnLst>
-                    </p:cTn>
-                  </p:par>
-                  <p:par>
-                    <p:cTn id="9" fill="hold">
-                      <p:stCondLst>
-                        <p:cond delay="indefinite"/>
-                      </p:stCondLst>
-                      <p:childTnLst>
-                        <p:par>
-                          <p:cTn id="10" fill="hold">
-                            <p:stCondLst>
-                              <p:cond delay="0"/>
-                            </p:stCondLst>
-                            <p:childTnLst>
                               <p:par>
-                                <p:cTn id="11" presetID="1" presetClass="entr" presetSubtype="0" fill="hold" grpId="0" nodeType="clickEffect">
+                                <p:cTn id="11" presetID="1" presetClass="entr" presetSubtype="0" fill="hold" nodeType="withEffect">
                                   <p:stCondLst>
                                     <p:cond delay="0"/>
                                   </p:stCondLst>
@@ -7507,11 +7524,7 @@
                                           </p:stCondLst>
                                         </p:cTn>
                                         <p:tgtEl>
-                                          <p:spTgt spid="3">
-                                            <p:txEl>
-                                              <p:pRg st="1" end="1"/>
-                                            </p:txEl>
-                                          </p:spTgt>
+                                          <p:spTgt spid="20482"/>
                                         </p:tgtEl>
                                         <p:attrNameLst>
                                           <p:attrName>style.visibility</p:attrName>
@@ -7844,7 +7857,7 @@
     </p:spTree>
     <p:extLst>
       <p:ext uri="{BB962C8B-B14F-4D97-AF65-F5344CB8AC3E}">
-        <p14:creationId xmlns:p14="http://schemas.microsoft.com/office/powerpoint/2010/main" val="1595990863"/>
+        <p14:creationId xmlns:p14="http://schemas.microsoft.com/office/powerpoint/2010/main" xmlns="" val="1595990863"/>
       </p:ext>
     </p:extLst>
   </p:cSld>
@@ -7991,7 +8004,7 @@
     </p:spTree>
     <p:extLst>
       <p:ext uri="{BB962C8B-B14F-4D97-AF65-F5344CB8AC3E}">
-        <p14:creationId xmlns:p14="http://schemas.microsoft.com/office/powerpoint/2010/main" val="1387166899"/>
+        <p14:creationId xmlns:p14="http://schemas.microsoft.com/office/powerpoint/2010/main" xmlns="" val="1387166899"/>
       </p:ext>
     </p:extLst>
   </p:cSld>
@@ -8533,7 +8546,7 @@
           <a:blip r:embed="rId2" cstate="print">
             <a:extLst>
               <a:ext uri="{BEBA8EAE-BF5A-486C-A8C5-ECC9F3942E4B}">
-                <a14:imgProps xmlns:a14="http://schemas.microsoft.com/office/drawing/2010/main">
+                <a14:imgProps xmlns:a14="http://schemas.microsoft.com/office/drawing/2010/main" xmlns="">
                   <a14:imgLayer r:embed="rId3">
                     <a14:imgEffect>
                       <a14:backgroundRemoval t="0" b="100000" l="0" r="100000"/>
@@ -8542,7 +8555,7 @@
                 </a14:imgProps>
               </a:ext>
               <a:ext uri="{28A0092B-C50C-407E-A947-70E740481C1C}">
-                <a14:useLocalDpi xmlns:a14="http://schemas.microsoft.com/office/drawing/2010/main" val="0"/>
+                <a14:useLocalDpi xmlns:a14="http://schemas.microsoft.com/office/drawing/2010/main" xmlns="" val="0"/>
               </a:ext>
             </a:extLst>
           </a:blip>
@@ -8566,14 +8579,14 @@
           <a:effectLst/>
           <a:extLst>
             <a:ext uri="{909E8E84-426E-40DD-AFC4-6F175D3DCCD1}">
-              <a14:hiddenFill xmlns:a14="http://schemas.microsoft.com/office/drawing/2010/main">
+              <a14:hiddenFill xmlns:a14="http://schemas.microsoft.com/office/drawing/2010/main" xmlns="">
                 <a:solidFill>
                   <a:schemeClr val="accent1"/>
                 </a:solidFill>
               </a14:hiddenFill>
             </a:ext>
             <a:ext uri="{91240B29-F687-4F45-9708-019B960494DF}">
-              <a14:hiddenLine xmlns:a14="http://schemas.microsoft.com/office/drawing/2010/main" w="9525">
+              <a14:hiddenLine xmlns:a14="http://schemas.microsoft.com/office/drawing/2010/main" xmlns="" w="9525">
                 <a:solidFill>
                   <a:schemeClr val="tx1"/>
                 </a:solidFill>
@@ -8583,7 +8596,7 @@
               </a14:hiddenLine>
             </a:ext>
             <a:ext uri="{AF507438-7753-43E0-B8FC-AC1667EBCBE1}">
-              <a14:hiddenEffects xmlns:a14="http://schemas.microsoft.com/office/drawing/2010/main">
+              <a14:hiddenEffects xmlns:a14="http://schemas.microsoft.com/office/drawing/2010/main" xmlns="">
                 <a:effectLst>
                   <a:outerShdw dist="35921" dir="2700000" algn="ctr" rotWithShape="0">
                     <a:schemeClr val="bg2"/>
@@ -8597,7 +8610,7 @@
     </p:spTree>
     <p:extLst>
       <p:ext uri="{BB962C8B-B14F-4D97-AF65-F5344CB8AC3E}">
-        <p14:creationId xmlns:p14="http://schemas.microsoft.com/office/powerpoint/2010/main" val="1599884037"/>
+        <p14:creationId xmlns:p14="http://schemas.microsoft.com/office/powerpoint/2010/main" xmlns="" val="1599884037"/>
       </p:ext>
     </p:extLst>
   </p:cSld>
@@ -8870,7 +8883,7 @@
           </a:xfrm>
           <a:prstGeom prst="roundRect">
             <a:avLst>
-              <a:gd name="adj" fmla="val 8594"/>
+              <a:gd name="adj" fmla="val 4108"/>
             </a:avLst>
           </a:prstGeom>
           <a:solidFill>
@@ -8936,7 +8949,7 @@
           <a:blip r:embed="rId4" cstate="print">
             <a:extLst>
               <a:ext uri="{28A0092B-C50C-407E-A947-70E740481C1C}">
-                <a14:useLocalDpi xmlns:a14="http://schemas.microsoft.com/office/drawing/2010/main" val="0"/>
+                <a14:useLocalDpi xmlns:a14="http://schemas.microsoft.com/office/drawing/2010/main" xmlns="" val="0"/>
               </a:ext>
             </a:extLst>
           </a:blip>
@@ -8951,7 +8964,7 @@
           </a:xfrm>
           <a:prstGeom prst="roundRect">
             <a:avLst>
-              <a:gd name="adj" fmla="val 8594"/>
+              <a:gd name="adj" fmla="val 3057"/>
             </a:avLst>
           </a:prstGeom>
           <a:solidFill>
@@ -8967,10 +8980,45 @@
           </a:effectLst>
         </p:spPr>
       </p:pic>
+      <p:pic>
+        <p:nvPicPr>
+          <p:cNvPr id="1026" name="Picture 2" descr="D:\Programming\C\LaserChess\docs\CRC.png"/>
+          <p:cNvPicPr>
+            <a:picLocks noChangeAspect="1" noChangeArrowheads="1"/>
+          </p:cNvPicPr>
+          <p:nvPr/>
+        </p:nvPicPr>
+        <p:blipFill>
+          <a:blip r:embed="rId5" cstate="print"/>
+          <a:srcRect/>
+          <a:stretch>
+            <a:fillRect/>
+          </a:stretch>
+        </p:blipFill>
+        <p:spPr bwMode="auto">
+          <a:xfrm>
+            <a:off x="3779912" y="1124744"/>
+            <a:ext cx="5040560" cy="3917916"/>
+          </a:xfrm>
+          <a:prstGeom prst="roundRect">
+            <a:avLst>
+              <a:gd name="adj" fmla="val 3650"/>
+            </a:avLst>
+          </a:prstGeom>
+          <a:noFill/>
+          <a:effectLst>
+            <a:outerShdw blurRad="50800" dist="38100" dir="2700000" algn="tl" rotWithShape="0">
+              <a:prstClr val="black">
+                <a:alpha val="40000"/>
+              </a:prstClr>
+            </a:outerShdw>
+          </a:effectLst>
+        </p:spPr>
+      </p:pic>
     </p:spTree>
     <p:extLst>
       <p:ext uri="{BB962C8B-B14F-4D97-AF65-F5344CB8AC3E}">
-        <p14:creationId xmlns:p14="http://schemas.microsoft.com/office/powerpoint/2010/main" val="2756733679"/>
+        <p14:creationId xmlns:p14="http://schemas.microsoft.com/office/powerpoint/2010/main" xmlns="" val="2756733679"/>
       </p:ext>
     </p:extLst>
   </p:cSld>
@@ -9221,7 +9269,7 @@
                             </p:stCondLst>
                             <p:childTnLst>
                               <p:par>
-                                <p:cTn id="23" presetID="1" presetClass="entr" presetSubtype="0" fill="hold" grpId="0" nodeType="clickEffect">
+                                <p:cTn id="23" presetID="10" presetClass="entr" presetSubtype="0" fill="hold" nodeType="clickEffect">
                                   <p:stCondLst>
                                     <p:cond delay="0"/>
                                   </p:stCondLst>
@@ -9229,6 +9277,59 @@
                                     <p:set>
                                       <p:cBhvr>
                                         <p:cTn id="24" dur="1" fill="hold">
+                                          <p:stCondLst>
+                                            <p:cond delay="0"/>
+                                          </p:stCondLst>
+                                        </p:cTn>
+                                        <p:tgtEl>
+                                          <p:spTgt spid="1026"/>
+                                        </p:tgtEl>
+                                        <p:attrNameLst>
+                                          <p:attrName>style.visibility</p:attrName>
+                                        </p:attrNameLst>
+                                      </p:cBhvr>
+                                      <p:to>
+                                        <p:strVal val="visible"/>
+                                      </p:to>
+                                    </p:set>
+                                    <p:animEffect transition="in" filter="fade">
+                                      <p:cBhvr>
+                                        <p:cTn id="25" dur="500"/>
+                                        <p:tgtEl>
+                                          <p:spTgt spid="1026"/>
+                                        </p:tgtEl>
+                                      </p:cBhvr>
+                                    </p:animEffect>
+                                  </p:childTnLst>
+                                </p:cTn>
+                              </p:par>
+                            </p:childTnLst>
+                          </p:cTn>
+                        </p:par>
+                      </p:childTnLst>
+                    </p:cTn>
+                  </p:par>
+                  <p:par>
+                    <p:cTn id="26" fill="hold">
+                      <p:stCondLst>
+                        <p:cond delay="indefinite"/>
+                      </p:stCondLst>
+                      <p:childTnLst>
+                        <p:par>
+                          <p:cTn id="27" fill="hold">
+                            <p:stCondLst>
+                              <p:cond delay="0"/>
+                            </p:stCondLst>
+                            <p:childTnLst>
+                              <p:par>
+                                <p:cTn id="28" presetID="1" presetClass="entr" presetSubtype="0" fill="hold" grpId="0" nodeType="clickEffect">
+                                  <p:stCondLst>
+                                    <p:cond delay="0"/>
+                                  </p:stCondLst>
+                                  <p:childTnLst>
+                                    <p:set>
+                                      <p:cBhvr>
+                                        <p:cTn id="29" dur="1" fill="hold">
                                           <p:stCondLst>
                                             <p:cond delay="0"/>
                                           </p:stCondLst>
@@ -9252,14 +9353,41 @@
                                 </p:cTn>
                               </p:par>
                               <p:par>
-                                <p:cTn id="25" presetID="10" presetClass="exit" presetSubtype="0" fill="hold" nodeType="withEffect">
+                                <p:cTn id="30" presetID="1" presetClass="exit" presetSubtype="0" fill="hold" nodeType="withEffect">
+                                  <p:stCondLst>
+                                    <p:cond delay="0"/>
+                                  </p:stCondLst>
+                                  <p:childTnLst>
+                                    <p:set>
+                                      <p:cBhvr>
+                                        <p:cTn id="31" dur="1" fill="hold">
+                                          <p:stCondLst>
+                                            <p:cond delay="0"/>
+                                          </p:stCondLst>
+                                        </p:cTn>
+                                        <p:tgtEl>
+                                          <p:spTgt spid="1026"/>
+                                        </p:tgtEl>
+                                        <p:attrNameLst>
+                                          <p:attrName>style.visibility</p:attrName>
+                                        </p:attrNameLst>
+                                      </p:cBhvr>
+                                      <p:to>
+                                        <p:strVal val="hidden"/>
+                                      </p:to>
+                                    </p:set>
+                                  </p:childTnLst>
+                                </p:cTn>
+                              </p:par>
+                              <p:par>
+                                <p:cTn id="32" presetID="10" presetClass="exit" presetSubtype="0" fill="hold" nodeType="withEffect">
                                   <p:stCondLst>
                                     <p:cond delay="0"/>
                                   </p:stCondLst>
                                   <p:childTnLst>
                                     <p:animEffect transition="out" filter="fade">
                                       <p:cBhvr>
-                                        <p:cTn id="26" dur="500"/>
+                                        <p:cTn id="33" dur="500"/>
                                         <p:tgtEl>
                                           <p:spTgt spid="6"/>
                                         </p:tgtEl>
@@ -9267,7 +9395,7 @@
                                     </p:animEffect>
                                     <p:set>
                                       <p:cBhvr>
-                                        <p:cTn id="27" dur="1" fill="hold">
+                                        <p:cTn id="34" dur="1" fill="hold">
                                           <p:stCondLst>
                                             <p:cond delay="499"/>
                                           </p:stCondLst>
@@ -9290,20 +9418,20 @@
                           </p:cTn>
                         </p:par>
                         <p:par>
-                          <p:cTn id="28" fill="hold">
+                          <p:cTn id="35" fill="hold">
                             <p:stCondLst>
                               <p:cond delay="500"/>
                             </p:stCondLst>
                             <p:childTnLst>
                               <p:par>
-                                <p:cTn id="29" presetID="1" presetClass="entr" presetSubtype="0" fill="hold" nodeType="afterEffect">
+                                <p:cTn id="36" presetID="1" presetClass="entr" presetSubtype="0" fill="hold" nodeType="afterEffect">
                                   <p:stCondLst>
                                     <p:cond delay="0"/>
                                   </p:stCondLst>
                                   <p:childTnLst>
                                     <p:set>
                                       <p:cBhvr>
-                                        <p:cTn id="30" dur="1" fill="hold">
+                                        <p:cTn id="37" dur="1" fill="hold">
                                           <p:stCondLst>
                                             <p:cond delay="0"/>
                                           </p:stCondLst>
@@ -9329,26 +9457,26 @@
                     </p:cTn>
                   </p:par>
                   <p:par>
-                    <p:cTn id="31" fill="hold">
+                    <p:cTn id="38" fill="hold">
                       <p:stCondLst>
                         <p:cond delay="indefinite"/>
                       </p:stCondLst>
                       <p:childTnLst>
                         <p:par>
-                          <p:cTn id="32" fill="hold">
+                          <p:cTn id="39" fill="hold">
                             <p:stCondLst>
                               <p:cond delay="0"/>
                             </p:stCondLst>
                             <p:childTnLst>
                               <p:par>
-                                <p:cTn id="33" presetID="1" presetClass="entr" presetSubtype="0" fill="hold" grpId="0" nodeType="clickEffect">
+                                <p:cTn id="40" presetID="1" presetClass="entr" presetSubtype="0" fill="hold" grpId="0" nodeType="clickEffect">
                                   <p:stCondLst>
                                     <p:cond delay="0"/>
                                   </p:stCondLst>
                                   <p:childTnLst>
                                     <p:set>
                                       <p:cBhvr>
-                                        <p:cTn id="34" dur="1" fill="hold">
+                                        <p:cTn id="41" dur="1" fill="hold">
                                           <p:stCondLst>
                                             <p:cond delay="0"/>
                                           </p:stCondLst>
@@ -9372,14 +9500,14 @@
                                 </p:cTn>
                               </p:par>
                               <p:par>
-                                <p:cTn id="35" presetID="1" presetClass="entr" presetSubtype="0" fill="hold" nodeType="withEffect">
+                                <p:cTn id="42" presetID="1" presetClass="entr" presetSubtype="0" fill="hold" nodeType="withEffect">
                                   <p:stCondLst>
                                     <p:cond delay="0"/>
                                   </p:stCondLst>
                                   <p:childTnLst>
                                     <p:set>
                                       <p:cBhvr>
-                                        <p:cTn id="36" dur="1" fill="hold">
+                                        <p:cTn id="43" dur="1" fill="hold">
                                           <p:stCondLst>
                                             <p:cond delay="0"/>
                                           </p:stCondLst>
@@ -9539,7 +9667,7 @@
     </p:spTree>
     <p:extLst>
       <p:ext uri="{BB962C8B-B14F-4D97-AF65-F5344CB8AC3E}">
-        <p14:creationId xmlns:p14="http://schemas.microsoft.com/office/powerpoint/2010/main" val="1334996816"/>
+        <p14:creationId xmlns:p14="http://schemas.microsoft.com/office/powerpoint/2010/main" xmlns="" val="1334996816"/>
       </p:ext>
     </p:extLst>
   </p:cSld>
@@ -9795,10 +9923,10 @@
             <p:nvPr/>
           </p:nvPicPr>
           <p:blipFill>
-            <a:blip r:embed="rId2">
+            <a:blip r:embed="rId2" cstate="print">
               <a:extLst>
                 <a:ext uri="{28A0092B-C50C-407E-A947-70E740481C1C}">
-                  <a14:useLocalDpi xmlns:a14="http://schemas.microsoft.com/office/drawing/2010/main" val="0"/>
+                  <a14:useLocalDpi xmlns:a14="http://schemas.microsoft.com/office/drawing/2010/main" xmlns="" val="0"/>
                 </a:ext>
               </a:extLst>
             </a:blip>
@@ -10370,10 +10498,10 @@
           <p:nvPr/>
         </p:nvPicPr>
         <p:blipFill rotWithShape="1">
-          <a:blip r:embed="rId3">
+          <a:blip r:embed="rId3" cstate="print">
             <a:extLst>
               <a:ext uri="{28A0092B-C50C-407E-A947-70E740481C1C}">
-                <a14:useLocalDpi xmlns:a14="http://schemas.microsoft.com/office/drawing/2010/main" val="0"/>
+                <a14:useLocalDpi xmlns:a14="http://schemas.microsoft.com/office/drawing/2010/main" xmlns="" val="0"/>
               </a:ext>
             </a:extLst>
           </a:blip>
@@ -10395,14 +10523,14 @@
           <a:effectLst/>
           <a:extLst>
             <a:ext uri="{909E8E84-426E-40DD-AFC4-6F175D3DCCD1}">
-              <a14:hiddenFill xmlns:a14="http://schemas.microsoft.com/office/drawing/2010/main">
+              <a14:hiddenFill xmlns:a14="http://schemas.microsoft.com/office/drawing/2010/main" xmlns="">
                 <a:solidFill>
                   <a:schemeClr val="accent1"/>
                 </a:solidFill>
               </a14:hiddenFill>
             </a:ext>
             <a:ext uri="{91240B29-F687-4F45-9708-019B960494DF}">
-              <a14:hiddenLine xmlns:a14="http://schemas.microsoft.com/office/drawing/2010/main" w="9525">
+              <a14:hiddenLine xmlns:a14="http://schemas.microsoft.com/office/drawing/2010/main" xmlns="" w="9525">
                 <a:solidFill>
                   <a:schemeClr val="tx1"/>
                 </a:solidFill>
@@ -10412,7 +10540,7 @@
               </a14:hiddenLine>
             </a:ext>
             <a:ext uri="{AF507438-7753-43E0-B8FC-AC1667EBCBE1}">
-              <a14:hiddenEffects xmlns:a14="http://schemas.microsoft.com/office/drawing/2010/main">
+              <a14:hiddenEffects xmlns:a14="http://schemas.microsoft.com/office/drawing/2010/main" xmlns="">
                 <a:effectLst>
                   <a:outerShdw dist="35921" dir="2700000" algn="ctr" rotWithShape="0">
                     <a:schemeClr val="bg2"/>
@@ -10426,7 +10554,7 @@
     </p:spTree>
     <p:extLst>
       <p:ext uri="{BB962C8B-B14F-4D97-AF65-F5344CB8AC3E}">
-        <p14:creationId xmlns:p14="http://schemas.microsoft.com/office/powerpoint/2010/main" val="3986502252"/>
+        <p14:creationId xmlns:p14="http://schemas.microsoft.com/office/powerpoint/2010/main" xmlns="" val="3986502252"/>
       </p:ext>
     </p:extLst>
   </p:cSld>
@@ -11023,7 +11151,7 @@
     </p:spTree>
     <p:extLst>
       <p:ext uri="{BB962C8B-B14F-4D97-AF65-F5344CB8AC3E}">
-        <p14:creationId xmlns:p14="http://schemas.microsoft.com/office/powerpoint/2010/main" val="3950922658"/>
+        <p14:creationId xmlns:p14="http://schemas.microsoft.com/office/powerpoint/2010/main" xmlns="" val="3950922658"/>
       </p:ext>
     </p:extLst>
   </p:cSld>
@@ -11573,7 +11701,7 @@
     </p:spTree>
     <p:extLst>
       <p:ext uri="{BB962C8B-B14F-4D97-AF65-F5344CB8AC3E}">
-        <p14:creationId xmlns:p14="http://schemas.microsoft.com/office/powerpoint/2010/main" val="1184306671"/>
+        <p14:creationId xmlns:p14="http://schemas.microsoft.com/office/powerpoint/2010/main" xmlns="" val="1184306671"/>
       </p:ext>
     </p:extLst>
   </p:cSld>
@@ -11994,7 +12122,7 @@
     </p:spTree>
     <p:extLst>
       <p:ext uri="{BB962C8B-B14F-4D97-AF65-F5344CB8AC3E}">
-        <p14:creationId xmlns:p14="http://schemas.microsoft.com/office/powerpoint/2010/main" val="3199722868"/>
+        <p14:creationId xmlns:p14="http://schemas.microsoft.com/office/powerpoint/2010/main" xmlns="" val="3199722868"/>
       </p:ext>
     </p:extLst>
   </p:cSld>

</xml_diff>